<commit_message>
working on formalizing the all IVC method
</commit_message>
<xml_diff>
--- a/all_ivcs/all_ivcs_TEX/figs/figs.pptx
+++ b/all_ivcs/all_ivcs_TEX/figs/figs.pptx
@@ -6,9 +6,10 @@
   </p:sldMasterIdLst>
   <p:sldIdLst>
     <p:sldId id="256" r:id="rId2"/>
-    <p:sldId id="257" r:id="rId3"/>
-    <p:sldId id="258" r:id="rId4"/>
-    <p:sldId id="259" r:id="rId5"/>
+    <p:sldId id="260" r:id="rId3"/>
+    <p:sldId id="257" r:id="rId4"/>
+    <p:sldId id="258" r:id="rId5"/>
+    <p:sldId id="259" r:id="rId6"/>
   </p:sldIdLst>
   <p:sldSz cx="12192000" cy="6858000"/>
   <p:notesSz cx="6858000" cy="9144000"/>
@@ -246,7 +247,7 @@
           <a:p>
             <a:fld id="{5A779009-EA30-43A9-A43B-F006CC3D9B84}" type="datetimeFigureOut">
               <a:rPr lang="en-US" smtClean="0"/>
-              <a:t>8/25/2016</a:t>
+              <a:t>1/8/2017</a:t>
             </a:fld>
             <a:endParaRPr lang="en-US"/>
           </a:p>
@@ -416,7 +417,7 @@
           <a:p>
             <a:fld id="{5A779009-EA30-43A9-A43B-F006CC3D9B84}" type="datetimeFigureOut">
               <a:rPr lang="en-US" smtClean="0"/>
-              <a:t>8/25/2016</a:t>
+              <a:t>1/8/2017</a:t>
             </a:fld>
             <a:endParaRPr lang="en-US"/>
           </a:p>
@@ -596,7 +597,7 @@
           <a:p>
             <a:fld id="{5A779009-EA30-43A9-A43B-F006CC3D9B84}" type="datetimeFigureOut">
               <a:rPr lang="en-US" smtClean="0"/>
-              <a:t>8/25/2016</a:t>
+              <a:t>1/8/2017</a:t>
             </a:fld>
             <a:endParaRPr lang="en-US"/>
           </a:p>
@@ -766,7 +767,7 @@
           <a:p>
             <a:fld id="{5A779009-EA30-43A9-A43B-F006CC3D9B84}" type="datetimeFigureOut">
               <a:rPr lang="en-US" smtClean="0"/>
-              <a:t>8/25/2016</a:t>
+              <a:t>1/8/2017</a:t>
             </a:fld>
             <a:endParaRPr lang="en-US"/>
           </a:p>
@@ -1012,7 +1013,7 @@
           <a:p>
             <a:fld id="{5A779009-EA30-43A9-A43B-F006CC3D9B84}" type="datetimeFigureOut">
               <a:rPr lang="en-US" smtClean="0"/>
-              <a:t>8/25/2016</a:t>
+              <a:t>1/8/2017</a:t>
             </a:fld>
             <a:endParaRPr lang="en-US"/>
           </a:p>
@@ -1244,7 +1245,7 @@
           <a:p>
             <a:fld id="{5A779009-EA30-43A9-A43B-F006CC3D9B84}" type="datetimeFigureOut">
               <a:rPr lang="en-US" smtClean="0"/>
-              <a:t>8/25/2016</a:t>
+              <a:t>1/8/2017</a:t>
             </a:fld>
             <a:endParaRPr lang="en-US"/>
           </a:p>
@@ -1611,7 +1612,7 @@
           <a:p>
             <a:fld id="{5A779009-EA30-43A9-A43B-F006CC3D9B84}" type="datetimeFigureOut">
               <a:rPr lang="en-US" smtClean="0"/>
-              <a:t>8/25/2016</a:t>
+              <a:t>1/8/2017</a:t>
             </a:fld>
             <a:endParaRPr lang="en-US"/>
           </a:p>
@@ -1729,7 +1730,7 @@
           <a:p>
             <a:fld id="{5A779009-EA30-43A9-A43B-F006CC3D9B84}" type="datetimeFigureOut">
               <a:rPr lang="en-US" smtClean="0"/>
-              <a:t>8/25/2016</a:t>
+              <a:t>1/8/2017</a:t>
             </a:fld>
             <a:endParaRPr lang="en-US"/>
           </a:p>
@@ -1824,7 +1825,7 @@
           <a:p>
             <a:fld id="{5A779009-EA30-43A9-A43B-F006CC3D9B84}" type="datetimeFigureOut">
               <a:rPr lang="en-US" smtClean="0"/>
-              <a:t>8/25/2016</a:t>
+              <a:t>1/8/2017</a:t>
             </a:fld>
             <a:endParaRPr lang="en-US"/>
           </a:p>
@@ -2101,7 +2102,7 @@
           <a:p>
             <a:fld id="{5A779009-EA30-43A9-A43B-F006CC3D9B84}" type="datetimeFigureOut">
               <a:rPr lang="en-US" smtClean="0"/>
-              <a:t>8/25/2016</a:t>
+              <a:t>1/8/2017</a:t>
             </a:fld>
             <a:endParaRPr lang="en-US"/>
           </a:p>
@@ -2354,7 +2355,7 @@
           <a:p>
             <a:fld id="{5A779009-EA30-43A9-A43B-F006CC3D9B84}" type="datetimeFigureOut">
               <a:rPr lang="en-US" smtClean="0"/>
-              <a:t>8/25/2016</a:t>
+              <a:t>1/8/2017</a:t>
             </a:fld>
             <a:endParaRPr lang="en-US"/>
           </a:p>
@@ -2567,7 +2568,7 @@
           <a:p>
             <a:fld id="{5A779009-EA30-43A9-A43B-F006CC3D9B84}" type="datetimeFigureOut">
               <a:rPr lang="en-US" smtClean="0"/>
-              <a:t>8/25/2016</a:t>
+              <a:t>1/8/2017</a:t>
             </a:fld>
             <a:endParaRPr lang="en-US"/>
           </a:p>
@@ -3024,6 +3025,615 @@
 </file>
 
 <file path=ppt/slides/slide2.xml><?xml version="1.0" encoding="utf-8"?>
+<p:sld xmlns:a="http://schemas.openxmlformats.org/drawingml/2006/main" xmlns:r="http://schemas.openxmlformats.org/officeDocument/2006/relationships" xmlns:p="http://schemas.openxmlformats.org/presentationml/2006/main">
+  <p:cSld>
+    <p:spTree>
+      <p:nvGrpSpPr>
+        <p:cNvPr id="1" name=""/>
+        <p:cNvGrpSpPr/>
+        <p:nvPr/>
+      </p:nvGrpSpPr>
+      <p:grpSpPr>
+        <a:xfrm>
+          <a:off x="0" y="0"/>
+          <a:ext cx="0" cy="0"/>
+          <a:chOff x="0" y="0"/>
+          <a:chExt cx="0" cy="0"/>
+        </a:xfrm>
+      </p:grpSpPr>
+      <p:sp>
+        <p:nvSpPr>
+          <p:cNvPr id="6" name="Rectangle 5"/>
+          <p:cNvSpPr/>
+          <p:nvPr/>
+        </p:nvSpPr>
+        <p:spPr>
+          <a:xfrm>
+            <a:off x="5852436" y="4943726"/>
+            <a:ext cx="338554" cy="400110"/>
+          </a:xfrm>
+          <a:prstGeom prst="rect">
+            <a:avLst/>
+          </a:prstGeom>
+        </p:spPr>
+        <p:txBody>
+          <a:bodyPr wrap="none">
+            <a:spAutoFit/>
+          </a:bodyPr>
+          <a:lstStyle/>
+          <a:p>
+            <a:r>
+              <a:rPr lang="en-US" sz="2000" dirty="0" smtClean="0">
+                <a:solidFill>
+                  <a:srgbClr val="C00000"/>
+                </a:solidFill>
+                <a:latin typeface="Courier New" panose="02070309020205020404" pitchFamily="49" charset="0"/>
+                <a:cs typeface="Courier New" panose="02070309020205020404" pitchFamily="49" charset="0"/>
+              </a:rPr>
+              <a:t>P</a:t>
+            </a:r>
+            <a:endParaRPr lang="en-US" sz="2000" dirty="0">
+              <a:latin typeface="Courier New" panose="02070309020205020404" pitchFamily="49" charset="0"/>
+              <a:cs typeface="Courier New" panose="02070309020205020404" pitchFamily="49" charset="0"/>
+            </a:endParaRPr>
+          </a:p>
+        </p:txBody>
+      </p:sp>
+      <p:sp>
+        <p:nvSpPr>
+          <p:cNvPr id="7" name="Rectangle 6"/>
+          <p:cNvSpPr/>
+          <p:nvPr/>
+        </p:nvSpPr>
+        <p:spPr>
+          <a:xfrm>
+            <a:off x="5497792" y="2742506"/>
+            <a:ext cx="954107" cy="400110"/>
+          </a:xfrm>
+          <a:prstGeom prst="rect">
+            <a:avLst/>
+          </a:prstGeom>
+        </p:spPr>
+        <p:txBody>
+          <a:bodyPr wrap="none">
+            <a:spAutoFit/>
+          </a:bodyPr>
+          <a:lstStyle/>
+          <a:p>
+            <a:r>
+              <a:rPr lang="en-US" sz="2000" dirty="0" smtClean="0">
+                <a:latin typeface="Courier New" panose="02070309020205020404" pitchFamily="49" charset="0"/>
+                <a:cs typeface="Courier New" panose="02070309020205020404" pitchFamily="49" charset="0"/>
+              </a:rPr>
+              <a:t>below</a:t>
+            </a:r>
+            <a:endParaRPr lang="en-US" sz="2000" dirty="0">
+              <a:latin typeface="Courier New" panose="02070309020205020404" pitchFamily="49" charset="0"/>
+              <a:cs typeface="Courier New" panose="02070309020205020404" pitchFamily="49" charset="0"/>
+            </a:endParaRPr>
+          </a:p>
+        </p:txBody>
+      </p:sp>
+      <p:sp>
+        <p:nvSpPr>
+          <p:cNvPr id="8" name="Rectangle 7"/>
+          <p:cNvSpPr/>
+          <p:nvPr/>
+        </p:nvSpPr>
+        <p:spPr>
+          <a:xfrm>
+            <a:off x="4263585" y="2915197"/>
+            <a:ext cx="492443" cy="400110"/>
+          </a:xfrm>
+          <a:prstGeom prst="rect">
+            <a:avLst/>
+          </a:prstGeom>
+        </p:spPr>
+        <p:txBody>
+          <a:bodyPr wrap="none">
+            <a:spAutoFit/>
+          </a:bodyPr>
+          <a:lstStyle/>
+          <a:p>
+            <a:r>
+              <a:rPr lang="en-US" sz="2000" dirty="0" smtClean="0">
+                <a:latin typeface="Courier New" panose="02070309020205020404" pitchFamily="49" charset="0"/>
+                <a:cs typeface="Courier New" panose="02070309020205020404" pitchFamily="49" charset="0"/>
+              </a:rPr>
+              <a:t>p1</a:t>
+            </a:r>
+            <a:endParaRPr lang="en-US" sz="2000" dirty="0">
+              <a:latin typeface="Courier New" panose="02070309020205020404" pitchFamily="49" charset="0"/>
+              <a:cs typeface="Courier New" panose="02070309020205020404" pitchFamily="49" charset="0"/>
+            </a:endParaRPr>
+          </a:p>
+        </p:txBody>
+      </p:sp>
+      <p:sp>
+        <p:nvSpPr>
+          <p:cNvPr id="9" name="Rectangle 8"/>
+          <p:cNvSpPr/>
+          <p:nvPr/>
+        </p:nvSpPr>
+        <p:spPr>
+          <a:xfrm>
+            <a:off x="7605976" y="3032214"/>
+            <a:ext cx="492443" cy="400110"/>
+          </a:xfrm>
+          <a:prstGeom prst="rect">
+            <a:avLst/>
+          </a:prstGeom>
+        </p:spPr>
+        <p:txBody>
+          <a:bodyPr wrap="none">
+            <a:spAutoFit/>
+          </a:bodyPr>
+          <a:lstStyle/>
+          <a:p>
+            <a:r>
+              <a:rPr lang="en-US" sz="2000" dirty="0" smtClean="0">
+                <a:latin typeface="Courier New" panose="02070309020205020404" pitchFamily="49" charset="0"/>
+                <a:cs typeface="Courier New" panose="02070309020205020404" pitchFamily="49" charset="0"/>
+              </a:rPr>
+              <a:t>c2</a:t>
+            </a:r>
+            <a:endParaRPr lang="en-US" sz="2000" dirty="0">
+              <a:latin typeface="Courier New" panose="02070309020205020404" pitchFamily="49" charset="0"/>
+              <a:cs typeface="Courier New" panose="02070309020205020404" pitchFamily="49" charset="0"/>
+            </a:endParaRPr>
+          </a:p>
+        </p:txBody>
+      </p:sp>
+      <p:sp>
+        <p:nvSpPr>
+          <p:cNvPr id="10" name="Rectangle 9"/>
+          <p:cNvSpPr/>
+          <p:nvPr/>
+        </p:nvSpPr>
+        <p:spPr>
+          <a:xfrm>
+            <a:off x="4538256" y="3478210"/>
+            <a:ext cx="492443" cy="400110"/>
+          </a:xfrm>
+          <a:prstGeom prst="rect">
+            <a:avLst/>
+          </a:prstGeom>
+        </p:spPr>
+        <p:txBody>
+          <a:bodyPr wrap="none">
+            <a:spAutoFit/>
+          </a:bodyPr>
+          <a:lstStyle/>
+          <a:p>
+            <a:r>
+              <a:rPr lang="en-US" sz="2000" dirty="0" smtClean="0">
+                <a:latin typeface="Courier New" panose="02070309020205020404" pitchFamily="49" charset="0"/>
+                <a:cs typeface="Courier New" panose="02070309020205020404" pitchFamily="49" charset="0"/>
+              </a:rPr>
+              <a:t>c1</a:t>
+            </a:r>
+            <a:endParaRPr lang="en-US" sz="2000" dirty="0">
+              <a:latin typeface="Courier New" panose="02070309020205020404" pitchFamily="49" charset="0"/>
+              <a:cs typeface="Courier New" panose="02070309020205020404" pitchFamily="49" charset="0"/>
+            </a:endParaRPr>
+          </a:p>
+        </p:txBody>
+      </p:sp>
+      <p:sp>
+        <p:nvSpPr>
+          <p:cNvPr id="11" name="Rectangle 10"/>
+          <p:cNvSpPr/>
+          <p:nvPr/>
+        </p:nvSpPr>
+        <p:spPr>
+          <a:xfrm>
+            <a:off x="5445596" y="2325011"/>
+            <a:ext cx="1157044" cy="400110"/>
+          </a:xfrm>
+          <a:prstGeom prst="rect">
+            <a:avLst/>
+          </a:prstGeom>
+        </p:spPr>
+        <p:txBody>
+          <a:bodyPr wrap="square">
+            <a:spAutoFit/>
+          </a:bodyPr>
+          <a:lstStyle/>
+          <a:p>
+            <a:r>
+              <a:rPr lang="en-US" sz="2000" dirty="0" smtClean="0">
+                <a:latin typeface="Courier New" panose="02070309020205020404" pitchFamily="49" charset="0"/>
+                <a:cs typeface="Courier New" panose="02070309020205020404" pitchFamily="49" charset="0"/>
+              </a:rPr>
+              <a:t>alarm</a:t>
+            </a:r>
+            <a:endParaRPr lang="en-US" sz="2000" dirty="0">
+              <a:latin typeface="Courier New" panose="02070309020205020404" pitchFamily="49" charset="0"/>
+              <a:cs typeface="Courier New" panose="02070309020205020404" pitchFamily="49" charset="0"/>
+            </a:endParaRPr>
+          </a:p>
+        </p:txBody>
+      </p:sp>
+      <p:sp>
+        <p:nvSpPr>
+          <p:cNvPr id="12" name="Rectangle 11"/>
+          <p:cNvSpPr/>
+          <p:nvPr/>
+        </p:nvSpPr>
+        <p:spPr>
+          <a:xfrm>
+            <a:off x="7313368" y="2454292"/>
+            <a:ext cx="492443" cy="400110"/>
+          </a:xfrm>
+          <a:prstGeom prst="rect">
+            <a:avLst/>
+          </a:prstGeom>
+        </p:spPr>
+        <p:txBody>
+          <a:bodyPr wrap="none">
+            <a:spAutoFit/>
+          </a:bodyPr>
+          <a:lstStyle/>
+          <a:p>
+            <a:r>
+              <a:rPr lang="en-US" sz="2000" dirty="0" smtClean="0">
+                <a:latin typeface="Courier New" panose="02070309020205020404" pitchFamily="49" charset="0"/>
+                <a:cs typeface="Courier New" panose="02070309020205020404" pitchFamily="49" charset="0"/>
+              </a:rPr>
+              <a:t>p2</a:t>
+            </a:r>
+            <a:endParaRPr lang="en-US" sz="2000" dirty="0">
+              <a:latin typeface="Courier New" panose="02070309020205020404" pitchFamily="49" charset="0"/>
+              <a:cs typeface="Courier New" panose="02070309020205020404" pitchFamily="49" charset="0"/>
+            </a:endParaRPr>
+          </a:p>
+        </p:txBody>
+      </p:sp>
+      <p:sp>
+        <p:nvSpPr>
+          <p:cNvPr id="14" name="Oval 13"/>
+          <p:cNvSpPr/>
+          <p:nvPr/>
+        </p:nvSpPr>
+        <p:spPr>
+          <a:xfrm rot="16200000">
+            <a:off x="5763122" y="1277448"/>
+            <a:ext cx="1987141" cy="3509532"/>
+          </a:xfrm>
+          <a:prstGeom prst="ellipse">
+            <a:avLst/>
+          </a:prstGeom>
+          <a:noFill/>
+          <a:ln w="19050">
+            <a:solidFill>
+              <a:schemeClr val="tx1"/>
+            </a:solidFill>
+          </a:ln>
+        </p:spPr>
+        <p:style>
+          <a:lnRef idx="2">
+            <a:schemeClr val="accent1">
+              <a:shade val="50000"/>
+            </a:schemeClr>
+          </a:lnRef>
+          <a:fillRef idx="1">
+            <a:schemeClr val="accent1"/>
+          </a:fillRef>
+          <a:effectRef idx="0">
+            <a:schemeClr val="accent1"/>
+          </a:effectRef>
+          <a:fontRef idx="minor">
+            <a:schemeClr val="lt1"/>
+          </a:fontRef>
+        </p:style>
+        <p:txBody>
+          <a:bodyPr rtlCol="0" anchor="ctr"/>
+          <a:lstStyle/>
+          <a:p>
+            <a:pPr algn="ctr"/>
+            <a:endParaRPr lang="en-US" sz="1600">
+              <a:latin typeface="Courier New" panose="02070309020205020404" pitchFamily="49" charset="0"/>
+              <a:cs typeface="Courier New" panose="02070309020205020404" pitchFamily="49" charset="0"/>
+            </a:endParaRPr>
+          </a:p>
+        </p:txBody>
+      </p:sp>
+      <p:sp>
+        <p:nvSpPr>
+          <p:cNvPr id="16" name="Oval 15"/>
+          <p:cNvSpPr/>
+          <p:nvPr/>
+        </p:nvSpPr>
+        <p:spPr>
+          <a:xfrm rot="15327280">
+            <a:off x="4473940" y="1458009"/>
+            <a:ext cx="2058743" cy="3444776"/>
+          </a:xfrm>
+          <a:prstGeom prst="ellipse">
+            <a:avLst/>
+          </a:prstGeom>
+          <a:noFill/>
+          <a:ln>
+            <a:solidFill>
+              <a:schemeClr val="tx1"/>
+            </a:solidFill>
+          </a:ln>
+        </p:spPr>
+        <p:style>
+          <a:lnRef idx="2">
+            <a:schemeClr val="accent1">
+              <a:shade val="50000"/>
+            </a:schemeClr>
+          </a:lnRef>
+          <a:fillRef idx="1">
+            <a:schemeClr val="accent1"/>
+          </a:fillRef>
+          <a:effectRef idx="0">
+            <a:schemeClr val="accent1"/>
+          </a:effectRef>
+          <a:fontRef idx="minor">
+            <a:schemeClr val="lt1"/>
+          </a:fontRef>
+        </p:style>
+        <p:txBody>
+          <a:bodyPr rtlCol="0" anchor="ctr"/>
+          <a:lstStyle/>
+          <a:p>
+            <a:pPr algn="ctr"/>
+            <a:endParaRPr lang="en-US" sz="1600">
+              <a:latin typeface="Courier New" panose="02070309020205020404" pitchFamily="49" charset="0"/>
+              <a:cs typeface="Courier New" panose="02070309020205020404" pitchFamily="49" charset="0"/>
+            </a:endParaRPr>
+          </a:p>
+        </p:txBody>
+      </p:sp>
+      <p:sp>
+        <p:nvSpPr>
+          <p:cNvPr id="17" name="Rectangle 16"/>
+          <p:cNvSpPr/>
+          <p:nvPr/>
+        </p:nvSpPr>
+        <p:spPr>
+          <a:xfrm>
+            <a:off x="5601730" y="3273942"/>
+            <a:ext cx="1107996" cy="400110"/>
+          </a:xfrm>
+          <a:prstGeom prst="rect">
+            <a:avLst/>
+          </a:prstGeom>
+        </p:spPr>
+        <p:txBody>
+          <a:bodyPr wrap="none">
+            <a:spAutoFit/>
+          </a:bodyPr>
+          <a:lstStyle/>
+          <a:p>
+            <a:r>
+              <a:rPr lang="en-US" sz="2000" dirty="0" smtClean="0">
+                <a:latin typeface="Courier New" panose="02070309020205020404" pitchFamily="49" charset="0"/>
+                <a:cs typeface="Courier New" panose="02070309020205020404" pitchFamily="49" charset="0"/>
+              </a:rPr>
+              <a:t>doi_on</a:t>
+            </a:r>
+            <a:endParaRPr lang="en-US" sz="2000" dirty="0">
+              <a:latin typeface="Courier New" panose="02070309020205020404" pitchFamily="49" charset="0"/>
+              <a:cs typeface="Courier New" panose="02070309020205020404" pitchFamily="49" charset="0"/>
+            </a:endParaRPr>
+          </a:p>
+        </p:txBody>
+      </p:sp>
+      <p:cxnSp>
+        <p:nvCxnSpPr>
+          <p:cNvPr id="18" name="Straight Arrow Connector 17"/>
+          <p:cNvCxnSpPr>
+            <a:endCxn id="6" idx="0"/>
+          </p:cNvCxnSpPr>
+          <p:nvPr/>
+        </p:nvCxnSpPr>
+        <p:spPr>
+          <a:xfrm>
+            <a:off x="5030699" y="4294353"/>
+            <a:ext cx="991014" cy="649373"/>
+          </a:xfrm>
+          <a:prstGeom prst="straightConnector1">
+            <a:avLst/>
+          </a:prstGeom>
+          <a:ln w="12700">
+            <a:solidFill>
+              <a:schemeClr val="tx1"/>
+            </a:solidFill>
+            <a:headEnd type="arrow" w="med" len="med"/>
+            <a:tailEnd type="none" w="med" len="med"/>
+          </a:ln>
+        </p:spPr>
+        <p:style>
+          <a:lnRef idx="1">
+            <a:schemeClr val="accent1"/>
+          </a:lnRef>
+          <a:fillRef idx="0">
+            <a:schemeClr val="accent1"/>
+          </a:fillRef>
+          <a:effectRef idx="0">
+            <a:schemeClr val="accent1"/>
+          </a:effectRef>
+          <a:fontRef idx="minor">
+            <a:schemeClr val="tx1"/>
+          </a:fontRef>
+        </p:style>
+      </p:cxnSp>
+      <p:cxnSp>
+        <p:nvCxnSpPr>
+          <p:cNvPr id="19" name="Straight Arrow Connector 18"/>
+          <p:cNvCxnSpPr>
+            <a:stCxn id="6" idx="0"/>
+            <a:endCxn id="14" idx="2"/>
+          </p:cNvCxnSpPr>
+          <p:nvPr/>
+        </p:nvCxnSpPr>
+        <p:spPr>
+          <a:xfrm flipV="1">
+            <a:off x="6021713" y="4025785"/>
+            <a:ext cx="734980" cy="917941"/>
+          </a:xfrm>
+          <a:prstGeom prst="straightConnector1">
+            <a:avLst/>
+          </a:prstGeom>
+          <a:ln w="19050">
+            <a:solidFill>
+              <a:schemeClr val="tx1"/>
+            </a:solidFill>
+            <a:headEnd type="none" w="med" len="med"/>
+            <a:tailEnd type="arrow" w="med" len="med"/>
+          </a:ln>
+        </p:spPr>
+        <p:style>
+          <a:lnRef idx="1">
+            <a:schemeClr val="accent1"/>
+          </a:lnRef>
+          <a:fillRef idx="0">
+            <a:schemeClr val="accent1"/>
+          </a:fillRef>
+          <a:effectRef idx="0">
+            <a:schemeClr val="accent1"/>
+          </a:effectRef>
+          <a:fontRef idx="minor">
+            <a:schemeClr val="tx1"/>
+          </a:fontRef>
+        </p:style>
+      </p:cxnSp>
+      <p:sp>
+        <p:nvSpPr>
+          <p:cNvPr id="20" name="Rectangle 19"/>
+          <p:cNvSpPr/>
+          <p:nvPr/>
+        </p:nvSpPr>
+        <p:spPr>
+          <a:xfrm>
+            <a:off x="3252158" y="1564427"/>
+            <a:ext cx="5761762" cy="3779409"/>
+          </a:xfrm>
+          <a:prstGeom prst="rect">
+            <a:avLst/>
+          </a:prstGeom>
+          <a:noFill/>
+          <a:ln>
+            <a:solidFill>
+              <a:schemeClr val="tx1"/>
+            </a:solidFill>
+          </a:ln>
+        </p:spPr>
+        <p:style>
+          <a:lnRef idx="2">
+            <a:schemeClr val="accent1">
+              <a:shade val="50000"/>
+            </a:schemeClr>
+          </a:lnRef>
+          <a:fillRef idx="1">
+            <a:schemeClr val="accent1"/>
+          </a:fillRef>
+          <a:effectRef idx="0">
+            <a:schemeClr val="accent1"/>
+          </a:effectRef>
+          <a:fontRef idx="minor">
+            <a:schemeClr val="lt1"/>
+          </a:fontRef>
+        </p:style>
+        <p:txBody>
+          <a:bodyPr rtlCol="0" anchor="ctr"/>
+          <a:lstStyle/>
+          <a:p>
+            <a:pPr algn="ctr"/>
+            <a:endParaRPr lang="en-US" sz="1600">
+              <a:latin typeface="Courier New" panose="02070309020205020404" pitchFamily="49" charset="0"/>
+              <a:cs typeface="Courier New" panose="02070309020205020404" pitchFamily="49" charset="0"/>
+            </a:endParaRPr>
+          </a:p>
+        </p:txBody>
+      </p:sp>
+      <p:sp>
+        <p:nvSpPr>
+          <p:cNvPr id="26" name="Rectangle 25"/>
+          <p:cNvSpPr/>
+          <p:nvPr/>
+        </p:nvSpPr>
+        <p:spPr>
+          <a:xfrm>
+            <a:off x="3372043" y="2500458"/>
+            <a:ext cx="801823" cy="338554"/>
+          </a:xfrm>
+          <a:prstGeom prst="rect">
+            <a:avLst/>
+          </a:prstGeom>
+        </p:spPr>
+        <p:txBody>
+          <a:bodyPr wrap="none">
+            <a:spAutoFit/>
+          </a:bodyPr>
+          <a:lstStyle/>
+          <a:p>
+            <a:r>
+              <a:rPr lang="en-US" sz="1600" dirty="0" smtClean="0">
+                <a:latin typeface="Courier New" panose="02070309020205020404" pitchFamily="49" charset="0"/>
+                <a:cs typeface="Courier New" panose="02070309020205020404" pitchFamily="49" charset="0"/>
+              </a:rPr>
+              <a:t>IVC#1</a:t>
+            </a:r>
+            <a:endParaRPr lang="en-US" sz="1600" dirty="0">
+              <a:latin typeface="Courier New" panose="02070309020205020404" pitchFamily="49" charset="0"/>
+              <a:cs typeface="Courier New" panose="02070309020205020404" pitchFamily="49" charset="0"/>
+            </a:endParaRPr>
+          </a:p>
+        </p:txBody>
+      </p:sp>
+      <p:sp>
+        <p:nvSpPr>
+          <p:cNvPr id="27" name="Rectangle 26"/>
+          <p:cNvSpPr/>
+          <p:nvPr/>
+        </p:nvSpPr>
+        <p:spPr>
+          <a:xfrm>
+            <a:off x="7514010" y="1886993"/>
+            <a:ext cx="801823" cy="338554"/>
+          </a:xfrm>
+          <a:prstGeom prst="rect">
+            <a:avLst/>
+          </a:prstGeom>
+        </p:spPr>
+        <p:txBody>
+          <a:bodyPr wrap="none">
+            <a:spAutoFit/>
+          </a:bodyPr>
+          <a:lstStyle/>
+          <a:p>
+            <a:r>
+              <a:rPr lang="en-US" sz="1600" dirty="0" smtClean="0">
+                <a:latin typeface="Courier New" panose="02070309020205020404" pitchFamily="49" charset="0"/>
+                <a:cs typeface="Courier New" panose="02070309020205020404" pitchFamily="49" charset="0"/>
+              </a:rPr>
+              <a:t>IVC#2</a:t>
+            </a:r>
+            <a:endParaRPr lang="en-US" sz="1600" dirty="0">
+              <a:latin typeface="Courier New" panose="02070309020205020404" pitchFamily="49" charset="0"/>
+              <a:cs typeface="Courier New" panose="02070309020205020404" pitchFamily="49" charset="0"/>
+            </a:endParaRPr>
+          </a:p>
+        </p:txBody>
+      </p:sp>
+    </p:spTree>
+    <p:extLst>
+      <p:ext uri="{BB962C8B-B14F-4D97-AF65-F5344CB8AC3E}">
+        <p14:creationId xmlns:p14="http://schemas.microsoft.com/office/powerpoint/2010/main" val="260141613"/>
+      </p:ext>
+    </p:extLst>
+  </p:cSld>
+  <p:clrMapOvr>
+    <a:masterClrMapping/>
+  </p:clrMapOvr>
+</p:sld>
+</file>
+
+<file path=ppt/slides/slide3.xml><?xml version="1.0" encoding="utf-8"?>
 <p:sld xmlns:a="http://schemas.openxmlformats.org/drawingml/2006/main" xmlns:r="http://schemas.openxmlformats.org/officeDocument/2006/relationships" xmlns:p="http://schemas.openxmlformats.org/presentationml/2006/main">
   <p:cSld>
     <p:spTree>
@@ -4291,7 +4901,7 @@
 </p:sld>
 </file>
 
-<file path=ppt/slides/slide3.xml><?xml version="1.0" encoding="utf-8"?>
+<file path=ppt/slides/slide4.xml><?xml version="1.0" encoding="utf-8"?>
 <p:sld xmlns:a="http://schemas.openxmlformats.org/drawingml/2006/main" xmlns:r="http://schemas.openxmlformats.org/officeDocument/2006/relationships" xmlns:p="http://schemas.openxmlformats.org/presentationml/2006/main">
   <p:cSld>
     <p:spTree>
@@ -5803,7 +6413,7 @@
 </p:sld>
 </file>
 
-<file path=ppt/slides/slide4.xml><?xml version="1.0" encoding="utf-8"?>
+<file path=ppt/slides/slide5.xml><?xml version="1.0" encoding="utf-8"?>
 <p:sld xmlns:a="http://schemas.openxmlformats.org/drawingml/2006/main" xmlns:r="http://schemas.openxmlformats.org/officeDocument/2006/relationships" xmlns:p="http://schemas.openxmlformats.org/presentationml/2006/main">
   <p:cSld>
     <p:spTree>

</xml_diff>

<commit_message>
update the example-- all IVCs
</commit_message>
<xml_diff>
--- a/all_ivcs/all_ivcs_TEX/figs/figs.pptx
+++ b/all_ivcs/all_ivcs_TEX/figs/figs.pptx
@@ -247,7 +247,7 @@
           <a:p>
             <a:fld id="{5A779009-EA30-43A9-A43B-F006CC3D9B84}" type="datetimeFigureOut">
               <a:rPr lang="en-US" smtClean="0"/>
-              <a:t>1/8/2017</a:t>
+              <a:t>1/13/2017</a:t>
             </a:fld>
             <a:endParaRPr lang="en-US"/>
           </a:p>
@@ -417,7 +417,7 @@
           <a:p>
             <a:fld id="{5A779009-EA30-43A9-A43B-F006CC3D9B84}" type="datetimeFigureOut">
               <a:rPr lang="en-US" smtClean="0"/>
-              <a:t>1/8/2017</a:t>
+              <a:t>1/13/2017</a:t>
             </a:fld>
             <a:endParaRPr lang="en-US"/>
           </a:p>
@@ -597,7 +597,7 @@
           <a:p>
             <a:fld id="{5A779009-EA30-43A9-A43B-F006CC3D9B84}" type="datetimeFigureOut">
               <a:rPr lang="en-US" smtClean="0"/>
-              <a:t>1/8/2017</a:t>
+              <a:t>1/13/2017</a:t>
             </a:fld>
             <a:endParaRPr lang="en-US"/>
           </a:p>
@@ -767,7 +767,7 @@
           <a:p>
             <a:fld id="{5A779009-EA30-43A9-A43B-F006CC3D9B84}" type="datetimeFigureOut">
               <a:rPr lang="en-US" smtClean="0"/>
-              <a:t>1/8/2017</a:t>
+              <a:t>1/13/2017</a:t>
             </a:fld>
             <a:endParaRPr lang="en-US"/>
           </a:p>
@@ -1013,7 +1013,7 @@
           <a:p>
             <a:fld id="{5A779009-EA30-43A9-A43B-F006CC3D9B84}" type="datetimeFigureOut">
               <a:rPr lang="en-US" smtClean="0"/>
-              <a:t>1/8/2017</a:t>
+              <a:t>1/13/2017</a:t>
             </a:fld>
             <a:endParaRPr lang="en-US"/>
           </a:p>
@@ -1245,7 +1245,7 @@
           <a:p>
             <a:fld id="{5A779009-EA30-43A9-A43B-F006CC3D9B84}" type="datetimeFigureOut">
               <a:rPr lang="en-US" smtClean="0"/>
-              <a:t>1/8/2017</a:t>
+              <a:t>1/13/2017</a:t>
             </a:fld>
             <a:endParaRPr lang="en-US"/>
           </a:p>
@@ -1612,7 +1612,7 @@
           <a:p>
             <a:fld id="{5A779009-EA30-43A9-A43B-F006CC3D9B84}" type="datetimeFigureOut">
               <a:rPr lang="en-US" smtClean="0"/>
-              <a:t>1/8/2017</a:t>
+              <a:t>1/13/2017</a:t>
             </a:fld>
             <a:endParaRPr lang="en-US"/>
           </a:p>
@@ -1730,7 +1730,7 @@
           <a:p>
             <a:fld id="{5A779009-EA30-43A9-A43B-F006CC3D9B84}" type="datetimeFigureOut">
               <a:rPr lang="en-US" smtClean="0"/>
-              <a:t>1/8/2017</a:t>
+              <a:t>1/13/2017</a:t>
             </a:fld>
             <a:endParaRPr lang="en-US"/>
           </a:p>
@@ -1825,7 +1825,7 @@
           <a:p>
             <a:fld id="{5A779009-EA30-43A9-A43B-F006CC3D9B84}" type="datetimeFigureOut">
               <a:rPr lang="en-US" smtClean="0"/>
-              <a:t>1/8/2017</a:t>
+              <a:t>1/13/2017</a:t>
             </a:fld>
             <a:endParaRPr lang="en-US"/>
           </a:p>
@@ -2102,7 +2102,7 @@
           <a:p>
             <a:fld id="{5A779009-EA30-43A9-A43B-F006CC3D9B84}" type="datetimeFigureOut">
               <a:rPr lang="en-US" smtClean="0"/>
-              <a:t>1/8/2017</a:t>
+              <a:t>1/13/2017</a:t>
             </a:fld>
             <a:endParaRPr lang="en-US"/>
           </a:p>
@@ -2355,7 +2355,7 @@
           <a:p>
             <a:fld id="{5A779009-EA30-43A9-A43B-F006CC3D9B84}" type="datetimeFigureOut">
               <a:rPr lang="en-US" smtClean="0"/>
-              <a:t>1/8/2017</a:t>
+              <a:t>1/13/2017</a:t>
             </a:fld>
             <a:endParaRPr lang="en-US"/>
           </a:p>
@@ -2568,7 +2568,7 @@
           <a:p>
             <a:fld id="{5A779009-EA30-43A9-A43B-F006CC3D9B84}" type="datetimeFigureOut">
               <a:rPr lang="en-US" smtClean="0"/>
-              <a:t>1/8/2017</a:t>
+              <a:t>1/13/2017</a:t>
             </a:fld>
             <a:endParaRPr lang="en-US"/>
           </a:p>
@@ -3157,8 +3157,8 @@
         </p:nvSpPr>
         <p:spPr>
           <a:xfrm>
-            <a:off x="7605976" y="3032214"/>
-            <a:ext cx="492443" cy="400110"/>
+            <a:off x="7151868" y="3054021"/>
+            <a:ext cx="1415772" cy="400110"/>
           </a:xfrm>
           <a:prstGeom prst="rect">
             <a:avLst/>
@@ -3175,7 +3175,7 @@
                 <a:latin typeface="Courier New" panose="02070309020205020404" pitchFamily="49" charset="0"/>
                 <a:cs typeface="Courier New" panose="02070309020205020404" pitchFamily="49" charset="0"/>
               </a:rPr>
-              <a:t>c2</a:t>
+              <a:t>a2_below</a:t>
             </a:r>
             <a:endParaRPr lang="en-US" sz="2000" dirty="0">
               <a:latin typeface="Courier New" panose="02070309020205020404" pitchFamily="49" charset="0"/>
@@ -3192,8 +3192,8 @@
         </p:nvSpPr>
         <p:spPr>
           <a:xfrm>
-            <a:off x="4538256" y="3478210"/>
-            <a:ext cx="492443" cy="400110"/>
+            <a:off x="4012662" y="3624034"/>
+            <a:ext cx="1415772" cy="400110"/>
           </a:xfrm>
           <a:prstGeom prst="rect">
             <a:avLst/>
@@ -3206,11 +3206,11 @@
           <a:lstStyle/>
           <a:p>
             <a:r>
-              <a:rPr lang="en-US" sz="2000" dirty="0" smtClean="0">
+              <a:rPr lang="en-US" sz="2000" dirty="0">
                 <a:latin typeface="Courier New" panose="02070309020205020404" pitchFamily="49" charset="0"/>
                 <a:cs typeface="Courier New" panose="02070309020205020404" pitchFamily="49" charset="0"/>
               </a:rPr>
-              <a:t>c1</a:t>
+              <a:t>a1_below</a:t>
             </a:r>
             <a:endParaRPr lang="en-US" sz="2000" dirty="0">
               <a:latin typeface="Courier New" panose="02070309020205020404" pitchFamily="49" charset="0"/>
@@ -3297,8 +3297,8 @@
         </p:nvSpPr>
         <p:spPr>
           <a:xfrm rot="16200000">
-            <a:off x="5763122" y="1277448"/>
-            <a:ext cx="1987141" cy="3509532"/>
+            <a:off x="5829228" y="1211342"/>
+            <a:ext cx="1987141" cy="3641744"/>
           </a:xfrm>
           <a:prstGeom prst="ellipse">
             <a:avLst/>
@@ -3473,7 +3473,7 @@
         <p:spPr>
           <a:xfrm flipV="1">
             <a:off x="6021713" y="4025785"/>
-            <a:ext cx="734980" cy="917941"/>
+            <a:ext cx="801086" cy="917941"/>
           </a:xfrm>
           <a:prstGeom prst="straightConnector1">
             <a:avLst/>
@@ -3509,8 +3509,8 @@
         </p:nvSpPr>
         <p:spPr>
           <a:xfrm>
-            <a:off x="3252158" y="1564427"/>
-            <a:ext cx="5761762" cy="3779409"/>
+            <a:off x="3183147" y="1564427"/>
+            <a:ext cx="5719313" cy="3878841"/>
           </a:xfrm>
           <a:prstGeom prst="rect">
             <a:avLst/>

</xml_diff>

<commit_message>
change the asw code
</commit_message>
<xml_diff>
--- a/all_ivcs/all_ivcs_TEX/figs/figs.pptx
+++ b/all_ivcs/all_ivcs_TEX/figs/figs.pptx
@@ -3659,8 +3659,8 @@
         </p:nvSpPr>
         <p:spPr>
           <a:xfrm>
-            <a:off x="2500864" y="808617"/>
-            <a:ext cx="7583415" cy="5292365"/>
+            <a:off x="2500865" y="1496513"/>
+            <a:ext cx="7272864" cy="4205547"/>
           </a:xfrm>
         </p:spPr>
         <p:txBody>
@@ -3673,39 +3673,69 @@
               <a:buNone/>
             </a:pPr>
             <a:r>
+              <a:rPr lang="en-US" sz="1600" b="1" dirty="0" err="1" smtClean="0">
+                <a:latin typeface="Courier New" panose="02070309020205020404" pitchFamily="49" charset="0"/>
+                <a:cs typeface="Courier New" panose="02070309020205020404" pitchFamily="49" charset="0"/>
+              </a:rPr>
+              <a:t>var</a:t>
+            </a:r>
+            <a:endParaRPr lang="en-US" sz="1600" b="1" dirty="0">
+              <a:latin typeface="Courier New" panose="02070309020205020404" pitchFamily="49" charset="0"/>
+              <a:cs typeface="Courier New" panose="02070309020205020404" pitchFamily="49" charset="0"/>
+            </a:endParaRPr>
+          </a:p>
+          <a:p>
+            <a:pPr marL="0" indent="0">
+              <a:buNone/>
+            </a:pPr>
+            <a:r>
               <a:rPr lang="en-US" sz="1600" dirty="0">
                 <a:latin typeface="Courier New" panose="02070309020205020404" pitchFamily="49" charset="0"/>
                 <a:cs typeface="Courier New" panose="02070309020205020404" pitchFamily="49" charset="0"/>
               </a:rPr>
-              <a:t>node </a:t>
-            </a:r>
-            <a:r>
-              <a:rPr lang="en-US" sz="1600" dirty="0" err="1">
-                <a:latin typeface="Courier New" panose="02070309020205020404" pitchFamily="49" charset="0"/>
-                <a:cs typeface="Courier New" panose="02070309020205020404" pitchFamily="49" charset="0"/>
-              </a:rPr>
-              <a:t>asw</a:t>
+              <a:t>   </a:t>
+            </a:r>
+            <a:r>
+              <a:rPr lang="en-US" sz="1600" dirty="0" smtClean="0">
+                <a:latin typeface="Courier New" panose="02070309020205020404" pitchFamily="49" charset="0"/>
+                <a:cs typeface="Courier New" panose="02070309020205020404" pitchFamily="49" charset="0"/>
+              </a:rPr>
+              <a:t>   a1_below</a:t>
             </a:r>
             <a:r>
               <a:rPr lang="en-US" sz="1600" dirty="0">
                 <a:latin typeface="Courier New" panose="02070309020205020404" pitchFamily="49" charset="0"/>
                 <a:cs typeface="Courier New" panose="02070309020205020404" pitchFamily="49" charset="0"/>
               </a:rPr>
-              <a:t>(alt1, alt2: </a:t>
-            </a:r>
-            <a:r>
-              <a:rPr lang="en-US" sz="1600" dirty="0" err="1">
-                <a:latin typeface="Courier New" panose="02070309020205020404" pitchFamily="49" charset="0"/>
-                <a:cs typeface="Courier New" panose="02070309020205020404" pitchFamily="49" charset="0"/>
-              </a:rPr>
-              <a:t>int</a:t>
+              <a:t>, a2_below, </a:t>
+            </a:r>
+            <a:r>
+              <a:rPr lang="en-US" sz="1600" dirty="0" smtClean="0">
+                <a:latin typeface="Courier New" panose="02070309020205020404" pitchFamily="49" charset="0"/>
+                <a:cs typeface="Courier New" panose="02070309020205020404" pitchFamily="49" charset="0"/>
+              </a:rPr>
+              <a:t>below, p1</a:t>
             </a:r>
             <a:r>
               <a:rPr lang="en-US" sz="1600" dirty="0">
                 <a:latin typeface="Courier New" panose="02070309020205020404" pitchFamily="49" charset="0"/>
                 <a:cs typeface="Courier New" panose="02070309020205020404" pitchFamily="49" charset="0"/>
               </a:rPr>
-              <a:t>; stat1, stat2 : bool)</a:t>
+              <a:t>, p2 : </a:t>
+            </a:r>
+            <a:r>
+              <a:rPr lang="en-US" sz="1600" b="1" dirty="0">
+                <a:latin typeface="Courier New" panose="02070309020205020404" pitchFamily="49" charset="0"/>
+                <a:cs typeface="Courier New" panose="02070309020205020404" pitchFamily="49" charset="0"/>
+              </a:rPr>
+              <a:t>bool</a:t>
+            </a:r>
+            <a:r>
+              <a:rPr lang="en-US" sz="1600" dirty="0">
+                <a:latin typeface="Courier New" panose="02070309020205020404" pitchFamily="49" charset="0"/>
+                <a:cs typeface="Courier New" panose="02070309020205020404" pitchFamily="49" charset="0"/>
+              </a:rPr>
+              <a:t>;</a:t>
             </a:r>
           </a:p>
           <a:p>
@@ -3713,37 +3743,83 @@
               <a:buNone/>
             </a:pPr>
             <a:r>
+              <a:rPr lang="en-US" sz="1600" dirty="0" smtClean="0">
+                <a:latin typeface="Courier New" panose="02070309020205020404" pitchFamily="49" charset="0"/>
+                <a:cs typeface="Courier New" panose="02070309020205020404" pitchFamily="49" charset="0"/>
+              </a:rPr>
+              <a:t>  </a:t>
+            </a:r>
+            <a:r>
+              <a:rPr lang="en-US" sz="1600" b="1" dirty="0" smtClean="0">
+                <a:latin typeface="Courier New" panose="02070309020205020404" pitchFamily="49" charset="0"/>
+                <a:cs typeface="Courier New" panose="02070309020205020404" pitchFamily="49" charset="0"/>
+              </a:rPr>
+              <a:t>let</a:t>
+            </a:r>
+            <a:endParaRPr lang="en-US" sz="1600" b="1" dirty="0">
+              <a:latin typeface="Courier New" panose="02070309020205020404" pitchFamily="49" charset="0"/>
+              <a:cs typeface="Courier New" panose="02070309020205020404" pitchFamily="49" charset="0"/>
+            </a:endParaRPr>
+          </a:p>
+          <a:p>
+            <a:pPr marL="0" indent="0">
+              <a:buNone/>
+            </a:pPr>
+            <a:r>
               <a:rPr lang="en-US" sz="1600" dirty="0">
                 <a:latin typeface="Courier New" panose="02070309020205020404" pitchFamily="49" charset="0"/>
                 <a:cs typeface="Courier New" panose="02070309020205020404" pitchFamily="49" charset="0"/>
               </a:rPr>
-              <a:t>     returns (alarm: bool; </a:t>
-            </a:r>
-            <a:r>
-              <a:rPr lang="en-US" sz="1600" dirty="0" err="1">
-                <a:latin typeface="Courier New" panose="02070309020205020404" pitchFamily="49" charset="0"/>
-                <a:cs typeface="Courier New" panose="02070309020205020404" pitchFamily="49" charset="0"/>
-              </a:rPr>
-              <a:t>doi_on</a:t>
+              <a:t>   </a:t>
+            </a:r>
+            <a:r>
+              <a:rPr lang="en-US" sz="1600" dirty="0" smtClean="0">
+                <a:latin typeface="Courier New" panose="02070309020205020404" pitchFamily="49" charset="0"/>
+                <a:cs typeface="Courier New" panose="02070309020205020404" pitchFamily="49" charset="0"/>
+              </a:rPr>
+              <a:t>   a1_below </a:t>
             </a:r>
             <a:r>
               <a:rPr lang="en-US" sz="1600" dirty="0">
                 <a:latin typeface="Courier New" panose="02070309020205020404" pitchFamily="49" charset="0"/>
                 <a:cs typeface="Courier New" panose="02070309020205020404" pitchFamily="49" charset="0"/>
               </a:rPr>
-              <a:t>: bool);</a:t>
-            </a:r>
-          </a:p>
-          <a:p>
-            <a:pPr marL="0" indent="0">
-              <a:buNone/>
-            </a:pPr>
-            <a:r>
-              <a:rPr lang="en-US" sz="1600" dirty="0" err="1">
-                <a:latin typeface="Courier New" panose="02070309020205020404" pitchFamily="49" charset="0"/>
-                <a:cs typeface="Courier New" panose="02070309020205020404" pitchFamily="49" charset="0"/>
-              </a:rPr>
-              <a:t>var</a:t>
+              <a:t>= stat1 </a:t>
+            </a:r>
+            <a:r>
+              <a:rPr lang="en-US" sz="1600" b="1" dirty="0">
+                <a:latin typeface="Courier New" panose="02070309020205020404" pitchFamily="49" charset="0"/>
+                <a:cs typeface="Courier New" panose="02070309020205020404" pitchFamily="49" charset="0"/>
+              </a:rPr>
+              <a:t>and</a:t>
+            </a:r>
+            <a:r>
+              <a:rPr lang="en-US" sz="1600" dirty="0">
+                <a:latin typeface="Courier New" panose="02070309020205020404" pitchFamily="49" charset="0"/>
+                <a:cs typeface="Courier New" panose="02070309020205020404" pitchFamily="49" charset="0"/>
+              </a:rPr>
+              <a:t> (alt1 </a:t>
+            </a:r>
+            <a:r>
+              <a:rPr lang="en-US" sz="1600" b="1" dirty="0">
+                <a:latin typeface="Courier New" panose="02070309020205020404" pitchFamily="49" charset="0"/>
+                <a:cs typeface="Courier New" panose="02070309020205020404" pitchFamily="49" charset="0"/>
+              </a:rPr>
+              <a:t>&lt;</a:t>
+            </a:r>
+            <a:r>
+              <a:rPr lang="en-US" sz="1600" dirty="0">
+                <a:latin typeface="Courier New" panose="02070309020205020404" pitchFamily="49" charset="0"/>
+                <a:cs typeface="Courier New" panose="02070309020205020404" pitchFamily="49" charset="0"/>
+              </a:rPr>
+              <a:t> THRESHOLD</a:t>
+            </a:r>
+            <a:r>
+              <a:rPr lang="en-US" sz="1600" dirty="0" smtClean="0">
+                <a:latin typeface="Courier New" panose="02070309020205020404" pitchFamily="49" charset="0"/>
+                <a:cs typeface="Courier New" panose="02070309020205020404" pitchFamily="49" charset="0"/>
+              </a:rPr>
+              <a:t>);  </a:t>
             </a:r>
             <a:endParaRPr lang="en-US" sz="1600" dirty="0">
               <a:latin typeface="Courier New" panose="02070309020205020404" pitchFamily="49" charset="0"/>
@@ -3759,62 +3835,56 @@
                 <a:latin typeface="Courier New" panose="02070309020205020404" pitchFamily="49" charset="0"/>
                 <a:cs typeface="Courier New" panose="02070309020205020404" pitchFamily="49" charset="0"/>
               </a:rPr>
-              <a:t>   a1_below, a2_below, below,</a:t>
-            </a:r>
-          </a:p>
-          <a:p>
-            <a:pPr marL="0" indent="0">
-              <a:buNone/>
-            </a:pPr>
+              <a:t>   </a:t>
+            </a:r>
+            <a:r>
+              <a:rPr lang="en-US" sz="1600" dirty="0" smtClean="0">
+                <a:latin typeface="Courier New" panose="02070309020205020404" pitchFamily="49" charset="0"/>
+                <a:cs typeface="Courier New" panose="02070309020205020404" pitchFamily="49" charset="0"/>
+              </a:rPr>
+              <a:t>   a2_below </a:t>
+            </a:r>
             <a:r>
               <a:rPr lang="en-US" sz="1600" dirty="0">
                 <a:latin typeface="Courier New" panose="02070309020205020404" pitchFamily="49" charset="0"/>
                 <a:cs typeface="Courier New" panose="02070309020205020404" pitchFamily="49" charset="0"/>
               </a:rPr>
-              <a:t>   p1, p2 : bool;</a:t>
-            </a:r>
-          </a:p>
-          <a:p>
-            <a:pPr marL="0" indent="0">
-              <a:buNone/>
-            </a:pPr>
+              <a:t>= stat2 </a:t>
+            </a:r>
+            <a:r>
+              <a:rPr lang="en-US" sz="1600" b="1" dirty="0">
+                <a:latin typeface="Courier New" panose="02070309020205020404" pitchFamily="49" charset="0"/>
+                <a:cs typeface="Courier New" panose="02070309020205020404" pitchFamily="49" charset="0"/>
+              </a:rPr>
+              <a:t>and</a:t>
+            </a:r>
             <a:r>
               <a:rPr lang="en-US" sz="1600" dirty="0">
                 <a:latin typeface="Courier New" panose="02070309020205020404" pitchFamily="49" charset="0"/>
                 <a:cs typeface="Courier New" panose="02070309020205020404" pitchFamily="49" charset="0"/>
               </a:rPr>
-              <a:t>let</a:t>
-            </a:r>
-          </a:p>
-          <a:p>
-            <a:pPr marL="0" indent="0">
-              <a:buNone/>
-            </a:pPr>
+              <a:t> (alt2 </a:t>
+            </a:r>
+            <a:r>
+              <a:rPr lang="en-US" sz="1600" b="1" dirty="0">
+                <a:latin typeface="Courier New" panose="02070309020205020404" pitchFamily="49" charset="0"/>
+                <a:cs typeface="Courier New" panose="02070309020205020404" pitchFamily="49" charset="0"/>
+              </a:rPr>
+              <a:t>&lt;</a:t>
+            </a:r>
             <a:r>
               <a:rPr lang="en-US" sz="1600" dirty="0">
                 <a:latin typeface="Courier New" panose="02070309020205020404" pitchFamily="49" charset="0"/>
                 <a:cs typeface="Courier New" panose="02070309020205020404" pitchFamily="49" charset="0"/>
               </a:rPr>
-              <a:t>   a1_below = stat1 and (alt1 &lt; THRESHOLD)  </a:t>
-            </a:r>
-          </a:p>
-          <a:p>
-            <a:pPr marL="0" indent="0">
-              <a:buNone/>
-            </a:pPr>
-            <a:r>
-              <a:rPr lang="en-US" sz="1600" dirty="0">
-                <a:latin typeface="Courier New" panose="02070309020205020404" pitchFamily="49" charset="0"/>
-                <a:cs typeface="Courier New" panose="02070309020205020404" pitchFamily="49" charset="0"/>
-              </a:rPr>
-              <a:t>   a2_below = stat2 and (alt2 &lt; THRESHOLD)  </a:t>
+              <a:t> THRESHOLD</a:t>
             </a:r>
             <a:r>
               <a:rPr lang="en-US" sz="1600" dirty="0" smtClean="0">
                 <a:latin typeface="Courier New" panose="02070309020205020404" pitchFamily="49" charset="0"/>
                 <a:cs typeface="Courier New" panose="02070309020205020404" pitchFamily="49" charset="0"/>
               </a:rPr>
-              <a:t> </a:t>
+              <a:t>);   </a:t>
             </a:r>
             <a:endParaRPr lang="en-US" sz="1600" dirty="0">
               <a:latin typeface="Courier New" panose="02070309020205020404" pitchFamily="49" charset="0"/>
@@ -3830,7 +3900,42 @@
                 <a:latin typeface="Courier New" panose="02070309020205020404" pitchFamily="49" charset="0"/>
                 <a:cs typeface="Courier New" panose="02070309020205020404" pitchFamily="49" charset="0"/>
               </a:rPr>
-              <a:t>   below = a1_below or a2_below </a:t>
+              <a:t>   </a:t>
+            </a:r>
+            <a:r>
+              <a:rPr lang="en-US" sz="1600" dirty="0" smtClean="0">
+                <a:latin typeface="Courier New" panose="02070309020205020404" pitchFamily="49" charset="0"/>
+                <a:cs typeface="Courier New" panose="02070309020205020404" pitchFamily="49" charset="0"/>
+              </a:rPr>
+              <a:t>   below </a:t>
+            </a:r>
+            <a:r>
+              <a:rPr lang="en-US" sz="1600" dirty="0">
+                <a:latin typeface="Courier New" panose="02070309020205020404" pitchFamily="49" charset="0"/>
+                <a:cs typeface="Courier New" panose="02070309020205020404" pitchFamily="49" charset="0"/>
+              </a:rPr>
+              <a:t>= a1_below </a:t>
+            </a:r>
+            <a:r>
+              <a:rPr lang="en-US" sz="1600" b="1" dirty="0">
+                <a:latin typeface="Courier New" panose="02070309020205020404" pitchFamily="49" charset="0"/>
+                <a:cs typeface="Courier New" panose="02070309020205020404" pitchFamily="49" charset="0"/>
+              </a:rPr>
+              <a:t>or</a:t>
+            </a:r>
+            <a:r>
+              <a:rPr lang="en-US" sz="1600" dirty="0">
+                <a:latin typeface="Courier New" panose="02070309020205020404" pitchFamily="49" charset="0"/>
+                <a:cs typeface="Courier New" panose="02070309020205020404" pitchFamily="49" charset="0"/>
+              </a:rPr>
+              <a:t> </a:t>
+            </a:r>
+            <a:r>
+              <a:rPr lang="en-US" sz="1600" dirty="0" smtClean="0">
+                <a:latin typeface="Courier New" panose="02070309020205020404" pitchFamily="49" charset="0"/>
+                <a:cs typeface="Courier New" panose="02070309020205020404" pitchFamily="49" charset="0"/>
+              </a:rPr>
+              <a:t>a2_below; </a:t>
             </a:r>
             <a:endParaRPr lang="en-US" sz="1600" dirty="0" smtClean="0">
               <a:latin typeface="Courier New" panose="02070309020205020404" pitchFamily="49" charset="0"/>
@@ -3853,14 +3958,63 @@
                 <a:latin typeface="Courier New" panose="02070309020205020404" pitchFamily="49" charset="0"/>
                 <a:cs typeface="Courier New" panose="02070309020205020404" pitchFamily="49" charset="0"/>
               </a:rPr>
-              <a:t>  alarm </a:t>
+              <a:t>  </a:t>
+            </a:r>
+            <a:r>
+              <a:rPr lang="en-US" sz="1600" dirty="0" smtClean="0">
+                <a:latin typeface="Courier New" panose="02070309020205020404" pitchFamily="49" charset="0"/>
+                <a:cs typeface="Courier New" panose="02070309020205020404" pitchFamily="49" charset="0"/>
+              </a:rPr>
+              <a:t>   alarm </a:t>
             </a:r>
             <a:r>
               <a:rPr lang="en-US" sz="1600" dirty="0">
                 <a:latin typeface="Courier New" panose="02070309020205020404" pitchFamily="49" charset="0"/>
                 <a:cs typeface="Courier New" panose="02070309020205020404" pitchFamily="49" charset="0"/>
               </a:rPr>
-              <a:t>= not stat1 and not stat2</a:t>
+              <a:t>= </a:t>
+            </a:r>
+            <a:r>
+              <a:rPr lang="en-US" sz="1600" b="1" dirty="0">
+                <a:latin typeface="Courier New" panose="02070309020205020404" pitchFamily="49" charset="0"/>
+                <a:cs typeface="Courier New" panose="02070309020205020404" pitchFamily="49" charset="0"/>
+              </a:rPr>
+              <a:t>not</a:t>
+            </a:r>
+            <a:r>
+              <a:rPr lang="en-US" sz="1600" dirty="0">
+                <a:latin typeface="Courier New" panose="02070309020205020404" pitchFamily="49" charset="0"/>
+                <a:cs typeface="Courier New" panose="02070309020205020404" pitchFamily="49" charset="0"/>
+              </a:rPr>
+              <a:t> stat1 </a:t>
+            </a:r>
+            <a:r>
+              <a:rPr lang="en-US" sz="1600" b="1" dirty="0">
+                <a:latin typeface="Courier New" panose="02070309020205020404" pitchFamily="49" charset="0"/>
+                <a:cs typeface="Courier New" panose="02070309020205020404" pitchFamily="49" charset="0"/>
+              </a:rPr>
+              <a:t>and</a:t>
+            </a:r>
+            <a:r>
+              <a:rPr lang="en-US" sz="1600" dirty="0">
+                <a:latin typeface="Courier New" panose="02070309020205020404" pitchFamily="49" charset="0"/>
+                <a:cs typeface="Courier New" panose="02070309020205020404" pitchFamily="49" charset="0"/>
+              </a:rPr>
+              <a:t> </a:t>
+            </a:r>
+            <a:r>
+              <a:rPr lang="en-US" sz="1600" b="1" dirty="0">
+                <a:latin typeface="Courier New" panose="02070309020205020404" pitchFamily="49" charset="0"/>
+                <a:cs typeface="Courier New" panose="02070309020205020404" pitchFamily="49" charset="0"/>
+              </a:rPr>
+              <a:t>not</a:t>
+            </a:r>
+            <a:r>
+              <a:rPr lang="en-US" sz="1600" dirty="0">
+                <a:latin typeface="Courier New" panose="02070309020205020404" pitchFamily="49" charset="0"/>
+                <a:cs typeface="Courier New" panose="02070309020205020404" pitchFamily="49" charset="0"/>
+              </a:rPr>
+              <a:t> stat2</a:t>
             </a:r>
             <a:r>
               <a:rPr lang="en-US" sz="1600" dirty="0" smtClean="0">
@@ -3886,18 +4040,74 @@
               <a:t>   </a:t>
             </a:r>
             <a:r>
-              <a:rPr lang="en-US" sz="1600" dirty="0" err="1">
+              <a:rPr lang="en-US" sz="1600" dirty="0" smtClean="0">
+                <a:latin typeface="Courier New" panose="02070309020205020404" pitchFamily="49" charset="0"/>
+                <a:cs typeface="Courier New" panose="02070309020205020404" pitchFamily="49" charset="0"/>
+              </a:rPr>
+              <a:t>   </a:t>
+            </a:r>
+            <a:r>
+              <a:rPr lang="en-US" sz="1600" dirty="0" err="1" smtClean="0">
                 <a:latin typeface="Courier New" panose="02070309020205020404" pitchFamily="49" charset="0"/>
                 <a:cs typeface="Courier New" panose="02070309020205020404" pitchFamily="49" charset="0"/>
               </a:rPr>
               <a:t>doi_on</a:t>
             </a:r>
             <a:r>
+              <a:rPr lang="en-US" sz="1600" dirty="0" smtClean="0">
+                <a:latin typeface="Courier New" panose="02070309020205020404" pitchFamily="49" charset="0"/>
+                <a:cs typeface="Courier New" panose="02070309020205020404" pitchFamily="49" charset="0"/>
+              </a:rPr>
+              <a:t> </a:t>
+            </a:r>
+            <a:r>
               <a:rPr lang="en-US" sz="1600" dirty="0">
                 <a:latin typeface="Courier New" panose="02070309020205020404" pitchFamily="49" charset="0"/>
                 <a:cs typeface="Courier New" panose="02070309020205020404" pitchFamily="49" charset="0"/>
               </a:rPr>
-              <a:t> = if alarm then pre(</a:t>
+              <a:t>= </a:t>
+            </a:r>
+            <a:r>
+              <a:rPr lang="en-US" sz="1600" b="1" dirty="0">
+                <a:latin typeface="Courier New" panose="02070309020205020404" pitchFamily="49" charset="0"/>
+                <a:cs typeface="Courier New" panose="02070309020205020404" pitchFamily="49" charset="0"/>
+              </a:rPr>
+              <a:t>if</a:t>
+            </a:r>
+            <a:r>
+              <a:rPr lang="en-US" sz="1600" dirty="0">
+                <a:latin typeface="Courier New" panose="02070309020205020404" pitchFamily="49" charset="0"/>
+                <a:cs typeface="Courier New" panose="02070309020205020404" pitchFamily="49" charset="0"/>
+              </a:rPr>
+              <a:t> alarm </a:t>
+            </a:r>
+            <a:r>
+              <a:rPr lang="en-US" sz="1600" b="1" dirty="0">
+                <a:latin typeface="Courier New" panose="02070309020205020404" pitchFamily="49" charset="0"/>
+                <a:cs typeface="Courier New" panose="02070309020205020404" pitchFamily="49" charset="0"/>
+              </a:rPr>
+              <a:t>then</a:t>
+            </a:r>
+            <a:r>
+              <a:rPr lang="en-US" sz="1600" dirty="0">
+                <a:latin typeface="Courier New" panose="02070309020205020404" pitchFamily="49" charset="0"/>
+                <a:cs typeface="Courier New" panose="02070309020205020404" pitchFamily="49" charset="0"/>
+              </a:rPr>
+              <a:t> </a:t>
+            </a:r>
+            <a:r>
+              <a:rPr lang="en-US" sz="1600" i="1" dirty="0">
+                <a:latin typeface="Courier New" panose="02070309020205020404" pitchFamily="49" charset="0"/>
+                <a:cs typeface="Courier New" panose="02070309020205020404" pitchFamily="49" charset="0"/>
+              </a:rPr>
+              <a:t>pre</a:t>
+            </a:r>
+            <a:r>
+              <a:rPr lang="en-US" sz="1600" dirty="0">
+                <a:latin typeface="Courier New" panose="02070309020205020404" pitchFamily="49" charset="0"/>
+                <a:cs typeface="Courier New" panose="02070309020205020404" pitchFamily="49" charset="0"/>
+              </a:rPr>
+              <a:t>(</a:t>
             </a:r>
             <a:r>
               <a:rPr lang="en-US" sz="1600" dirty="0" err="1">
@@ -3941,28 +4151,91 @@
                 <a:latin typeface="Courier New" panose="02070309020205020404" pitchFamily="49" charset="0"/>
                 <a:cs typeface="Courier New" panose="02070309020205020404" pitchFamily="49" charset="0"/>
               </a:rPr>
-              <a:t>else </a:t>
+              <a:t>   </a:t>
+            </a:r>
+            <a:r>
+              <a:rPr lang="en-US" sz="1600" b="1" dirty="0" smtClean="0">
+                <a:latin typeface="Courier New" panose="02070309020205020404" pitchFamily="49" charset="0"/>
+                <a:cs typeface="Courier New" panose="02070309020205020404" pitchFamily="49" charset="0"/>
+              </a:rPr>
+              <a:t>else</a:t>
+            </a:r>
+            <a:r>
+              <a:rPr lang="en-US" sz="1600" dirty="0" smtClean="0">
+                <a:latin typeface="Courier New" panose="02070309020205020404" pitchFamily="49" charset="0"/>
+                <a:cs typeface="Courier New" panose="02070309020205020404" pitchFamily="49" charset="0"/>
+              </a:rPr>
+              <a:t> </a:t>
+            </a:r>
+            <a:r>
+              <a:rPr lang="en-US" sz="1600" b="1" dirty="0">
+                <a:latin typeface="Courier New" panose="02070309020205020404" pitchFamily="49" charset="0"/>
+                <a:cs typeface="Courier New" panose="02070309020205020404" pitchFamily="49" charset="0"/>
+              </a:rPr>
+              <a:t>if</a:t>
             </a:r>
             <a:r>
               <a:rPr lang="en-US" sz="1600" dirty="0">
                 <a:latin typeface="Courier New" panose="02070309020205020404" pitchFamily="49" charset="0"/>
                 <a:cs typeface="Courier New" panose="02070309020205020404" pitchFamily="49" charset="0"/>
               </a:rPr>
-              <a:t>if below then </a:t>
+              <a:t> below </a:t>
+            </a:r>
+            <a:r>
+              <a:rPr lang="en-US" sz="1600" b="1" dirty="0">
+                <a:latin typeface="Courier New" panose="02070309020205020404" pitchFamily="49" charset="0"/>
+                <a:cs typeface="Courier New" panose="02070309020205020404" pitchFamily="49" charset="0"/>
+              </a:rPr>
+              <a:t>then</a:t>
+            </a:r>
+            <a:r>
+              <a:rPr lang="en-US" sz="1600" dirty="0">
+                <a:latin typeface="Courier New" panose="02070309020205020404" pitchFamily="49" charset="0"/>
+                <a:cs typeface="Courier New" panose="02070309020205020404" pitchFamily="49" charset="0"/>
+              </a:rPr>
+              <a:t> </a:t>
+            </a:r>
+            <a:r>
+              <a:rPr lang="en-US" sz="1600" i="1" dirty="0" smtClean="0">
+                <a:latin typeface="Courier New" panose="02070309020205020404" pitchFamily="49" charset="0"/>
+                <a:cs typeface="Courier New" panose="02070309020205020404" pitchFamily="49" charset="0"/>
+              </a:rPr>
+              <a:t>true</a:t>
             </a:r>
             <a:r>
               <a:rPr lang="en-US" sz="1600" dirty="0" smtClean="0">
                 <a:latin typeface="Courier New" panose="02070309020205020404" pitchFamily="49" charset="0"/>
                 <a:cs typeface="Courier New" panose="02070309020205020404" pitchFamily="49" charset="0"/>
               </a:rPr>
-              <a:t>true  else </a:t>
+              <a:t>  </a:t>
+            </a:r>
+            <a:r>
+              <a:rPr lang="en-US" sz="1600" b="1" dirty="0" smtClean="0">
+                <a:latin typeface="Courier New" panose="02070309020205020404" pitchFamily="49" charset="0"/>
+                <a:cs typeface="Courier New" panose="02070309020205020404" pitchFamily="49" charset="0"/>
+              </a:rPr>
+              <a:t>else</a:t>
+            </a:r>
+            <a:r>
+              <a:rPr lang="en-US" sz="1600" dirty="0" smtClean="0">
+                <a:latin typeface="Courier New" panose="02070309020205020404" pitchFamily="49" charset="0"/>
+                <a:cs typeface="Courier New" panose="02070309020205020404" pitchFamily="49" charset="0"/>
+              </a:rPr>
+              <a:t> </a:t>
+            </a:r>
+            <a:r>
+              <a:rPr lang="en-US" sz="1600" i="1" dirty="0">
+                <a:latin typeface="Courier New" panose="02070309020205020404" pitchFamily="49" charset="0"/>
+                <a:cs typeface="Courier New" panose="02070309020205020404" pitchFamily="49" charset="0"/>
+              </a:rPr>
+              <a:t>false</a:t>
             </a:r>
             <a:r>
               <a:rPr lang="en-US" sz="1600" dirty="0">
                 <a:latin typeface="Courier New" panose="02070309020205020404" pitchFamily="49" charset="0"/>
                 <a:cs typeface="Courier New" panose="02070309020205020404" pitchFamily="49" charset="0"/>
               </a:rPr>
-              <a:t>false;</a:t>
+              <a:t>;</a:t>
             </a:r>
           </a:p>
           <a:p>
@@ -3974,7 +4247,35 @@
                 <a:latin typeface="Courier New" panose="02070309020205020404" pitchFamily="49" charset="0"/>
                 <a:cs typeface="Courier New" panose="02070309020205020404" pitchFamily="49" charset="0"/>
               </a:rPr>
-              <a:t>   p1 = a1_below =&gt; </a:t>
+              <a:t>   </a:t>
+            </a:r>
+            <a:r>
+              <a:rPr lang="en-US" sz="1600" dirty="0" smtClean="0">
+                <a:latin typeface="Courier New" panose="02070309020205020404" pitchFamily="49" charset="0"/>
+                <a:cs typeface="Courier New" panose="02070309020205020404" pitchFamily="49" charset="0"/>
+              </a:rPr>
+              <a:t>   p1 </a:t>
+            </a:r>
+            <a:r>
+              <a:rPr lang="en-US" sz="1600" dirty="0">
+                <a:latin typeface="Courier New" panose="02070309020205020404" pitchFamily="49" charset="0"/>
+                <a:cs typeface="Courier New" panose="02070309020205020404" pitchFamily="49" charset="0"/>
+              </a:rPr>
+              <a:t>= a1_below </a:t>
+            </a:r>
+            <a:r>
+              <a:rPr lang="en-US" sz="1600" b="1" dirty="0">
+                <a:latin typeface="Courier New" panose="02070309020205020404" pitchFamily="49" charset="0"/>
+                <a:cs typeface="Courier New" panose="02070309020205020404" pitchFamily="49" charset="0"/>
+              </a:rPr>
+              <a:t>=&gt;</a:t>
+            </a:r>
+            <a:r>
+              <a:rPr lang="en-US" sz="1600" dirty="0">
+                <a:latin typeface="Courier New" panose="02070309020205020404" pitchFamily="49" charset="0"/>
+                <a:cs typeface="Courier New" panose="02070309020205020404" pitchFamily="49" charset="0"/>
+              </a:rPr>
+              <a:t> </a:t>
             </a:r>
             <a:r>
               <a:rPr lang="en-US" sz="1600" dirty="0" err="1">
@@ -4000,29 +4301,75 @@
                 <a:latin typeface="Courier New" panose="02070309020205020404" pitchFamily="49" charset="0"/>
                 <a:cs typeface="Courier New" panose="02070309020205020404" pitchFamily="49" charset="0"/>
               </a:rPr>
-              <a:t>   p2 = a2_below =&gt; </a:t>
-            </a:r>
-            <a:r>
-              <a:rPr lang="en-US" sz="1600" dirty="0" err="1">
+              <a:t>   </a:t>
+            </a:r>
+            <a:r>
+              <a:rPr lang="en-US" sz="1600" dirty="0" smtClean="0">
+                <a:latin typeface="Courier New" panose="02070309020205020404" pitchFamily="49" charset="0"/>
+                <a:cs typeface="Courier New" panose="02070309020205020404" pitchFamily="49" charset="0"/>
+              </a:rPr>
+              <a:t>   p2 </a:t>
+            </a:r>
+            <a:r>
+              <a:rPr lang="en-US" sz="1600" dirty="0">
+                <a:latin typeface="Courier New" panose="02070309020205020404" pitchFamily="49" charset="0"/>
+                <a:cs typeface="Courier New" panose="02070309020205020404" pitchFamily="49" charset="0"/>
+              </a:rPr>
+              <a:t>= a2_below </a:t>
+            </a:r>
+            <a:r>
+              <a:rPr lang="en-US" sz="1600" b="1" dirty="0">
+                <a:latin typeface="Courier New" panose="02070309020205020404" pitchFamily="49" charset="0"/>
+                <a:cs typeface="Courier New" panose="02070309020205020404" pitchFamily="49" charset="0"/>
+              </a:rPr>
+              <a:t>=&gt;</a:t>
+            </a:r>
+            <a:r>
+              <a:rPr lang="en-US" sz="1600" dirty="0">
+                <a:latin typeface="Courier New" panose="02070309020205020404" pitchFamily="49" charset="0"/>
+                <a:cs typeface="Courier New" panose="02070309020205020404" pitchFamily="49" charset="0"/>
+              </a:rPr>
+              <a:t> </a:t>
+            </a:r>
+            <a:r>
+              <a:rPr lang="en-US" sz="1600" dirty="0" err="1" smtClean="0">
                 <a:latin typeface="Courier New" panose="02070309020205020404" pitchFamily="49" charset="0"/>
                 <a:cs typeface="Courier New" panose="02070309020205020404" pitchFamily="49" charset="0"/>
               </a:rPr>
               <a:t>doi_on</a:t>
             </a:r>
             <a:r>
+              <a:rPr lang="en-US" sz="1600" dirty="0" smtClean="0">
+                <a:latin typeface="Courier New" panose="02070309020205020404" pitchFamily="49" charset="0"/>
+                <a:cs typeface="Courier New" panose="02070309020205020404" pitchFamily="49" charset="0"/>
+              </a:rPr>
+              <a:t>;                </a:t>
+            </a:r>
+            <a:endParaRPr lang="en-US" sz="1600" dirty="0">
+              <a:latin typeface="Courier New" panose="02070309020205020404" pitchFamily="49" charset="0"/>
+              <a:cs typeface="Courier New" panose="02070309020205020404" pitchFamily="49" charset="0"/>
+            </a:endParaRPr>
+          </a:p>
+          <a:p>
+            <a:pPr marL="0" indent="0">
+              <a:buNone/>
+            </a:pPr>
+            <a:r>
               <a:rPr lang="en-US" sz="1600" dirty="0">
                 <a:latin typeface="Courier New" panose="02070309020205020404" pitchFamily="49" charset="0"/>
                 <a:cs typeface="Courier New" panose="02070309020205020404" pitchFamily="49" charset="0"/>
               </a:rPr>
-              <a:t> ;                </a:t>
-            </a:r>
-          </a:p>
-          <a:p>
-            <a:pPr marL="0" indent="0">
-              <a:buNone/>
-            </a:pPr>
-            <a:r>
-              <a:rPr lang="en-US" sz="1600" dirty="0" err="1">
+              <a:t> </a:t>
+            </a:r>
+            <a:r>
+              <a:rPr lang="en-US" sz="1600" dirty="0" smtClean="0">
+                <a:latin typeface="Courier New" panose="02070309020205020404" pitchFamily="49" charset="0"/>
+                <a:cs typeface="Courier New" panose="02070309020205020404" pitchFamily="49" charset="0"/>
+              </a:rPr>
+              <a:t> </a:t>
+            </a:r>
+            <a:r>
+              <a:rPr lang="en-US" sz="1600" b="1" dirty="0" err="1" smtClean="0">
                 <a:latin typeface="Courier New" panose="02070309020205020404" pitchFamily="49" charset="0"/>
                 <a:cs typeface="Courier New" panose="02070309020205020404" pitchFamily="49" charset="0"/>
               </a:rPr>
@@ -4046,7 +4393,7 @@
         </p:nvSpPr>
         <p:spPr>
           <a:xfrm>
-            <a:off x="1660841" y="2921577"/>
+            <a:off x="1899103" y="2550642"/>
             <a:ext cx="506870" cy="307777"/>
           </a:xfrm>
           <a:prstGeom prst="rect">
@@ -4081,7 +4428,7 @@
         </p:nvSpPr>
         <p:spPr>
           <a:xfrm>
-            <a:off x="1660841" y="3253857"/>
+            <a:off x="1899103" y="2882922"/>
             <a:ext cx="506870" cy="307777"/>
           </a:xfrm>
           <a:prstGeom prst="rect">
@@ -4116,7 +4463,7 @@
         </p:nvSpPr>
         <p:spPr>
           <a:xfrm>
-            <a:off x="1660841" y="3606644"/>
+            <a:off x="1899103" y="3235709"/>
             <a:ext cx="506870" cy="307777"/>
           </a:xfrm>
           <a:prstGeom prst="rect">
@@ -4151,7 +4498,7 @@
         </p:nvSpPr>
         <p:spPr>
           <a:xfrm>
-            <a:off x="1660841" y="3963427"/>
+            <a:off x="1899103" y="3592492"/>
             <a:ext cx="506870" cy="307777"/>
           </a:xfrm>
           <a:prstGeom prst="rect">
@@ -4186,7 +4533,7 @@
         </p:nvSpPr>
         <p:spPr>
           <a:xfrm>
-            <a:off x="1660841" y="4320210"/>
+            <a:off x="1899103" y="3949275"/>
             <a:ext cx="506870" cy="307777"/>
           </a:xfrm>
           <a:prstGeom prst="rect">
@@ -4221,7 +4568,7 @@
         </p:nvSpPr>
         <p:spPr>
           <a:xfrm>
-            <a:off x="1660841" y="5011778"/>
+            <a:off x="1899103" y="4640843"/>
             <a:ext cx="506870" cy="307777"/>
           </a:xfrm>
           <a:prstGeom prst="rect">
@@ -4256,7 +4603,7 @@
         </p:nvSpPr>
         <p:spPr>
           <a:xfrm>
-            <a:off x="1660841" y="5319555"/>
+            <a:off x="1899103" y="4948620"/>
             <a:ext cx="506870" cy="307777"/>
           </a:xfrm>
           <a:prstGeom prst="rect">
@@ -4292,7 +4639,7 @@
         <p:spPr>
           <a:xfrm>
             <a:off x="1496203" y="576483"/>
-            <a:ext cx="8682967" cy="5524499"/>
+            <a:ext cx="8347807" cy="5246347"/>
           </a:xfrm>
           <a:prstGeom prst="rect">
             <a:avLst/>
@@ -4326,6 +4673,162 @@
           <a:p>
             <a:pPr algn="ctr"/>
             <a:endParaRPr lang="en-US" sz="1600">
+              <a:latin typeface="Courier New" panose="02070309020205020404" pitchFamily="49" charset="0"/>
+              <a:cs typeface="Courier New" panose="02070309020205020404" pitchFamily="49" charset="0"/>
+            </a:endParaRPr>
+          </a:p>
+        </p:txBody>
+      </p:sp>
+      <p:sp>
+        <p:nvSpPr>
+          <p:cNvPr id="2" name="Rectangle 1"/>
+          <p:cNvSpPr/>
+          <p:nvPr/>
+        </p:nvSpPr>
+        <p:spPr>
+          <a:xfrm>
+            <a:off x="1831362" y="774778"/>
+            <a:ext cx="8012648" cy="615553"/>
+          </a:xfrm>
+          <a:prstGeom prst="rect">
+            <a:avLst/>
+          </a:prstGeom>
+        </p:spPr>
+        <p:txBody>
+          <a:bodyPr wrap="square">
+            <a:spAutoFit/>
+          </a:bodyPr>
+          <a:lstStyle/>
+          <a:p>
+            <a:r>
+              <a:rPr lang="en-US" sz="1700" b="1" dirty="0">
+                <a:latin typeface="Courier New" panose="02070309020205020404" pitchFamily="49" charset="0"/>
+                <a:cs typeface="Courier New" panose="02070309020205020404" pitchFamily="49" charset="0"/>
+              </a:rPr>
+              <a:t>node</a:t>
+            </a:r>
+            <a:r>
+              <a:rPr lang="en-US" sz="1700" dirty="0">
+                <a:latin typeface="Courier New" panose="02070309020205020404" pitchFamily="49" charset="0"/>
+                <a:cs typeface="Courier New" panose="02070309020205020404" pitchFamily="49" charset="0"/>
+              </a:rPr>
+              <a:t> </a:t>
+            </a:r>
+            <a:r>
+              <a:rPr lang="en-US" sz="1700" dirty="0" err="1">
+                <a:latin typeface="Courier New" panose="02070309020205020404" pitchFamily="49" charset="0"/>
+                <a:cs typeface="Courier New" panose="02070309020205020404" pitchFamily="49" charset="0"/>
+              </a:rPr>
+              <a:t>asw</a:t>
+            </a:r>
+            <a:r>
+              <a:rPr lang="en-US" sz="1700" dirty="0">
+                <a:latin typeface="Courier New" panose="02070309020205020404" pitchFamily="49" charset="0"/>
+                <a:cs typeface="Courier New" panose="02070309020205020404" pitchFamily="49" charset="0"/>
+              </a:rPr>
+              <a:t>(alt1, alt2: </a:t>
+            </a:r>
+            <a:r>
+              <a:rPr lang="en-US" sz="1700" b="1" dirty="0" err="1">
+                <a:latin typeface="Courier New" panose="02070309020205020404" pitchFamily="49" charset="0"/>
+                <a:cs typeface="Courier New" panose="02070309020205020404" pitchFamily="49" charset="0"/>
+              </a:rPr>
+              <a:t>int</a:t>
+            </a:r>
+            <a:r>
+              <a:rPr lang="en-US" sz="1700" dirty="0">
+                <a:latin typeface="Courier New" panose="02070309020205020404" pitchFamily="49" charset="0"/>
+                <a:cs typeface="Courier New" panose="02070309020205020404" pitchFamily="49" charset="0"/>
+              </a:rPr>
+              <a:t>; stat1, stat2 : </a:t>
+            </a:r>
+            <a:r>
+              <a:rPr lang="en-US" sz="1700" b="1" dirty="0">
+                <a:latin typeface="Courier New" panose="02070309020205020404" pitchFamily="49" charset="0"/>
+                <a:cs typeface="Courier New" panose="02070309020205020404" pitchFamily="49" charset="0"/>
+              </a:rPr>
+              <a:t>bool</a:t>
+            </a:r>
+            <a:r>
+              <a:rPr lang="en-US" sz="1700" dirty="0">
+                <a:latin typeface="Courier New" panose="02070309020205020404" pitchFamily="49" charset="0"/>
+                <a:cs typeface="Courier New" panose="02070309020205020404" pitchFamily="49" charset="0"/>
+              </a:rPr>
+              <a:t>)</a:t>
+            </a:r>
+          </a:p>
+          <a:p>
+            <a:r>
+              <a:rPr lang="en-US" sz="1700" dirty="0" smtClean="0">
+                <a:latin typeface="Courier New" panose="02070309020205020404" pitchFamily="49" charset="0"/>
+                <a:cs typeface="Courier New" panose="02070309020205020404" pitchFamily="49" charset="0"/>
+              </a:rPr>
+              <a:t>     </a:t>
+            </a:r>
+            <a:r>
+              <a:rPr lang="en-US" sz="1700" b="1" dirty="0" smtClean="0">
+                <a:latin typeface="Courier New" panose="02070309020205020404" pitchFamily="49" charset="0"/>
+                <a:cs typeface="Courier New" panose="02070309020205020404" pitchFamily="49" charset="0"/>
+              </a:rPr>
+              <a:t>returns</a:t>
+            </a:r>
+            <a:r>
+              <a:rPr lang="en-US" sz="1700" dirty="0" smtClean="0">
+                <a:latin typeface="Courier New" panose="02070309020205020404" pitchFamily="49" charset="0"/>
+                <a:cs typeface="Courier New" panose="02070309020205020404" pitchFamily="49" charset="0"/>
+              </a:rPr>
+              <a:t> </a:t>
+            </a:r>
+            <a:r>
+              <a:rPr lang="en-US" sz="1700" dirty="0">
+                <a:latin typeface="Courier New" panose="02070309020205020404" pitchFamily="49" charset="0"/>
+                <a:cs typeface="Courier New" panose="02070309020205020404" pitchFamily="49" charset="0"/>
+              </a:rPr>
+              <a:t>(alarm: </a:t>
+            </a:r>
+            <a:r>
+              <a:rPr lang="en-US" sz="1700" b="1" dirty="0">
+                <a:latin typeface="Courier New" panose="02070309020205020404" pitchFamily="49" charset="0"/>
+                <a:cs typeface="Courier New" panose="02070309020205020404" pitchFamily="49" charset="0"/>
+              </a:rPr>
+              <a:t>bool</a:t>
+            </a:r>
+            <a:r>
+              <a:rPr lang="en-US" sz="1700" dirty="0">
+                <a:latin typeface="Courier New" panose="02070309020205020404" pitchFamily="49" charset="0"/>
+                <a:cs typeface="Courier New" panose="02070309020205020404" pitchFamily="49" charset="0"/>
+              </a:rPr>
+              <a:t>; </a:t>
+            </a:r>
+            <a:r>
+              <a:rPr lang="en-US" sz="1700" dirty="0" err="1">
+                <a:latin typeface="Courier New" panose="02070309020205020404" pitchFamily="49" charset="0"/>
+                <a:cs typeface="Courier New" panose="02070309020205020404" pitchFamily="49" charset="0"/>
+              </a:rPr>
+              <a:t>doi_on</a:t>
+            </a:r>
+            <a:r>
+              <a:rPr lang="en-US" sz="1700" dirty="0">
+                <a:latin typeface="Courier New" panose="02070309020205020404" pitchFamily="49" charset="0"/>
+                <a:cs typeface="Courier New" panose="02070309020205020404" pitchFamily="49" charset="0"/>
+              </a:rPr>
+              <a:t>: </a:t>
+            </a:r>
+            <a:r>
+              <a:rPr lang="en-US" sz="1700" b="1" dirty="0">
+                <a:latin typeface="Courier New" panose="02070309020205020404" pitchFamily="49" charset="0"/>
+                <a:cs typeface="Courier New" panose="02070309020205020404" pitchFamily="49" charset="0"/>
+              </a:rPr>
+              <a:t>bool</a:t>
+            </a:r>
+            <a:r>
+              <a:rPr lang="en-US" sz="1700" dirty="0">
+                <a:latin typeface="Courier New" panose="02070309020205020404" pitchFamily="49" charset="0"/>
+                <a:cs typeface="Courier New" panose="02070309020205020404" pitchFamily="49" charset="0"/>
+              </a:rPr>
+              <a:t>);</a:t>
+            </a:r>
+            <a:endParaRPr lang="en-US" sz="1700" dirty="0">
               <a:latin typeface="Courier New" panose="02070309020205020404" pitchFamily="49" charset="0"/>
               <a:cs typeface="Courier New" panose="02070309020205020404" pitchFamily="49" charset="0"/>
             </a:endParaRPr>

</xml_diff>

<commit_message>
add impl section to the AIVC paper
</commit_message>
<xml_diff>
--- a/all_ivcs/all_ivcs_TEX/figs/figs.pptx
+++ b/all_ivcs/all_ivcs_TEX/figs/figs.pptx
@@ -3673,6 +3673,13 @@
               <a:buNone/>
             </a:pPr>
             <a:r>
+              <a:rPr lang="en-US" sz="1600" b="1" dirty="0" smtClean="0">
+                <a:latin typeface="Courier New" panose="02070309020205020404" pitchFamily="49" charset="0"/>
+                <a:cs typeface="Courier New" panose="02070309020205020404" pitchFamily="49" charset="0"/>
+              </a:rPr>
+              <a:t>  </a:t>
+            </a:r>
+            <a:r>
               <a:rPr lang="en-US" sz="1600" b="1" dirty="0" err="1" smtClean="0">
                 <a:latin typeface="Courier New" panose="02070309020205020404" pitchFamily="49" charset="0"/>
                 <a:cs typeface="Courier New" panose="02070309020205020404" pitchFamily="49" charset="0"/>
@@ -3937,6 +3944,181 @@
               </a:rPr>
               <a:t>a2_below; </a:t>
             </a:r>
+          </a:p>
+          <a:p>
+            <a:pPr marL="0" indent="0">
+              <a:buNone/>
+            </a:pPr>
+            <a:r>
+              <a:rPr lang="en-US" sz="1600" dirty="0">
+                <a:latin typeface="Courier New" panose="02070309020205020404" pitchFamily="49" charset="0"/>
+                <a:cs typeface="Courier New" panose="02070309020205020404" pitchFamily="49" charset="0"/>
+              </a:rPr>
+              <a:t> </a:t>
+            </a:r>
+            <a:r>
+              <a:rPr lang="en-US" sz="1600" dirty="0" smtClean="0">
+                <a:latin typeface="Courier New" panose="02070309020205020404" pitchFamily="49" charset="0"/>
+                <a:cs typeface="Courier New" panose="02070309020205020404" pitchFamily="49" charset="0"/>
+              </a:rPr>
+              <a:t>     alarm </a:t>
+            </a:r>
+            <a:r>
+              <a:rPr lang="en-US" sz="1600" dirty="0">
+                <a:latin typeface="Courier New" panose="02070309020205020404" pitchFamily="49" charset="0"/>
+                <a:cs typeface="Courier New" panose="02070309020205020404" pitchFamily="49" charset="0"/>
+              </a:rPr>
+              <a:t>= </a:t>
+            </a:r>
+            <a:r>
+              <a:rPr lang="en-US" sz="1600" b="1" dirty="0">
+                <a:latin typeface="Courier New" panose="02070309020205020404" pitchFamily="49" charset="0"/>
+                <a:cs typeface="Courier New" panose="02070309020205020404" pitchFamily="49" charset="0"/>
+              </a:rPr>
+              <a:t>not</a:t>
+            </a:r>
+            <a:r>
+              <a:rPr lang="en-US" sz="1600" dirty="0">
+                <a:latin typeface="Courier New" panose="02070309020205020404" pitchFamily="49" charset="0"/>
+                <a:cs typeface="Courier New" panose="02070309020205020404" pitchFamily="49" charset="0"/>
+              </a:rPr>
+              <a:t> stat1 </a:t>
+            </a:r>
+            <a:r>
+              <a:rPr lang="en-US" sz="1600" b="1" dirty="0">
+                <a:latin typeface="Courier New" panose="02070309020205020404" pitchFamily="49" charset="0"/>
+                <a:cs typeface="Courier New" panose="02070309020205020404" pitchFamily="49" charset="0"/>
+              </a:rPr>
+              <a:t>and</a:t>
+            </a:r>
+            <a:r>
+              <a:rPr lang="en-US" sz="1600" dirty="0">
+                <a:latin typeface="Courier New" panose="02070309020205020404" pitchFamily="49" charset="0"/>
+                <a:cs typeface="Courier New" panose="02070309020205020404" pitchFamily="49" charset="0"/>
+              </a:rPr>
+              <a:t> </a:t>
+            </a:r>
+            <a:r>
+              <a:rPr lang="en-US" sz="1600" b="1" dirty="0">
+                <a:latin typeface="Courier New" panose="02070309020205020404" pitchFamily="49" charset="0"/>
+                <a:cs typeface="Courier New" panose="02070309020205020404" pitchFamily="49" charset="0"/>
+              </a:rPr>
+              <a:t>not</a:t>
+            </a:r>
+            <a:r>
+              <a:rPr lang="en-US" sz="1600" dirty="0">
+                <a:latin typeface="Courier New" panose="02070309020205020404" pitchFamily="49" charset="0"/>
+                <a:cs typeface="Courier New" panose="02070309020205020404" pitchFamily="49" charset="0"/>
+              </a:rPr>
+              <a:t> stat2</a:t>
+            </a:r>
+            <a:r>
+              <a:rPr lang="en-US" sz="1600" dirty="0" smtClean="0">
+                <a:latin typeface="Courier New" panose="02070309020205020404" pitchFamily="49" charset="0"/>
+                <a:cs typeface="Courier New" panose="02070309020205020404" pitchFamily="49" charset="0"/>
+              </a:rPr>
+              <a:t>;</a:t>
+            </a:r>
+            <a:endParaRPr lang="en-US" sz="1600" dirty="0">
+              <a:latin typeface="Courier New" panose="02070309020205020404" pitchFamily="49" charset="0"/>
+              <a:cs typeface="Courier New" panose="02070309020205020404" pitchFamily="49" charset="0"/>
+            </a:endParaRPr>
+          </a:p>
+          <a:p>
+            <a:pPr marL="0" indent="0">
+              <a:buNone/>
+            </a:pPr>
+            <a:r>
+              <a:rPr lang="en-US" sz="1600" dirty="0">
+                <a:latin typeface="Courier New" panose="02070309020205020404" pitchFamily="49" charset="0"/>
+                <a:cs typeface="Courier New" panose="02070309020205020404" pitchFamily="49" charset="0"/>
+              </a:rPr>
+              <a:t>   </a:t>
+            </a:r>
+            <a:r>
+              <a:rPr lang="en-US" sz="1600" dirty="0" smtClean="0">
+                <a:latin typeface="Courier New" panose="02070309020205020404" pitchFamily="49" charset="0"/>
+                <a:cs typeface="Courier New" panose="02070309020205020404" pitchFamily="49" charset="0"/>
+              </a:rPr>
+              <a:t>   </a:t>
+            </a:r>
+            <a:r>
+              <a:rPr lang="en-US" sz="1600" dirty="0" err="1" smtClean="0">
+                <a:latin typeface="Courier New" panose="02070309020205020404" pitchFamily="49" charset="0"/>
+                <a:cs typeface="Courier New" panose="02070309020205020404" pitchFamily="49" charset="0"/>
+              </a:rPr>
+              <a:t>doi_on</a:t>
+            </a:r>
+            <a:r>
+              <a:rPr lang="en-US" sz="1600" dirty="0" smtClean="0">
+                <a:latin typeface="Courier New" panose="02070309020205020404" pitchFamily="49" charset="0"/>
+                <a:cs typeface="Courier New" panose="02070309020205020404" pitchFamily="49" charset="0"/>
+              </a:rPr>
+              <a:t> </a:t>
+            </a:r>
+            <a:r>
+              <a:rPr lang="en-US" sz="1600" dirty="0">
+                <a:latin typeface="Courier New" panose="02070309020205020404" pitchFamily="49" charset="0"/>
+                <a:cs typeface="Courier New" panose="02070309020205020404" pitchFamily="49" charset="0"/>
+              </a:rPr>
+              <a:t>= </a:t>
+            </a:r>
+            <a:r>
+              <a:rPr lang="en-US" sz="1600" b="1" dirty="0">
+                <a:latin typeface="Courier New" panose="02070309020205020404" pitchFamily="49" charset="0"/>
+                <a:cs typeface="Courier New" panose="02070309020205020404" pitchFamily="49" charset="0"/>
+              </a:rPr>
+              <a:t>if</a:t>
+            </a:r>
+            <a:r>
+              <a:rPr lang="en-US" sz="1600" dirty="0">
+                <a:latin typeface="Courier New" panose="02070309020205020404" pitchFamily="49" charset="0"/>
+                <a:cs typeface="Courier New" panose="02070309020205020404" pitchFamily="49" charset="0"/>
+              </a:rPr>
+              <a:t> alarm </a:t>
+            </a:r>
+            <a:r>
+              <a:rPr lang="en-US" sz="1600" b="1" dirty="0">
+                <a:latin typeface="Courier New" panose="02070309020205020404" pitchFamily="49" charset="0"/>
+                <a:cs typeface="Courier New" panose="02070309020205020404" pitchFamily="49" charset="0"/>
+              </a:rPr>
+              <a:t>then</a:t>
+            </a:r>
+            <a:r>
+              <a:rPr lang="en-US" sz="1600" dirty="0">
+                <a:latin typeface="Courier New" panose="02070309020205020404" pitchFamily="49" charset="0"/>
+                <a:cs typeface="Courier New" panose="02070309020205020404" pitchFamily="49" charset="0"/>
+              </a:rPr>
+              <a:t> </a:t>
+            </a:r>
+            <a:r>
+              <a:rPr lang="en-US" sz="1600" i="1" dirty="0">
+                <a:latin typeface="Courier New" panose="02070309020205020404" pitchFamily="49" charset="0"/>
+                <a:cs typeface="Courier New" panose="02070309020205020404" pitchFamily="49" charset="0"/>
+              </a:rPr>
+              <a:t>pre</a:t>
+            </a:r>
+            <a:r>
+              <a:rPr lang="en-US" sz="1600" dirty="0">
+                <a:latin typeface="Courier New" panose="02070309020205020404" pitchFamily="49" charset="0"/>
+                <a:cs typeface="Courier New" panose="02070309020205020404" pitchFamily="49" charset="0"/>
+              </a:rPr>
+              <a:t>(</a:t>
+            </a:r>
+            <a:r>
+              <a:rPr lang="en-US" sz="1600" dirty="0" err="1">
+                <a:latin typeface="Courier New" panose="02070309020205020404" pitchFamily="49" charset="0"/>
+                <a:cs typeface="Courier New" panose="02070309020205020404" pitchFamily="49" charset="0"/>
+              </a:rPr>
+              <a:t>doi_on</a:t>
+            </a:r>
+            <a:r>
+              <a:rPr lang="en-US" sz="1600" dirty="0">
+                <a:latin typeface="Courier New" panose="02070309020205020404" pitchFamily="49" charset="0"/>
+                <a:cs typeface="Courier New" panose="02070309020205020404" pitchFamily="49" charset="0"/>
+              </a:rPr>
+              <a:t>)  </a:t>
+            </a:r>
             <a:endParaRPr lang="en-US" sz="1600" dirty="0" smtClean="0">
               <a:latin typeface="Courier New" panose="02070309020205020404" pitchFamily="49" charset="0"/>
               <a:cs typeface="Courier New" panose="02070309020205020404" pitchFamily="49" charset="0"/>
@@ -3958,200 +4140,7 @@
                 <a:latin typeface="Courier New" panose="02070309020205020404" pitchFamily="49" charset="0"/>
                 <a:cs typeface="Courier New" panose="02070309020205020404" pitchFamily="49" charset="0"/>
               </a:rPr>
-              <a:t>  </a:t>
-            </a:r>
-            <a:r>
-              <a:rPr lang="en-US" sz="1600" dirty="0" smtClean="0">
-                <a:latin typeface="Courier New" panose="02070309020205020404" pitchFamily="49" charset="0"/>
-                <a:cs typeface="Courier New" panose="02070309020205020404" pitchFamily="49" charset="0"/>
-              </a:rPr>
-              <a:t>   alarm </a:t>
-            </a:r>
-            <a:r>
-              <a:rPr lang="en-US" sz="1600" dirty="0">
-                <a:latin typeface="Courier New" panose="02070309020205020404" pitchFamily="49" charset="0"/>
-                <a:cs typeface="Courier New" panose="02070309020205020404" pitchFamily="49" charset="0"/>
-              </a:rPr>
-              <a:t>= </a:t>
-            </a:r>
-            <a:r>
-              <a:rPr lang="en-US" sz="1600" b="1" dirty="0">
-                <a:latin typeface="Courier New" panose="02070309020205020404" pitchFamily="49" charset="0"/>
-                <a:cs typeface="Courier New" panose="02070309020205020404" pitchFamily="49" charset="0"/>
-              </a:rPr>
-              <a:t>not</a:t>
-            </a:r>
-            <a:r>
-              <a:rPr lang="en-US" sz="1600" dirty="0">
-                <a:latin typeface="Courier New" panose="02070309020205020404" pitchFamily="49" charset="0"/>
-                <a:cs typeface="Courier New" panose="02070309020205020404" pitchFamily="49" charset="0"/>
-              </a:rPr>
-              <a:t> stat1 </a:t>
-            </a:r>
-            <a:r>
-              <a:rPr lang="en-US" sz="1600" b="1" dirty="0">
-                <a:latin typeface="Courier New" panose="02070309020205020404" pitchFamily="49" charset="0"/>
-                <a:cs typeface="Courier New" panose="02070309020205020404" pitchFamily="49" charset="0"/>
-              </a:rPr>
-              <a:t>and</a:t>
-            </a:r>
-            <a:r>
-              <a:rPr lang="en-US" sz="1600" dirty="0">
-                <a:latin typeface="Courier New" panose="02070309020205020404" pitchFamily="49" charset="0"/>
-                <a:cs typeface="Courier New" panose="02070309020205020404" pitchFamily="49" charset="0"/>
-              </a:rPr>
-              <a:t> </a:t>
-            </a:r>
-            <a:r>
-              <a:rPr lang="en-US" sz="1600" b="1" dirty="0">
-                <a:latin typeface="Courier New" panose="02070309020205020404" pitchFamily="49" charset="0"/>
-                <a:cs typeface="Courier New" panose="02070309020205020404" pitchFamily="49" charset="0"/>
-              </a:rPr>
-              <a:t>not</a:t>
-            </a:r>
-            <a:r>
-              <a:rPr lang="en-US" sz="1600" dirty="0">
-                <a:latin typeface="Courier New" panose="02070309020205020404" pitchFamily="49" charset="0"/>
-                <a:cs typeface="Courier New" panose="02070309020205020404" pitchFamily="49" charset="0"/>
-              </a:rPr>
-              <a:t> stat2</a:t>
-            </a:r>
-            <a:r>
-              <a:rPr lang="en-US" sz="1600" dirty="0" smtClean="0">
-                <a:latin typeface="Courier New" panose="02070309020205020404" pitchFamily="49" charset="0"/>
-                <a:cs typeface="Courier New" panose="02070309020205020404" pitchFamily="49" charset="0"/>
-              </a:rPr>
-              <a:t>;</a:t>
-            </a:r>
-            <a:endParaRPr lang="en-US" sz="1600" dirty="0">
-              <a:latin typeface="Courier New" panose="02070309020205020404" pitchFamily="49" charset="0"/>
-              <a:cs typeface="Courier New" panose="02070309020205020404" pitchFamily="49" charset="0"/>
-            </a:endParaRPr>
-          </a:p>
-          <a:p>
-            <a:pPr marL="0" indent="0">
-              <a:buNone/>
-            </a:pPr>
-            <a:r>
-              <a:rPr lang="en-US" sz="1600" dirty="0">
-                <a:latin typeface="Courier New" panose="02070309020205020404" pitchFamily="49" charset="0"/>
-                <a:cs typeface="Courier New" panose="02070309020205020404" pitchFamily="49" charset="0"/>
-              </a:rPr>
-              <a:t>   </a:t>
-            </a:r>
-            <a:r>
-              <a:rPr lang="en-US" sz="1600" dirty="0" smtClean="0">
-                <a:latin typeface="Courier New" panose="02070309020205020404" pitchFamily="49" charset="0"/>
-                <a:cs typeface="Courier New" panose="02070309020205020404" pitchFamily="49" charset="0"/>
-              </a:rPr>
-              <a:t>   </a:t>
-            </a:r>
-            <a:r>
-              <a:rPr lang="en-US" sz="1600" dirty="0" err="1" smtClean="0">
-                <a:latin typeface="Courier New" panose="02070309020205020404" pitchFamily="49" charset="0"/>
-                <a:cs typeface="Courier New" panose="02070309020205020404" pitchFamily="49" charset="0"/>
-              </a:rPr>
-              <a:t>doi_on</a:t>
-            </a:r>
-            <a:r>
-              <a:rPr lang="en-US" sz="1600" dirty="0" smtClean="0">
-                <a:latin typeface="Courier New" panose="02070309020205020404" pitchFamily="49" charset="0"/>
-                <a:cs typeface="Courier New" panose="02070309020205020404" pitchFamily="49" charset="0"/>
-              </a:rPr>
-              <a:t> </a:t>
-            </a:r>
-            <a:r>
-              <a:rPr lang="en-US" sz="1600" dirty="0">
-                <a:latin typeface="Courier New" panose="02070309020205020404" pitchFamily="49" charset="0"/>
-                <a:cs typeface="Courier New" panose="02070309020205020404" pitchFamily="49" charset="0"/>
-              </a:rPr>
-              <a:t>= </a:t>
-            </a:r>
-            <a:r>
-              <a:rPr lang="en-US" sz="1600" b="1" dirty="0">
-                <a:latin typeface="Courier New" panose="02070309020205020404" pitchFamily="49" charset="0"/>
-                <a:cs typeface="Courier New" panose="02070309020205020404" pitchFamily="49" charset="0"/>
-              </a:rPr>
-              <a:t>if</a:t>
-            </a:r>
-            <a:r>
-              <a:rPr lang="en-US" sz="1600" dirty="0">
-                <a:latin typeface="Courier New" panose="02070309020205020404" pitchFamily="49" charset="0"/>
-                <a:cs typeface="Courier New" panose="02070309020205020404" pitchFamily="49" charset="0"/>
-              </a:rPr>
-              <a:t> alarm </a:t>
-            </a:r>
-            <a:r>
-              <a:rPr lang="en-US" sz="1600" b="1" dirty="0">
-                <a:latin typeface="Courier New" panose="02070309020205020404" pitchFamily="49" charset="0"/>
-                <a:cs typeface="Courier New" panose="02070309020205020404" pitchFamily="49" charset="0"/>
-              </a:rPr>
-              <a:t>then</a:t>
-            </a:r>
-            <a:r>
-              <a:rPr lang="en-US" sz="1600" dirty="0">
-                <a:latin typeface="Courier New" panose="02070309020205020404" pitchFamily="49" charset="0"/>
-                <a:cs typeface="Courier New" panose="02070309020205020404" pitchFamily="49" charset="0"/>
-              </a:rPr>
-              <a:t> </a:t>
-            </a:r>
-            <a:r>
-              <a:rPr lang="en-US" sz="1600" i="1" dirty="0">
-                <a:latin typeface="Courier New" panose="02070309020205020404" pitchFamily="49" charset="0"/>
-                <a:cs typeface="Courier New" panose="02070309020205020404" pitchFamily="49" charset="0"/>
-              </a:rPr>
-              <a:t>pre</a:t>
-            </a:r>
-            <a:r>
-              <a:rPr lang="en-US" sz="1600" dirty="0">
-                <a:latin typeface="Courier New" panose="02070309020205020404" pitchFamily="49" charset="0"/>
-                <a:cs typeface="Courier New" panose="02070309020205020404" pitchFamily="49" charset="0"/>
-              </a:rPr>
-              <a:t>(</a:t>
-            </a:r>
-            <a:r>
-              <a:rPr lang="en-US" sz="1600" dirty="0" err="1">
-                <a:latin typeface="Courier New" panose="02070309020205020404" pitchFamily="49" charset="0"/>
-                <a:cs typeface="Courier New" panose="02070309020205020404" pitchFamily="49" charset="0"/>
-              </a:rPr>
-              <a:t>doi_on</a:t>
-            </a:r>
-            <a:r>
-              <a:rPr lang="en-US" sz="1600" dirty="0">
-                <a:latin typeface="Courier New" panose="02070309020205020404" pitchFamily="49" charset="0"/>
-                <a:cs typeface="Courier New" panose="02070309020205020404" pitchFamily="49" charset="0"/>
-              </a:rPr>
-              <a:t>)  </a:t>
-            </a:r>
-            <a:endParaRPr lang="en-US" sz="1600" dirty="0" smtClean="0">
-              <a:latin typeface="Courier New" panose="02070309020205020404" pitchFamily="49" charset="0"/>
-              <a:cs typeface="Courier New" panose="02070309020205020404" pitchFamily="49" charset="0"/>
-            </a:endParaRPr>
-          </a:p>
-          <a:p>
-            <a:pPr marL="0" indent="0">
-              <a:buNone/>
-            </a:pPr>
-            <a:r>
-              <a:rPr lang="en-US" sz="1600" dirty="0">
-                <a:latin typeface="Courier New" panose="02070309020205020404" pitchFamily="49" charset="0"/>
-                <a:cs typeface="Courier New" panose="02070309020205020404" pitchFamily="49" charset="0"/>
-              </a:rPr>
-              <a:t> </a:t>
-            </a:r>
-            <a:r>
-              <a:rPr lang="en-US" sz="1600" dirty="0" smtClean="0">
-                <a:latin typeface="Courier New" panose="02070309020205020404" pitchFamily="49" charset="0"/>
-                <a:cs typeface="Courier New" panose="02070309020205020404" pitchFamily="49" charset="0"/>
-              </a:rPr>
-              <a:t>           </a:t>
-            </a:r>
-            <a:r>
-              <a:rPr lang="en-US" sz="1600" dirty="0" smtClean="0">
-                <a:latin typeface="Courier New" panose="02070309020205020404" pitchFamily="49" charset="0"/>
-                <a:cs typeface="Courier New" panose="02070309020205020404" pitchFamily="49" charset="0"/>
-              </a:rPr>
-              <a:t>   </a:t>
+              <a:t>              </a:t>
             </a:r>
             <a:r>
               <a:rPr lang="en-US" sz="1600" b="1" dirty="0" smtClean="0">
@@ -4828,10 +4817,6 @@
               </a:rPr>
               <a:t>);</a:t>
             </a:r>
-            <a:endParaRPr lang="en-US" sz="1700" dirty="0">
-              <a:latin typeface="Courier New" panose="02070309020205020404" pitchFamily="49" charset="0"/>
-              <a:cs typeface="Courier New" panose="02070309020205020404" pitchFamily="49" charset="0"/>
-            </a:endParaRPr>
           </a:p>
         </p:txBody>
       </p:sp>

</xml_diff>

<commit_message>
complete first draft of the all IVC paper
</commit_message>
<xml_diff>
--- a/all_ivcs/all_ivcs_TEX/figs/figs.pptx
+++ b/all_ivcs/all_ivcs_TEX/figs/figs.pptx
@@ -248,7 +248,7 @@
           <a:p>
             <a:fld id="{5A779009-EA30-43A9-A43B-F006CC3D9B84}" type="datetimeFigureOut">
               <a:rPr lang="en-US" smtClean="0"/>
-              <a:t>1/16/2017</a:t>
+              <a:t>1/17/2017</a:t>
             </a:fld>
             <a:endParaRPr lang="en-US"/>
           </a:p>
@@ -418,7 +418,7 @@
           <a:p>
             <a:fld id="{5A779009-EA30-43A9-A43B-F006CC3D9B84}" type="datetimeFigureOut">
               <a:rPr lang="en-US" smtClean="0"/>
-              <a:t>1/16/2017</a:t>
+              <a:t>1/17/2017</a:t>
             </a:fld>
             <a:endParaRPr lang="en-US"/>
           </a:p>
@@ -598,7 +598,7 @@
           <a:p>
             <a:fld id="{5A779009-EA30-43A9-A43B-F006CC3D9B84}" type="datetimeFigureOut">
               <a:rPr lang="en-US" smtClean="0"/>
-              <a:t>1/16/2017</a:t>
+              <a:t>1/17/2017</a:t>
             </a:fld>
             <a:endParaRPr lang="en-US"/>
           </a:p>
@@ -768,7 +768,7 @@
           <a:p>
             <a:fld id="{5A779009-EA30-43A9-A43B-F006CC3D9B84}" type="datetimeFigureOut">
               <a:rPr lang="en-US" smtClean="0"/>
-              <a:t>1/16/2017</a:t>
+              <a:t>1/17/2017</a:t>
             </a:fld>
             <a:endParaRPr lang="en-US"/>
           </a:p>
@@ -1014,7 +1014,7 @@
           <a:p>
             <a:fld id="{5A779009-EA30-43A9-A43B-F006CC3D9B84}" type="datetimeFigureOut">
               <a:rPr lang="en-US" smtClean="0"/>
-              <a:t>1/16/2017</a:t>
+              <a:t>1/17/2017</a:t>
             </a:fld>
             <a:endParaRPr lang="en-US"/>
           </a:p>
@@ -1246,7 +1246,7 @@
           <a:p>
             <a:fld id="{5A779009-EA30-43A9-A43B-F006CC3D9B84}" type="datetimeFigureOut">
               <a:rPr lang="en-US" smtClean="0"/>
-              <a:t>1/16/2017</a:t>
+              <a:t>1/17/2017</a:t>
             </a:fld>
             <a:endParaRPr lang="en-US"/>
           </a:p>
@@ -1613,7 +1613,7 @@
           <a:p>
             <a:fld id="{5A779009-EA30-43A9-A43B-F006CC3D9B84}" type="datetimeFigureOut">
               <a:rPr lang="en-US" smtClean="0"/>
-              <a:t>1/16/2017</a:t>
+              <a:t>1/17/2017</a:t>
             </a:fld>
             <a:endParaRPr lang="en-US"/>
           </a:p>
@@ -1731,7 +1731,7 @@
           <a:p>
             <a:fld id="{5A779009-EA30-43A9-A43B-F006CC3D9B84}" type="datetimeFigureOut">
               <a:rPr lang="en-US" smtClean="0"/>
-              <a:t>1/16/2017</a:t>
+              <a:t>1/17/2017</a:t>
             </a:fld>
             <a:endParaRPr lang="en-US"/>
           </a:p>
@@ -1826,7 +1826,7 @@
           <a:p>
             <a:fld id="{5A779009-EA30-43A9-A43B-F006CC3D9B84}" type="datetimeFigureOut">
               <a:rPr lang="en-US" smtClean="0"/>
-              <a:t>1/16/2017</a:t>
+              <a:t>1/17/2017</a:t>
             </a:fld>
             <a:endParaRPr lang="en-US"/>
           </a:p>
@@ -2103,7 +2103,7 @@
           <a:p>
             <a:fld id="{5A779009-EA30-43A9-A43B-F006CC3D9B84}" type="datetimeFigureOut">
               <a:rPr lang="en-US" smtClean="0"/>
-              <a:t>1/16/2017</a:t>
+              <a:t>1/17/2017</a:t>
             </a:fld>
             <a:endParaRPr lang="en-US"/>
           </a:p>
@@ -2356,7 +2356,7 @@
           <a:p>
             <a:fld id="{5A779009-EA30-43A9-A43B-F006CC3D9B84}" type="datetimeFigureOut">
               <a:rPr lang="en-US" smtClean="0"/>
-              <a:t>1/16/2017</a:t>
+              <a:t>1/17/2017</a:t>
             </a:fld>
             <a:endParaRPr lang="en-US"/>
           </a:p>
@@ -2569,7 +2569,7 @@
           <a:p>
             <a:fld id="{5A779009-EA30-43A9-A43B-F006CC3D9B84}" type="datetimeFigureOut">
               <a:rPr lang="en-US" smtClean="0"/>
-              <a:t>1/16/2017</a:t>
+              <a:t>1/17/2017</a:t>
             </a:fld>
             <a:endParaRPr lang="en-US"/>
           </a:p>
@@ -4185,28 +4185,28 @@
               <a:t> </a:t>
             </a:r>
             <a:r>
-              <a:rPr lang="en-US" sz="1600" i="1" dirty="0" smtClean="0">
+              <a:rPr lang="en-US" sz="1600" i="1" smtClean="0">
                 <a:latin typeface="Courier New" panose="02070309020205020404" pitchFamily="49" charset="0"/>
                 <a:cs typeface="Courier New" panose="02070309020205020404" pitchFamily="49" charset="0"/>
               </a:rPr>
               <a:t>true</a:t>
             </a:r>
             <a:r>
-              <a:rPr lang="en-US" sz="1600" dirty="0" smtClean="0">
-                <a:latin typeface="Courier New" panose="02070309020205020404" pitchFamily="49" charset="0"/>
-                <a:cs typeface="Courier New" panose="02070309020205020404" pitchFamily="49" charset="0"/>
-              </a:rPr>
-              <a:t>  </a:t>
-            </a:r>
-            <a:r>
-              <a:rPr lang="en-US" sz="1600" b="1" dirty="0" smtClean="0">
+              <a:rPr lang="en-US" sz="1600" smtClean="0">
+                <a:latin typeface="Courier New" panose="02070309020205020404" pitchFamily="49" charset="0"/>
+                <a:cs typeface="Courier New" panose="02070309020205020404" pitchFamily="49" charset="0"/>
+              </a:rPr>
+              <a:t> </a:t>
+            </a:r>
+            <a:r>
+              <a:rPr lang="en-US" sz="1600" b="1" smtClean="0">
                 <a:latin typeface="Courier New" panose="02070309020205020404" pitchFamily="49" charset="0"/>
                 <a:cs typeface="Courier New" panose="02070309020205020404" pitchFamily="49" charset="0"/>
               </a:rPr>
               <a:t>else</a:t>
             </a:r>
             <a:r>
-              <a:rPr lang="en-US" sz="1600" dirty="0" smtClean="0">
+              <a:rPr lang="en-US" sz="1600" smtClean="0">
                 <a:latin typeface="Courier New" panose="02070309020205020404" pitchFamily="49" charset="0"/>
                 <a:cs typeface="Courier New" panose="02070309020205020404" pitchFamily="49" charset="0"/>
               </a:rPr>

</xml_diff>

<commit_message>
updates on the experiment section
</commit_message>
<xml_diff>
--- a/all_ivcs/all_ivcs_TEX/figs/figs.pptx
+++ b/all_ivcs/all_ivcs_TEX/figs/figs.pptx
@@ -11,6 +11,11 @@
     <p:sldId id="257" r:id="rId5"/>
     <p:sldId id="258" r:id="rId6"/>
     <p:sldId id="259" r:id="rId7"/>
+    <p:sldId id="262" r:id="rId8"/>
+    <p:sldId id="264" r:id="rId9"/>
+    <p:sldId id="263" r:id="rId10"/>
+    <p:sldId id="265" r:id="rId11"/>
+    <p:sldId id="266" r:id="rId12"/>
   </p:sldIdLst>
   <p:sldSz cx="12192000" cy="6858000"/>
   <p:notesSz cx="6858000" cy="9144000"/>
@@ -248,7 +253,7 @@
           <a:p>
             <a:fld id="{5A779009-EA30-43A9-A43B-F006CC3D9B84}" type="datetimeFigureOut">
               <a:rPr lang="en-US" smtClean="0"/>
-              <a:t>1/17/2017</a:t>
+              <a:t>1/23/2017</a:t>
             </a:fld>
             <a:endParaRPr lang="en-US"/>
           </a:p>
@@ -418,7 +423,7 @@
           <a:p>
             <a:fld id="{5A779009-EA30-43A9-A43B-F006CC3D9B84}" type="datetimeFigureOut">
               <a:rPr lang="en-US" smtClean="0"/>
-              <a:t>1/17/2017</a:t>
+              <a:t>1/23/2017</a:t>
             </a:fld>
             <a:endParaRPr lang="en-US"/>
           </a:p>
@@ -598,7 +603,7 @@
           <a:p>
             <a:fld id="{5A779009-EA30-43A9-A43B-F006CC3D9B84}" type="datetimeFigureOut">
               <a:rPr lang="en-US" smtClean="0"/>
-              <a:t>1/17/2017</a:t>
+              <a:t>1/23/2017</a:t>
             </a:fld>
             <a:endParaRPr lang="en-US"/>
           </a:p>
@@ -768,7 +773,7 @@
           <a:p>
             <a:fld id="{5A779009-EA30-43A9-A43B-F006CC3D9B84}" type="datetimeFigureOut">
               <a:rPr lang="en-US" smtClean="0"/>
-              <a:t>1/17/2017</a:t>
+              <a:t>1/23/2017</a:t>
             </a:fld>
             <a:endParaRPr lang="en-US"/>
           </a:p>
@@ -1014,7 +1019,7 @@
           <a:p>
             <a:fld id="{5A779009-EA30-43A9-A43B-F006CC3D9B84}" type="datetimeFigureOut">
               <a:rPr lang="en-US" smtClean="0"/>
-              <a:t>1/17/2017</a:t>
+              <a:t>1/23/2017</a:t>
             </a:fld>
             <a:endParaRPr lang="en-US"/>
           </a:p>
@@ -1246,7 +1251,7 @@
           <a:p>
             <a:fld id="{5A779009-EA30-43A9-A43B-F006CC3D9B84}" type="datetimeFigureOut">
               <a:rPr lang="en-US" smtClean="0"/>
-              <a:t>1/17/2017</a:t>
+              <a:t>1/23/2017</a:t>
             </a:fld>
             <a:endParaRPr lang="en-US"/>
           </a:p>
@@ -1613,7 +1618,7 @@
           <a:p>
             <a:fld id="{5A779009-EA30-43A9-A43B-F006CC3D9B84}" type="datetimeFigureOut">
               <a:rPr lang="en-US" smtClean="0"/>
-              <a:t>1/17/2017</a:t>
+              <a:t>1/23/2017</a:t>
             </a:fld>
             <a:endParaRPr lang="en-US"/>
           </a:p>
@@ -1731,7 +1736,7 @@
           <a:p>
             <a:fld id="{5A779009-EA30-43A9-A43B-F006CC3D9B84}" type="datetimeFigureOut">
               <a:rPr lang="en-US" smtClean="0"/>
-              <a:t>1/17/2017</a:t>
+              <a:t>1/23/2017</a:t>
             </a:fld>
             <a:endParaRPr lang="en-US"/>
           </a:p>
@@ -1826,7 +1831,7 @@
           <a:p>
             <a:fld id="{5A779009-EA30-43A9-A43B-F006CC3D9B84}" type="datetimeFigureOut">
               <a:rPr lang="en-US" smtClean="0"/>
-              <a:t>1/17/2017</a:t>
+              <a:t>1/23/2017</a:t>
             </a:fld>
             <a:endParaRPr lang="en-US"/>
           </a:p>
@@ -2103,7 +2108,7 @@
           <a:p>
             <a:fld id="{5A779009-EA30-43A9-A43B-F006CC3D9B84}" type="datetimeFigureOut">
               <a:rPr lang="en-US" smtClean="0"/>
-              <a:t>1/17/2017</a:t>
+              <a:t>1/23/2017</a:t>
             </a:fld>
             <a:endParaRPr lang="en-US"/>
           </a:p>
@@ -2356,7 +2361,7 @@
           <a:p>
             <a:fld id="{5A779009-EA30-43A9-A43B-F006CC3D9B84}" type="datetimeFigureOut">
               <a:rPr lang="en-US" smtClean="0"/>
-              <a:t>1/17/2017</a:t>
+              <a:t>1/23/2017</a:t>
             </a:fld>
             <a:endParaRPr lang="en-US"/>
           </a:p>
@@ -2569,7 +2574,7 @@
           <a:p>
             <a:fld id="{5A779009-EA30-43A9-A43B-F006CC3D9B84}" type="datetimeFigureOut">
               <a:rPr lang="en-US" smtClean="0"/>
-              <a:t>1/17/2017</a:t>
+              <a:t>1/23/2017</a:t>
             </a:fld>
             <a:endParaRPr lang="en-US"/>
           </a:p>
@@ -3016,6 +3021,292 @@
     <p:extLst>
       <p:ext uri="{BB962C8B-B14F-4D97-AF65-F5344CB8AC3E}">
         <p14:creationId xmlns:p14="http://schemas.microsoft.com/office/powerpoint/2010/main" val="1384878601"/>
+      </p:ext>
+    </p:extLst>
+  </p:cSld>
+  <p:clrMapOvr>
+    <a:masterClrMapping/>
+  </p:clrMapOvr>
+</p:sld>
+</file>
+
+<file path=ppt/slides/slide10.xml><?xml version="1.0" encoding="utf-8"?>
+<p:sld xmlns:a="http://schemas.openxmlformats.org/drawingml/2006/main" xmlns:r="http://schemas.openxmlformats.org/officeDocument/2006/relationships" xmlns:p="http://schemas.openxmlformats.org/presentationml/2006/main">
+  <p:cSld>
+    <p:spTree>
+      <p:nvGrpSpPr>
+        <p:cNvPr id="1" name=""/>
+        <p:cNvGrpSpPr/>
+        <p:nvPr/>
+      </p:nvGrpSpPr>
+      <p:grpSpPr>
+        <a:xfrm>
+          <a:off x="0" y="0"/>
+          <a:ext cx="0" cy="0"/>
+          <a:chOff x="0" y="0"/>
+          <a:chExt cx="0" cy="0"/>
+        </a:xfrm>
+      </p:grpSpPr>
+      <p:pic>
+        <p:nvPicPr>
+          <p:cNvPr id="4" name="Picture 3"/>
+          <p:cNvPicPr>
+            <a:picLocks noChangeAspect="1"/>
+          </p:cNvPicPr>
+          <p:nvPr/>
+        </p:nvPicPr>
+        <p:blipFill rotWithShape="1">
+          <a:blip r:embed="rId2">
+            <a:extLst>
+              <a:ext uri="{28A0092B-C50C-407E-A947-70E740481C1C}">
+                <a14:useLocalDpi xmlns:a14="http://schemas.microsoft.com/office/drawing/2010/main" val="0"/>
+              </a:ext>
+            </a:extLst>
+          </a:blip>
+          <a:srcRect l="2078" t="3817" b="3055"/>
+          <a:stretch/>
+        </p:blipFill>
+        <p:spPr>
+          <a:xfrm>
+            <a:off x="308342" y="361507"/>
+            <a:ext cx="11344941" cy="6071191"/>
+          </a:xfrm>
+          <a:prstGeom prst="rect">
+            <a:avLst/>
+          </a:prstGeom>
+        </p:spPr>
+      </p:pic>
+      <p:sp>
+        <p:nvSpPr>
+          <p:cNvPr id="5" name="Rectangle 4"/>
+          <p:cNvSpPr/>
+          <p:nvPr/>
+        </p:nvSpPr>
+        <p:spPr>
+          <a:xfrm>
+            <a:off x="5866124" y="6432698"/>
+            <a:ext cx="729687" cy="307777"/>
+          </a:xfrm>
+          <a:prstGeom prst="rect">
+            <a:avLst/>
+          </a:prstGeom>
+          <a:noFill/>
+        </p:spPr>
+        <p:txBody>
+          <a:bodyPr wrap="none">
+            <a:spAutoFit/>
+          </a:bodyPr>
+          <a:lstStyle/>
+          <a:p>
+            <a:r>
+              <a:rPr lang="en-US" sz="1400" dirty="0" smtClean="0"/>
+              <a:t>Models</a:t>
+            </a:r>
+            <a:endParaRPr lang="en-US" sz="1400" dirty="0"/>
+          </a:p>
+        </p:txBody>
+      </p:sp>
+      <p:sp>
+        <p:nvSpPr>
+          <p:cNvPr id="6" name="Rectangle 5"/>
+          <p:cNvSpPr/>
+          <p:nvPr/>
+        </p:nvSpPr>
+        <p:spPr>
+          <a:xfrm rot="16200000">
+            <a:off x="-440954" y="3135924"/>
+            <a:ext cx="1189685" cy="307777"/>
+          </a:xfrm>
+          <a:prstGeom prst="rect">
+            <a:avLst/>
+          </a:prstGeom>
+          <a:noFill/>
+        </p:spPr>
+        <p:txBody>
+          <a:bodyPr wrap="none">
+            <a:spAutoFit/>
+          </a:bodyPr>
+          <a:lstStyle/>
+          <a:p>
+            <a:r>
+              <a:rPr lang="en-US" sz="1400" dirty="0" smtClean="0"/>
+              <a:t>Runtime (sec)</a:t>
+            </a:r>
+            <a:endParaRPr lang="en-US" sz="1400" dirty="0"/>
+          </a:p>
+        </p:txBody>
+      </p:sp>
+      <p:pic>
+        <p:nvPicPr>
+          <p:cNvPr id="7" name="Picture 6"/>
+          <p:cNvPicPr>
+            <a:picLocks noChangeAspect="1"/>
+          </p:cNvPicPr>
+          <p:nvPr/>
+        </p:nvPicPr>
+        <p:blipFill>
+          <a:blip r:embed="rId3"/>
+          <a:stretch>
+            <a:fillRect/>
+          </a:stretch>
+        </p:blipFill>
+        <p:spPr>
+          <a:xfrm>
+            <a:off x="826145" y="478466"/>
+            <a:ext cx="5756348" cy="1467292"/>
+          </a:xfrm>
+          <a:prstGeom prst="rect">
+            <a:avLst/>
+          </a:prstGeom>
+        </p:spPr>
+      </p:pic>
+    </p:spTree>
+    <p:extLst>
+      <p:ext uri="{BB962C8B-B14F-4D97-AF65-F5344CB8AC3E}">
+        <p14:creationId xmlns:p14="http://schemas.microsoft.com/office/powerpoint/2010/main" val="3317551779"/>
+      </p:ext>
+    </p:extLst>
+  </p:cSld>
+  <p:clrMapOvr>
+    <a:masterClrMapping/>
+  </p:clrMapOvr>
+</p:sld>
+</file>
+
+<file path=ppt/slides/slide11.xml><?xml version="1.0" encoding="utf-8"?>
+<p:sld xmlns:a="http://schemas.openxmlformats.org/drawingml/2006/main" xmlns:r="http://schemas.openxmlformats.org/officeDocument/2006/relationships" xmlns:p="http://schemas.openxmlformats.org/presentationml/2006/main">
+  <p:cSld>
+    <p:spTree>
+      <p:nvGrpSpPr>
+        <p:cNvPr id="1" name=""/>
+        <p:cNvGrpSpPr/>
+        <p:nvPr/>
+      </p:nvGrpSpPr>
+      <p:grpSpPr>
+        <a:xfrm>
+          <a:off x="0" y="0"/>
+          <a:ext cx="0" cy="0"/>
+          <a:chOff x="0" y="0"/>
+          <a:chExt cx="0" cy="0"/>
+        </a:xfrm>
+      </p:grpSpPr>
+      <p:pic>
+        <p:nvPicPr>
+          <p:cNvPr id="4" name="Picture 3"/>
+          <p:cNvPicPr>
+            <a:picLocks noChangeAspect="1"/>
+          </p:cNvPicPr>
+          <p:nvPr/>
+        </p:nvPicPr>
+        <p:blipFill rotWithShape="1">
+          <a:blip r:embed="rId2">
+            <a:extLst>
+              <a:ext uri="{28A0092B-C50C-407E-A947-70E740481C1C}">
+                <a14:useLocalDpi xmlns:a14="http://schemas.microsoft.com/office/drawing/2010/main" val="0"/>
+              </a:ext>
+            </a:extLst>
+          </a:blip>
+          <a:srcRect l="1926" b="3257"/>
+          <a:stretch/>
+        </p:blipFill>
+        <p:spPr>
+          <a:xfrm>
+            <a:off x="741871" y="397758"/>
+            <a:ext cx="10922835" cy="5865019"/>
+          </a:xfrm>
+          <a:prstGeom prst="rect">
+            <a:avLst/>
+          </a:prstGeom>
+        </p:spPr>
+      </p:pic>
+      <p:sp>
+        <p:nvSpPr>
+          <p:cNvPr id="5" name="Rectangle 4"/>
+          <p:cNvSpPr/>
+          <p:nvPr/>
+        </p:nvSpPr>
+        <p:spPr>
+          <a:xfrm>
+            <a:off x="6211181" y="6262777"/>
+            <a:ext cx="805029" cy="338554"/>
+          </a:xfrm>
+          <a:prstGeom prst="rect">
+            <a:avLst/>
+          </a:prstGeom>
+          <a:noFill/>
+        </p:spPr>
+        <p:txBody>
+          <a:bodyPr wrap="none">
+            <a:spAutoFit/>
+          </a:bodyPr>
+          <a:lstStyle/>
+          <a:p>
+            <a:r>
+              <a:rPr lang="en-US" sz="1600" dirty="0" smtClean="0"/>
+              <a:t>Models</a:t>
+            </a:r>
+            <a:endParaRPr lang="en-US" sz="1600" dirty="0"/>
+          </a:p>
+        </p:txBody>
+      </p:sp>
+      <p:sp>
+        <p:nvSpPr>
+          <p:cNvPr id="6" name="Rectangle 5"/>
+          <p:cNvSpPr/>
+          <p:nvPr/>
+        </p:nvSpPr>
+        <p:spPr>
+          <a:xfrm rot="16200000">
+            <a:off x="92425" y="2950615"/>
+            <a:ext cx="813043" cy="338554"/>
+          </a:xfrm>
+          <a:prstGeom prst="rect">
+            <a:avLst/>
+          </a:prstGeom>
+          <a:noFill/>
+        </p:spPr>
+        <p:txBody>
+          <a:bodyPr wrap="none">
+            <a:spAutoFit/>
+          </a:bodyPr>
+          <a:lstStyle/>
+          <a:p>
+            <a:r>
+              <a:rPr lang="en-US" sz="1600" dirty="0" smtClean="0"/>
+              <a:t>IVC size</a:t>
+            </a:r>
+            <a:endParaRPr lang="en-US" sz="1600" dirty="0"/>
+          </a:p>
+        </p:txBody>
+      </p:sp>
+      <p:pic>
+        <p:nvPicPr>
+          <p:cNvPr id="7" name="Picture 6"/>
+          <p:cNvPicPr>
+            <a:picLocks noChangeAspect="1"/>
+          </p:cNvPicPr>
+          <p:nvPr/>
+        </p:nvPicPr>
+        <p:blipFill>
+          <a:blip r:embed="rId3"/>
+          <a:stretch>
+            <a:fillRect/>
+          </a:stretch>
+        </p:blipFill>
+        <p:spPr>
+          <a:xfrm>
+            <a:off x="1191908" y="482048"/>
+            <a:ext cx="7629525" cy="1600200"/>
+          </a:xfrm>
+          <a:prstGeom prst="rect">
+            <a:avLst/>
+          </a:prstGeom>
+        </p:spPr>
+      </p:pic>
+    </p:spTree>
+    <p:extLst>
+      <p:ext uri="{BB962C8B-B14F-4D97-AF65-F5344CB8AC3E}">
+        <p14:creationId xmlns:p14="http://schemas.microsoft.com/office/powerpoint/2010/main" val="2477388029"/>
       </p:ext>
     </p:extLst>
   </p:cSld>
@@ -8553,6 +8844,926 @@
 </p:sld>
 </file>
 
+<file path=ppt/slides/slide7.xml><?xml version="1.0" encoding="utf-8"?>
+<p:sld xmlns:a="http://schemas.openxmlformats.org/drawingml/2006/main" xmlns:r="http://schemas.openxmlformats.org/officeDocument/2006/relationships" xmlns:p="http://schemas.openxmlformats.org/presentationml/2006/main">
+  <p:cSld>
+    <p:spTree>
+      <p:nvGrpSpPr>
+        <p:cNvPr id="1" name=""/>
+        <p:cNvGrpSpPr/>
+        <p:nvPr/>
+      </p:nvGrpSpPr>
+      <p:grpSpPr>
+        <a:xfrm>
+          <a:off x="0" y="0"/>
+          <a:ext cx="0" cy="0"/>
+          <a:chOff x="0" y="0"/>
+          <a:chExt cx="0" cy="0"/>
+        </a:xfrm>
+      </p:grpSpPr>
+      <p:grpSp>
+        <p:nvGrpSpPr>
+          <p:cNvPr id="2" name="Group 1"/>
+          <p:cNvGrpSpPr/>
+          <p:nvPr/>
+        </p:nvGrpSpPr>
+        <p:grpSpPr>
+          <a:xfrm>
+            <a:off x="-359246" y="0"/>
+            <a:ext cx="12156799" cy="7356968"/>
+            <a:chOff x="35201" y="0"/>
+            <a:chExt cx="12156799" cy="7356968"/>
+          </a:xfrm>
+          <a:noFill/>
+        </p:grpSpPr>
+        <p:pic>
+          <p:nvPicPr>
+            <p:cNvPr id="5" name="Picture 4"/>
+            <p:cNvPicPr>
+              <a:picLocks noChangeAspect="1"/>
+            </p:cNvPicPr>
+            <p:nvPr/>
+          </p:nvPicPr>
+          <p:blipFill rotWithShape="1">
+            <a:blip r:embed="rId2" cstate="print">
+              <a:extLst>
+                <a:ext uri="{28A0092B-C50C-407E-A947-70E740481C1C}">
+                  <a14:useLocalDpi xmlns:a14="http://schemas.microsoft.com/office/drawing/2010/main" val="0"/>
+                </a:ext>
+              </a:extLst>
+            </a:blip>
+            <a:srcRect l="1905" r="1513" b="3215"/>
+            <a:stretch/>
+          </p:blipFill>
+          <p:spPr>
+            <a:xfrm>
+              <a:off x="6202390" y="0"/>
+              <a:ext cx="5697896" cy="3541059"/>
+            </a:xfrm>
+            <a:prstGeom prst="rect">
+              <a:avLst/>
+            </a:prstGeom>
+            <a:grpFill/>
+            <a:ln w="6350">
+              <a:noFill/>
+            </a:ln>
+          </p:spPr>
+        </p:pic>
+        <p:pic>
+          <p:nvPicPr>
+            <p:cNvPr id="6" name="Picture 5"/>
+            <p:cNvPicPr>
+              <a:picLocks noChangeAspect="1"/>
+            </p:cNvPicPr>
+            <p:nvPr/>
+          </p:nvPicPr>
+          <p:blipFill rotWithShape="1">
+            <a:blip r:embed="rId3" cstate="print">
+              <a:extLst>
+                <a:ext uri="{28A0092B-C50C-407E-A947-70E740481C1C}">
+                  <a14:useLocalDpi xmlns:a14="http://schemas.microsoft.com/office/drawing/2010/main" val="0"/>
+                </a:ext>
+              </a:extLst>
+            </a:blip>
+            <a:srcRect l="2650" t="744" r="1748" b="2666"/>
+            <a:stretch/>
+          </p:blipFill>
+          <p:spPr>
+            <a:xfrm>
+              <a:off x="367553" y="44824"/>
+              <a:ext cx="5773271" cy="3487270"/>
+            </a:xfrm>
+            <a:prstGeom prst="rect">
+              <a:avLst/>
+            </a:prstGeom>
+            <a:grpFill/>
+            <a:ln w="6350">
+              <a:noFill/>
+            </a:ln>
+          </p:spPr>
+        </p:pic>
+        <p:pic>
+          <p:nvPicPr>
+            <p:cNvPr id="7" name="Picture 6"/>
+            <p:cNvPicPr>
+              <a:picLocks noChangeAspect="1"/>
+            </p:cNvPicPr>
+            <p:nvPr/>
+          </p:nvPicPr>
+          <p:blipFill rotWithShape="1">
+            <a:blip r:embed="rId4" cstate="print">
+              <a:extLst>
+                <a:ext uri="{28A0092B-C50C-407E-A947-70E740481C1C}">
+                  <a14:useLocalDpi xmlns:a14="http://schemas.microsoft.com/office/drawing/2010/main" val="0"/>
+                </a:ext>
+              </a:extLst>
+            </a:blip>
+            <a:srcRect l="2194" r="1162" b="3063"/>
+            <a:stretch/>
+          </p:blipFill>
+          <p:spPr>
+            <a:xfrm>
+              <a:off x="6279080" y="3806115"/>
+              <a:ext cx="5624992" cy="3550853"/>
+            </a:xfrm>
+            <a:prstGeom prst="rect">
+              <a:avLst/>
+            </a:prstGeom>
+            <a:grpFill/>
+            <a:ln w="6350">
+              <a:noFill/>
+            </a:ln>
+          </p:spPr>
+        </p:pic>
+        <p:pic>
+          <p:nvPicPr>
+            <p:cNvPr id="8" name="Picture 7"/>
+            <p:cNvPicPr>
+              <a:picLocks noChangeAspect="1"/>
+            </p:cNvPicPr>
+            <p:nvPr/>
+          </p:nvPicPr>
+          <p:blipFill rotWithShape="1">
+            <a:blip r:embed="rId5" cstate="print">
+              <a:extLst>
+                <a:ext uri="{28A0092B-C50C-407E-A947-70E740481C1C}">
+                  <a14:useLocalDpi xmlns:a14="http://schemas.microsoft.com/office/drawing/2010/main" val="0"/>
+                </a:ext>
+              </a:extLst>
+            </a:blip>
+            <a:srcRect l="1761" r="1682" b="2468"/>
+            <a:stretch/>
+          </p:blipFill>
+          <p:spPr>
+            <a:xfrm>
+              <a:off x="314844" y="3794108"/>
+              <a:ext cx="5813967" cy="3550853"/>
+            </a:xfrm>
+            <a:prstGeom prst="rect">
+              <a:avLst/>
+            </a:prstGeom>
+            <a:grpFill/>
+            <a:ln w="6350">
+              <a:noFill/>
+            </a:ln>
+          </p:spPr>
+        </p:pic>
+        <p:pic>
+          <p:nvPicPr>
+            <p:cNvPr id="11" name="Picture 10"/>
+            <p:cNvPicPr>
+              <a:picLocks noChangeAspect="1"/>
+            </p:cNvPicPr>
+            <p:nvPr/>
+          </p:nvPicPr>
+          <p:blipFill>
+            <a:blip r:embed="rId6"/>
+            <a:stretch>
+              <a:fillRect/>
+            </a:stretch>
+          </p:blipFill>
+          <p:spPr>
+            <a:xfrm>
+              <a:off x="6500364" y="17929"/>
+              <a:ext cx="3352800" cy="1133475"/>
+            </a:xfrm>
+            <a:prstGeom prst="rect">
+              <a:avLst/>
+            </a:prstGeom>
+            <a:grpFill/>
+          </p:spPr>
+        </p:pic>
+        <p:pic>
+          <p:nvPicPr>
+            <p:cNvPr id="12" name="Picture 11"/>
+            <p:cNvPicPr>
+              <a:picLocks noChangeAspect="1"/>
+            </p:cNvPicPr>
+            <p:nvPr/>
+          </p:nvPicPr>
+          <p:blipFill>
+            <a:blip r:embed="rId7"/>
+            <a:stretch>
+              <a:fillRect/>
+            </a:stretch>
+          </p:blipFill>
+          <p:spPr>
+            <a:xfrm>
+              <a:off x="594841" y="36979"/>
+              <a:ext cx="3267075" cy="1114425"/>
+            </a:xfrm>
+            <a:prstGeom prst="rect">
+              <a:avLst/>
+            </a:prstGeom>
+            <a:grpFill/>
+          </p:spPr>
+        </p:pic>
+        <p:pic>
+          <p:nvPicPr>
+            <p:cNvPr id="13" name="Picture 12"/>
+            <p:cNvPicPr>
+              <a:picLocks noChangeAspect="1"/>
+            </p:cNvPicPr>
+            <p:nvPr/>
+          </p:nvPicPr>
+          <p:blipFill>
+            <a:blip r:embed="rId8"/>
+            <a:stretch>
+              <a:fillRect/>
+            </a:stretch>
+          </p:blipFill>
+          <p:spPr>
+            <a:xfrm>
+              <a:off x="6536096" y="3806115"/>
+              <a:ext cx="3371850" cy="1209675"/>
+            </a:xfrm>
+            <a:prstGeom prst="rect">
+              <a:avLst/>
+            </a:prstGeom>
+            <a:grpFill/>
+          </p:spPr>
+        </p:pic>
+        <p:pic>
+          <p:nvPicPr>
+            <p:cNvPr id="14" name="Picture 13"/>
+            <p:cNvPicPr>
+              <a:picLocks noChangeAspect="1"/>
+            </p:cNvPicPr>
+            <p:nvPr/>
+          </p:nvPicPr>
+          <p:blipFill>
+            <a:blip r:embed="rId9"/>
+            <a:stretch>
+              <a:fillRect/>
+            </a:stretch>
+          </p:blipFill>
+          <p:spPr>
+            <a:xfrm>
+              <a:off x="585316" y="3794108"/>
+              <a:ext cx="3276600" cy="1095375"/>
+            </a:xfrm>
+            <a:prstGeom prst="rect">
+              <a:avLst/>
+            </a:prstGeom>
+            <a:grpFill/>
+          </p:spPr>
+        </p:pic>
+        <p:sp>
+          <p:nvSpPr>
+            <p:cNvPr id="15" name="Rectangle 14"/>
+            <p:cNvSpPr/>
+            <p:nvPr/>
+          </p:nvSpPr>
+          <p:spPr>
+            <a:xfrm rot="16200000">
+              <a:off x="11629987" y="3076653"/>
+              <a:ext cx="816249" cy="307777"/>
+            </a:xfrm>
+            <a:prstGeom prst="rect">
+              <a:avLst/>
+            </a:prstGeom>
+            <a:grpFill/>
+          </p:spPr>
+          <p:txBody>
+            <a:bodyPr wrap="none">
+              <a:spAutoFit/>
+            </a:bodyPr>
+            <a:lstStyle/>
+            <a:p>
+              <a:r>
+                <a:rPr lang="en-US" sz="1400" dirty="0" smtClean="0"/>
+                <a:t>#of  IVCs</a:t>
+              </a:r>
+              <a:endParaRPr lang="en-US" sz="1400" dirty="0"/>
+            </a:p>
+          </p:txBody>
+        </p:sp>
+        <p:cxnSp>
+          <p:nvCxnSpPr>
+            <p:cNvPr id="17" name="Straight Arrow Connector 16"/>
+            <p:cNvCxnSpPr/>
+            <p:nvPr/>
+          </p:nvCxnSpPr>
+          <p:spPr>
+            <a:xfrm flipV="1">
+              <a:off x="11884222" y="1811401"/>
+              <a:ext cx="18856" cy="2696800"/>
+            </a:xfrm>
+            <a:prstGeom prst="straightConnector1">
+              <a:avLst/>
+            </a:prstGeom>
+            <a:grpFill/>
+            <a:ln>
+              <a:solidFill>
+                <a:schemeClr val="tx1"/>
+              </a:solidFill>
+              <a:tailEnd type="triangle"/>
+            </a:ln>
+          </p:spPr>
+          <p:style>
+            <a:lnRef idx="1">
+              <a:schemeClr val="accent1"/>
+            </a:lnRef>
+            <a:fillRef idx="0">
+              <a:schemeClr val="accent1"/>
+            </a:fillRef>
+            <a:effectRef idx="0">
+              <a:schemeClr val="accent1"/>
+            </a:effectRef>
+            <a:fontRef idx="minor">
+              <a:schemeClr val="tx1"/>
+            </a:fontRef>
+          </p:style>
+        </p:cxnSp>
+        <p:cxnSp>
+          <p:nvCxnSpPr>
+            <p:cNvPr id="18" name="Straight Arrow Connector 17"/>
+            <p:cNvCxnSpPr/>
+            <p:nvPr/>
+          </p:nvCxnSpPr>
+          <p:spPr>
+            <a:xfrm flipV="1">
+              <a:off x="6481314" y="3618582"/>
+              <a:ext cx="1811546" cy="1898"/>
+            </a:xfrm>
+            <a:prstGeom prst="straightConnector1">
+              <a:avLst/>
+            </a:prstGeom>
+            <a:grpFill/>
+            <a:ln>
+              <a:solidFill>
+                <a:schemeClr val="tx1"/>
+              </a:solidFill>
+              <a:tailEnd type="triangle"/>
+            </a:ln>
+          </p:spPr>
+          <p:style>
+            <a:lnRef idx="1">
+              <a:schemeClr val="accent1"/>
+            </a:lnRef>
+            <a:fillRef idx="0">
+              <a:schemeClr val="accent1"/>
+            </a:fillRef>
+            <a:effectRef idx="0">
+              <a:schemeClr val="accent1"/>
+            </a:effectRef>
+            <a:fontRef idx="minor">
+              <a:schemeClr val="tx1"/>
+            </a:fontRef>
+          </p:style>
+        </p:cxnSp>
+        <p:sp>
+          <p:nvSpPr>
+            <p:cNvPr id="22" name="Rectangle 21"/>
+            <p:cNvSpPr/>
+            <p:nvPr/>
+          </p:nvSpPr>
+          <p:spPr>
+            <a:xfrm>
+              <a:off x="5734364" y="3451004"/>
+              <a:ext cx="729687" cy="307777"/>
+            </a:xfrm>
+            <a:prstGeom prst="rect">
+              <a:avLst/>
+            </a:prstGeom>
+            <a:grpFill/>
+          </p:spPr>
+          <p:txBody>
+            <a:bodyPr wrap="none">
+              <a:spAutoFit/>
+            </a:bodyPr>
+            <a:lstStyle/>
+            <a:p>
+              <a:r>
+                <a:rPr lang="en-US" sz="1400" dirty="0" smtClean="0"/>
+                <a:t>Models</a:t>
+              </a:r>
+              <a:endParaRPr lang="en-US" sz="1400" dirty="0"/>
+            </a:p>
+          </p:txBody>
+        </p:sp>
+        <p:cxnSp>
+          <p:nvCxnSpPr>
+            <p:cNvPr id="24" name="Straight Arrow Connector 23"/>
+            <p:cNvCxnSpPr/>
+            <p:nvPr/>
+          </p:nvCxnSpPr>
+          <p:spPr>
+            <a:xfrm flipV="1">
+              <a:off x="3861916" y="3623146"/>
+              <a:ext cx="1811546" cy="1898"/>
+            </a:xfrm>
+            <a:prstGeom prst="straightConnector1">
+              <a:avLst/>
+            </a:prstGeom>
+            <a:grpFill/>
+            <a:ln>
+              <a:solidFill>
+                <a:schemeClr val="tx1"/>
+              </a:solidFill>
+              <a:tailEnd type="triangle"/>
+            </a:ln>
+          </p:spPr>
+          <p:style>
+            <a:lnRef idx="1">
+              <a:schemeClr val="accent1"/>
+            </a:lnRef>
+            <a:fillRef idx="0">
+              <a:schemeClr val="accent1"/>
+            </a:fillRef>
+            <a:effectRef idx="0">
+              <a:schemeClr val="accent1"/>
+            </a:effectRef>
+            <a:fontRef idx="minor">
+              <a:schemeClr val="tx1"/>
+            </a:fontRef>
+          </p:style>
+        </p:cxnSp>
+        <p:sp>
+          <p:nvSpPr>
+            <p:cNvPr id="26" name="Rectangle 25"/>
+            <p:cNvSpPr/>
+            <p:nvPr/>
+          </p:nvSpPr>
+          <p:spPr>
+            <a:xfrm rot="16200000">
+              <a:off x="-405753" y="3076652"/>
+              <a:ext cx="1189685" cy="307777"/>
+            </a:xfrm>
+            <a:prstGeom prst="rect">
+              <a:avLst/>
+            </a:prstGeom>
+            <a:grpFill/>
+          </p:spPr>
+          <p:txBody>
+            <a:bodyPr wrap="none">
+              <a:spAutoFit/>
+            </a:bodyPr>
+            <a:lstStyle/>
+            <a:p>
+              <a:r>
+                <a:rPr lang="en-US" sz="1400" dirty="0" smtClean="0"/>
+                <a:t>Runtime (sec)</a:t>
+              </a:r>
+              <a:endParaRPr lang="en-US" sz="1400" dirty="0"/>
+            </a:p>
+          </p:txBody>
+        </p:sp>
+        <p:cxnSp>
+          <p:nvCxnSpPr>
+            <p:cNvPr id="27" name="Straight Arrow Connector 26"/>
+            <p:cNvCxnSpPr/>
+            <p:nvPr/>
+          </p:nvCxnSpPr>
+          <p:spPr>
+            <a:xfrm flipV="1">
+              <a:off x="314844" y="1811401"/>
+              <a:ext cx="18856" cy="2696800"/>
+            </a:xfrm>
+            <a:prstGeom prst="straightConnector1">
+              <a:avLst/>
+            </a:prstGeom>
+            <a:grpFill/>
+            <a:ln>
+              <a:solidFill>
+                <a:schemeClr val="tx1"/>
+              </a:solidFill>
+              <a:tailEnd type="triangle"/>
+            </a:ln>
+          </p:spPr>
+          <p:style>
+            <a:lnRef idx="1">
+              <a:schemeClr val="accent1"/>
+            </a:lnRef>
+            <a:fillRef idx="0">
+              <a:schemeClr val="accent1"/>
+            </a:fillRef>
+            <a:effectRef idx="0">
+              <a:schemeClr val="accent1"/>
+            </a:effectRef>
+            <a:fontRef idx="minor">
+              <a:schemeClr val="tx1"/>
+            </a:fontRef>
+          </p:style>
+        </p:cxnSp>
+      </p:grpSp>
+    </p:spTree>
+    <p:extLst>
+      <p:ext uri="{BB962C8B-B14F-4D97-AF65-F5344CB8AC3E}">
+        <p14:creationId xmlns:p14="http://schemas.microsoft.com/office/powerpoint/2010/main" val="1293658443"/>
+      </p:ext>
+    </p:extLst>
+  </p:cSld>
+  <p:clrMapOvr>
+    <a:masterClrMapping/>
+  </p:clrMapOvr>
+</p:sld>
+</file>
+
+<file path=ppt/slides/slide8.xml><?xml version="1.0" encoding="utf-8"?>
+<p:sld xmlns:a="http://schemas.openxmlformats.org/drawingml/2006/main" xmlns:r="http://schemas.openxmlformats.org/officeDocument/2006/relationships" xmlns:p="http://schemas.openxmlformats.org/presentationml/2006/main">
+  <p:cSld>
+    <p:spTree>
+      <p:nvGrpSpPr>
+        <p:cNvPr id="1" name=""/>
+        <p:cNvGrpSpPr/>
+        <p:nvPr/>
+      </p:nvGrpSpPr>
+      <p:grpSpPr>
+        <a:xfrm>
+          <a:off x="0" y="0"/>
+          <a:ext cx="0" cy="0"/>
+          <a:chOff x="0" y="0"/>
+          <a:chExt cx="0" cy="0"/>
+        </a:xfrm>
+      </p:grpSpPr>
+      <p:pic>
+        <p:nvPicPr>
+          <p:cNvPr id="7" name="Picture 6"/>
+          <p:cNvPicPr>
+            <a:picLocks noChangeAspect="1"/>
+          </p:cNvPicPr>
+          <p:nvPr/>
+        </p:nvPicPr>
+        <p:blipFill rotWithShape="1">
+          <a:blip r:embed="rId2" cstate="print">
+            <a:extLst>
+              <a:ext uri="{28A0092B-C50C-407E-A947-70E740481C1C}">
+                <a14:useLocalDpi xmlns:a14="http://schemas.microsoft.com/office/drawing/2010/main" val="0"/>
+              </a:ext>
+            </a:extLst>
+          </a:blip>
+          <a:srcRect l="2194" r="1162" b="3063"/>
+          <a:stretch/>
+        </p:blipFill>
+        <p:spPr>
+          <a:xfrm>
+            <a:off x="1479176" y="1389483"/>
+            <a:ext cx="9188823" cy="4834195"/>
+          </a:xfrm>
+          <a:prstGeom prst="rect">
+            <a:avLst/>
+          </a:prstGeom>
+          <a:noFill/>
+          <a:ln w="6350">
+            <a:noFill/>
+          </a:ln>
+        </p:spPr>
+      </p:pic>
+      <p:pic>
+        <p:nvPicPr>
+          <p:cNvPr id="13" name="Picture 12"/>
+          <p:cNvPicPr>
+            <a:picLocks noChangeAspect="1"/>
+          </p:cNvPicPr>
+          <p:nvPr/>
+        </p:nvPicPr>
+        <p:blipFill>
+          <a:blip r:embed="rId3"/>
+          <a:stretch>
+            <a:fillRect/>
+          </a:stretch>
+        </p:blipFill>
+        <p:spPr>
+          <a:xfrm>
+            <a:off x="1881859" y="1487125"/>
+            <a:ext cx="3371850" cy="1209675"/>
+          </a:xfrm>
+          <a:prstGeom prst="rect">
+            <a:avLst/>
+          </a:prstGeom>
+          <a:noFill/>
+        </p:spPr>
+      </p:pic>
+      <p:sp>
+        <p:nvSpPr>
+          <p:cNvPr id="15" name="Rectangle 14"/>
+          <p:cNvSpPr/>
+          <p:nvPr/>
+        </p:nvSpPr>
+        <p:spPr>
+          <a:xfrm rot="16200000">
+            <a:off x="10339335" y="3512475"/>
+            <a:ext cx="816249" cy="307777"/>
+          </a:xfrm>
+          <a:prstGeom prst="rect">
+            <a:avLst/>
+          </a:prstGeom>
+          <a:noFill/>
+        </p:spPr>
+        <p:txBody>
+          <a:bodyPr wrap="none">
+            <a:spAutoFit/>
+          </a:bodyPr>
+          <a:lstStyle/>
+          <a:p>
+            <a:r>
+              <a:rPr lang="en-US" sz="1400" dirty="0" smtClean="0"/>
+              <a:t>#of  IVCs</a:t>
+            </a:r>
+            <a:endParaRPr lang="en-US" sz="1400" dirty="0"/>
+          </a:p>
+        </p:txBody>
+      </p:sp>
+      <p:sp>
+        <p:nvSpPr>
+          <p:cNvPr id="22" name="Rectangle 21"/>
+          <p:cNvSpPr/>
+          <p:nvPr/>
+        </p:nvSpPr>
+        <p:spPr>
+          <a:xfrm>
+            <a:off x="5940551" y="6149250"/>
+            <a:ext cx="729687" cy="307777"/>
+          </a:xfrm>
+          <a:prstGeom prst="rect">
+            <a:avLst/>
+          </a:prstGeom>
+          <a:noFill/>
+        </p:spPr>
+        <p:txBody>
+          <a:bodyPr wrap="none">
+            <a:spAutoFit/>
+          </a:bodyPr>
+          <a:lstStyle/>
+          <a:p>
+            <a:r>
+              <a:rPr lang="en-US" sz="1400" dirty="0" smtClean="0"/>
+              <a:t>Models</a:t>
+            </a:r>
+            <a:endParaRPr lang="en-US" sz="1400" dirty="0"/>
+          </a:p>
+        </p:txBody>
+      </p:sp>
+      <p:sp>
+        <p:nvSpPr>
+          <p:cNvPr id="26" name="Rectangle 25"/>
+          <p:cNvSpPr/>
+          <p:nvPr/>
+        </p:nvSpPr>
+        <p:spPr>
+          <a:xfrm rot="16200000">
+            <a:off x="730445" y="3603500"/>
+            <a:ext cx="1189685" cy="307777"/>
+          </a:xfrm>
+          <a:prstGeom prst="rect">
+            <a:avLst/>
+          </a:prstGeom>
+          <a:noFill/>
+        </p:spPr>
+        <p:txBody>
+          <a:bodyPr wrap="none">
+            <a:spAutoFit/>
+          </a:bodyPr>
+          <a:lstStyle/>
+          <a:p>
+            <a:r>
+              <a:rPr lang="en-US" sz="1400" dirty="0" smtClean="0"/>
+              <a:t>Runtime (sec)</a:t>
+            </a:r>
+            <a:endParaRPr lang="en-US" sz="1400" dirty="0"/>
+          </a:p>
+        </p:txBody>
+      </p:sp>
+    </p:spTree>
+    <p:extLst>
+      <p:ext uri="{BB962C8B-B14F-4D97-AF65-F5344CB8AC3E}">
+        <p14:creationId xmlns:p14="http://schemas.microsoft.com/office/powerpoint/2010/main" val="219871825"/>
+      </p:ext>
+    </p:extLst>
+  </p:cSld>
+  <p:clrMapOvr>
+    <a:masterClrMapping/>
+  </p:clrMapOvr>
+</p:sld>
+</file>
+
+<file path=ppt/slides/slide9.xml><?xml version="1.0" encoding="utf-8"?>
+<p:sld xmlns:a="http://schemas.openxmlformats.org/drawingml/2006/main" xmlns:r="http://schemas.openxmlformats.org/officeDocument/2006/relationships" xmlns:p="http://schemas.openxmlformats.org/presentationml/2006/main">
+  <p:cSld>
+    <p:spTree>
+      <p:nvGrpSpPr>
+        <p:cNvPr id="1" name=""/>
+        <p:cNvGrpSpPr/>
+        <p:nvPr/>
+      </p:nvGrpSpPr>
+      <p:grpSpPr>
+        <a:xfrm>
+          <a:off x="0" y="0"/>
+          <a:ext cx="0" cy="0"/>
+          <a:chOff x="0" y="0"/>
+          <a:chExt cx="0" cy="0"/>
+        </a:xfrm>
+      </p:grpSpPr>
+      <p:sp>
+        <p:nvSpPr>
+          <p:cNvPr id="3" name="Content Placeholder 2"/>
+          <p:cNvSpPr>
+            <a:spLocks noGrp="1"/>
+          </p:cNvSpPr>
+          <p:nvPr>
+            <p:ph idx="1"/>
+          </p:nvPr>
+        </p:nvSpPr>
+        <p:spPr/>
+        <p:txBody>
+          <a:bodyPr/>
+          <a:lstStyle/>
+          <a:p>
+            <a:endParaRPr lang="en-US"/>
+          </a:p>
+        </p:txBody>
+      </p:sp>
+      <p:pic>
+        <p:nvPicPr>
+          <p:cNvPr id="4" name="Picture 3"/>
+          <p:cNvPicPr>
+            <a:picLocks noChangeAspect="1"/>
+          </p:cNvPicPr>
+          <p:nvPr/>
+        </p:nvPicPr>
+        <p:blipFill rotWithShape="1">
+          <a:blip r:embed="rId2">
+            <a:extLst>
+              <a:ext uri="{28A0092B-C50C-407E-A947-70E740481C1C}">
+                <a14:useLocalDpi xmlns:a14="http://schemas.microsoft.com/office/drawing/2010/main" val="0"/>
+              </a:ext>
+            </a:extLst>
+          </a:blip>
+          <a:srcRect l="2284" r="1866" b="2631"/>
+          <a:stretch/>
+        </p:blipFill>
+        <p:spPr>
+          <a:xfrm>
+            <a:off x="244549" y="988828"/>
+            <a:ext cx="11419367" cy="5709684"/>
+          </a:xfrm>
+          <a:prstGeom prst="rect">
+            <a:avLst/>
+          </a:prstGeom>
+        </p:spPr>
+      </p:pic>
+      <p:pic>
+        <p:nvPicPr>
+          <p:cNvPr id="5" name="Picture 4"/>
+          <p:cNvPicPr>
+            <a:picLocks noChangeAspect="1"/>
+          </p:cNvPicPr>
+          <p:nvPr/>
+        </p:nvPicPr>
+        <p:blipFill>
+          <a:blip r:embed="rId3"/>
+          <a:stretch>
+            <a:fillRect/>
+          </a:stretch>
+        </p:blipFill>
+        <p:spPr>
+          <a:xfrm>
+            <a:off x="700011" y="1040273"/>
+            <a:ext cx="5094733" cy="1617867"/>
+          </a:xfrm>
+          <a:prstGeom prst="rect">
+            <a:avLst/>
+          </a:prstGeom>
+        </p:spPr>
+      </p:pic>
+      <p:sp>
+        <p:nvSpPr>
+          <p:cNvPr id="6" name="Rectangle 5"/>
+          <p:cNvSpPr/>
+          <p:nvPr/>
+        </p:nvSpPr>
+        <p:spPr>
+          <a:xfrm rot="16200000">
+            <a:off x="10520089" y="3593125"/>
+            <a:ext cx="816249" cy="307777"/>
+          </a:xfrm>
+          <a:prstGeom prst="rect">
+            <a:avLst/>
+          </a:prstGeom>
+          <a:solidFill>
+            <a:schemeClr val="bg1"/>
+          </a:solidFill>
+        </p:spPr>
+        <p:txBody>
+          <a:bodyPr wrap="none">
+            <a:spAutoFit/>
+          </a:bodyPr>
+          <a:lstStyle/>
+          <a:p>
+            <a:r>
+              <a:rPr lang="en-US" sz="1400" dirty="0" smtClean="0"/>
+              <a:t>#of  IVCs</a:t>
+            </a:r>
+            <a:endParaRPr lang="en-US" sz="1400" dirty="0"/>
+          </a:p>
+        </p:txBody>
+      </p:sp>
+      <p:sp>
+        <p:nvSpPr>
+          <p:cNvPr id="7" name="Rectangle 6"/>
+          <p:cNvSpPr/>
+          <p:nvPr/>
+        </p:nvSpPr>
+        <p:spPr>
+          <a:xfrm>
+            <a:off x="5462086" y="6550223"/>
+            <a:ext cx="729687" cy="307777"/>
+          </a:xfrm>
+          <a:prstGeom prst="rect">
+            <a:avLst/>
+          </a:prstGeom>
+          <a:noFill/>
+        </p:spPr>
+        <p:txBody>
+          <a:bodyPr wrap="none">
+            <a:spAutoFit/>
+          </a:bodyPr>
+          <a:lstStyle/>
+          <a:p>
+            <a:r>
+              <a:rPr lang="en-US" sz="1400" dirty="0" smtClean="0"/>
+              <a:t>Models</a:t>
+            </a:r>
+            <a:endParaRPr lang="en-US" sz="1400" dirty="0"/>
+          </a:p>
+        </p:txBody>
+      </p:sp>
+      <p:sp>
+        <p:nvSpPr>
+          <p:cNvPr id="8" name="Rectangle 7"/>
+          <p:cNvSpPr/>
+          <p:nvPr/>
+        </p:nvSpPr>
+        <p:spPr>
+          <a:xfrm rot="16200000">
+            <a:off x="-504182" y="3593124"/>
+            <a:ext cx="1189685" cy="307777"/>
+          </a:xfrm>
+          <a:prstGeom prst="rect">
+            <a:avLst/>
+          </a:prstGeom>
+          <a:noFill/>
+        </p:spPr>
+        <p:txBody>
+          <a:bodyPr wrap="none">
+            <a:spAutoFit/>
+          </a:bodyPr>
+          <a:lstStyle/>
+          <a:p>
+            <a:r>
+              <a:rPr lang="en-US" sz="1400" dirty="0" smtClean="0"/>
+              <a:t>Runtime (sec)</a:t>
+            </a:r>
+            <a:endParaRPr lang="en-US" sz="1400" dirty="0"/>
+          </a:p>
+        </p:txBody>
+      </p:sp>
+      <p:sp>
+        <p:nvSpPr>
+          <p:cNvPr id="9" name="Rectangle 8"/>
+          <p:cNvSpPr/>
+          <p:nvPr/>
+        </p:nvSpPr>
+        <p:spPr>
+          <a:xfrm rot="16200000">
+            <a:off x="11033113" y="4187966"/>
+            <a:ext cx="1225528" cy="307777"/>
+          </a:xfrm>
+          <a:prstGeom prst="rect">
+            <a:avLst/>
+          </a:prstGeom>
+          <a:solidFill>
+            <a:schemeClr val="bg1"/>
+          </a:solidFill>
+        </p:spPr>
+        <p:txBody>
+          <a:bodyPr wrap="none">
+            <a:spAutoFit/>
+          </a:bodyPr>
+          <a:lstStyle/>
+          <a:p>
+            <a:r>
+              <a:rPr lang="en-US" sz="1400" dirty="0" smtClean="0"/>
+              <a:t>#of  Equations</a:t>
+            </a:r>
+            <a:endParaRPr lang="en-US" sz="1400" dirty="0"/>
+          </a:p>
+        </p:txBody>
+      </p:sp>
+    </p:spTree>
+    <p:extLst>
+      <p:ext uri="{BB962C8B-B14F-4D97-AF65-F5344CB8AC3E}">
+        <p14:creationId xmlns:p14="http://schemas.microsoft.com/office/powerpoint/2010/main" val="3258950361"/>
+      </p:ext>
+    </p:extLst>
+  </p:cSld>
+  <p:clrMapOvr>
+    <a:masterClrMapping/>
+  </p:clrMapOvr>
+</p:sld>
+</file>
+
 <file path=ppt/theme/theme1.xml><?xml version="1.0" encoding="utf-8"?>
 <a:theme xmlns:a="http://schemas.openxmlformats.org/drawingml/2006/main" name="Office Theme">
   <a:themeElements>

</xml_diff>

<commit_message>
working on the experiments
</commit_message>
<xml_diff>
--- a/all_ivcs/all_ivcs_TEX/figs/figs.pptx
+++ b/all_ivcs/all_ivcs_TEX/figs/figs.pptx
@@ -16,6 +16,9 @@
     <p:sldId id="263" r:id="rId10"/>
     <p:sldId id="265" r:id="rId11"/>
     <p:sldId id="266" r:id="rId12"/>
+    <p:sldId id="267" r:id="rId13"/>
+    <p:sldId id="268" r:id="rId14"/>
+    <p:sldId id="269" r:id="rId15"/>
   </p:sldIdLst>
   <p:sldSz cx="12192000" cy="6858000"/>
   <p:notesSz cx="6858000" cy="9144000"/>
@@ -3316,6 +3319,451 @@
 </p:sld>
 </file>
 
+<file path=ppt/slides/slide12.xml><?xml version="1.0" encoding="utf-8"?>
+<p:sld xmlns:a="http://schemas.openxmlformats.org/drawingml/2006/main" xmlns:r="http://schemas.openxmlformats.org/officeDocument/2006/relationships" xmlns:p="http://schemas.openxmlformats.org/presentationml/2006/main">
+  <p:cSld>
+    <p:spTree>
+      <p:nvGrpSpPr>
+        <p:cNvPr id="1" name=""/>
+        <p:cNvGrpSpPr/>
+        <p:nvPr/>
+      </p:nvGrpSpPr>
+      <p:grpSpPr>
+        <a:xfrm>
+          <a:off x="0" y="0"/>
+          <a:ext cx="0" cy="0"/>
+          <a:chOff x="0" y="0"/>
+          <a:chExt cx="0" cy="0"/>
+        </a:xfrm>
+      </p:grpSpPr>
+      <p:pic>
+        <p:nvPicPr>
+          <p:cNvPr id="4" name="Content Placeholder 3"/>
+          <p:cNvPicPr>
+            <a:picLocks noGrp="1" noChangeAspect="1"/>
+          </p:cNvPicPr>
+          <p:nvPr>
+            <p:ph idx="1"/>
+          </p:nvPr>
+        </p:nvPicPr>
+        <p:blipFill>
+          <a:blip r:embed="rId2">
+            <a:extLst>
+              <a:ext uri="{28A0092B-C50C-407E-A947-70E740481C1C}">
+                <a14:useLocalDpi xmlns:a14="http://schemas.microsoft.com/office/drawing/2010/main" val="0"/>
+              </a:ext>
+            </a:extLst>
+          </a:blip>
+          <a:stretch>
+            <a:fillRect/>
+          </a:stretch>
+        </p:blipFill>
+        <p:spPr>
+          <a:xfrm>
+            <a:off x="356152" y="320048"/>
+            <a:ext cx="11512295" cy="6281927"/>
+          </a:xfrm>
+        </p:spPr>
+      </p:pic>
+      <p:sp>
+        <p:nvSpPr>
+          <p:cNvPr id="6" name="Rectangle 5"/>
+          <p:cNvSpPr/>
+          <p:nvPr/>
+        </p:nvSpPr>
+        <p:spPr>
+          <a:xfrm>
+            <a:off x="5866124" y="6432698"/>
+            <a:ext cx="805029" cy="338554"/>
+          </a:xfrm>
+          <a:prstGeom prst="rect">
+            <a:avLst/>
+          </a:prstGeom>
+          <a:noFill/>
+        </p:spPr>
+        <p:txBody>
+          <a:bodyPr wrap="none">
+            <a:spAutoFit/>
+          </a:bodyPr>
+          <a:lstStyle/>
+          <a:p>
+            <a:r>
+              <a:rPr lang="en-US" sz="1600" dirty="0" smtClean="0"/>
+              <a:t>Models</a:t>
+            </a:r>
+            <a:endParaRPr lang="en-US" sz="1600" dirty="0"/>
+          </a:p>
+        </p:txBody>
+      </p:sp>
+      <p:sp>
+        <p:nvSpPr>
+          <p:cNvPr id="7" name="Rectangle 6"/>
+          <p:cNvSpPr/>
+          <p:nvPr/>
+        </p:nvSpPr>
+        <p:spPr>
+          <a:xfrm rot="16200000">
+            <a:off x="-479173" y="3291734"/>
+            <a:ext cx="1332096" cy="338554"/>
+          </a:xfrm>
+          <a:prstGeom prst="rect">
+            <a:avLst/>
+          </a:prstGeom>
+          <a:noFill/>
+        </p:spPr>
+        <p:txBody>
+          <a:bodyPr wrap="none">
+            <a:spAutoFit/>
+          </a:bodyPr>
+          <a:lstStyle/>
+          <a:p>
+            <a:r>
+              <a:rPr lang="en-US" sz="1600" dirty="0" smtClean="0"/>
+              <a:t>Runtime (sec)</a:t>
+            </a:r>
+            <a:endParaRPr lang="en-US" sz="1600" dirty="0"/>
+          </a:p>
+        </p:txBody>
+      </p:sp>
+      <p:pic>
+        <p:nvPicPr>
+          <p:cNvPr id="8" name="Picture 7"/>
+          <p:cNvPicPr>
+            <a:picLocks noChangeAspect="1"/>
+          </p:cNvPicPr>
+          <p:nvPr/>
+        </p:nvPicPr>
+        <p:blipFill>
+          <a:blip r:embed="rId3"/>
+          <a:stretch>
+            <a:fillRect/>
+          </a:stretch>
+        </p:blipFill>
+        <p:spPr>
+          <a:xfrm>
+            <a:off x="870428" y="583501"/>
+            <a:ext cx="5800725" cy="1685925"/>
+          </a:xfrm>
+          <a:prstGeom prst="rect">
+            <a:avLst/>
+          </a:prstGeom>
+        </p:spPr>
+      </p:pic>
+    </p:spTree>
+    <p:extLst>
+      <p:ext uri="{BB962C8B-B14F-4D97-AF65-F5344CB8AC3E}">
+        <p14:creationId xmlns:p14="http://schemas.microsoft.com/office/powerpoint/2010/main" val="2899966833"/>
+      </p:ext>
+    </p:extLst>
+  </p:cSld>
+  <p:clrMapOvr>
+    <a:masterClrMapping/>
+  </p:clrMapOvr>
+</p:sld>
+</file>
+
+<file path=ppt/slides/slide13.xml><?xml version="1.0" encoding="utf-8"?>
+<p:sld xmlns:a="http://schemas.openxmlformats.org/drawingml/2006/main" xmlns:r="http://schemas.openxmlformats.org/officeDocument/2006/relationships" xmlns:p="http://schemas.openxmlformats.org/presentationml/2006/main">
+  <p:cSld>
+    <p:spTree>
+      <p:nvGrpSpPr>
+        <p:cNvPr id="1" name=""/>
+        <p:cNvGrpSpPr/>
+        <p:nvPr/>
+      </p:nvGrpSpPr>
+      <p:grpSpPr>
+        <a:xfrm>
+          <a:off x="0" y="0"/>
+          <a:ext cx="0" cy="0"/>
+          <a:chOff x="0" y="0"/>
+          <a:chExt cx="0" cy="0"/>
+        </a:xfrm>
+      </p:grpSpPr>
+      <p:pic>
+        <p:nvPicPr>
+          <p:cNvPr id="4" name="Picture 3"/>
+          <p:cNvPicPr>
+            <a:picLocks noChangeAspect="1"/>
+          </p:cNvPicPr>
+          <p:nvPr/>
+        </p:nvPicPr>
+        <p:blipFill>
+          <a:blip r:embed="rId2">
+            <a:extLst>
+              <a:ext uri="{28A0092B-C50C-407E-A947-70E740481C1C}">
+                <a14:useLocalDpi xmlns:a14="http://schemas.microsoft.com/office/drawing/2010/main" val="0"/>
+              </a:ext>
+            </a:extLst>
+          </a:blip>
+          <a:stretch>
+            <a:fillRect/>
+          </a:stretch>
+        </p:blipFill>
+        <p:spPr>
+          <a:xfrm>
+            <a:off x="510040" y="510845"/>
+            <a:ext cx="11137414" cy="6062484"/>
+          </a:xfrm>
+          <a:prstGeom prst="rect">
+            <a:avLst/>
+          </a:prstGeom>
+        </p:spPr>
+      </p:pic>
+      <p:pic>
+        <p:nvPicPr>
+          <p:cNvPr id="5" name="Picture 4"/>
+          <p:cNvPicPr>
+            <a:picLocks noChangeAspect="1"/>
+          </p:cNvPicPr>
+          <p:nvPr/>
+        </p:nvPicPr>
+        <p:blipFill>
+          <a:blip r:embed="rId3"/>
+          <a:stretch>
+            <a:fillRect/>
+          </a:stretch>
+        </p:blipFill>
+        <p:spPr>
+          <a:xfrm>
+            <a:off x="969645" y="672274"/>
+            <a:ext cx="6229350" cy="1819275"/>
+          </a:xfrm>
+          <a:prstGeom prst="rect">
+            <a:avLst/>
+          </a:prstGeom>
+        </p:spPr>
+      </p:pic>
+      <p:sp>
+        <p:nvSpPr>
+          <p:cNvPr id="6" name="Rectangle 5"/>
+          <p:cNvSpPr/>
+          <p:nvPr/>
+        </p:nvSpPr>
+        <p:spPr>
+          <a:xfrm>
+            <a:off x="5866124" y="6432698"/>
+            <a:ext cx="805029" cy="338554"/>
+          </a:xfrm>
+          <a:prstGeom prst="rect">
+            <a:avLst/>
+          </a:prstGeom>
+          <a:noFill/>
+        </p:spPr>
+        <p:txBody>
+          <a:bodyPr wrap="none">
+            <a:spAutoFit/>
+          </a:bodyPr>
+          <a:lstStyle/>
+          <a:p>
+            <a:r>
+              <a:rPr lang="en-US" sz="1600" dirty="0" smtClean="0"/>
+              <a:t>Models</a:t>
+            </a:r>
+            <a:endParaRPr lang="en-US" sz="1600" dirty="0"/>
+          </a:p>
+        </p:txBody>
+      </p:sp>
+      <p:sp>
+        <p:nvSpPr>
+          <p:cNvPr id="7" name="Rectangle 6"/>
+          <p:cNvSpPr/>
+          <p:nvPr/>
+        </p:nvSpPr>
+        <p:spPr>
+          <a:xfrm rot="16200000">
+            <a:off x="-309896" y="3372810"/>
+            <a:ext cx="1332096" cy="338554"/>
+          </a:xfrm>
+          <a:prstGeom prst="rect">
+            <a:avLst/>
+          </a:prstGeom>
+          <a:noFill/>
+        </p:spPr>
+        <p:txBody>
+          <a:bodyPr wrap="none">
+            <a:spAutoFit/>
+          </a:bodyPr>
+          <a:lstStyle/>
+          <a:p>
+            <a:r>
+              <a:rPr lang="en-US" sz="1600" dirty="0" smtClean="0"/>
+              <a:t>Runtime (sec)</a:t>
+            </a:r>
+            <a:endParaRPr lang="en-US" sz="1600" dirty="0"/>
+          </a:p>
+        </p:txBody>
+      </p:sp>
+    </p:spTree>
+    <p:extLst>
+      <p:ext uri="{BB962C8B-B14F-4D97-AF65-F5344CB8AC3E}">
+        <p14:creationId xmlns:p14="http://schemas.microsoft.com/office/powerpoint/2010/main" val="1028824182"/>
+      </p:ext>
+    </p:extLst>
+  </p:cSld>
+  <p:clrMapOvr>
+    <a:masterClrMapping/>
+  </p:clrMapOvr>
+  <p:timing>
+    <p:tnLst>
+      <p:par>
+        <p:cTn id="1" dur="indefinite" restart="never" nodeType="tmRoot"/>
+      </p:par>
+    </p:tnLst>
+  </p:timing>
+</p:sld>
+</file>
+
+<file path=ppt/slides/slide14.xml><?xml version="1.0" encoding="utf-8"?>
+<p:sld xmlns:a="http://schemas.openxmlformats.org/drawingml/2006/main" xmlns:r="http://schemas.openxmlformats.org/officeDocument/2006/relationships" xmlns:p="http://schemas.openxmlformats.org/presentationml/2006/main">
+  <p:cSld>
+    <p:spTree>
+      <p:nvGrpSpPr>
+        <p:cNvPr id="1" name=""/>
+        <p:cNvGrpSpPr/>
+        <p:nvPr/>
+      </p:nvGrpSpPr>
+      <p:grpSpPr>
+        <a:xfrm>
+          <a:off x="0" y="0"/>
+          <a:ext cx="0" cy="0"/>
+          <a:chOff x="0" y="0"/>
+          <a:chExt cx="0" cy="0"/>
+        </a:xfrm>
+      </p:grpSpPr>
+      <p:sp>
+        <p:nvSpPr>
+          <p:cNvPr id="5" name="Rectangle 4"/>
+          <p:cNvSpPr/>
+          <p:nvPr/>
+        </p:nvSpPr>
+        <p:spPr>
+          <a:xfrm rot="16200000">
+            <a:off x="-309896" y="3372810"/>
+            <a:ext cx="1332096" cy="338554"/>
+          </a:xfrm>
+          <a:prstGeom prst="rect">
+            <a:avLst/>
+          </a:prstGeom>
+          <a:noFill/>
+        </p:spPr>
+        <p:txBody>
+          <a:bodyPr wrap="none">
+            <a:spAutoFit/>
+          </a:bodyPr>
+          <a:lstStyle/>
+          <a:p>
+            <a:r>
+              <a:rPr lang="en-US" sz="1600" dirty="0" smtClean="0"/>
+              <a:t>Runtime (sec)</a:t>
+            </a:r>
+            <a:endParaRPr lang="en-US" sz="1600" dirty="0"/>
+          </a:p>
+        </p:txBody>
+      </p:sp>
+      <p:pic>
+        <p:nvPicPr>
+          <p:cNvPr id="6" name="Picture 5"/>
+          <p:cNvPicPr>
+            <a:picLocks noChangeAspect="1"/>
+          </p:cNvPicPr>
+          <p:nvPr/>
+        </p:nvPicPr>
+        <p:blipFill>
+          <a:blip r:embed="rId2">
+            <a:extLst>
+              <a:ext uri="{28A0092B-C50C-407E-A947-70E740481C1C}">
+                <a14:useLocalDpi xmlns:a14="http://schemas.microsoft.com/office/drawing/2010/main" val="0"/>
+              </a:ext>
+            </a:extLst>
+          </a:blip>
+          <a:stretch>
+            <a:fillRect/>
+          </a:stretch>
+        </p:blipFill>
+        <p:spPr>
+          <a:xfrm>
+            <a:off x="525429" y="232913"/>
+            <a:ext cx="11389650" cy="6199785"/>
+          </a:xfrm>
+          <a:prstGeom prst="rect">
+            <a:avLst/>
+          </a:prstGeom>
+        </p:spPr>
+      </p:pic>
+      <p:sp>
+        <p:nvSpPr>
+          <p:cNvPr id="4" name="Rectangle 3"/>
+          <p:cNvSpPr/>
+          <p:nvPr/>
+        </p:nvSpPr>
+        <p:spPr>
+          <a:xfrm>
+            <a:off x="6094136" y="6329182"/>
+            <a:ext cx="805029" cy="338554"/>
+          </a:xfrm>
+          <a:prstGeom prst="rect">
+            <a:avLst/>
+          </a:prstGeom>
+          <a:noFill/>
+        </p:spPr>
+        <p:txBody>
+          <a:bodyPr wrap="none">
+            <a:spAutoFit/>
+          </a:bodyPr>
+          <a:lstStyle/>
+          <a:p>
+            <a:r>
+              <a:rPr lang="en-US" sz="1600" dirty="0" smtClean="0"/>
+              <a:t>Models</a:t>
+            </a:r>
+            <a:endParaRPr lang="en-US" sz="1600" dirty="0"/>
+          </a:p>
+        </p:txBody>
+      </p:sp>
+      <p:pic>
+        <p:nvPicPr>
+          <p:cNvPr id="2" name="Picture 1"/>
+          <p:cNvPicPr>
+            <a:picLocks noChangeAspect="1"/>
+          </p:cNvPicPr>
+          <p:nvPr/>
+        </p:nvPicPr>
+        <p:blipFill>
+          <a:blip r:embed="rId3"/>
+          <a:stretch>
+            <a:fillRect/>
+          </a:stretch>
+        </p:blipFill>
+        <p:spPr>
+          <a:xfrm>
+            <a:off x="992804" y="401578"/>
+            <a:ext cx="6337324" cy="2220851"/>
+          </a:xfrm>
+          <a:prstGeom prst="rect">
+            <a:avLst/>
+          </a:prstGeom>
+        </p:spPr>
+      </p:pic>
+    </p:spTree>
+    <p:extLst>
+      <p:ext uri="{BB962C8B-B14F-4D97-AF65-F5344CB8AC3E}">
+        <p14:creationId xmlns:p14="http://schemas.microsoft.com/office/powerpoint/2010/main" val="3493321500"/>
+      </p:ext>
+    </p:extLst>
+  </p:cSld>
+  <p:clrMapOvr>
+    <a:masterClrMapping/>
+  </p:clrMapOvr>
+  <p:timing>
+    <p:tnLst>
+      <p:par>
+        <p:cTn id="1" dur="indefinite" restart="never" nodeType="tmRoot"/>
+      </p:par>
+    </p:tnLst>
+  </p:timing>
+</p:sld>
+</file>
+
 <file path=ppt/slides/slide2.xml><?xml version="1.0" encoding="utf-8"?>
 <p:sld xmlns:a="http://schemas.openxmlformats.org/drawingml/2006/main" xmlns:r="http://schemas.openxmlformats.org/officeDocument/2006/relationships" xmlns:p="http://schemas.openxmlformats.org/presentationml/2006/main">
   <p:cSld>
@@ -4441,14 +4889,7 @@
                 <a:latin typeface="Courier New" panose="02070309020205020404" pitchFamily="49" charset="0"/>
                 <a:cs typeface="Courier New" panose="02070309020205020404" pitchFamily="49" charset="0"/>
               </a:rPr>
-              <a:t>     </a:t>
-            </a:r>
-            <a:r>
-              <a:rPr lang="en-US" sz="1600" dirty="0" smtClean="0">
-                <a:latin typeface="Courier New" panose="02070309020205020404" pitchFamily="49" charset="0"/>
-                <a:cs typeface="Courier New" panose="02070309020205020404" pitchFamily="49" charset="0"/>
-              </a:rPr>
-              <a:t>p1 </a:t>
+              <a:t>     p1 </a:t>
             </a:r>
             <a:r>
               <a:rPr lang="en-US" sz="1600" dirty="0">

</xml_diff>

<commit_message>
update the example pics
</commit_message>
<xml_diff>
--- a/all_ivcs/all_ivcs_TEX/figs/figs.pptx
+++ b/all_ivcs/all_ivcs_TEX/figs/figs.pptx
@@ -7,18 +7,19 @@
   <p:sldIdLst>
     <p:sldId id="256" r:id="rId2"/>
     <p:sldId id="260" r:id="rId3"/>
-    <p:sldId id="261" r:id="rId4"/>
-    <p:sldId id="257" r:id="rId5"/>
-    <p:sldId id="258" r:id="rId6"/>
-    <p:sldId id="259" r:id="rId7"/>
-    <p:sldId id="262" r:id="rId8"/>
-    <p:sldId id="264" r:id="rId9"/>
-    <p:sldId id="263" r:id="rId10"/>
-    <p:sldId id="265" r:id="rId11"/>
-    <p:sldId id="266" r:id="rId12"/>
-    <p:sldId id="267" r:id="rId13"/>
-    <p:sldId id="268" r:id="rId14"/>
-    <p:sldId id="269" r:id="rId15"/>
+    <p:sldId id="270" r:id="rId4"/>
+    <p:sldId id="261" r:id="rId5"/>
+    <p:sldId id="257" r:id="rId6"/>
+    <p:sldId id="258" r:id="rId7"/>
+    <p:sldId id="259" r:id="rId8"/>
+    <p:sldId id="262" r:id="rId9"/>
+    <p:sldId id="264" r:id="rId10"/>
+    <p:sldId id="263" r:id="rId11"/>
+    <p:sldId id="265" r:id="rId12"/>
+    <p:sldId id="266" r:id="rId13"/>
+    <p:sldId id="267" r:id="rId14"/>
+    <p:sldId id="268" r:id="rId15"/>
+    <p:sldId id="269" r:id="rId16"/>
   </p:sldIdLst>
   <p:sldSz cx="12192000" cy="6858000"/>
   <p:notesSz cx="6858000" cy="9144000"/>
@@ -3050,6 +3051,232 @@
           <a:chExt cx="0" cy="0"/>
         </a:xfrm>
       </p:grpSpPr>
+      <p:sp>
+        <p:nvSpPr>
+          <p:cNvPr id="3" name="Content Placeholder 2"/>
+          <p:cNvSpPr>
+            <a:spLocks noGrp="1"/>
+          </p:cNvSpPr>
+          <p:nvPr>
+            <p:ph idx="1"/>
+          </p:nvPr>
+        </p:nvSpPr>
+        <p:spPr/>
+        <p:txBody>
+          <a:bodyPr/>
+          <a:lstStyle/>
+          <a:p>
+            <a:endParaRPr lang="en-US"/>
+          </a:p>
+        </p:txBody>
+      </p:sp>
+      <p:pic>
+        <p:nvPicPr>
+          <p:cNvPr id="4" name="Picture 3"/>
+          <p:cNvPicPr>
+            <a:picLocks noChangeAspect="1"/>
+          </p:cNvPicPr>
+          <p:nvPr/>
+        </p:nvPicPr>
+        <p:blipFill rotWithShape="1">
+          <a:blip r:embed="rId2">
+            <a:extLst>
+              <a:ext uri="{28A0092B-C50C-407E-A947-70E740481C1C}">
+                <a14:useLocalDpi xmlns:a14="http://schemas.microsoft.com/office/drawing/2010/main" val="0"/>
+              </a:ext>
+            </a:extLst>
+          </a:blip>
+          <a:srcRect l="2284" r="1866" b="2631"/>
+          <a:stretch/>
+        </p:blipFill>
+        <p:spPr>
+          <a:xfrm>
+            <a:off x="244549" y="988828"/>
+            <a:ext cx="11419367" cy="5709684"/>
+          </a:xfrm>
+          <a:prstGeom prst="rect">
+            <a:avLst/>
+          </a:prstGeom>
+        </p:spPr>
+      </p:pic>
+      <p:pic>
+        <p:nvPicPr>
+          <p:cNvPr id="5" name="Picture 4"/>
+          <p:cNvPicPr>
+            <a:picLocks noChangeAspect="1"/>
+          </p:cNvPicPr>
+          <p:nvPr/>
+        </p:nvPicPr>
+        <p:blipFill>
+          <a:blip r:embed="rId3"/>
+          <a:stretch>
+            <a:fillRect/>
+          </a:stretch>
+        </p:blipFill>
+        <p:spPr>
+          <a:xfrm>
+            <a:off x="700011" y="1040273"/>
+            <a:ext cx="5094733" cy="1617867"/>
+          </a:xfrm>
+          <a:prstGeom prst="rect">
+            <a:avLst/>
+          </a:prstGeom>
+        </p:spPr>
+      </p:pic>
+      <p:sp>
+        <p:nvSpPr>
+          <p:cNvPr id="6" name="Rectangle 5"/>
+          <p:cNvSpPr/>
+          <p:nvPr/>
+        </p:nvSpPr>
+        <p:spPr>
+          <a:xfrm rot="16200000">
+            <a:off x="10520089" y="3593125"/>
+            <a:ext cx="816249" cy="307777"/>
+          </a:xfrm>
+          <a:prstGeom prst="rect">
+            <a:avLst/>
+          </a:prstGeom>
+          <a:solidFill>
+            <a:schemeClr val="bg1"/>
+          </a:solidFill>
+        </p:spPr>
+        <p:txBody>
+          <a:bodyPr wrap="none">
+            <a:spAutoFit/>
+          </a:bodyPr>
+          <a:lstStyle/>
+          <a:p>
+            <a:r>
+              <a:rPr lang="en-US" sz="1400" dirty="0" smtClean="0"/>
+              <a:t>#of  IVCs</a:t>
+            </a:r>
+            <a:endParaRPr lang="en-US" sz="1400" dirty="0"/>
+          </a:p>
+        </p:txBody>
+      </p:sp>
+      <p:sp>
+        <p:nvSpPr>
+          <p:cNvPr id="7" name="Rectangle 6"/>
+          <p:cNvSpPr/>
+          <p:nvPr/>
+        </p:nvSpPr>
+        <p:spPr>
+          <a:xfrm>
+            <a:off x="5462086" y="6550223"/>
+            <a:ext cx="729687" cy="307777"/>
+          </a:xfrm>
+          <a:prstGeom prst="rect">
+            <a:avLst/>
+          </a:prstGeom>
+          <a:noFill/>
+        </p:spPr>
+        <p:txBody>
+          <a:bodyPr wrap="none">
+            <a:spAutoFit/>
+          </a:bodyPr>
+          <a:lstStyle/>
+          <a:p>
+            <a:r>
+              <a:rPr lang="en-US" sz="1400" dirty="0" smtClean="0"/>
+              <a:t>Models</a:t>
+            </a:r>
+            <a:endParaRPr lang="en-US" sz="1400" dirty="0"/>
+          </a:p>
+        </p:txBody>
+      </p:sp>
+      <p:sp>
+        <p:nvSpPr>
+          <p:cNvPr id="8" name="Rectangle 7"/>
+          <p:cNvSpPr/>
+          <p:nvPr/>
+        </p:nvSpPr>
+        <p:spPr>
+          <a:xfrm rot="16200000">
+            <a:off x="-504182" y="3593124"/>
+            <a:ext cx="1189685" cy="307777"/>
+          </a:xfrm>
+          <a:prstGeom prst="rect">
+            <a:avLst/>
+          </a:prstGeom>
+          <a:noFill/>
+        </p:spPr>
+        <p:txBody>
+          <a:bodyPr wrap="none">
+            <a:spAutoFit/>
+          </a:bodyPr>
+          <a:lstStyle/>
+          <a:p>
+            <a:r>
+              <a:rPr lang="en-US" sz="1400" dirty="0" smtClean="0"/>
+              <a:t>Runtime (sec)</a:t>
+            </a:r>
+            <a:endParaRPr lang="en-US" sz="1400" dirty="0"/>
+          </a:p>
+        </p:txBody>
+      </p:sp>
+      <p:sp>
+        <p:nvSpPr>
+          <p:cNvPr id="9" name="Rectangle 8"/>
+          <p:cNvSpPr/>
+          <p:nvPr/>
+        </p:nvSpPr>
+        <p:spPr>
+          <a:xfrm rot="16200000">
+            <a:off x="11033113" y="4187966"/>
+            <a:ext cx="1225528" cy="307777"/>
+          </a:xfrm>
+          <a:prstGeom prst="rect">
+            <a:avLst/>
+          </a:prstGeom>
+          <a:solidFill>
+            <a:schemeClr val="bg1"/>
+          </a:solidFill>
+        </p:spPr>
+        <p:txBody>
+          <a:bodyPr wrap="none">
+            <a:spAutoFit/>
+          </a:bodyPr>
+          <a:lstStyle/>
+          <a:p>
+            <a:r>
+              <a:rPr lang="en-US" sz="1400" dirty="0" smtClean="0"/>
+              <a:t>#of  Equations</a:t>
+            </a:r>
+            <a:endParaRPr lang="en-US" sz="1400" dirty="0"/>
+          </a:p>
+        </p:txBody>
+      </p:sp>
+    </p:spTree>
+    <p:extLst>
+      <p:ext uri="{BB962C8B-B14F-4D97-AF65-F5344CB8AC3E}">
+        <p14:creationId xmlns:p14="http://schemas.microsoft.com/office/powerpoint/2010/main" val="3258950361"/>
+      </p:ext>
+    </p:extLst>
+  </p:cSld>
+  <p:clrMapOvr>
+    <a:masterClrMapping/>
+  </p:clrMapOvr>
+</p:sld>
+</file>
+
+<file path=ppt/slides/slide11.xml><?xml version="1.0" encoding="utf-8"?>
+<p:sld xmlns:a="http://schemas.openxmlformats.org/drawingml/2006/main" xmlns:r="http://schemas.openxmlformats.org/officeDocument/2006/relationships" xmlns:p="http://schemas.openxmlformats.org/presentationml/2006/main">
+  <p:cSld>
+    <p:spTree>
+      <p:nvGrpSpPr>
+        <p:cNvPr id="1" name=""/>
+        <p:cNvGrpSpPr/>
+        <p:nvPr/>
+      </p:nvGrpSpPr>
+      <p:grpSpPr>
+        <a:xfrm>
+          <a:off x="0" y="0"/>
+          <a:ext cx="0" cy="0"/>
+          <a:chOff x="0" y="0"/>
+          <a:chExt cx="0" cy="0"/>
+        </a:xfrm>
+      </p:grpSpPr>
       <p:pic>
         <p:nvPicPr>
           <p:cNvPr id="4" name="Picture 3"/>
@@ -3176,7 +3403,7 @@
 </p:sld>
 </file>
 
-<file path=ppt/slides/slide11.xml><?xml version="1.0" encoding="utf-8"?>
+<file path=ppt/slides/slide12.xml><?xml version="1.0" encoding="utf-8"?>
 <p:sld xmlns:a="http://schemas.openxmlformats.org/drawingml/2006/main" xmlns:r="http://schemas.openxmlformats.org/officeDocument/2006/relationships" xmlns:p="http://schemas.openxmlformats.org/presentationml/2006/main">
   <p:cSld>
     <p:spTree>
@@ -3319,7 +3546,7 @@
 </p:sld>
 </file>
 
-<file path=ppt/slides/slide12.xml><?xml version="1.0" encoding="utf-8"?>
+<file path=ppt/slides/slide13.xml><?xml version="1.0" encoding="utf-8"?>
 <p:sld xmlns:a="http://schemas.openxmlformats.org/drawingml/2006/main" xmlns:r="http://schemas.openxmlformats.org/officeDocument/2006/relationships" xmlns:p="http://schemas.openxmlformats.org/presentationml/2006/main">
   <p:cSld>
     <p:spTree>
@@ -3462,7 +3689,7 @@
 </p:sld>
 </file>
 
-<file path=ppt/slides/slide13.xml><?xml version="1.0" encoding="utf-8"?>
+<file path=ppt/slides/slide14.xml><?xml version="1.0" encoding="utf-8"?>
 <p:sld xmlns:a="http://schemas.openxmlformats.org/drawingml/2006/main" xmlns:r="http://schemas.openxmlformats.org/officeDocument/2006/relationships" xmlns:p="http://schemas.openxmlformats.org/presentationml/2006/main">
   <p:cSld>
     <p:spTree>
@@ -3613,7 +3840,7 @@
 </p:sld>
 </file>
 
-<file path=ppt/slides/slide14.xml><?xml version="1.0" encoding="utf-8"?>
+<file path=ppt/slides/slide15.xml><?xml version="1.0" encoding="utf-8"?>
 <p:sld xmlns:a="http://schemas.openxmlformats.org/drawingml/2006/main" xmlns:r="http://schemas.openxmlformats.org/officeDocument/2006/relationships" xmlns:p="http://schemas.openxmlformats.org/presentationml/2006/main">
   <p:cSld>
     <p:spTree>
@@ -3828,7 +4055,7 @@
         <p:spPr>
           <a:xfrm>
             <a:off x="5497792" y="2742506"/>
-            <a:ext cx="954107" cy="400110"/>
+            <a:ext cx="1569660" cy="400110"/>
           </a:xfrm>
           <a:prstGeom prst="rect">
             <a:avLst/>
@@ -3841,11 +4068,11 @@
           <a:lstStyle/>
           <a:p>
             <a:r>
-              <a:rPr lang="en-US" sz="2000" dirty="0" smtClean="0">
+              <a:rPr lang="en-US" sz="2000" dirty="0" err="1" smtClean="0">
                 <a:latin typeface="Courier New" panose="02070309020205020404" pitchFamily="49" charset="0"/>
                 <a:cs typeface="Courier New" panose="02070309020205020404" pitchFamily="49" charset="0"/>
               </a:rPr>
-              <a:t>below</a:t>
+              <a:t>one_below</a:t>
             </a:r>
             <a:endParaRPr lang="en-US" sz="2000" dirty="0">
               <a:latin typeface="Courier New" panose="02070309020205020404" pitchFamily="49" charset="0"/>
@@ -3977,11 +4204,11 @@
           <a:lstStyle/>
           <a:p>
             <a:r>
-              <a:rPr lang="en-US" sz="2000" dirty="0" smtClean="0">
+              <a:rPr lang="en-US" sz="2000" dirty="0" err="1" smtClean="0">
                 <a:latin typeface="Courier New" panose="02070309020205020404" pitchFamily="49" charset="0"/>
                 <a:cs typeface="Courier New" panose="02070309020205020404" pitchFamily="49" charset="0"/>
               </a:rPr>
-              <a:t>alarm</a:t>
+              <a:t>on_p</a:t>
             </a:r>
             <a:endParaRPr lang="en-US" sz="2000" dirty="0">
               <a:latin typeface="Courier New" panose="02070309020205020404" pitchFamily="49" charset="0"/>
@@ -4294,8 +4521,8 @@
         </p:nvSpPr>
         <p:spPr>
           <a:xfrm>
-            <a:off x="3372043" y="2500458"/>
-            <a:ext cx="801823" cy="338554"/>
+            <a:off x="3324647" y="2492785"/>
+            <a:ext cx="925253" cy="338554"/>
           </a:xfrm>
           <a:prstGeom prst="rect">
             <a:avLst/>
@@ -4312,7 +4539,7 @@
                 <a:latin typeface="Courier New" panose="02070309020205020404" pitchFamily="49" charset="0"/>
                 <a:cs typeface="Courier New" panose="02070309020205020404" pitchFamily="49" charset="0"/>
               </a:rPr>
-              <a:t>IVC#1</a:t>
+              <a:t>MIVC#1</a:t>
             </a:r>
             <a:endParaRPr lang="en-US" sz="1600" dirty="0">
               <a:latin typeface="Courier New" panose="02070309020205020404" pitchFamily="49" charset="0"/>
@@ -4329,8 +4556,8 @@
         </p:nvSpPr>
         <p:spPr>
           <a:xfrm>
-            <a:off x="7514010" y="1886993"/>
-            <a:ext cx="801823" cy="338554"/>
+            <a:off x="7573718" y="1846652"/>
+            <a:ext cx="925253" cy="338554"/>
           </a:xfrm>
           <a:prstGeom prst="rect">
             <a:avLst/>
@@ -4342,6 +4569,13 @@
           </a:bodyPr>
           <a:lstStyle/>
           <a:p>
+            <a:r>
+              <a:rPr lang="en-US" sz="1600" dirty="0">
+                <a:latin typeface="Courier New" panose="02070309020205020404" pitchFamily="49" charset="0"/>
+                <a:cs typeface="Courier New" panose="02070309020205020404" pitchFamily="49" charset="0"/>
+              </a:rPr>
+              <a:t>M</a:t>
+            </a:r>
             <a:r>
               <a:rPr lang="en-US" sz="1600" dirty="0" smtClean="0">
                 <a:latin typeface="Courier New" panose="02070309020205020404" pitchFamily="49" charset="0"/>
@@ -4388,648 +4622,14 @@
       </p:grpSpPr>
       <p:sp>
         <p:nvSpPr>
-          <p:cNvPr id="3" name="Content Placeholder 2"/>
-          <p:cNvSpPr>
-            <a:spLocks noGrp="1"/>
-          </p:cNvSpPr>
-          <p:nvPr>
-            <p:ph idx="1"/>
-          </p:nvPr>
-        </p:nvSpPr>
-        <p:spPr>
-          <a:xfrm>
-            <a:off x="2500865" y="1496513"/>
-            <a:ext cx="7272864" cy="4205547"/>
-          </a:xfrm>
-        </p:spPr>
-        <p:txBody>
-          <a:bodyPr>
-            <a:noAutofit/>
-          </a:bodyPr>
-          <a:lstStyle/>
-          <a:p>
-            <a:pPr marL="0" indent="0">
-              <a:buNone/>
-            </a:pPr>
-            <a:r>
-              <a:rPr lang="en-US" sz="1600" b="1" dirty="0" smtClean="0">
-                <a:latin typeface="Courier New" panose="02070309020205020404" pitchFamily="49" charset="0"/>
-                <a:cs typeface="Courier New" panose="02070309020205020404" pitchFamily="49" charset="0"/>
-              </a:rPr>
-              <a:t>  </a:t>
-            </a:r>
-            <a:r>
-              <a:rPr lang="en-US" sz="1600" b="1" dirty="0" err="1" smtClean="0">
-                <a:latin typeface="Courier New" panose="02070309020205020404" pitchFamily="49" charset="0"/>
-                <a:cs typeface="Courier New" panose="02070309020205020404" pitchFamily="49" charset="0"/>
-              </a:rPr>
-              <a:t>var</a:t>
-            </a:r>
-            <a:endParaRPr lang="en-US" sz="1600" b="1" dirty="0">
-              <a:latin typeface="Courier New" panose="02070309020205020404" pitchFamily="49" charset="0"/>
-              <a:cs typeface="Courier New" panose="02070309020205020404" pitchFamily="49" charset="0"/>
-            </a:endParaRPr>
-          </a:p>
-          <a:p>
-            <a:pPr marL="0" indent="0">
-              <a:buNone/>
-            </a:pPr>
-            <a:r>
-              <a:rPr lang="en-US" sz="1600" dirty="0">
-                <a:latin typeface="Courier New" panose="02070309020205020404" pitchFamily="49" charset="0"/>
-                <a:cs typeface="Courier New" panose="02070309020205020404" pitchFamily="49" charset="0"/>
-              </a:rPr>
-              <a:t>   </a:t>
-            </a:r>
-            <a:r>
-              <a:rPr lang="en-US" sz="1600" dirty="0" smtClean="0">
-                <a:latin typeface="Courier New" panose="02070309020205020404" pitchFamily="49" charset="0"/>
-                <a:cs typeface="Courier New" panose="02070309020205020404" pitchFamily="49" charset="0"/>
-              </a:rPr>
-              <a:t>   a1_below</a:t>
-            </a:r>
-            <a:r>
-              <a:rPr lang="en-US" sz="1600" dirty="0">
-                <a:latin typeface="Courier New" panose="02070309020205020404" pitchFamily="49" charset="0"/>
-                <a:cs typeface="Courier New" panose="02070309020205020404" pitchFamily="49" charset="0"/>
-              </a:rPr>
-              <a:t>, a2_below, </a:t>
-            </a:r>
-            <a:r>
-              <a:rPr lang="en-US" sz="1600" dirty="0" smtClean="0">
-                <a:latin typeface="Courier New" panose="02070309020205020404" pitchFamily="49" charset="0"/>
-                <a:cs typeface="Courier New" panose="02070309020205020404" pitchFamily="49" charset="0"/>
-              </a:rPr>
-              <a:t>below, p1</a:t>
-            </a:r>
-            <a:r>
-              <a:rPr lang="en-US" sz="1600" dirty="0">
-                <a:latin typeface="Courier New" panose="02070309020205020404" pitchFamily="49" charset="0"/>
-                <a:cs typeface="Courier New" panose="02070309020205020404" pitchFamily="49" charset="0"/>
-              </a:rPr>
-              <a:t>, p2 : </a:t>
-            </a:r>
-            <a:r>
-              <a:rPr lang="en-US" sz="1600" b="1" dirty="0">
-                <a:latin typeface="Courier New" panose="02070309020205020404" pitchFamily="49" charset="0"/>
-                <a:cs typeface="Courier New" panose="02070309020205020404" pitchFamily="49" charset="0"/>
-              </a:rPr>
-              <a:t>bool</a:t>
-            </a:r>
-            <a:r>
-              <a:rPr lang="en-US" sz="1600" dirty="0">
-                <a:latin typeface="Courier New" panose="02070309020205020404" pitchFamily="49" charset="0"/>
-                <a:cs typeface="Courier New" panose="02070309020205020404" pitchFamily="49" charset="0"/>
-              </a:rPr>
-              <a:t>;</a:t>
-            </a:r>
-          </a:p>
-          <a:p>
-            <a:pPr marL="0" indent="0">
-              <a:buNone/>
-            </a:pPr>
-            <a:r>
-              <a:rPr lang="en-US" sz="1600" dirty="0" smtClean="0">
-                <a:latin typeface="Courier New" panose="02070309020205020404" pitchFamily="49" charset="0"/>
-                <a:cs typeface="Courier New" panose="02070309020205020404" pitchFamily="49" charset="0"/>
-              </a:rPr>
-              <a:t>  </a:t>
-            </a:r>
-            <a:r>
-              <a:rPr lang="en-US" sz="1600" b="1" dirty="0" smtClean="0">
-                <a:latin typeface="Courier New" panose="02070309020205020404" pitchFamily="49" charset="0"/>
-                <a:cs typeface="Courier New" panose="02070309020205020404" pitchFamily="49" charset="0"/>
-              </a:rPr>
-              <a:t>let</a:t>
-            </a:r>
-            <a:endParaRPr lang="en-US" sz="1600" b="1" dirty="0">
-              <a:latin typeface="Courier New" panose="02070309020205020404" pitchFamily="49" charset="0"/>
-              <a:cs typeface="Courier New" panose="02070309020205020404" pitchFamily="49" charset="0"/>
-            </a:endParaRPr>
-          </a:p>
-          <a:p>
-            <a:pPr marL="0" indent="0">
-              <a:buNone/>
-            </a:pPr>
-            <a:r>
-              <a:rPr lang="en-US" sz="1600" dirty="0">
-                <a:latin typeface="Courier New" panose="02070309020205020404" pitchFamily="49" charset="0"/>
-                <a:cs typeface="Courier New" panose="02070309020205020404" pitchFamily="49" charset="0"/>
-              </a:rPr>
-              <a:t>   </a:t>
-            </a:r>
-            <a:r>
-              <a:rPr lang="en-US" sz="1600" dirty="0" smtClean="0">
-                <a:latin typeface="Courier New" panose="02070309020205020404" pitchFamily="49" charset="0"/>
-                <a:cs typeface="Courier New" panose="02070309020205020404" pitchFamily="49" charset="0"/>
-              </a:rPr>
-              <a:t>   a1_below </a:t>
-            </a:r>
-            <a:r>
-              <a:rPr lang="en-US" sz="1600" dirty="0">
-                <a:latin typeface="Courier New" panose="02070309020205020404" pitchFamily="49" charset="0"/>
-                <a:cs typeface="Courier New" panose="02070309020205020404" pitchFamily="49" charset="0"/>
-              </a:rPr>
-              <a:t>= stat1 </a:t>
-            </a:r>
-            <a:r>
-              <a:rPr lang="en-US" sz="1600" b="1" dirty="0">
-                <a:latin typeface="Courier New" panose="02070309020205020404" pitchFamily="49" charset="0"/>
-                <a:cs typeface="Courier New" panose="02070309020205020404" pitchFamily="49" charset="0"/>
-              </a:rPr>
-              <a:t>and</a:t>
-            </a:r>
-            <a:r>
-              <a:rPr lang="en-US" sz="1600" dirty="0">
-                <a:latin typeface="Courier New" panose="02070309020205020404" pitchFamily="49" charset="0"/>
-                <a:cs typeface="Courier New" panose="02070309020205020404" pitchFamily="49" charset="0"/>
-              </a:rPr>
-              <a:t> (alt1 </a:t>
-            </a:r>
-            <a:r>
-              <a:rPr lang="en-US" sz="1600" b="1" dirty="0">
-                <a:latin typeface="Courier New" panose="02070309020205020404" pitchFamily="49" charset="0"/>
-                <a:cs typeface="Courier New" panose="02070309020205020404" pitchFamily="49" charset="0"/>
-              </a:rPr>
-              <a:t>&lt;</a:t>
-            </a:r>
-            <a:r>
-              <a:rPr lang="en-US" sz="1600" dirty="0">
-                <a:latin typeface="Courier New" panose="02070309020205020404" pitchFamily="49" charset="0"/>
-                <a:cs typeface="Courier New" panose="02070309020205020404" pitchFamily="49" charset="0"/>
-              </a:rPr>
-              <a:t> THRESHOLD</a:t>
-            </a:r>
-            <a:r>
-              <a:rPr lang="en-US" sz="1600" dirty="0" smtClean="0">
-                <a:latin typeface="Courier New" panose="02070309020205020404" pitchFamily="49" charset="0"/>
-                <a:cs typeface="Courier New" panose="02070309020205020404" pitchFamily="49" charset="0"/>
-              </a:rPr>
-              <a:t>);  </a:t>
-            </a:r>
-            <a:endParaRPr lang="en-US" sz="1600" dirty="0">
-              <a:latin typeface="Courier New" panose="02070309020205020404" pitchFamily="49" charset="0"/>
-              <a:cs typeface="Courier New" panose="02070309020205020404" pitchFamily="49" charset="0"/>
-            </a:endParaRPr>
-          </a:p>
-          <a:p>
-            <a:pPr marL="0" indent="0">
-              <a:buNone/>
-            </a:pPr>
-            <a:r>
-              <a:rPr lang="en-US" sz="1600" dirty="0">
-                <a:latin typeface="Courier New" panose="02070309020205020404" pitchFamily="49" charset="0"/>
-                <a:cs typeface="Courier New" panose="02070309020205020404" pitchFamily="49" charset="0"/>
-              </a:rPr>
-              <a:t>   </a:t>
-            </a:r>
-            <a:r>
-              <a:rPr lang="en-US" sz="1600" dirty="0" smtClean="0">
-                <a:latin typeface="Courier New" panose="02070309020205020404" pitchFamily="49" charset="0"/>
-                <a:cs typeface="Courier New" panose="02070309020205020404" pitchFamily="49" charset="0"/>
-              </a:rPr>
-              <a:t>   a2_below </a:t>
-            </a:r>
-            <a:r>
-              <a:rPr lang="en-US" sz="1600" dirty="0">
-                <a:latin typeface="Courier New" panose="02070309020205020404" pitchFamily="49" charset="0"/>
-                <a:cs typeface="Courier New" panose="02070309020205020404" pitchFamily="49" charset="0"/>
-              </a:rPr>
-              <a:t>= stat2 </a:t>
-            </a:r>
-            <a:r>
-              <a:rPr lang="en-US" sz="1600" b="1" dirty="0">
-                <a:latin typeface="Courier New" panose="02070309020205020404" pitchFamily="49" charset="0"/>
-                <a:cs typeface="Courier New" panose="02070309020205020404" pitchFamily="49" charset="0"/>
-              </a:rPr>
-              <a:t>and</a:t>
-            </a:r>
-            <a:r>
-              <a:rPr lang="en-US" sz="1600" dirty="0">
-                <a:latin typeface="Courier New" panose="02070309020205020404" pitchFamily="49" charset="0"/>
-                <a:cs typeface="Courier New" panose="02070309020205020404" pitchFamily="49" charset="0"/>
-              </a:rPr>
-              <a:t> (alt2 </a:t>
-            </a:r>
-            <a:r>
-              <a:rPr lang="en-US" sz="1600" b="1" dirty="0">
-                <a:latin typeface="Courier New" panose="02070309020205020404" pitchFamily="49" charset="0"/>
-                <a:cs typeface="Courier New" panose="02070309020205020404" pitchFamily="49" charset="0"/>
-              </a:rPr>
-              <a:t>&lt;</a:t>
-            </a:r>
-            <a:r>
-              <a:rPr lang="en-US" sz="1600" dirty="0">
-                <a:latin typeface="Courier New" panose="02070309020205020404" pitchFamily="49" charset="0"/>
-                <a:cs typeface="Courier New" panose="02070309020205020404" pitchFamily="49" charset="0"/>
-              </a:rPr>
-              <a:t> THRESHOLD</a:t>
-            </a:r>
-            <a:r>
-              <a:rPr lang="en-US" sz="1600" dirty="0" smtClean="0">
-                <a:latin typeface="Courier New" panose="02070309020205020404" pitchFamily="49" charset="0"/>
-                <a:cs typeface="Courier New" panose="02070309020205020404" pitchFamily="49" charset="0"/>
-              </a:rPr>
-              <a:t>);   </a:t>
-            </a:r>
-            <a:endParaRPr lang="en-US" sz="1600" dirty="0">
-              <a:latin typeface="Courier New" panose="02070309020205020404" pitchFamily="49" charset="0"/>
-              <a:cs typeface="Courier New" panose="02070309020205020404" pitchFamily="49" charset="0"/>
-            </a:endParaRPr>
-          </a:p>
-          <a:p>
-            <a:pPr marL="0" indent="0">
-              <a:buNone/>
-            </a:pPr>
-            <a:r>
-              <a:rPr lang="en-US" sz="1600" dirty="0">
-                <a:latin typeface="Courier New" panose="02070309020205020404" pitchFamily="49" charset="0"/>
-                <a:cs typeface="Courier New" panose="02070309020205020404" pitchFamily="49" charset="0"/>
-              </a:rPr>
-              <a:t>   </a:t>
-            </a:r>
-            <a:r>
-              <a:rPr lang="en-US" sz="1600" dirty="0" smtClean="0">
-                <a:latin typeface="Courier New" panose="02070309020205020404" pitchFamily="49" charset="0"/>
-                <a:cs typeface="Courier New" panose="02070309020205020404" pitchFamily="49" charset="0"/>
-              </a:rPr>
-              <a:t>   below </a:t>
-            </a:r>
-            <a:r>
-              <a:rPr lang="en-US" sz="1600" dirty="0">
-                <a:latin typeface="Courier New" panose="02070309020205020404" pitchFamily="49" charset="0"/>
-                <a:cs typeface="Courier New" panose="02070309020205020404" pitchFamily="49" charset="0"/>
-              </a:rPr>
-              <a:t>= a1_below </a:t>
-            </a:r>
-            <a:r>
-              <a:rPr lang="en-US" sz="1600" b="1" dirty="0">
-                <a:latin typeface="Courier New" panose="02070309020205020404" pitchFamily="49" charset="0"/>
-                <a:cs typeface="Courier New" panose="02070309020205020404" pitchFamily="49" charset="0"/>
-              </a:rPr>
-              <a:t>or</a:t>
-            </a:r>
-            <a:r>
-              <a:rPr lang="en-US" sz="1600" dirty="0">
-                <a:latin typeface="Courier New" panose="02070309020205020404" pitchFamily="49" charset="0"/>
-                <a:cs typeface="Courier New" panose="02070309020205020404" pitchFamily="49" charset="0"/>
-              </a:rPr>
-              <a:t> </a:t>
-            </a:r>
-            <a:r>
-              <a:rPr lang="en-US" sz="1600" dirty="0" smtClean="0">
-                <a:latin typeface="Courier New" panose="02070309020205020404" pitchFamily="49" charset="0"/>
-                <a:cs typeface="Courier New" panose="02070309020205020404" pitchFamily="49" charset="0"/>
-              </a:rPr>
-              <a:t>a2_below; </a:t>
-            </a:r>
-          </a:p>
-          <a:p>
-            <a:pPr marL="0" indent="0">
-              <a:buNone/>
-            </a:pPr>
-            <a:r>
-              <a:rPr lang="en-US" sz="1600" dirty="0">
-                <a:latin typeface="Courier New" panose="02070309020205020404" pitchFamily="49" charset="0"/>
-                <a:cs typeface="Courier New" panose="02070309020205020404" pitchFamily="49" charset="0"/>
-              </a:rPr>
-              <a:t> </a:t>
-            </a:r>
-            <a:r>
-              <a:rPr lang="en-US" sz="1600" dirty="0" smtClean="0">
-                <a:latin typeface="Courier New" panose="02070309020205020404" pitchFamily="49" charset="0"/>
-                <a:cs typeface="Courier New" panose="02070309020205020404" pitchFamily="49" charset="0"/>
-              </a:rPr>
-              <a:t>     alarm </a:t>
-            </a:r>
-            <a:r>
-              <a:rPr lang="en-US" sz="1600" dirty="0">
-                <a:latin typeface="Courier New" panose="02070309020205020404" pitchFamily="49" charset="0"/>
-                <a:cs typeface="Courier New" panose="02070309020205020404" pitchFamily="49" charset="0"/>
-              </a:rPr>
-              <a:t>= </a:t>
-            </a:r>
-            <a:r>
-              <a:rPr lang="en-US" sz="1600" b="1" dirty="0">
-                <a:latin typeface="Courier New" panose="02070309020205020404" pitchFamily="49" charset="0"/>
-                <a:cs typeface="Courier New" panose="02070309020205020404" pitchFamily="49" charset="0"/>
-              </a:rPr>
-              <a:t>not</a:t>
-            </a:r>
-            <a:r>
-              <a:rPr lang="en-US" sz="1600" dirty="0">
-                <a:latin typeface="Courier New" panose="02070309020205020404" pitchFamily="49" charset="0"/>
-                <a:cs typeface="Courier New" panose="02070309020205020404" pitchFamily="49" charset="0"/>
-              </a:rPr>
-              <a:t> stat1 </a:t>
-            </a:r>
-            <a:r>
-              <a:rPr lang="en-US" sz="1600" b="1" dirty="0">
-                <a:latin typeface="Courier New" panose="02070309020205020404" pitchFamily="49" charset="0"/>
-                <a:cs typeface="Courier New" panose="02070309020205020404" pitchFamily="49" charset="0"/>
-              </a:rPr>
-              <a:t>and</a:t>
-            </a:r>
-            <a:r>
-              <a:rPr lang="en-US" sz="1600" dirty="0">
-                <a:latin typeface="Courier New" panose="02070309020205020404" pitchFamily="49" charset="0"/>
-                <a:cs typeface="Courier New" panose="02070309020205020404" pitchFamily="49" charset="0"/>
-              </a:rPr>
-              <a:t> </a:t>
-            </a:r>
-            <a:r>
-              <a:rPr lang="en-US" sz="1600" b="1" dirty="0">
-                <a:latin typeface="Courier New" panose="02070309020205020404" pitchFamily="49" charset="0"/>
-                <a:cs typeface="Courier New" panose="02070309020205020404" pitchFamily="49" charset="0"/>
-              </a:rPr>
-              <a:t>not</a:t>
-            </a:r>
-            <a:r>
-              <a:rPr lang="en-US" sz="1600" dirty="0">
-                <a:latin typeface="Courier New" panose="02070309020205020404" pitchFamily="49" charset="0"/>
-                <a:cs typeface="Courier New" panose="02070309020205020404" pitchFamily="49" charset="0"/>
-              </a:rPr>
-              <a:t> stat2</a:t>
-            </a:r>
-            <a:r>
-              <a:rPr lang="en-US" sz="1600" dirty="0" smtClean="0">
-                <a:latin typeface="Courier New" panose="02070309020205020404" pitchFamily="49" charset="0"/>
-                <a:cs typeface="Courier New" panose="02070309020205020404" pitchFamily="49" charset="0"/>
-              </a:rPr>
-              <a:t>;</a:t>
-            </a:r>
-            <a:endParaRPr lang="en-US" sz="1600" dirty="0">
-              <a:latin typeface="Courier New" panose="02070309020205020404" pitchFamily="49" charset="0"/>
-              <a:cs typeface="Courier New" panose="02070309020205020404" pitchFamily="49" charset="0"/>
-            </a:endParaRPr>
-          </a:p>
-          <a:p>
-            <a:pPr marL="0" indent="0">
-              <a:buNone/>
-            </a:pPr>
-            <a:r>
-              <a:rPr lang="en-US" sz="1600" dirty="0">
-                <a:latin typeface="Courier New" panose="02070309020205020404" pitchFamily="49" charset="0"/>
-                <a:cs typeface="Courier New" panose="02070309020205020404" pitchFamily="49" charset="0"/>
-              </a:rPr>
-              <a:t>   </a:t>
-            </a:r>
-            <a:r>
-              <a:rPr lang="en-US" sz="1600" dirty="0" smtClean="0">
-                <a:latin typeface="Courier New" panose="02070309020205020404" pitchFamily="49" charset="0"/>
-                <a:cs typeface="Courier New" panose="02070309020205020404" pitchFamily="49" charset="0"/>
-              </a:rPr>
-              <a:t>   </a:t>
-            </a:r>
-            <a:r>
-              <a:rPr lang="en-US" sz="1600" dirty="0" err="1" smtClean="0">
-                <a:latin typeface="Courier New" panose="02070309020205020404" pitchFamily="49" charset="0"/>
-                <a:cs typeface="Courier New" panose="02070309020205020404" pitchFamily="49" charset="0"/>
-              </a:rPr>
-              <a:t>doi_on</a:t>
-            </a:r>
-            <a:r>
-              <a:rPr lang="en-US" sz="1600" dirty="0" smtClean="0">
-                <a:latin typeface="Courier New" panose="02070309020205020404" pitchFamily="49" charset="0"/>
-                <a:cs typeface="Courier New" panose="02070309020205020404" pitchFamily="49" charset="0"/>
-              </a:rPr>
-              <a:t> </a:t>
-            </a:r>
-            <a:r>
-              <a:rPr lang="en-US" sz="1600" dirty="0">
-                <a:latin typeface="Courier New" panose="02070309020205020404" pitchFamily="49" charset="0"/>
-                <a:cs typeface="Courier New" panose="02070309020205020404" pitchFamily="49" charset="0"/>
-              </a:rPr>
-              <a:t>= </a:t>
-            </a:r>
-            <a:r>
-              <a:rPr lang="en-US" sz="1600" b="1" dirty="0">
-                <a:latin typeface="Courier New" panose="02070309020205020404" pitchFamily="49" charset="0"/>
-                <a:cs typeface="Courier New" panose="02070309020205020404" pitchFamily="49" charset="0"/>
-              </a:rPr>
-              <a:t>if</a:t>
-            </a:r>
-            <a:r>
-              <a:rPr lang="en-US" sz="1600" dirty="0">
-                <a:latin typeface="Courier New" panose="02070309020205020404" pitchFamily="49" charset="0"/>
-                <a:cs typeface="Courier New" panose="02070309020205020404" pitchFamily="49" charset="0"/>
-              </a:rPr>
-              <a:t> alarm </a:t>
-            </a:r>
-            <a:r>
-              <a:rPr lang="en-US" sz="1600" b="1" dirty="0">
-                <a:latin typeface="Courier New" panose="02070309020205020404" pitchFamily="49" charset="0"/>
-                <a:cs typeface="Courier New" panose="02070309020205020404" pitchFamily="49" charset="0"/>
-              </a:rPr>
-              <a:t>then</a:t>
-            </a:r>
-            <a:r>
-              <a:rPr lang="en-US" sz="1600" dirty="0">
-                <a:latin typeface="Courier New" panose="02070309020205020404" pitchFamily="49" charset="0"/>
-                <a:cs typeface="Courier New" panose="02070309020205020404" pitchFamily="49" charset="0"/>
-              </a:rPr>
-              <a:t> </a:t>
-            </a:r>
-            <a:r>
-              <a:rPr lang="en-US" sz="1600" i="1" dirty="0" smtClean="0">
-                <a:latin typeface="Courier New" panose="02070309020205020404" pitchFamily="49" charset="0"/>
-                <a:cs typeface="Courier New" panose="02070309020205020404" pitchFamily="49" charset="0"/>
-              </a:rPr>
-              <a:t>pre</a:t>
-            </a:r>
-            <a:r>
-              <a:rPr lang="en-US" sz="1600" dirty="0" smtClean="0">
-                <a:latin typeface="Courier New" panose="02070309020205020404" pitchFamily="49" charset="0"/>
-                <a:cs typeface="Courier New" panose="02070309020205020404" pitchFamily="49" charset="0"/>
-              </a:rPr>
-              <a:t>(</a:t>
-            </a:r>
-            <a:r>
-              <a:rPr lang="en-US" sz="1600" dirty="0" err="1" smtClean="0">
-                <a:latin typeface="Courier New" panose="02070309020205020404" pitchFamily="49" charset="0"/>
-                <a:cs typeface="Courier New" panose="02070309020205020404" pitchFamily="49" charset="0"/>
-              </a:rPr>
-              <a:t>doi_on</a:t>
-            </a:r>
-            <a:r>
-              <a:rPr lang="en-US" sz="1600" dirty="0" smtClean="0">
-                <a:latin typeface="Courier New" panose="02070309020205020404" pitchFamily="49" charset="0"/>
-                <a:cs typeface="Courier New" panose="02070309020205020404" pitchFamily="49" charset="0"/>
-              </a:rPr>
-              <a:t>) </a:t>
-            </a:r>
-            <a:r>
-              <a:rPr lang="en-US" sz="1600" b="1" dirty="0" smtClean="0">
-                <a:latin typeface="Courier New" panose="02070309020205020404" pitchFamily="49" charset="0"/>
-                <a:cs typeface="Courier New" panose="02070309020205020404" pitchFamily="49" charset="0"/>
-              </a:rPr>
-              <a:t>else</a:t>
-            </a:r>
-            <a:r>
-              <a:rPr lang="en-US" sz="1600" dirty="0" smtClean="0">
-                <a:latin typeface="Courier New" panose="02070309020205020404" pitchFamily="49" charset="0"/>
-                <a:cs typeface="Courier New" panose="02070309020205020404" pitchFamily="49" charset="0"/>
-              </a:rPr>
-              <a:t> below </a:t>
-            </a:r>
-          </a:p>
-          <a:p>
-            <a:pPr marL="0" indent="0">
-              <a:buNone/>
-            </a:pPr>
-            <a:r>
-              <a:rPr lang="en-US" sz="1600" dirty="0">
-                <a:latin typeface="Courier New" panose="02070309020205020404" pitchFamily="49" charset="0"/>
-                <a:cs typeface="Courier New" panose="02070309020205020404" pitchFamily="49" charset="0"/>
-              </a:rPr>
-              <a:t> </a:t>
-            </a:r>
-            <a:r>
-              <a:rPr lang="en-US" sz="1600" dirty="0" smtClean="0">
-                <a:latin typeface="Courier New" panose="02070309020205020404" pitchFamily="49" charset="0"/>
-                <a:cs typeface="Courier New" panose="02070309020205020404" pitchFamily="49" charset="0"/>
-              </a:rPr>
-              <a:t>     p1 </a:t>
-            </a:r>
-            <a:r>
-              <a:rPr lang="en-US" sz="1600" dirty="0">
-                <a:latin typeface="Courier New" panose="02070309020205020404" pitchFamily="49" charset="0"/>
-                <a:cs typeface="Courier New" panose="02070309020205020404" pitchFamily="49" charset="0"/>
-              </a:rPr>
-              <a:t>= a1_below </a:t>
-            </a:r>
-            <a:r>
-              <a:rPr lang="en-US" sz="1600" b="1" dirty="0">
-                <a:latin typeface="Courier New" panose="02070309020205020404" pitchFamily="49" charset="0"/>
-                <a:cs typeface="Courier New" panose="02070309020205020404" pitchFamily="49" charset="0"/>
-              </a:rPr>
-              <a:t>=&gt;</a:t>
-            </a:r>
-            <a:r>
-              <a:rPr lang="en-US" sz="1600" dirty="0">
-                <a:latin typeface="Courier New" panose="02070309020205020404" pitchFamily="49" charset="0"/>
-                <a:cs typeface="Courier New" panose="02070309020205020404" pitchFamily="49" charset="0"/>
-              </a:rPr>
-              <a:t> </a:t>
-            </a:r>
-            <a:r>
-              <a:rPr lang="en-US" sz="1600" dirty="0" err="1">
-                <a:latin typeface="Courier New" panose="02070309020205020404" pitchFamily="49" charset="0"/>
-                <a:cs typeface="Courier New" panose="02070309020205020404" pitchFamily="49" charset="0"/>
-              </a:rPr>
-              <a:t>doi_on</a:t>
-            </a:r>
-            <a:r>
-              <a:rPr lang="en-US" sz="1600" dirty="0">
-                <a:latin typeface="Courier New" panose="02070309020205020404" pitchFamily="49" charset="0"/>
-                <a:cs typeface="Courier New" panose="02070309020205020404" pitchFamily="49" charset="0"/>
-              </a:rPr>
-              <a:t>;                 </a:t>
-            </a:r>
-          </a:p>
-          <a:p>
-            <a:pPr marL="0" indent="0">
-              <a:buNone/>
-            </a:pPr>
-            <a:r>
-              <a:rPr lang="en-US" sz="1600" dirty="0">
-                <a:latin typeface="Courier New" panose="02070309020205020404" pitchFamily="49" charset="0"/>
-                <a:cs typeface="Courier New" panose="02070309020205020404" pitchFamily="49" charset="0"/>
-              </a:rPr>
-              <a:t>   </a:t>
-            </a:r>
-            <a:r>
-              <a:rPr lang="en-US" sz="1600" dirty="0" smtClean="0">
-                <a:latin typeface="Courier New" panose="02070309020205020404" pitchFamily="49" charset="0"/>
-                <a:cs typeface="Courier New" panose="02070309020205020404" pitchFamily="49" charset="0"/>
-              </a:rPr>
-              <a:t>   p2 </a:t>
-            </a:r>
-            <a:r>
-              <a:rPr lang="en-US" sz="1600" dirty="0">
-                <a:latin typeface="Courier New" panose="02070309020205020404" pitchFamily="49" charset="0"/>
-                <a:cs typeface="Courier New" panose="02070309020205020404" pitchFamily="49" charset="0"/>
-              </a:rPr>
-              <a:t>= a2_below </a:t>
-            </a:r>
-            <a:r>
-              <a:rPr lang="en-US" sz="1600" b="1" dirty="0">
-                <a:latin typeface="Courier New" panose="02070309020205020404" pitchFamily="49" charset="0"/>
-                <a:cs typeface="Courier New" panose="02070309020205020404" pitchFamily="49" charset="0"/>
-              </a:rPr>
-              <a:t>=&gt;</a:t>
-            </a:r>
-            <a:r>
-              <a:rPr lang="en-US" sz="1600" dirty="0">
-                <a:latin typeface="Courier New" panose="02070309020205020404" pitchFamily="49" charset="0"/>
-                <a:cs typeface="Courier New" panose="02070309020205020404" pitchFamily="49" charset="0"/>
-              </a:rPr>
-              <a:t> </a:t>
-            </a:r>
-            <a:r>
-              <a:rPr lang="en-US" sz="1600" dirty="0" err="1" smtClean="0">
-                <a:latin typeface="Courier New" panose="02070309020205020404" pitchFamily="49" charset="0"/>
-                <a:cs typeface="Courier New" panose="02070309020205020404" pitchFamily="49" charset="0"/>
-              </a:rPr>
-              <a:t>doi_on</a:t>
-            </a:r>
-            <a:r>
-              <a:rPr lang="en-US" sz="1600" dirty="0" smtClean="0">
-                <a:latin typeface="Courier New" panose="02070309020205020404" pitchFamily="49" charset="0"/>
-                <a:cs typeface="Courier New" panose="02070309020205020404" pitchFamily="49" charset="0"/>
-              </a:rPr>
-              <a:t>;                </a:t>
-            </a:r>
-            <a:endParaRPr lang="en-US" sz="1600" dirty="0">
-              <a:latin typeface="Courier New" panose="02070309020205020404" pitchFamily="49" charset="0"/>
-              <a:cs typeface="Courier New" panose="02070309020205020404" pitchFamily="49" charset="0"/>
-            </a:endParaRPr>
-          </a:p>
-          <a:p>
-            <a:pPr marL="0" indent="0">
-              <a:buNone/>
-            </a:pPr>
-            <a:r>
-              <a:rPr lang="en-US" sz="1600" dirty="0">
-                <a:latin typeface="Courier New" panose="02070309020205020404" pitchFamily="49" charset="0"/>
-                <a:cs typeface="Courier New" panose="02070309020205020404" pitchFamily="49" charset="0"/>
-              </a:rPr>
-              <a:t> </a:t>
-            </a:r>
-            <a:r>
-              <a:rPr lang="en-US" sz="1600" dirty="0" smtClean="0">
-                <a:latin typeface="Courier New" panose="02070309020205020404" pitchFamily="49" charset="0"/>
-                <a:cs typeface="Courier New" panose="02070309020205020404" pitchFamily="49" charset="0"/>
-              </a:rPr>
-              <a:t> </a:t>
-            </a:r>
-            <a:r>
-              <a:rPr lang="en-US" sz="1600" b="1" dirty="0" err="1" smtClean="0">
-                <a:latin typeface="Courier New" panose="02070309020205020404" pitchFamily="49" charset="0"/>
-                <a:cs typeface="Courier New" panose="02070309020205020404" pitchFamily="49" charset="0"/>
-              </a:rPr>
-              <a:t>tel</a:t>
-            </a:r>
-            <a:r>
-              <a:rPr lang="en-US" sz="1600" dirty="0">
-                <a:latin typeface="Courier New" panose="02070309020205020404" pitchFamily="49" charset="0"/>
-                <a:cs typeface="Courier New" panose="02070309020205020404" pitchFamily="49" charset="0"/>
-              </a:rPr>
-              <a:t>;</a:t>
-            </a:r>
-          </a:p>
-        </p:txBody>
-      </p:sp>
-      <p:sp>
-        <p:nvSpPr>
           <p:cNvPr id="6" name="Rectangle 5"/>
           <p:cNvSpPr/>
           <p:nvPr/>
         </p:nvSpPr>
         <p:spPr>
           <a:xfrm>
-            <a:off x="1899103" y="2550642"/>
-            <a:ext cx="506870" cy="307777"/>
+            <a:off x="5852436" y="4943726"/>
+            <a:ext cx="338554" cy="400110"/>
           </a:xfrm>
           <a:prstGeom prst="rect">
             <a:avLst/>
@@ -5042,16 +4642,19 @@
           <a:lstStyle/>
           <a:p>
             <a:r>
-              <a:rPr lang="en-US" sz="1400" dirty="0">
+              <a:rPr lang="en-US" sz="2000" dirty="0" smtClean="0">
                 <a:solidFill>
-                  <a:prstClr val="black"/>
+                  <a:srgbClr val="C00000"/>
                 </a:solidFill>
                 <a:latin typeface="Courier New" panose="02070309020205020404" pitchFamily="49" charset="0"/>
                 <a:cs typeface="Courier New" panose="02070309020205020404" pitchFamily="49" charset="0"/>
               </a:rPr>
-              <a:t>(1)</a:t>
-            </a:r>
-            <a:endParaRPr lang="en-US" dirty="0"/>
+              <a:t>P</a:t>
+            </a:r>
+            <a:endParaRPr lang="en-US" sz="2000" dirty="0">
+              <a:latin typeface="Courier New" panose="02070309020205020404" pitchFamily="49" charset="0"/>
+              <a:cs typeface="Courier New" panose="02070309020205020404" pitchFamily="49" charset="0"/>
+            </a:endParaRPr>
           </a:p>
         </p:txBody>
       </p:sp>
@@ -5063,8 +4666,8 @@
         </p:nvSpPr>
         <p:spPr>
           <a:xfrm>
-            <a:off x="1899103" y="2882922"/>
-            <a:ext cx="506870" cy="307777"/>
+            <a:off x="5497792" y="2742506"/>
+            <a:ext cx="1569660" cy="400110"/>
           </a:xfrm>
           <a:prstGeom prst="rect">
             <a:avLst/>
@@ -5077,29 +4680,29 @@
           <a:lstStyle/>
           <a:p>
             <a:r>
-              <a:rPr lang="en-US" sz="1400" dirty="0" smtClean="0">
-                <a:solidFill>
-                  <a:prstClr val="black"/>
-                </a:solidFill>
+              <a:rPr lang="en-US" sz="2000" dirty="0" err="1" smtClean="0">
                 <a:latin typeface="Courier New" panose="02070309020205020404" pitchFamily="49" charset="0"/>
                 <a:cs typeface="Courier New" panose="02070309020205020404" pitchFamily="49" charset="0"/>
               </a:rPr>
-              <a:t>(2)</a:t>
-            </a:r>
-            <a:endParaRPr lang="en-US" dirty="0"/>
-          </a:p>
-        </p:txBody>
-      </p:sp>
-      <p:sp>
-        <p:nvSpPr>
-          <p:cNvPr id="8" name="Rectangle 7"/>
+              <a:t>one_below</a:t>
+            </a:r>
+            <a:endParaRPr lang="en-US" sz="2000" dirty="0">
+              <a:latin typeface="Courier New" panose="02070309020205020404" pitchFamily="49" charset="0"/>
+              <a:cs typeface="Courier New" panose="02070309020205020404" pitchFamily="49" charset="0"/>
+            </a:endParaRPr>
+          </a:p>
+        </p:txBody>
+      </p:sp>
+      <p:sp>
+        <p:nvSpPr>
+          <p:cNvPr id="9" name="Rectangle 8"/>
           <p:cNvSpPr/>
           <p:nvPr/>
         </p:nvSpPr>
         <p:spPr>
           <a:xfrm>
-            <a:off x="1899103" y="3235709"/>
-            <a:ext cx="506870" cy="307777"/>
+            <a:off x="7154815" y="2831339"/>
+            <a:ext cx="1415772" cy="400110"/>
           </a:xfrm>
           <a:prstGeom prst="rect">
             <a:avLst/>
@@ -5112,29 +4715,29 @@
           <a:lstStyle/>
           <a:p>
             <a:r>
-              <a:rPr lang="en-US" sz="1400" dirty="0" smtClean="0">
-                <a:solidFill>
-                  <a:prstClr val="black"/>
-                </a:solidFill>
+              <a:rPr lang="en-US" sz="2000" dirty="0" smtClean="0">
                 <a:latin typeface="Courier New" panose="02070309020205020404" pitchFamily="49" charset="0"/>
                 <a:cs typeface="Courier New" panose="02070309020205020404" pitchFamily="49" charset="0"/>
               </a:rPr>
-              <a:t>(3)</a:t>
-            </a:r>
-            <a:endParaRPr lang="en-US" dirty="0"/>
-          </a:p>
-        </p:txBody>
-      </p:sp>
-      <p:sp>
-        <p:nvSpPr>
-          <p:cNvPr id="9" name="Rectangle 8"/>
+              <a:t>a2_below</a:t>
+            </a:r>
+            <a:endParaRPr lang="en-US" sz="2000" dirty="0">
+              <a:latin typeface="Courier New" panose="02070309020205020404" pitchFamily="49" charset="0"/>
+              <a:cs typeface="Courier New" panose="02070309020205020404" pitchFamily="49" charset="0"/>
+            </a:endParaRPr>
+          </a:p>
+        </p:txBody>
+      </p:sp>
+      <p:sp>
+        <p:nvSpPr>
+          <p:cNvPr id="10" name="Rectangle 9"/>
           <p:cNvSpPr/>
           <p:nvPr/>
         </p:nvSpPr>
         <p:spPr>
           <a:xfrm>
-            <a:off x="1899103" y="3592492"/>
-            <a:ext cx="506870" cy="307777"/>
+            <a:off x="3880599" y="3372623"/>
+            <a:ext cx="1415772" cy="400110"/>
           </a:xfrm>
           <a:prstGeom prst="rect">
             <a:avLst/>
@@ -5147,64 +4750,158 @@
           <a:lstStyle/>
           <a:p>
             <a:r>
-              <a:rPr lang="en-US" sz="1400" dirty="0" smtClean="0">
-                <a:solidFill>
-                  <a:prstClr val="black"/>
-                </a:solidFill>
+              <a:rPr lang="en-US" sz="2000" dirty="0">
                 <a:latin typeface="Courier New" panose="02070309020205020404" pitchFamily="49" charset="0"/>
                 <a:cs typeface="Courier New" panose="02070309020205020404" pitchFamily="49" charset="0"/>
               </a:rPr>
-              <a:t>(4)</a:t>
-            </a:r>
-            <a:endParaRPr lang="en-US" dirty="0"/>
-          </a:p>
-        </p:txBody>
-      </p:sp>
-      <p:sp>
-        <p:nvSpPr>
-          <p:cNvPr id="10" name="Rectangle 9"/>
+              <a:t>a1_below</a:t>
+            </a:r>
+          </a:p>
+        </p:txBody>
+      </p:sp>
+      <p:sp>
+        <p:nvSpPr>
+          <p:cNvPr id="11" name="Rectangle 10"/>
           <p:cNvSpPr/>
           <p:nvPr/>
         </p:nvSpPr>
         <p:spPr>
           <a:xfrm>
-            <a:off x="1899103" y="3949275"/>
-            <a:ext cx="506870" cy="307777"/>
+            <a:off x="5722524" y="2312907"/>
+            <a:ext cx="1157044" cy="400110"/>
           </a:xfrm>
           <a:prstGeom prst="rect">
             <a:avLst/>
           </a:prstGeom>
         </p:spPr>
         <p:txBody>
-          <a:bodyPr wrap="none">
+          <a:bodyPr wrap="square">
             <a:spAutoFit/>
           </a:bodyPr>
           <a:lstStyle/>
           <a:p>
             <a:r>
-              <a:rPr lang="en-US" sz="1400" dirty="0" smtClean="0">
-                <a:solidFill>
-                  <a:prstClr val="black"/>
-                </a:solidFill>
+              <a:rPr lang="en-US" sz="2000" dirty="0" err="1" smtClean="0">
                 <a:latin typeface="Courier New" panose="02070309020205020404" pitchFamily="49" charset="0"/>
                 <a:cs typeface="Courier New" panose="02070309020205020404" pitchFamily="49" charset="0"/>
               </a:rPr>
-              <a:t>(5)</a:t>
-            </a:r>
-            <a:endParaRPr lang="en-US" dirty="0"/>
-          </a:p>
-        </p:txBody>
-      </p:sp>
-      <p:sp>
-        <p:nvSpPr>
-          <p:cNvPr id="11" name="Rectangle 10"/>
+              <a:t>on_p</a:t>
+            </a:r>
+            <a:endParaRPr lang="en-US" sz="2000" dirty="0">
+              <a:latin typeface="Courier New" panose="02070309020205020404" pitchFamily="49" charset="0"/>
+              <a:cs typeface="Courier New" panose="02070309020205020404" pitchFamily="49" charset="0"/>
+            </a:endParaRPr>
+          </a:p>
+        </p:txBody>
+      </p:sp>
+      <p:sp>
+        <p:nvSpPr>
+          <p:cNvPr id="14" name="Oval 13"/>
           <p:cNvSpPr/>
           <p:nvPr/>
         </p:nvSpPr>
         <p:spPr>
+          <a:xfrm rot="16200000">
+            <a:off x="5885998" y="1268112"/>
+            <a:ext cx="1987141" cy="3528204"/>
+          </a:xfrm>
+          <a:prstGeom prst="ellipse">
+            <a:avLst/>
+          </a:prstGeom>
+          <a:noFill/>
+          <a:ln w="19050">
+            <a:solidFill>
+              <a:schemeClr val="tx1"/>
+            </a:solidFill>
+          </a:ln>
+        </p:spPr>
+        <p:style>
+          <a:lnRef idx="2">
+            <a:schemeClr val="accent1">
+              <a:shade val="50000"/>
+            </a:schemeClr>
+          </a:lnRef>
+          <a:fillRef idx="1">
+            <a:schemeClr val="accent1"/>
+          </a:fillRef>
+          <a:effectRef idx="0">
+            <a:schemeClr val="accent1"/>
+          </a:effectRef>
+          <a:fontRef idx="minor">
+            <a:schemeClr val="lt1"/>
+          </a:fontRef>
+        </p:style>
+        <p:txBody>
+          <a:bodyPr rtlCol="0" anchor="ctr"/>
+          <a:lstStyle/>
+          <a:p>
+            <a:pPr algn="ctr"/>
+            <a:endParaRPr lang="en-US" sz="1600">
+              <a:latin typeface="Courier New" panose="02070309020205020404" pitchFamily="49" charset="0"/>
+              <a:cs typeface="Courier New" panose="02070309020205020404" pitchFamily="49" charset="0"/>
+            </a:endParaRPr>
+          </a:p>
+        </p:txBody>
+      </p:sp>
+      <p:sp>
+        <p:nvSpPr>
+          <p:cNvPr id="16" name="Oval 15"/>
+          <p:cNvSpPr/>
+          <p:nvPr/>
+        </p:nvSpPr>
+        <p:spPr>
+          <a:xfrm rot="15327280">
+            <a:off x="4473940" y="1458009"/>
+            <a:ext cx="2058743" cy="3444776"/>
+          </a:xfrm>
+          <a:prstGeom prst="ellipse">
+            <a:avLst/>
+          </a:prstGeom>
+          <a:noFill/>
+          <a:ln>
+            <a:solidFill>
+              <a:schemeClr val="tx1"/>
+            </a:solidFill>
+          </a:ln>
+        </p:spPr>
+        <p:style>
+          <a:lnRef idx="2">
+            <a:schemeClr val="accent1">
+              <a:shade val="50000"/>
+            </a:schemeClr>
+          </a:lnRef>
+          <a:fillRef idx="1">
+            <a:schemeClr val="accent1"/>
+          </a:fillRef>
+          <a:effectRef idx="0">
+            <a:schemeClr val="accent1"/>
+          </a:effectRef>
+          <a:fontRef idx="minor">
+            <a:schemeClr val="lt1"/>
+          </a:fontRef>
+        </p:style>
+        <p:txBody>
+          <a:bodyPr rtlCol="0" anchor="ctr"/>
+          <a:lstStyle/>
+          <a:p>
+            <a:pPr algn="ctr"/>
+            <a:endParaRPr lang="en-US" sz="1600">
+              <a:latin typeface="Courier New" panose="02070309020205020404" pitchFamily="49" charset="0"/>
+              <a:cs typeface="Courier New" panose="02070309020205020404" pitchFamily="49" charset="0"/>
+            </a:endParaRPr>
+          </a:p>
+        </p:txBody>
+      </p:sp>
+      <p:sp>
+        <p:nvSpPr>
+          <p:cNvPr id="17" name="Rectangle 16"/>
+          <p:cNvSpPr/>
+          <p:nvPr/>
+        </p:nvSpPr>
+        <p:spPr>
           <a:xfrm>
-            <a:off x="1899103" y="4640843"/>
-            <a:ext cx="506870" cy="307777"/>
+            <a:off x="5601730" y="3273942"/>
+            <a:ext cx="1107996" cy="400110"/>
           </a:xfrm>
           <a:prstGeom prst="rect">
             <a:avLst/>
@@ -5217,64 +4914,108 @@
           <a:lstStyle/>
           <a:p>
             <a:r>
-              <a:rPr lang="en-US" sz="1400" dirty="0" smtClean="0">
-                <a:solidFill>
-                  <a:prstClr val="black"/>
-                </a:solidFill>
+              <a:rPr lang="en-US" sz="2000" dirty="0" smtClean="0">
                 <a:latin typeface="Courier New" panose="02070309020205020404" pitchFamily="49" charset="0"/>
                 <a:cs typeface="Courier New" panose="02070309020205020404" pitchFamily="49" charset="0"/>
               </a:rPr>
-              <a:t>(6)</a:t>
-            </a:r>
-            <a:endParaRPr lang="en-US" dirty="0"/>
-          </a:p>
-        </p:txBody>
-      </p:sp>
-      <p:sp>
-        <p:nvSpPr>
-          <p:cNvPr id="12" name="Rectangle 11"/>
+              <a:t>doi_on</a:t>
+            </a:r>
+            <a:endParaRPr lang="en-US" sz="2000" dirty="0">
+              <a:latin typeface="Courier New" panose="02070309020205020404" pitchFamily="49" charset="0"/>
+              <a:cs typeface="Courier New" panose="02070309020205020404" pitchFamily="49" charset="0"/>
+            </a:endParaRPr>
+          </a:p>
+        </p:txBody>
+      </p:sp>
+      <p:cxnSp>
+        <p:nvCxnSpPr>
+          <p:cNvPr id="18" name="Straight Arrow Connector 17"/>
+          <p:cNvCxnSpPr>
+            <a:endCxn id="6" idx="0"/>
+          </p:cNvCxnSpPr>
+          <p:nvPr/>
+        </p:nvCxnSpPr>
+        <p:spPr>
+          <a:xfrm>
+            <a:off x="5030699" y="4294353"/>
+            <a:ext cx="991014" cy="649373"/>
+          </a:xfrm>
+          <a:prstGeom prst="straightConnector1">
+            <a:avLst/>
+          </a:prstGeom>
+          <a:ln w="12700">
+            <a:solidFill>
+              <a:schemeClr val="tx1"/>
+            </a:solidFill>
+            <a:headEnd type="arrow" w="med" len="med"/>
+            <a:tailEnd type="none" w="med" len="med"/>
+          </a:ln>
+        </p:spPr>
+        <p:style>
+          <a:lnRef idx="1">
+            <a:schemeClr val="accent1"/>
+          </a:lnRef>
+          <a:fillRef idx="0">
+            <a:schemeClr val="accent1"/>
+          </a:fillRef>
+          <a:effectRef idx="0">
+            <a:schemeClr val="accent1"/>
+          </a:effectRef>
+          <a:fontRef idx="minor">
+            <a:schemeClr val="tx1"/>
+          </a:fontRef>
+        </p:style>
+      </p:cxnSp>
+      <p:cxnSp>
+        <p:nvCxnSpPr>
+          <p:cNvPr id="19" name="Straight Arrow Connector 18"/>
+          <p:cNvCxnSpPr>
+            <a:stCxn id="6" idx="0"/>
+            <a:endCxn id="14" idx="2"/>
+          </p:cNvCxnSpPr>
+          <p:nvPr/>
+        </p:nvCxnSpPr>
+        <p:spPr>
+          <a:xfrm flipV="1">
+            <a:off x="6021713" y="4025785"/>
+            <a:ext cx="801086" cy="917941"/>
+          </a:xfrm>
+          <a:prstGeom prst="straightConnector1">
+            <a:avLst/>
+          </a:prstGeom>
+          <a:ln w="19050">
+            <a:solidFill>
+              <a:schemeClr val="tx1"/>
+            </a:solidFill>
+            <a:headEnd type="none" w="med" len="med"/>
+            <a:tailEnd type="arrow" w="med" len="med"/>
+          </a:ln>
+        </p:spPr>
+        <p:style>
+          <a:lnRef idx="1">
+            <a:schemeClr val="accent1"/>
+          </a:lnRef>
+          <a:fillRef idx="0">
+            <a:schemeClr val="accent1"/>
+          </a:fillRef>
+          <a:effectRef idx="0">
+            <a:schemeClr val="accent1"/>
+          </a:effectRef>
+          <a:fontRef idx="minor">
+            <a:schemeClr val="tx1"/>
+          </a:fontRef>
+        </p:style>
+      </p:cxnSp>
+      <p:sp>
+        <p:nvSpPr>
+          <p:cNvPr id="20" name="Rectangle 19"/>
           <p:cNvSpPr/>
           <p:nvPr/>
         </p:nvSpPr>
         <p:spPr>
           <a:xfrm>
-            <a:off x="1899103" y="4948620"/>
-            <a:ext cx="506870" cy="307777"/>
-          </a:xfrm>
-          <a:prstGeom prst="rect">
-            <a:avLst/>
-          </a:prstGeom>
-        </p:spPr>
-        <p:txBody>
-          <a:bodyPr wrap="none">
-            <a:spAutoFit/>
-          </a:bodyPr>
-          <a:lstStyle/>
-          <a:p>
-            <a:r>
-              <a:rPr lang="en-US" sz="1400" dirty="0" smtClean="0">
-                <a:solidFill>
-                  <a:prstClr val="black"/>
-                </a:solidFill>
-                <a:latin typeface="Courier New" panose="02070309020205020404" pitchFamily="49" charset="0"/>
-                <a:cs typeface="Courier New" panose="02070309020205020404" pitchFamily="49" charset="0"/>
-              </a:rPr>
-              <a:t>(7)</a:t>
-            </a:r>
-            <a:endParaRPr lang="en-US" dirty="0"/>
-          </a:p>
-        </p:txBody>
-      </p:sp>
-      <p:sp>
-        <p:nvSpPr>
-          <p:cNvPr id="13" name="Rectangle 12"/>
-          <p:cNvSpPr/>
-          <p:nvPr/>
-        </p:nvSpPr>
-        <p:spPr>
-          <a:xfrm>
-            <a:off x="1496203" y="576483"/>
-            <a:ext cx="8347807" cy="5246347"/>
+            <a:off x="3183147" y="1564427"/>
+            <a:ext cx="5719313" cy="3878841"/>
           </a:xfrm>
           <a:prstGeom prst="rect">
             <a:avLst/>
@@ -5316,153 +5057,1773 @@
       </p:sp>
       <p:sp>
         <p:nvSpPr>
-          <p:cNvPr id="2" name="Rectangle 1"/>
+          <p:cNvPr id="26" name="Rectangle 25"/>
           <p:cNvSpPr/>
           <p:nvPr/>
         </p:nvSpPr>
         <p:spPr>
           <a:xfrm>
-            <a:off x="1831362" y="774778"/>
-            <a:ext cx="8012648" cy="615553"/>
+            <a:off x="3324647" y="2492785"/>
+            <a:ext cx="925253" cy="338554"/>
           </a:xfrm>
           <a:prstGeom prst="rect">
             <a:avLst/>
           </a:prstGeom>
         </p:spPr>
         <p:txBody>
+          <a:bodyPr wrap="none">
+            <a:spAutoFit/>
+          </a:bodyPr>
+          <a:lstStyle/>
+          <a:p>
+            <a:r>
+              <a:rPr lang="en-US" sz="1600" dirty="0" smtClean="0">
+                <a:latin typeface="Courier New" panose="02070309020205020404" pitchFamily="49" charset="0"/>
+                <a:cs typeface="Courier New" panose="02070309020205020404" pitchFamily="49" charset="0"/>
+              </a:rPr>
+              <a:t>MIVC#1</a:t>
+            </a:r>
+            <a:endParaRPr lang="en-US" sz="1600" dirty="0">
+              <a:latin typeface="Courier New" panose="02070309020205020404" pitchFamily="49" charset="0"/>
+              <a:cs typeface="Courier New" panose="02070309020205020404" pitchFamily="49" charset="0"/>
+            </a:endParaRPr>
+          </a:p>
+        </p:txBody>
+      </p:sp>
+      <p:sp>
+        <p:nvSpPr>
+          <p:cNvPr id="27" name="Rectangle 26"/>
+          <p:cNvSpPr/>
+          <p:nvPr/>
+        </p:nvSpPr>
+        <p:spPr>
+          <a:xfrm>
+            <a:off x="7573718" y="1846652"/>
+            <a:ext cx="925253" cy="338554"/>
+          </a:xfrm>
+          <a:prstGeom prst="rect">
+            <a:avLst/>
+          </a:prstGeom>
+        </p:spPr>
+        <p:txBody>
+          <a:bodyPr wrap="none">
+            <a:spAutoFit/>
+          </a:bodyPr>
+          <a:lstStyle/>
+          <a:p>
+            <a:r>
+              <a:rPr lang="en-US" sz="1600" dirty="0">
+                <a:latin typeface="Courier New" panose="02070309020205020404" pitchFamily="49" charset="0"/>
+                <a:cs typeface="Courier New" panose="02070309020205020404" pitchFamily="49" charset="0"/>
+              </a:rPr>
+              <a:t>M</a:t>
+            </a:r>
+            <a:r>
+              <a:rPr lang="en-US" sz="1600" dirty="0" smtClean="0">
+                <a:latin typeface="Courier New" panose="02070309020205020404" pitchFamily="49" charset="0"/>
+                <a:cs typeface="Courier New" panose="02070309020205020404" pitchFamily="49" charset="0"/>
+              </a:rPr>
+              <a:t>IVC#2</a:t>
+            </a:r>
+            <a:endParaRPr lang="en-US" sz="1600" dirty="0">
+              <a:latin typeface="Courier New" panose="02070309020205020404" pitchFamily="49" charset="0"/>
+              <a:cs typeface="Courier New" panose="02070309020205020404" pitchFamily="49" charset="0"/>
+            </a:endParaRPr>
+          </a:p>
+        </p:txBody>
+      </p:sp>
+    </p:spTree>
+    <p:extLst>
+      <p:ext uri="{BB962C8B-B14F-4D97-AF65-F5344CB8AC3E}">
+        <p14:creationId xmlns:p14="http://schemas.microsoft.com/office/powerpoint/2010/main" val="3619954222"/>
+      </p:ext>
+    </p:extLst>
+  </p:cSld>
+  <p:clrMapOvr>
+    <a:masterClrMapping/>
+  </p:clrMapOvr>
+</p:sld>
+</file>
+
+<file path=ppt/slides/slide4.xml><?xml version="1.0" encoding="utf-8"?>
+<p:sld xmlns:a="http://schemas.openxmlformats.org/drawingml/2006/main" xmlns:r="http://schemas.openxmlformats.org/officeDocument/2006/relationships" xmlns:p="http://schemas.openxmlformats.org/presentationml/2006/main">
+  <p:cSld>
+    <p:spTree>
+      <p:nvGrpSpPr>
+        <p:cNvPr id="1" name=""/>
+        <p:cNvGrpSpPr/>
+        <p:nvPr/>
+      </p:nvGrpSpPr>
+      <p:grpSpPr>
+        <a:xfrm>
+          <a:off x="0" y="0"/>
+          <a:ext cx="0" cy="0"/>
+          <a:chOff x="0" y="0"/>
+          <a:chExt cx="0" cy="0"/>
+        </a:xfrm>
+      </p:grpSpPr>
+      <p:sp>
+        <p:nvSpPr>
+          <p:cNvPr id="3" name="Content Placeholder 2"/>
+          <p:cNvSpPr>
+            <a:spLocks noGrp="1"/>
+          </p:cNvSpPr>
+          <p:nvPr>
+            <p:ph idx="1"/>
+          </p:nvPr>
+        </p:nvSpPr>
+        <p:spPr>
+          <a:xfrm>
+            <a:off x="1920098" y="840906"/>
+            <a:ext cx="8842638" cy="5510468"/>
+          </a:xfrm>
+        </p:spPr>
+        <p:txBody>
+          <a:bodyPr>
+            <a:noAutofit/>
+          </a:bodyPr>
+          <a:lstStyle/>
+          <a:p>
+            <a:pPr marL="0" indent="0">
+              <a:buNone/>
+            </a:pPr>
+            <a:r>
+              <a:rPr lang="en-US" sz="1800" b="1" dirty="0" err="1" smtClean="0">
+                <a:solidFill>
+                  <a:srgbClr val="993366"/>
+                </a:solidFill>
+                <a:latin typeface="Consolas" panose="020B0609020204030204" pitchFamily="49" charset="0"/>
+                <a:cs typeface="Courier New" panose="02070309020205020404" pitchFamily="49" charset="0"/>
+              </a:rPr>
+              <a:t>var</a:t>
+            </a:r>
+            <a:endParaRPr lang="en-US" sz="1800" b="1" dirty="0">
+              <a:solidFill>
+                <a:srgbClr val="993366"/>
+              </a:solidFill>
+              <a:latin typeface="Consolas" panose="020B0609020204030204" pitchFamily="49" charset="0"/>
+              <a:cs typeface="Courier New" panose="02070309020205020404" pitchFamily="49" charset="0"/>
+            </a:endParaRPr>
+          </a:p>
+          <a:p>
+            <a:pPr marL="0" indent="0">
+              <a:buNone/>
+            </a:pPr>
+            <a:r>
+              <a:rPr lang="en-US" sz="1800" dirty="0" smtClean="0">
+                <a:latin typeface="Consolas" panose="020B0609020204030204" pitchFamily="49" charset="0"/>
+                <a:cs typeface="Courier New" panose="02070309020205020404" pitchFamily="49" charset="0"/>
+              </a:rPr>
+              <a:t>     a1_below</a:t>
+            </a:r>
+            <a:r>
+              <a:rPr lang="en-US" sz="1800" b="1" dirty="0">
+                <a:solidFill>
+                  <a:srgbClr val="993366"/>
+                </a:solidFill>
+                <a:latin typeface="Consolas" panose="020B0609020204030204" pitchFamily="49" charset="0"/>
+                <a:cs typeface="Courier New" panose="02070309020205020404" pitchFamily="49" charset="0"/>
+              </a:rPr>
+              <a:t>,</a:t>
+            </a:r>
+            <a:r>
+              <a:rPr lang="en-US" sz="1800" dirty="0">
+                <a:latin typeface="Consolas" panose="020B0609020204030204" pitchFamily="49" charset="0"/>
+                <a:cs typeface="Courier New" panose="02070309020205020404" pitchFamily="49" charset="0"/>
+              </a:rPr>
+              <a:t> a2_below</a:t>
+            </a:r>
+            <a:r>
+              <a:rPr lang="en-US" sz="1800" b="1" dirty="0">
+                <a:solidFill>
+                  <a:srgbClr val="993366"/>
+                </a:solidFill>
+                <a:latin typeface="Consolas" panose="020B0609020204030204" pitchFamily="49" charset="0"/>
+                <a:cs typeface="Courier New" panose="02070309020205020404" pitchFamily="49" charset="0"/>
+              </a:rPr>
+              <a:t>,</a:t>
+            </a:r>
+            <a:r>
+              <a:rPr lang="en-US" sz="1800" dirty="0">
+                <a:latin typeface="Consolas" panose="020B0609020204030204" pitchFamily="49" charset="0"/>
+                <a:cs typeface="Courier New" panose="02070309020205020404" pitchFamily="49" charset="0"/>
+              </a:rPr>
+              <a:t> a1_above</a:t>
+            </a:r>
+            <a:r>
+              <a:rPr lang="en-US" sz="1800" b="1" dirty="0">
+                <a:solidFill>
+                  <a:srgbClr val="993366"/>
+                </a:solidFill>
+                <a:latin typeface="Consolas" panose="020B0609020204030204" pitchFamily="49" charset="0"/>
+                <a:cs typeface="Courier New" panose="02070309020205020404" pitchFamily="49" charset="0"/>
+              </a:rPr>
+              <a:t>,</a:t>
+            </a:r>
+            <a:r>
+              <a:rPr lang="en-US" sz="1800" dirty="0">
+                <a:latin typeface="Consolas" panose="020B0609020204030204" pitchFamily="49" charset="0"/>
+                <a:cs typeface="Courier New" panose="02070309020205020404" pitchFamily="49" charset="0"/>
+              </a:rPr>
+              <a:t> </a:t>
+            </a:r>
+            <a:r>
+              <a:rPr lang="en-US" sz="1800" dirty="0" smtClean="0">
+                <a:latin typeface="Consolas" panose="020B0609020204030204" pitchFamily="49" charset="0"/>
+                <a:cs typeface="Courier New" panose="02070309020205020404" pitchFamily="49" charset="0"/>
+              </a:rPr>
+              <a:t>a2_above</a:t>
+            </a:r>
+            <a:r>
+              <a:rPr lang="en-US" sz="1800" b="1" dirty="0" smtClean="0">
+                <a:solidFill>
+                  <a:srgbClr val="993366"/>
+                </a:solidFill>
+                <a:latin typeface="Consolas" panose="020B0609020204030204" pitchFamily="49" charset="0"/>
+                <a:cs typeface="Courier New" panose="02070309020205020404" pitchFamily="49" charset="0"/>
+              </a:rPr>
+              <a:t>, </a:t>
+            </a:r>
+            <a:endParaRPr lang="en-US" sz="1800" b="1" dirty="0" smtClean="0">
+              <a:solidFill>
+                <a:srgbClr val="993366"/>
+              </a:solidFill>
+              <a:latin typeface="Consolas" panose="020B0609020204030204" pitchFamily="49" charset="0"/>
+              <a:cs typeface="Courier New" panose="02070309020205020404" pitchFamily="49" charset="0"/>
+            </a:endParaRPr>
+          </a:p>
+          <a:p>
+            <a:pPr marL="0" indent="0">
+              <a:buNone/>
+            </a:pPr>
+            <a:r>
+              <a:rPr lang="en-US" sz="1800" b="1" dirty="0" smtClean="0">
+                <a:solidFill>
+                  <a:srgbClr val="993366"/>
+                </a:solidFill>
+                <a:latin typeface="Consolas" panose="020B0609020204030204" pitchFamily="49" charset="0"/>
+                <a:cs typeface="Courier New" panose="02070309020205020404" pitchFamily="49" charset="0"/>
+              </a:rPr>
+              <a:t>     </a:t>
+            </a:r>
+            <a:r>
+              <a:rPr lang="en-US" sz="1800" dirty="0" err="1" smtClean="0">
+                <a:latin typeface="Consolas" panose="020B0609020204030204" pitchFamily="49" charset="0"/>
+                <a:cs typeface="Courier New" panose="02070309020205020404" pitchFamily="49" charset="0"/>
+              </a:rPr>
+              <a:t>one_below</a:t>
+            </a:r>
+            <a:r>
+              <a:rPr lang="en-US" sz="1800" b="1" dirty="0" smtClean="0">
+                <a:solidFill>
+                  <a:srgbClr val="993366"/>
+                </a:solidFill>
+                <a:latin typeface="Consolas" panose="020B0609020204030204" pitchFamily="49" charset="0"/>
+                <a:cs typeface="Courier New" panose="02070309020205020404" pitchFamily="49" charset="0"/>
+              </a:rPr>
+              <a:t>,</a:t>
+            </a:r>
+            <a:r>
+              <a:rPr lang="en-US" sz="1800" dirty="0" smtClean="0">
+                <a:latin typeface="Consolas" panose="020B0609020204030204" pitchFamily="49" charset="0"/>
+                <a:cs typeface="Courier New" panose="02070309020205020404" pitchFamily="49" charset="0"/>
+              </a:rPr>
+              <a:t> </a:t>
+            </a:r>
+            <a:r>
+              <a:rPr lang="en-US" sz="1800" dirty="0" err="1" smtClean="0">
+                <a:latin typeface="Consolas" panose="020B0609020204030204" pitchFamily="49" charset="0"/>
+                <a:cs typeface="Courier New" panose="02070309020205020404" pitchFamily="49" charset="0"/>
+              </a:rPr>
+              <a:t>both_above</a:t>
+            </a:r>
+            <a:r>
+              <a:rPr lang="en-US" sz="1800" dirty="0" smtClean="0">
+                <a:latin typeface="Consolas" panose="020B0609020204030204" pitchFamily="49" charset="0"/>
+                <a:cs typeface="Courier New" panose="02070309020205020404" pitchFamily="49" charset="0"/>
+              </a:rPr>
+              <a:t>, </a:t>
+            </a:r>
+            <a:r>
+              <a:rPr lang="en-US" sz="1800" dirty="0" err="1" smtClean="0">
+                <a:latin typeface="Consolas" panose="020B0609020204030204" pitchFamily="49" charset="0"/>
+                <a:cs typeface="Courier New" panose="02070309020205020404" pitchFamily="49" charset="0"/>
+              </a:rPr>
+              <a:t>on_p</a:t>
+            </a:r>
+            <a:r>
+              <a:rPr lang="en-US" sz="1800" dirty="0" smtClean="0">
+                <a:latin typeface="Consolas" panose="020B0609020204030204" pitchFamily="49" charset="0"/>
+                <a:cs typeface="Courier New" panose="02070309020205020404" pitchFamily="49" charset="0"/>
+              </a:rPr>
+              <a:t> </a:t>
+            </a:r>
+            <a:r>
+              <a:rPr lang="en-US" sz="1800" b="1" dirty="0" smtClean="0">
+                <a:solidFill>
+                  <a:srgbClr val="993366"/>
+                </a:solidFill>
+                <a:latin typeface="Consolas" panose="020B0609020204030204" pitchFamily="49" charset="0"/>
+                <a:cs typeface="Courier New" panose="02070309020205020404" pitchFamily="49" charset="0"/>
+              </a:rPr>
+              <a:t>: bool; </a:t>
+            </a:r>
+          </a:p>
+          <a:p>
+            <a:pPr marL="0" indent="0">
+              <a:buNone/>
+            </a:pPr>
+            <a:r>
+              <a:rPr lang="en-US" sz="1800" b="1" dirty="0" smtClean="0">
+                <a:solidFill>
+                  <a:srgbClr val="993366"/>
+                </a:solidFill>
+                <a:latin typeface="Consolas" panose="020B0609020204030204" pitchFamily="49" charset="0"/>
+                <a:cs typeface="Courier New" panose="02070309020205020404" pitchFamily="49" charset="0"/>
+              </a:rPr>
+              <a:t>let</a:t>
+            </a:r>
+            <a:endParaRPr lang="en-US" sz="1800" b="1" dirty="0">
+              <a:solidFill>
+                <a:srgbClr val="993366"/>
+              </a:solidFill>
+              <a:latin typeface="Consolas" panose="020B0609020204030204" pitchFamily="49" charset="0"/>
+              <a:cs typeface="Courier New" panose="02070309020205020404" pitchFamily="49" charset="0"/>
+            </a:endParaRPr>
+          </a:p>
+          <a:p>
+            <a:pPr marL="0" indent="0">
+              <a:lnSpc>
+                <a:spcPct val="110000"/>
+              </a:lnSpc>
+              <a:buNone/>
+            </a:pPr>
+            <a:r>
+              <a:rPr lang="en-US" sz="1800" dirty="0" smtClean="0">
+                <a:latin typeface="Consolas" panose="020B0609020204030204" pitchFamily="49" charset="0"/>
+                <a:cs typeface="Courier New" panose="02070309020205020404" pitchFamily="49" charset="0"/>
+              </a:rPr>
+              <a:t>     a1_below </a:t>
+            </a:r>
+            <a:r>
+              <a:rPr lang="en-US" sz="1800" b="1" dirty="0" smtClean="0">
+                <a:solidFill>
+                  <a:srgbClr val="993366"/>
+                </a:solidFill>
+                <a:latin typeface="Consolas" panose="020B0609020204030204" pitchFamily="49" charset="0"/>
+                <a:cs typeface="Courier New" panose="02070309020205020404" pitchFamily="49" charset="0"/>
+              </a:rPr>
+              <a:t>=</a:t>
+            </a:r>
+            <a:r>
+              <a:rPr lang="en-US" sz="1800" dirty="0" smtClean="0">
+                <a:latin typeface="Consolas" panose="020B0609020204030204" pitchFamily="49" charset="0"/>
+                <a:cs typeface="Courier New" panose="02070309020205020404" pitchFamily="49" charset="0"/>
+              </a:rPr>
+              <a:t> </a:t>
+            </a:r>
+            <a:r>
+              <a:rPr lang="en-US" sz="1800" b="1" dirty="0">
+                <a:solidFill>
+                  <a:srgbClr val="993366"/>
+                </a:solidFill>
+                <a:latin typeface="Consolas" panose="020B0609020204030204" pitchFamily="49" charset="0"/>
+                <a:cs typeface="Courier New" panose="02070309020205020404" pitchFamily="49" charset="0"/>
+              </a:rPr>
+              <a:t>(</a:t>
+            </a:r>
+            <a:r>
+              <a:rPr lang="en-US" sz="1800" dirty="0">
+                <a:latin typeface="Consolas" panose="020B0609020204030204" pitchFamily="49" charset="0"/>
+                <a:cs typeface="Courier New" panose="02070309020205020404" pitchFamily="49" charset="0"/>
+              </a:rPr>
+              <a:t>alt1 </a:t>
+            </a:r>
+            <a:r>
+              <a:rPr lang="en-US" sz="1800" b="1" dirty="0">
+                <a:solidFill>
+                  <a:srgbClr val="993366"/>
+                </a:solidFill>
+                <a:latin typeface="Consolas" panose="020B0609020204030204" pitchFamily="49" charset="0"/>
+                <a:cs typeface="Courier New" panose="02070309020205020404" pitchFamily="49" charset="0"/>
+              </a:rPr>
+              <a:t>&lt;</a:t>
+            </a:r>
+            <a:r>
+              <a:rPr lang="en-US" sz="1800" dirty="0">
+                <a:latin typeface="Consolas" panose="020B0609020204030204" pitchFamily="49" charset="0"/>
+                <a:cs typeface="Courier New" panose="02070309020205020404" pitchFamily="49" charset="0"/>
+              </a:rPr>
+              <a:t> THRESHOLD</a:t>
+            </a:r>
+            <a:r>
+              <a:rPr lang="en-US" sz="1800" b="1" dirty="0">
+                <a:solidFill>
+                  <a:srgbClr val="993366"/>
+                </a:solidFill>
+                <a:latin typeface="Consolas" panose="020B0609020204030204" pitchFamily="49" charset="0"/>
+                <a:cs typeface="Courier New" panose="02070309020205020404" pitchFamily="49" charset="0"/>
+              </a:rPr>
+              <a:t>); </a:t>
+            </a:r>
+          </a:p>
+          <a:p>
+            <a:pPr marL="0" indent="0">
+              <a:lnSpc>
+                <a:spcPct val="110000"/>
+              </a:lnSpc>
+              <a:buNone/>
+            </a:pPr>
+            <a:r>
+              <a:rPr lang="en-US" sz="1800" dirty="0" smtClean="0">
+                <a:latin typeface="Consolas" panose="020B0609020204030204" pitchFamily="49" charset="0"/>
+                <a:cs typeface="Courier New" panose="02070309020205020404" pitchFamily="49" charset="0"/>
+              </a:rPr>
+              <a:t>     a2_below </a:t>
+            </a:r>
+            <a:r>
+              <a:rPr lang="en-US" sz="1800" b="1" dirty="0" smtClean="0">
+                <a:solidFill>
+                  <a:srgbClr val="993366"/>
+                </a:solidFill>
+                <a:latin typeface="Consolas" panose="020B0609020204030204" pitchFamily="49" charset="0"/>
+                <a:cs typeface="Courier New" panose="02070309020205020404" pitchFamily="49" charset="0"/>
+              </a:rPr>
+              <a:t>=</a:t>
+            </a:r>
+            <a:r>
+              <a:rPr lang="en-US" sz="1800" dirty="0" smtClean="0">
+                <a:latin typeface="Consolas" panose="020B0609020204030204" pitchFamily="49" charset="0"/>
+                <a:cs typeface="Courier New" panose="02070309020205020404" pitchFamily="49" charset="0"/>
+              </a:rPr>
+              <a:t> </a:t>
+            </a:r>
+            <a:r>
+              <a:rPr lang="en-US" sz="1800" b="1" dirty="0">
+                <a:solidFill>
+                  <a:srgbClr val="993366"/>
+                </a:solidFill>
+                <a:latin typeface="Consolas" panose="020B0609020204030204" pitchFamily="49" charset="0"/>
+                <a:cs typeface="Courier New" panose="02070309020205020404" pitchFamily="49" charset="0"/>
+              </a:rPr>
+              <a:t>(</a:t>
+            </a:r>
+            <a:r>
+              <a:rPr lang="en-US" sz="1800" dirty="0">
+                <a:latin typeface="Consolas" panose="020B0609020204030204" pitchFamily="49" charset="0"/>
+                <a:cs typeface="Courier New" panose="02070309020205020404" pitchFamily="49" charset="0"/>
+              </a:rPr>
+              <a:t>alt2 </a:t>
+            </a:r>
+            <a:r>
+              <a:rPr lang="en-US" sz="1800" b="1" dirty="0">
+                <a:solidFill>
+                  <a:srgbClr val="993366"/>
+                </a:solidFill>
+                <a:latin typeface="Consolas" panose="020B0609020204030204" pitchFamily="49" charset="0"/>
+                <a:cs typeface="Courier New" panose="02070309020205020404" pitchFamily="49" charset="0"/>
+              </a:rPr>
+              <a:t>&lt;</a:t>
+            </a:r>
+            <a:r>
+              <a:rPr lang="en-US" sz="1800" dirty="0">
+                <a:latin typeface="Consolas" panose="020B0609020204030204" pitchFamily="49" charset="0"/>
+                <a:cs typeface="Courier New" panose="02070309020205020404" pitchFamily="49" charset="0"/>
+              </a:rPr>
+              <a:t> THRESHOLD</a:t>
+            </a:r>
+            <a:r>
+              <a:rPr lang="en-US" sz="1800" b="1" dirty="0">
+                <a:solidFill>
+                  <a:srgbClr val="993366"/>
+                </a:solidFill>
+                <a:latin typeface="Consolas" panose="020B0609020204030204" pitchFamily="49" charset="0"/>
+                <a:cs typeface="Courier New" panose="02070309020205020404" pitchFamily="49" charset="0"/>
+              </a:rPr>
+              <a:t>);</a:t>
+            </a:r>
+            <a:r>
+              <a:rPr lang="en-US" sz="1800" dirty="0">
+                <a:latin typeface="Consolas" panose="020B0609020204030204" pitchFamily="49" charset="0"/>
+                <a:cs typeface="Courier New" panose="02070309020205020404" pitchFamily="49" charset="0"/>
+              </a:rPr>
+              <a:t> </a:t>
+            </a:r>
+          </a:p>
+          <a:p>
+            <a:pPr marL="0" indent="0">
+              <a:lnSpc>
+                <a:spcPct val="110000"/>
+              </a:lnSpc>
+              <a:buNone/>
+            </a:pPr>
+            <a:r>
+              <a:rPr lang="en-US" sz="1800" dirty="0" smtClean="0">
+                <a:latin typeface="Consolas" panose="020B0609020204030204" pitchFamily="49" charset="0"/>
+                <a:cs typeface="Courier New" panose="02070309020205020404" pitchFamily="49" charset="0"/>
+              </a:rPr>
+              <a:t>     a1_above </a:t>
+            </a:r>
+            <a:r>
+              <a:rPr lang="en-US" sz="1800" b="1" dirty="0" smtClean="0">
+                <a:solidFill>
+                  <a:srgbClr val="993366"/>
+                </a:solidFill>
+                <a:latin typeface="Consolas" panose="020B0609020204030204" pitchFamily="49" charset="0"/>
+                <a:cs typeface="Courier New" panose="02070309020205020404" pitchFamily="49" charset="0"/>
+              </a:rPr>
+              <a:t>=</a:t>
+            </a:r>
+            <a:r>
+              <a:rPr lang="en-US" sz="1800" dirty="0" smtClean="0">
+                <a:latin typeface="Consolas" panose="020B0609020204030204" pitchFamily="49" charset="0"/>
+                <a:cs typeface="Courier New" panose="02070309020205020404" pitchFamily="49" charset="0"/>
+              </a:rPr>
+              <a:t> </a:t>
+            </a:r>
+            <a:r>
+              <a:rPr lang="en-US" sz="1800" b="1" dirty="0">
+                <a:solidFill>
+                  <a:srgbClr val="993366"/>
+                </a:solidFill>
+                <a:latin typeface="Consolas" panose="020B0609020204030204" pitchFamily="49" charset="0"/>
+                <a:cs typeface="Courier New" panose="02070309020205020404" pitchFamily="49" charset="0"/>
+              </a:rPr>
+              <a:t>(</a:t>
+            </a:r>
+            <a:r>
+              <a:rPr lang="en-US" sz="1800" dirty="0">
+                <a:latin typeface="Consolas" panose="020B0609020204030204" pitchFamily="49" charset="0"/>
+                <a:cs typeface="Courier New" panose="02070309020205020404" pitchFamily="49" charset="0"/>
+              </a:rPr>
+              <a:t>alt1 </a:t>
+            </a:r>
+            <a:r>
+              <a:rPr lang="en-US" sz="1800" b="1" dirty="0">
+                <a:solidFill>
+                  <a:srgbClr val="993366"/>
+                </a:solidFill>
+                <a:latin typeface="Consolas" panose="020B0609020204030204" pitchFamily="49" charset="0"/>
+                <a:cs typeface="Courier New" panose="02070309020205020404" pitchFamily="49" charset="0"/>
+              </a:rPr>
+              <a:t>&gt;=</a:t>
+            </a:r>
+            <a:r>
+              <a:rPr lang="en-US" sz="1800" dirty="0">
+                <a:latin typeface="Consolas" panose="020B0609020204030204" pitchFamily="49" charset="0"/>
+                <a:cs typeface="Courier New" panose="02070309020205020404" pitchFamily="49" charset="0"/>
+              </a:rPr>
+              <a:t> T_HYST</a:t>
+            </a:r>
+            <a:r>
+              <a:rPr lang="en-US" sz="1800" b="1" dirty="0">
+                <a:solidFill>
+                  <a:srgbClr val="993366"/>
+                </a:solidFill>
+                <a:latin typeface="Consolas" panose="020B0609020204030204" pitchFamily="49" charset="0"/>
+                <a:cs typeface="Courier New" panose="02070309020205020404" pitchFamily="49" charset="0"/>
+              </a:rPr>
+              <a:t>);</a:t>
+            </a:r>
+            <a:r>
+              <a:rPr lang="en-US" sz="1800" dirty="0">
+                <a:latin typeface="Consolas" panose="020B0609020204030204" pitchFamily="49" charset="0"/>
+                <a:cs typeface="Courier New" panose="02070309020205020404" pitchFamily="49" charset="0"/>
+              </a:rPr>
+              <a:t> </a:t>
+            </a:r>
+          </a:p>
+          <a:p>
+            <a:pPr marL="0" indent="0">
+              <a:lnSpc>
+                <a:spcPct val="110000"/>
+              </a:lnSpc>
+              <a:buNone/>
+            </a:pPr>
+            <a:r>
+              <a:rPr lang="en-US" sz="1800" dirty="0" smtClean="0">
+                <a:latin typeface="Consolas" panose="020B0609020204030204" pitchFamily="49" charset="0"/>
+                <a:cs typeface="Courier New" panose="02070309020205020404" pitchFamily="49" charset="0"/>
+              </a:rPr>
+              <a:t>     a2_above </a:t>
+            </a:r>
+            <a:r>
+              <a:rPr lang="en-US" sz="1800" b="1" dirty="0" smtClean="0">
+                <a:solidFill>
+                  <a:srgbClr val="993366"/>
+                </a:solidFill>
+                <a:latin typeface="Consolas" panose="020B0609020204030204" pitchFamily="49" charset="0"/>
+                <a:cs typeface="Courier New" panose="02070309020205020404" pitchFamily="49" charset="0"/>
+              </a:rPr>
+              <a:t>=</a:t>
+            </a:r>
+            <a:r>
+              <a:rPr lang="en-US" sz="1800" dirty="0" smtClean="0">
+                <a:latin typeface="Consolas" panose="020B0609020204030204" pitchFamily="49" charset="0"/>
+                <a:cs typeface="Courier New" panose="02070309020205020404" pitchFamily="49" charset="0"/>
+              </a:rPr>
+              <a:t> </a:t>
+            </a:r>
+            <a:r>
+              <a:rPr lang="en-US" sz="1800" b="1" dirty="0">
+                <a:solidFill>
+                  <a:srgbClr val="993366"/>
+                </a:solidFill>
+                <a:latin typeface="Consolas" panose="020B0609020204030204" pitchFamily="49" charset="0"/>
+                <a:cs typeface="Courier New" panose="02070309020205020404" pitchFamily="49" charset="0"/>
+              </a:rPr>
+              <a:t>(</a:t>
+            </a:r>
+            <a:r>
+              <a:rPr lang="en-US" sz="1800" dirty="0">
+                <a:latin typeface="Consolas" panose="020B0609020204030204" pitchFamily="49" charset="0"/>
+                <a:cs typeface="Courier New" panose="02070309020205020404" pitchFamily="49" charset="0"/>
+              </a:rPr>
+              <a:t>alt2 </a:t>
+            </a:r>
+            <a:r>
+              <a:rPr lang="en-US" sz="1800" b="1" dirty="0">
+                <a:solidFill>
+                  <a:srgbClr val="993366"/>
+                </a:solidFill>
+                <a:latin typeface="Consolas" panose="020B0609020204030204" pitchFamily="49" charset="0"/>
+                <a:cs typeface="Courier New" panose="02070309020205020404" pitchFamily="49" charset="0"/>
+              </a:rPr>
+              <a:t>&gt;= </a:t>
+            </a:r>
+            <a:r>
+              <a:rPr lang="en-US" sz="1800" dirty="0">
+                <a:latin typeface="Consolas" panose="020B0609020204030204" pitchFamily="49" charset="0"/>
+                <a:cs typeface="Courier New" panose="02070309020205020404" pitchFamily="49" charset="0"/>
+              </a:rPr>
+              <a:t>T_HYST</a:t>
+            </a:r>
+            <a:r>
+              <a:rPr lang="en-US" sz="1800" b="1" dirty="0">
+                <a:solidFill>
+                  <a:srgbClr val="993366"/>
+                </a:solidFill>
+                <a:latin typeface="Consolas" panose="020B0609020204030204" pitchFamily="49" charset="0"/>
+                <a:cs typeface="Courier New" panose="02070309020205020404" pitchFamily="49" charset="0"/>
+              </a:rPr>
+              <a:t>);</a:t>
+            </a:r>
+            <a:r>
+              <a:rPr lang="en-US" sz="1800" dirty="0">
+                <a:latin typeface="Consolas" panose="020B0609020204030204" pitchFamily="49" charset="0"/>
+                <a:cs typeface="Courier New" panose="02070309020205020404" pitchFamily="49" charset="0"/>
+              </a:rPr>
+              <a:t> </a:t>
+            </a:r>
+          </a:p>
+          <a:p>
+            <a:pPr marL="0" indent="0">
+              <a:lnSpc>
+                <a:spcPct val="110000"/>
+              </a:lnSpc>
+              <a:buNone/>
+            </a:pPr>
+            <a:r>
+              <a:rPr lang="en-US" sz="1800" dirty="0" smtClean="0">
+                <a:latin typeface="Consolas" panose="020B0609020204030204" pitchFamily="49" charset="0"/>
+                <a:cs typeface="Courier New" panose="02070309020205020404" pitchFamily="49" charset="0"/>
+              </a:rPr>
+              <a:t>     </a:t>
+            </a:r>
+            <a:r>
+              <a:rPr lang="en-US" sz="1800" dirty="0" err="1" smtClean="0">
+                <a:latin typeface="Consolas" panose="020B0609020204030204" pitchFamily="49" charset="0"/>
+                <a:cs typeface="Courier New" panose="02070309020205020404" pitchFamily="49" charset="0"/>
+              </a:rPr>
+              <a:t>one_below</a:t>
+            </a:r>
+            <a:r>
+              <a:rPr lang="en-US" sz="1800" dirty="0" smtClean="0">
+                <a:latin typeface="Consolas" panose="020B0609020204030204" pitchFamily="49" charset="0"/>
+                <a:cs typeface="Courier New" panose="02070309020205020404" pitchFamily="49" charset="0"/>
+              </a:rPr>
+              <a:t> </a:t>
+            </a:r>
+            <a:r>
+              <a:rPr lang="en-US" sz="1800" b="1" dirty="0" smtClean="0">
+                <a:solidFill>
+                  <a:srgbClr val="993366"/>
+                </a:solidFill>
+                <a:latin typeface="Consolas" panose="020B0609020204030204" pitchFamily="49" charset="0"/>
+                <a:cs typeface="Courier New" panose="02070309020205020404" pitchFamily="49" charset="0"/>
+              </a:rPr>
+              <a:t>=</a:t>
+            </a:r>
+            <a:r>
+              <a:rPr lang="en-US" sz="1800" dirty="0" smtClean="0">
+                <a:latin typeface="Consolas" panose="020B0609020204030204" pitchFamily="49" charset="0"/>
+                <a:cs typeface="Courier New" panose="02070309020205020404" pitchFamily="49" charset="0"/>
+              </a:rPr>
+              <a:t> </a:t>
+            </a:r>
+            <a:r>
+              <a:rPr lang="en-US" sz="1800" dirty="0">
+                <a:latin typeface="Consolas" panose="020B0609020204030204" pitchFamily="49" charset="0"/>
+                <a:cs typeface="Courier New" panose="02070309020205020404" pitchFamily="49" charset="0"/>
+              </a:rPr>
+              <a:t>a1_below </a:t>
+            </a:r>
+            <a:r>
+              <a:rPr lang="en-US" sz="1800" b="1" dirty="0">
+                <a:solidFill>
+                  <a:srgbClr val="993366"/>
+                </a:solidFill>
+                <a:latin typeface="Consolas" panose="020B0609020204030204" pitchFamily="49" charset="0"/>
+                <a:cs typeface="Courier New" panose="02070309020205020404" pitchFamily="49" charset="0"/>
+              </a:rPr>
+              <a:t>or</a:t>
+            </a:r>
+            <a:r>
+              <a:rPr lang="en-US" sz="1800" dirty="0">
+                <a:latin typeface="Consolas" panose="020B0609020204030204" pitchFamily="49" charset="0"/>
+                <a:cs typeface="Courier New" panose="02070309020205020404" pitchFamily="49" charset="0"/>
+              </a:rPr>
+              <a:t> a2_below</a:t>
+            </a:r>
+            <a:r>
+              <a:rPr lang="en-US" sz="1800" b="1" dirty="0">
+                <a:solidFill>
+                  <a:srgbClr val="993366"/>
+                </a:solidFill>
+                <a:latin typeface="Consolas" panose="020B0609020204030204" pitchFamily="49" charset="0"/>
+                <a:cs typeface="Courier New" panose="02070309020205020404" pitchFamily="49" charset="0"/>
+              </a:rPr>
+              <a:t>;</a:t>
+            </a:r>
+            <a:r>
+              <a:rPr lang="en-US" sz="1800" dirty="0">
+                <a:latin typeface="Consolas" panose="020B0609020204030204" pitchFamily="49" charset="0"/>
+                <a:cs typeface="Courier New" panose="02070309020205020404" pitchFamily="49" charset="0"/>
+              </a:rPr>
+              <a:t> </a:t>
+            </a:r>
+          </a:p>
+          <a:p>
+            <a:pPr marL="0" indent="0">
+              <a:lnSpc>
+                <a:spcPct val="110000"/>
+              </a:lnSpc>
+              <a:buNone/>
+            </a:pPr>
+            <a:r>
+              <a:rPr lang="en-US" sz="1800" dirty="0" smtClean="0">
+                <a:latin typeface="Consolas" panose="020B0609020204030204" pitchFamily="49" charset="0"/>
+                <a:cs typeface="Courier New" panose="02070309020205020404" pitchFamily="49" charset="0"/>
+              </a:rPr>
+              <a:t>     </a:t>
+            </a:r>
+            <a:r>
+              <a:rPr lang="en-US" sz="1800" dirty="0" err="1" smtClean="0">
+                <a:latin typeface="Consolas" panose="020B0609020204030204" pitchFamily="49" charset="0"/>
+                <a:cs typeface="Courier New" panose="02070309020205020404" pitchFamily="49" charset="0"/>
+              </a:rPr>
+              <a:t>both_above</a:t>
+            </a:r>
+            <a:r>
+              <a:rPr lang="en-US" sz="1800" dirty="0" smtClean="0">
+                <a:latin typeface="Consolas" panose="020B0609020204030204" pitchFamily="49" charset="0"/>
+                <a:cs typeface="Courier New" panose="02070309020205020404" pitchFamily="49" charset="0"/>
+              </a:rPr>
+              <a:t> </a:t>
+            </a:r>
+            <a:r>
+              <a:rPr lang="en-US" sz="1800" b="1" dirty="0">
+                <a:solidFill>
+                  <a:srgbClr val="993366"/>
+                </a:solidFill>
+                <a:latin typeface="Consolas" panose="020B0609020204030204" pitchFamily="49" charset="0"/>
+                <a:cs typeface="Courier New" panose="02070309020205020404" pitchFamily="49" charset="0"/>
+              </a:rPr>
+              <a:t>=</a:t>
+            </a:r>
+            <a:r>
+              <a:rPr lang="en-US" sz="1800" dirty="0">
+                <a:latin typeface="Consolas" panose="020B0609020204030204" pitchFamily="49" charset="0"/>
+                <a:cs typeface="Courier New" panose="02070309020205020404" pitchFamily="49" charset="0"/>
+              </a:rPr>
+              <a:t> a1_above </a:t>
+            </a:r>
+            <a:r>
+              <a:rPr lang="en-US" sz="1800" b="1" dirty="0">
+                <a:solidFill>
+                  <a:srgbClr val="993366"/>
+                </a:solidFill>
+                <a:latin typeface="Consolas" panose="020B0609020204030204" pitchFamily="49" charset="0"/>
+                <a:cs typeface="Courier New" panose="02070309020205020404" pitchFamily="49" charset="0"/>
+              </a:rPr>
+              <a:t>and</a:t>
+            </a:r>
+            <a:r>
+              <a:rPr lang="en-US" sz="1800" dirty="0">
+                <a:latin typeface="Consolas" panose="020B0609020204030204" pitchFamily="49" charset="0"/>
+                <a:cs typeface="Courier New" panose="02070309020205020404" pitchFamily="49" charset="0"/>
+              </a:rPr>
+              <a:t> a2_above</a:t>
+            </a:r>
+            <a:r>
+              <a:rPr lang="en-US" sz="1800" b="1" dirty="0">
+                <a:solidFill>
+                  <a:srgbClr val="993366"/>
+                </a:solidFill>
+                <a:latin typeface="Consolas" panose="020B0609020204030204" pitchFamily="49" charset="0"/>
+                <a:cs typeface="Courier New" panose="02070309020205020404" pitchFamily="49" charset="0"/>
+              </a:rPr>
+              <a:t>;</a:t>
+            </a:r>
+            <a:r>
+              <a:rPr lang="en-US" sz="1800" dirty="0">
+                <a:latin typeface="Consolas" panose="020B0609020204030204" pitchFamily="49" charset="0"/>
+                <a:cs typeface="Courier New" panose="02070309020205020404" pitchFamily="49" charset="0"/>
+              </a:rPr>
+              <a:t> </a:t>
+            </a:r>
+          </a:p>
+          <a:p>
+            <a:pPr marL="0" indent="0">
+              <a:lnSpc>
+                <a:spcPct val="110000"/>
+              </a:lnSpc>
+              <a:buNone/>
+            </a:pPr>
+            <a:r>
+              <a:rPr lang="en-US" sz="1800" dirty="0" smtClean="0">
+                <a:latin typeface="Consolas" panose="020B0609020204030204" pitchFamily="49" charset="0"/>
+                <a:cs typeface="Courier New" panose="02070309020205020404" pitchFamily="49" charset="0"/>
+              </a:rPr>
+              <a:t>     </a:t>
+            </a:r>
+            <a:r>
+              <a:rPr lang="en-US" sz="1800" dirty="0" err="1" smtClean="0">
+                <a:latin typeface="Consolas" panose="020B0609020204030204" pitchFamily="49" charset="0"/>
+                <a:cs typeface="Courier New" panose="02070309020205020404" pitchFamily="49" charset="0"/>
+              </a:rPr>
+              <a:t>doi_on</a:t>
+            </a:r>
+            <a:r>
+              <a:rPr lang="en-US" sz="1800" dirty="0" smtClean="0">
+                <a:latin typeface="Consolas" panose="020B0609020204030204" pitchFamily="49" charset="0"/>
+                <a:cs typeface="Courier New" panose="02070309020205020404" pitchFamily="49" charset="0"/>
+              </a:rPr>
+              <a:t> </a:t>
+            </a:r>
+            <a:r>
+              <a:rPr lang="en-US" sz="1800" b="1" dirty="0" smtClean="0">
+                <a:solidFill>
+                  <a:srgbClr val="993366"/>
+                </a:solidFill>
+                <a:latin typeface="Consolas" panose="020B0609020204030204" pitchFamily="49" charset="0"/>
+                <a:cs typeface="Courier New" panose="02070309020205020404" pitchFamily="49" charset="0"/>
+              </a:rPr>
+              <a:t>=</a:t>
+            </a:r>
+            <a:r>
+              <a:rPr lang="en-US" sz="1800" b="1" dirty="0" smtClean="0">
+                <a:latin typeface="Consolas" panose="020B0609020204030204" pitchFamily="49" charset="0"/>
+                <a:cs typeface="Courier New" panose="02070309020205020404" pitchFamily="49" charset="0"/>
+              </a:rPr>
+              <a:t> </a:t>
+            </a:r>
+            <a:r>
+              <a:rPr lang="en-US" sz="1800" b="1" dirty="0" smtClean="0">
+                <a:solidFill>
+                  <a:srgbClr val="993366"/>
+                </a:solidFill>
+                <a:latin typeface="Consolas" panose="020B0609020204030204" pitchFamily="49" charset="0"/>
+                <a:cs typeface="Courier New" panose="02070309020205020404" pitchFamily="49" charset="0"/>
+              </a:rPr>
+              <a:t>if</a:t>
+            </a:r>
+            <a:r>
+              <a:rPr lang="en-US" sz="1800" dirty="0" smtClean="0">
+                <a:latin typeface="Consolas" panose="020B0609020204030204" pitchFamily="49" charset="0"/>
+                <a:cs typeface="Courier New" panose="02070309020205020404" pitchFamily="49" charset="0"/>
+              </a:rPr>
+              <a:t> </a:t>
+            </a:r>
+            <a:r>
+              <a:rPr lang="en-US" sz="1800" dirty="0" err="1">
+                <a:latin typeface="Consolas" panose="020B0609020204030204" pitchFamily="49" charset="0"/>
+                <a:cs typeface="Courier New" panose="02070309020205020404" pitchFamily="49" charset="0"/>
+              </a:rPr>
+              <a:t>one_below</a:t>
+            </a:r>
+            <a:r>
+              <a:rPr lang="en-US" sz="1800" dirty="0">
+                <a:latin typeface="Consolas" panose="020B0609020204030204" pitchFamily="49" charset="0"/>
+                <a:cs typeface="Courier New" panose="02070309020205020404" pitchFamily="49" charset="0"/>
+              </a:rPr>
+              <a:t> </a:t>
+            </a:r>
+            <a:r>
+              <a:rPr lang="en-US" sz="1800" b="1" dirty="0">
+                <a:solidFill>
+                  <a:srgbClr val="993366"/>
+                </a:solidFill>
+                <a:latin typeface="Consolas" panose="020B0609020204030204" pitchFamily="49" charset="0"/>
+                <a:cs typeface="Courier New" panose="02070309020205020404" pitchFamily="49" charset="0"/>
+              </a:rPr>
+              <a:t>then</a:t>
+            </a:r>
+            <a:r>
+              <a:rPr lang="en-US" sz="1800" dirty="0">
+                <a:latin typeface="Consolas" panose="020B0609020204030204" pitchFamily="49" charset="0"/>
+                <a:cs typeface="Courier New" panose="02070309020205020404" pitchFamily="49" charset="0"/>
+              </a:rPr>
+              <a:t> </a:t>
+            </a:r>
+            <a:r>
+              <a:rPr lang="en-US" sz="1800" b="1" dirty="0">
+                <a:solidFill>
+                  <a:srgbClr val="993366"/>
+                </a:solidFill>
+                <a:latin typeface="Consolas" panose="020B0609020204030204" pitchFamily="49" charset="0"/>
+                <a:cs typeface="Courier New" panose="02070309020205020404" pitchFamily="49" charset="0"/>
+              </a:rPr>
+              <a:t>true</a:t>
+            </a:r>
+            <a:r>
+              <a:rPr lang="en-US" sz="1800" dirty="0">
+                <a:latin typeface="Consolas" panose="020B0609020204030204" pitchFamily="49" charset="0"/>
+                <a:cs typeface="Courier New" panose="02070309020205020404" pitchFamily="49" charset="0"/>
+              </a:rPr>
+              <a:t> </a:t>
+            </a:r>
+            <a:r>
+              <a:rPr lang="en-US" sz="1800" b="1" dirty="0">
+                <a:solidFill>
+                  <a:srgbClr val="993366"/>
+                </a:solidFill>
+                <a:latin typeface="Consolas" panose="020B0609020204030204" pitchFamily="49" charset="0"/>
+                <a:cs typeface="Courier New" panose="02070309020205020404" pitchFamily="49" charset="0"/>
+              </a:rPr>
+              <a:t>else</a:t>
+            </a:r>
+            <a:r>
+              <a:rPr lang="en-US" sz="1800" dirty="0">
+                <a:latin typeface="Consolas" panose="020B0609020204030204" pitchFamily="49" charset="0"/>
+                <a:cs typeface="Courier New" panose="02070309020205020404" pitchFamily="49" charset="0"/>
+              </a:rPr>
+              <a:t> </a:t>
+            </a:r>
+          </a:p>
+          <a:p>
+            <a:pPr marL="0" indent="0">
+              <a:lnSpc>
+                <a:spcPct val="110000"/>
+              </a:lnSpc>
+              <a:buNone/>
+            </a:pPr>
+            <a:r>
+              <a:rPr lang="en-US" sz="1800" dirty="0">
+                <a:latin typeface="Consolas" panose="020B0609020204030204" pitchFamily="49" charset="0"/>
+                <a:cs typeface="Courier New" panose="02070309020205020404" pitchFamily="49" charset="0"/>
+              </a:rPr>
+              <a:t>	</a:t>
+            </a:r>
+            <a:r>
+              <a:rPr lang="en-US" sz="1800" dirty="0" smtClean="0">
+                <a:latin typeface="Consolas" panose="020B0609020204030204" pitchFamily="49" charset="0"/>
+                <a:cs typeface="Courier New" panose="02070309020205020404" pitchFamily="49" charset="0"/>
+              </a:rPr>
+              <a:t>      </a:t>
+            </a:r>
+            <a:r>
+              <a:rPr lang="en-US" sz="1800" b="1" dirty="0">
+                <a:latin typeface="Consolas" panose="020B0609020204030204" pitchFamily="49" charset="0"/>
+                <a:cs typeface="Courier New" panose="02070309020205020404" pitchFamily="49" charset="0"/>
+              </a:rPr>
+              <a:t> </a:t>
+            </a:r>
+            <a:r>
+              <a:rPr lang="en-US" sz="1800" b="1" dirty="0" smtClean="0">
+                <a:solidFill>
+                  <a:srgbClr val="993366"/>
+                </a:solidFill>
+                <a:latin typeface="Consolas" panose="020B0609020204030204" pitchFamily="49" charset="0"/>
+                <a:cs typeface="Courier New" panose="02070309020205020404" pitchFamily="49" charset="0"/>
+              </a:rPr>
+              <a:t>if</a:t>
+            </a:r>
+            <a:r>
+              <a:rPr lang="en-US" sz="1800" dirty="0" smtClean="0">
+                <a:latin typeface="Consolas" panose="020B0609020204030204" pitchFamily="49" charset="0"/>
+                <a:cs typeface="Courier New" panose="02070309020205020404" pitchFamily="49" charset="0"/>
+              </a:rPr>
+              <a:t> </a:t>
+            </a:r>
+            <a:r>
+              <a:rPr lang="en-US" sz="1800" dirty="0" err="1">
+                <a:latin typeface="Consolas" panose="020B0609020204030204" pitchFamily="49" charset="0"/>
+                <a:cs typeface="Courier New" panose="02070309020205020404" pitchFamily="49" charset="0"/>
+              </a:rPr>
+              <a:t>both_above</a:t>
+            </a:r>
+            <a:r>
+              <a:rPr lang="en-US" sz="1800" dirty="0">
+                <a:latin typeface="Consolas" panose="020B0609020204030204" pitchFamily="49" charset="0"/>
+                <a:cs typeface="Courier New" panose="02070309020205020404" pitchFamily="49" charset="0"/>
+              </a:rPr>
+              <a:t> </a:t>
+            </a:r>
+            <a:r>
+              <a:rPr lang="en-US" sz="1800" b="1" dirty="0">
+                <a:solidFill>
+                  <a:srgbClr val="993366"/>
+                </a:solidFill>
+                <a:latin typeface="Consolas" panose="020B0609020204030204" pitchFamily="49" charset="0"/>
+                <a:cs typeface="Courier New" panose="02070309020205020404" pitchFamily="49" charset="0"/>
+              </a:rPr>
+              <a:t>then</a:t>
+            </a:r>
+            <a:r>
+              <a:rPr lang="en-US" sz="1800" dirty="0">
+                <a:latin typeface="Consolas" panose="020B0609020204030204" pitchFamily="49" charset="0"/>
+                <a:cs typeface="Courier New" panose="02070309020205020404" pitchFamily="49" charset="0"/>
+              </a:rPr>
+              <a:t> </a:t>
+            </a:r>
+            <a:r>
+              <a:rPr lang="en-US" sz="1800" b="1" dirty="0">
+                <a:solidFill>
+                  <a:srgbClr val="993366"/>
+                </a:solidFill>
+                <a:latin typeface="Consolas" panose="020B0609020204030204" pitchFamily="49" charset="0"/>
+                <a:cs typeface="Courier New" panose="02070309020205020404" pitchFamily="49" charset="0"/>
+              </a:rPr>
+              <a:t>false</a:t>
+            </a:r>
+            <a:r>
+              <a:rPr lang="en-US" sz="1800" dirty="0">
+                <a:latin typeface="Consolas" panose="020B0609020204030204" pitchFamily="49" charset="0"/>
+                <a:cs typeface="Courier New" panose="02070309020205020404" pitchFamily="49" charset="0"/>
+              </a:rPr>
+              <a:t> </a:t>
+            </a:r>
+            <a:r>
+              <a:rPr lang="en-US" sz="1800" b="1" dirty="0" smtClean="0">
+                <a:solidFill>
+                  <a:srgbClr val="993366"/>
+                </a:solidFill>
+                <a:latin typeface="Consolas" panose="020B0609020204030204" pitchFamily="49" charset="0"/>
+                <a:cs typeface="Courier New" panose="02070309020205020404" pitchFamily="49" charset="0"/>
+              </a:rPr>
+              <a:t>else</a:t>
+            </a:r>
+            <a:r>
+              <a:rPr lang="en-US" sz="1800" dirty="0" smtClean="0">
+                <a:latin typeface="Consolas" panose="020B0609020204030204" pitchFamily="49" charset="0"/>
+                <a:cs typeface="Courier New" panose="02070309020205020404" pitchFamily="49" charset="0"/>
+              </a:rPr>
+              <a:t> </a:t>
+            </a:r>
+            <a:r>
+              <a:rPr lang="en-US" sz="1800" b="1" dirty="0" smtClean="0">
+                <a:solidFill>
+                  <a:srgbClr val="993366"/>
+                </a:solidFill>
+                <a:latin typeface="Consolas" panose="020B0609020204030204" pitchFamily="49" charset="0"/>
+                <a:cs typeface="Courier New" panose="02070309020205020404" pitchFamily="49" charset="0"/>
+              </a:rPr>
+              <a:t>(</a:t>
+            </a:r>
+            <a:r>
+              <a:rPr lang="en-US" sz="1800" b="1" dirty="0">
+                <a:solidFill>
+                  <a:srgbClr val="993366"/>
+                </a:solidFill>
+                <a:latin typeface="Consolas" panose="020B0609020204030204" pitchFamily="49" charset="0"/>
+                <a:cs typeface="Courier New" panose="02070309020205020404" pitchFamily="49" charset="0"/>
+              </a:rPr>
+              <a:t>false -&gt; pre(</a:t>
+            </a:r>
+            <a:r>
+              <a:rPr lang="en-US" sz="1800" dirty="0" err="1">
+                <a:latin typeface="Consolas" panose="020B0609020204030204" pitchFamily="49" charset="0"/>
+                <a:cs typeface="Courier New" panose="02070309020205020404" pitchFamily="49" charset="0"/>
+              </a:rPr>
+              <a:t>doi_on</a:t>
+            </a:r>
+            <a:r>
+              <a:rPr lang="en-US" sz="1800" b="1" dirty="0">
+                <a:solidFill>
+                  <a:srgbClr val="993366"/>
+                </a:solidFill>
+                <a:latin typeface="Consolas" panose="020B0609020204030204" pitchFamily="49" charset="0"/>
+                <a:cs typeface="Courier New" panose="02070309020205020404" pitchFamily="49" charset="0"/>
+              </a:rPr>
+              <a:t>));</a:t>
+            </a:r>
+            <a:r>
+              <a:rPr lang="en-US" sz="1800" dirty="0">
+                <a:latin typeface="Consolas" panose="020B0609020204030204" pitchFamily="49" charset="0"/>
+                <a:cs typeface="Courier New" panose="02070309020205020404" pitchFamily="49" charset="0"/>
+              </a:rPr>
+              <a:t> </a:t>
+            </a:r>
+          </a:p>
+          <a:p>
+            <a:pPr marL="0" indent="0">
+              <a:lnSpc>
+                <a:spcPct val="150000"/>
+              </a:lnSpc>
+              <a:buNone/>
+            </a:pPr>
+            <a:r>
+              <a:rPr lang="en-US" sz="1800" dirty="0" smtClean="0">
+                <a:latin typeface="Consolas" panose="020B0609020204030204" pitchFamily="49" charset="0"/>
+                <a:cs typeface="Courier New" panose="02070309020205020404" pitchFamily="49" charset="0"/>
+              </a:rPr>
+              <a:t>     </a:t>
+            </a:r>
+            <a:r>
+              <a:rPr lang="en-US" sz="1800" dirty="0" err="1" smtClean="0">
+                <a:latin typeface="Consolas" panose="020B0609020204030204" pitchFamily="49" charset="0"/>
+                <a:cs typeface="Courier New" panose="02070309020205020404" pitchFamily="49" charset="0"/>
+              </a:rPr>
+              <a:t>on_p</a:t>
+            </a:r>
+            <a:r>
+              <a:rPr lang="en-US" sz="1800" dirty="0" smtClean="0">
+                <a:latin typeface="Consolas" panose="020B0609020204030204" pitchFamily="49" charset="0"/>
+                <a:cs typeface="Courier New" panose="02070309020205020404" pitchFamily="49" charset="0"/>
+              </a:rPr>
+              <a:t> </a:t>
+            </a:r>
+            <a:r>
+              <a:rPr lang="en-US" sz="1800" b="1" dirty="0" smtClean="0">
+                <a:solidFill>
+                  <a:srgbClr val="993366"/>
+                </a:solidFill>
+                <a:latin typeface="Consolas" panose="020B0609020204030204" pitchFamily="49" charset="0"/>
+                <a:cs typeface="Courier New" panose="02070309020205020404" pitchFamily="49" charset="0"/>
+              </a:rPr>
+              <a:t>=</a:t>
+            </a:r>
+            <a:r>
+              <a:rPr lang="en-US" sz="1800" dirty="0" smtClean="0">
+                <a:latin typeface="Consolas" panose="020B0609020204030204" pitchFamily="49" charset="0"/>
+                <a:cs typeface="Courier New" panose="02070309020205020404" pitchFamily="49" charset="0"/>
+              </a:rPr>
+              <a:t> </a:t>
+            </a:r>
+            <a:r>
+              <a:rPr lang="en-US" sz="1800" b="1" dirty="0">
+                <a:solidFill>
+                  <a:srgbClr val="993366"/>
+                </a:solidFill>
+                <a:latin typeface="Consolas" panose="020B0609020204030204" pitchFamily="49" charset="0"/>
+                <a:cs typeface="Courier New" panose="02070309020205020404" pitchFamily="49" charset="0"/>
+              </a:rPr>
+              <a:t>((</a:t>
+            </a:r>
+            <a:r>
+              <a:rPr lang="en-US" sz="1800" dirty="0">
+                <a:latin typeface="Consolas" panose="020B0609020204030204" pitchFamily="49" charset="0"/>
+                <a:cs typeface="Courier New" panose="02070309020205020404" pitchFamily="49" charset="0"/>
+              </a:rPr>
+              <a:t>alt1 </a:t>
+            </a:r>
+            <a:r>
+              <a:rPr lang="en-US" sz="1800" b="1" dirty="0">
+                <a:solidFill>
+                  <a:srgbClr val="993366"/>
+                </a:solidFill>
+                <a:latin typeface="Consolas" panose="020B0609020204030204" pitchFamily="49" charset="0"/>
+                <a:cs typeface="Courier New" panose="02070309020205020404" pitchFamily="49" charset="0"/>
+              </a:rPr>
+              <a:t>&lt;</a:t>
+            </a:r>
+            <a:r>
+              <a:rPr lang="en-US" sz="1800" dirty="0">
+                <a:latin typeface="Consolas" panose="020B0609020204030204" pitchFamily="49" charset="0"/>
+                <a:cs typeface="Courier New" panose="02070309020205020404" pitchFamily="49" charset="0"/>
+              </a:rPr>
+              <a:t> THRESHOLD</a:t>
+            </a:r>
+            <a:r>
+              <a:rPr lang="en-US" sz="1800" b="1" dirty="0">
+                <a:solidFill>
+                  <a:srgbClr val="993366"/>
+                </a:solidFill>
+                <a:latin typeface="Consolas" panose="020B0609020204030204" pitchFamily="49" charset="0"/>
+                <a:cs typeface="Courier New" panose="02070309020205020404" pitchFamily="49" charset="0"/>
+              </a:rPr>
+              <a:t>) and (</a:t>
+            </a:r>
+            <a:r>
+              <a:rPr lang="en-US" sz="1800" dirty="0">
+                <a:latin typeface="Consolas" panose="020B0609020204030204" pitchFamily="49" charset="0"/>
+                <a:cs typeface="Courier New" panose="02070309020205020404" pitchFamily="49" charset="0"/>
+              </a:rPr>
+              <a:t>alt2 </a:t>
+            </a:r>
+            <a:r>
+              <a:rPr lang="en-US" sz="1800" b="1" dirty="0">
+                <a:solidFill>
+                  <a:srgbClr val="993366"/>
+                </a:solidFill>
+                <a:latin typeface="Consolas" panose="020B0609020204030204" pitchFamily="49" charset="0"/>
+                <a:cs typeface="Courier New" panose="02070309020205020404" pitchFamily="49" charset="0"/>
+              </a:rPr>
+              <a:t>&lt;</a:t>
+            </a:r>
+            <a:r>
+              <a:rPr lang="en-US" sz="1800" dirty="0">
+                <a:latin typeface="Consolas" panose="020B0609020204030204" pitchFamily="49" charset="0"/>
+                <a:cs typeface="Courier New" panose="02070309020205020404" pitchFamily="49" charset="0"/>
+              </a:rPr>
+              <a:t> THRESHOLD</a:t>
+            </a:r>
+            <a:r>
+              <a:rPr lang="en-US" sz="1800" b="1" dirty="0">
+                <a:solidFill>
+                  <a:srgbClr val="993366"/>
+                </a:solidFill>
+                <a:latin typeface="Consolas" panose="020B0609020204030204" pitchFamily="49" charset="0"/>
+                <a:cs typeface="Courier New" panose="02070309020205020404" pitchFamily="49" charset="0"/>
+              </a:rPr>
+              <a:t>)) =&gt; </a:t>
+            </a:r>
+            <a:r>
+              <a:rPr lang="en-US" sz="1800" dirty="0" err="1" smtClean="0">
+                <a:latin typeface="Consolas" panose="020B0609020204030204" pitchFamily="49" charset="0"/>
+                <a:cs typeface="Courier New" panose="02070309020205020404" pitchFamily="49" charset="0"/>
+              </a:rPr>
+              <a:t>doi_on</a:t>
+            </a:r>
+            <a:r>
+              <a:rPr lang="en-US" sz="1800" b="1" dirty="0" smtClean="0">
+                <a:solidFill>
+                  <a:srgbClr val="993366"/>
+                </a:solidFill>
+                <a:latin typeface="Consolas" panose="020B0609020204030204" pitchFamily="49" charset="0"/>
+                <a:cs typeface="Courier New" panose="02070309020205020404" pitchFamily="49" charset="0"/>
+              </a:rPr>
+              <a:t>;</a:t>
+            </a:r>
+            <a:r>
+              <a:rPr lang="en-US" sz="1800" dirty="0" smtClean="0">
+                <a:latin typeface="Consolas" panose="020B0609020204030204" pitchFamily="49" charset="0"/>
+                <a:cs typeface="Courier New" panose="02070309020205020404" pitchFamily="49" charset="0"/>
+              </a:rPr>
+              <a:t> </a:t>
+            </a:r>
+            <a:r>
+              <a:rPr lang="en-US" sz="1800" b="1" dirty="0" err="1" smtClean="0">
+                <a:solidFill>
+                  <a:srgbClr val="993366"/>
+                </a:solidFill>
+                <a:latin typeface="Consolas" panose="020B0609020204030204" pitchFamily="49" charset="0"/>
+                <a:cs typeface="Courier New" panose="02070309020205020404" pitchFamily="49" charset="0"/>
+              </a:rPr>
+              <a:t>tel</a:t>
+            </a:r>
+            <a:r>
+              <a:rPr lang="en-US" sz="1800" b="1" dirty="0">
+                <a:solidFill>
+                  <a:srgbClr val="993366"/>
+                </a:solidFill>
+                <a:latin typeface="Consolas" panose="020B0609020204030204" pitchFamily="49" charset="0"/>
+                <a:cs typeface="Courier New" panose="02070309020205020404" pitchFamily="49" charset="0"/>
+              </a:rPr>
+              <a:t>;</a:t>
+            </a:r>
+          </a:p>
+        </p:txBody>
+      </p:sp>
+      <p:sp>
+        <p:nvSpPr>
+          <p:cNvPr id="6" name="Rectangle 5"/>
+          <p:cNvSpPr/>
+          <p:nvPr/>
+        </p:nvSpPr>
+        <p:spPr>
+          <a:xfrm>
+            <a:off x="1250595" y="2366806"/>
+            <a:ext cx="564578" cy="369332"/>
+          </a:xfrm>
+          <a:prstGeom prst="rect">
+            <a:avLst/>
+          </a:prstGeom>
+        </p:spPr>
+        <p:txBody>
+          <a:bodyPr wrap="none">
+            <a:spAutoFit/>
+          </a:bodyPr>
+          <a:lstStyle/>
+          <a:p>
+            <a:r>
+              <a:rPr lang="en-US" dirty="0">
+                <a:solidFill>
+                  <a:prstClr val="black"/>
+                </a:solidFill>
+                <a:latin typeface="Consolas" panose="020B0609020204030204" pitchFamily="49" charset="0"/>
+                <a:cs typeface="Courier New" panose="02070309020205020404" pitchFamily="49" charset="0"/>
+              </a:rPr>
+              <a:t>(1)</a:t>
+            </a:r>
+            <a:endParaRPr lang="en-US" dirty="0">
+              <a:latin typeface="Consolas" panose="020B0609020204030204" pitchFamily="49" charset="0"/>
+            </a:endParaRPr>
+          </a:p>
+        </p:txBody>
+      </p:sp>
+      <p:sp>
+        <p:nvSpPr>
+          <p:cNvPr id="7" name="Rectangle 6"/>
+          <p:cNvSpPr/>
+          <p:nvPr/>
+        </p:nvSpPr>
+        <p:spPr>
+          <a:xfrm>
+            <a:off x="1250595" y="2748124"/>
+            <a:ext cx="564578" cy="369332"/>
+          </a:xfrm>
+          <a:prstGeom prst="rect">
+            <a:avLst/>
+          </a:prstGeom>
+        </p:spPr>
+        <p:txBody>
+          <a:bodyPr wrap="none">
+            <a:spAutoFit/>
+          </a:bodyPr>
+          <a:lstStyle/>
+          <a:p>
+            <a:r>
+              <a:rPr lang="en-US" dirty="0" smtClean="0">
+                <a:solidFill>
+                  <a:prstClr val="black"/>
+                </a:solidFill>
+                <a:latin typeface="Consolas" panose="020B0609020204030204" pitchFamily="49" charset="0"/>
+                <a:cs typeface="Courier New" panose="02070309020205020404" pitchFamily="49" charset="0"/>
+              </a:rPr>
+              <a:t>(2)</a:t>
+            </a:r>
+            <a:endParaRPr lang="en-US" dirty="0">
+              <a:latin typeface="Consolas" panose="020B0609020204030204" pitchFamily="49" charset="0"/>
+            </a:endParaRPr>
+          </a:p>
+        </p:txBody>
+      </p:sp>
+      <p:sp>
+        <p:nvSpPr>
+          <p:cNvPr id="8" name="Rectangle 7"/>
+          <p:cNvSpPr/>
+          <p:nvPr/>
+        </p:nvSpPr>
+        <p:spPr>
+          <a:xfrm>
+            <a:off x="1249272" y="3156141"/>
+            <a:ext cx="564578" cy="369332"/>
+          </a:xfrm>
+          <a:prstGeom prst="rect">
+            <a:avLst/>
+          </a:prstGeom>
+        </p:spPr>
+        <p:txBody>
+          <a:bodyPr wrap="none">
+            <a:spAutoFit/>
+          </a:bodyPr>
+          <a:lstStyle/>
+          <a:p>
+            <a:r>
+              <a:rPr lang="en-US" dirty="0" smtClean="0">
+                <a:solidFill>
+                  <a:prstClr val="black"/>
+                </a:solidFill>
+                <a:latin typeface="Consolas" panose="020B0609020204030204" pitchFamily="49" charset="0"/>
+                <a:cs typeface="Courier New" panose="02070309020205020404" pitchFamily="49" charset="0"/>
+              </a:rPr>
+              <a:t>(3)</a:t>
+            </a:r>
+            <a:endParaRPr lang="en-US" dirty="0">
+              <a:latin typeface="Consolas" panose="020B0609020204030204" pitchFamily="49" charset="0"/>
+            </a:endParaRPr>
+          </a:p>
+        </p:txBody>
+      </p:sp>
+      <p:sp>
+        <p:nvSpPr>
+          <p:cNvPr id="9" name="Rectangle 8"/>
+          <p:cNvSpPr/>
+          <p:nvPr/>
+        </p:nvSpPr>
+        <p:spPr>
+          <a:xfrm>
+            <a:off x="1246260" y="3621800"/>
+            <a:ext cx="564578" cy="369332"/>
+          </a:xfrm>
+          <a:prstGeom prst="rect">
+            <a:avLst/>
+          </a:prstGeom>
+        </p:spPr>
+        <p:txBody>
+          <a:bodyPr wrap="none">
+            <a:spAutoFit/>
+          </a:bodyPr>
+          <a:lstStyle/>
+          <a:p>
+            <a:r>
+              <a:rPr lang="en-US" dirty="0" smtClean="0">
+                <a:solidFill>
+                  <a:prstClr val="black"/>
+                </a:solidFill>
+                <a:latin typeface="Consolas" panose="020B0609020204030204" pitchFamily="49" charset="0"/>
+                <a:cs typeface="Courier New" panose="02070309020205020404" pitchFamily="49" charset="0"/>
+              </a:rPr>
+              <a:t>(4)</a:t>
+            </a:r>
+            <a:endParaRPr lang="en-US" dirty="0">
+              <a:latin typeface="Consolas" panose="020B0609020204030204" pitchFamily="49" charset="0"/>
+            </a:endParaRPr>
+          </a:p>
+        </p:txBody>
+      </p:sp>
+      <p:sp>
+        <p:nvSpPr>
+          <p:cNvPr id="10" name="Rectangle 9"/>
+          <p:cNvSpPr/>
+          <p:nvPr/>
+        </p:nvSpPr>
+        <p:spPr>
+          <a:xfrm>
+            <a:off x="1254750" y="4051707"/>
+            <a:ext cx="564578" cy="369332"/>
+          </a:xfrm>
+          <a:prstGeom prst="rect">
+            <a:avLst/>
+          </a:prstGeom>
+        </p:spPr>
+        <p:txBody>
+          <a:bodyPr wrap="none">
+            <a:spAutoFit/>
+          </a:bodyPr>
+          <a:lstStyle/>
+          <a:p>
+            <a:r>
+              <a:rPr lang="en-US" dirty="0" smtClean="0">
+                <a:solidFill>
+                  <a:prstClr val="black"/>
+                </a:solidFill>
+                <a:latin typeface="Consolas" panose="020B0609020204030204" pitchFamily="49" charset="0"/>
+                <a:cs typeface="Courier New" panose="02070309020205020404" pitchFamily="49" charset="0"/>
+              </a:rPr>
+              <a:t>(5)</a:t>
+            </a:r>
+            <a:endParaRPr lang="en-US" dirty="0">
+              <a:latin typeface="Consolas" panose="020B0609020204030204" pitchFamily="49" charset="0"/>
+            </a:endParaRPr>
+          </a:p>
+        </p:txBody>
+      </p:sp>
+      <p:sp>
+        <p:nvSpPr>
+          <p:cNvPr id="11" name="Rectangle 10"/>
+          <p:cNvSpPr/>
+          <p:nvPr/>
+        </p:nvSpPr>
+        <p:spPr>
+          <a:xfrm>
+            <a:off x="1254750" y="4471710"/>
+            <a:ext cx="564578" cy="369332"/>
+          </a:xfrm>
+          <a:prstGeom prst="rect">
+            <a:avLst/>
+          </a:prstGeom>
+        </p:spPr>
+        <p:txBody>
+          <a:bodyPr wrap="none">
+            <a:spAutoFit/>
+          </a:bodyPr>
+          <a:lstStyle/>
+          <a:p>
+            <a:r>
+              <a:rPr lang="en-US" dirty="0" smtClean="0">
+                <a:solidFill>
+                  <a:prstClr val="black"/>
+                </a:solidFill>
+                <a:latin typeface="Consolas" panose="020B0609020204030204" pitchFamily="49" charset="0"/>
+                <a:cs typeface="Courier New" panose="02070309020205020404" pitchFamily="49" charset="0"/>
+              </a:rPr>
+              <a:t>(6)</a:t>
+            </a:r>
+            <a:endParaRPr lang="en-US" dirty="0">
+              <a:latin typeface="Consolas" panose="020B0609020204030204" pitchFamily="49" charset="0"/>
+            </a:endParaRPr>
+          </a:p>
+        </p:txBody>
+      </p:sp>
+      <p:sp>
+        <p:nvSpPr>
+          <p:cNvPr id="12" name="Rectangle 11"/>
+          <p:cNvSpPr/>
+          <p:nvPr/>
+        </p:nvSpPr>
+        <p:spPr>
+          <a:xfrm>
+            <a:off x="1254750" y="4916977"/>
+            <a:ext cx="564578" cy="369332"/>
+          </a:xfrm>
+          <a:prstGeom prst="rect">
+            <a:avLst/>
+          </a:prstGeom>
+        </p:spPr>
+        <p:txBody>
+          <a:bodyPr wrap="none">
+            <a:spAutoFit/>
+          </a:bodyPr>
+          <a:lstStyle/>
+          <a:p>
+            <a:r>
+              <a:rPr lang="en-US" dirty="0" smtClean="0">
+                <a:solidFill>
+                  <a:prstClr val="black"/>
+                </a:solidFill>
+                <a:latin typeface="Consolas" panose="020B0609020204030204" pitchFamily="49" charset="0"/>
+                <a:cs typeface="Courier New" panose="02070309020205020404" pitchFamily="49" charset="0"/>
+              </a:rPr>
+              <a:t>(7)</a:t>
+            </a:r>
+            <a:endParaRPr lang="en-US" dirty="0">
+              <a:latin typeface="Consolas" panose="020B0609020204030204" pitchFamily="49" charset="0"/>
+            </a:endParaRPr>
+          </a:p>
+        </p:txBody>
+      </p:sp>
+      <p:sp>
+        <p:nvSpPr>
+          <p:cNvPr id="13" name="Rectangle 12"/>
+          <p:cNvSpPr/>
+          <p:nvPr/>
+        </p:nvSpPr>
+        <p:spPr>
+          <a:xfrm>
+            <a:off x="753762" y="129396"/>
+            <a:ext cx="10342605" cy="6728604"/>
+          </a:xfrm>
+          <a:prstGeom prst="rect">
+            <a:avLst/>
+          </a:prstGeom>
+          <a:noFill/>
+          <a:ln>
+            <a:solidFill>
+              <a:schemeClr val="tx1"/>
+            </a:solidFill>
+          </a:ln>
+        </p:spPr>
+        <p:style>
+          <a:lnRef idx="2">
+            <a:schemeClr val="accent1">
+              <a:shade val="50000"/>
+            </a:schemeClr>
+          </a:lnRef>
+          <a:fillRef idx="1">
+            <a:schemeClr val="accent1"/>
+          </a:fillRef>
+          <a:effectRef idx="0">
+            <a:schemeClr val="accent1"/>
+          </a:effectRef>
+          <a:fontRef idx="minor">
+            <a:schemeClr val="lt1"/>
+          </a:fontRef>
+        </p:style>
+        <p:txBody>
+          <a:bodyPr rtlCol="0" anchor="ctr"/>
+          <a:lstStyle/>
+          <a:p>
+            <a:pPr algn="ctr"/>
+            <a:endParaRPr lang="en-US">
+              <a:latin typeface="Consolas" panose="020B0609020204030204" pitchFamily="49" charset="0"/>
+              <a:cs typeface="Courier New" panose="02070309020205020404" pitchFamily="49" charset="0"/>
+            </a:endParaRPr>
+          </a:p>
+        </p:txBody>
+      </p:sp>
+      <p:sp>
+        <p:nvSpPr>
+          <p:cNvPr id="2" name="Rectangle 1"/>
+          <p:cNvSpPr/>
+          <p:nvPr/>
+        </p:nvSpPr>
+        <p:spPr>
+          <a:xfrm>
+            <a:off x="1246260" y="343663"/>
+            <a:ext cx="8012648" cy="369332"/>
+          </a:xfrm>
+          <a:prstGeom prst="rect">
+            <a:avLst/>
+          </a:prstGeom>
+        </p:spPr>
+        <p:txBody>
           <a:bodyPr wrap="square">
             <a:spAutoFit/>
           </a:bodyPr>
           <a:lstStyle/>
           <a:p>
             <a:r>
-              <a:rPr lang="en-US" sz="1700" b="1" dirty="0">
-                <a:latin typeface="Courier New" panose="02070309020205020404" pitchFamily="49" charset="0"/>
+              <a:rPr lang="en-US" b="1" dirty="0">
+                <a:solidFill>
+                  <a:srgbClr val="993366"/>
+                </a:solidFill>
+                <a:latin typeface="Consolas" panose="020B0609020204030204" pitchFamily="49" charset="0"/>
                 <a:cs typeface="Courier New" panose="02070309020205020404" pitchFamily="49" charset="0"/>
               </a:rPr>
               <a:t>node</a:t>
             </a:r>
             <a:r>
-              <a:rPr lang="en-US" sz="1700" dirty="0">
-                <a:latin typeface="Courier New" panose="02070309020205020404" pitchFamily="49" charset="0"/>
+              <a:rPr lang="en-US" dirty="0">
+                <a:latin typeface="Consolas" panose="020B0609020204030204" pitchFamily="49" charset="0"/>
                 <a:cs typeface="Courier New" panose="02070309020205020404" pitchFamily="49" charset="0"/>
               </a:rPr>
               <a:t> </a:t>
             </a:r>
             <a:r>
-              <a:rPr lang="en-US" sz="1700" dirty="0" err="1">
-                <a:latin typeface="Courier New" panose="02070309020205020404" pitchFamily="49" charset="0"/>
+              <a:rPr lang="en-US" dirty="0" err="1" smtClean="0">
+                <a:latin typeface="Consolas" panose="020B0609020204030204" pitchFamily="49" charset="0"/>
                 <a:cs typeface="Courier New" panose="02070309020205020404" pitchFamily="49" charset="0"/>
               </a:rPr>
               <a:t>asw</a:t>
             </a:r>
             <a:r>
-              <a:rPr lang="en-US" sz="1700" dirty="0">
-                <a:latin typeface="Courier New" panose="02070309020205020404" pitchFamily="49" charset="0"/>
-                <a:cs typeface="Courier New" panose="02070309020205020404" pitchFamily="49" charset="0"/>
-              </a:rPr>
-              <a:t>(alt1, alt2: </a:t>
-            </a:r>
-            <a:r>
-              <a:rPr lang="en-US" sz="1700" b="1" dirty="0" err="1">
-                <a:latin typeface="Courier New" panose="02070309020205020404" pitchFamily="49" charset="0"/>
+              <a:rPr lang="en-US" dirty="0" smtClean="0">
+                <a:latin typeface="Consolas" panose="020B0609020204030204" pitchFamily="49" charset="0"/>
+                <a:cs typeface="Courier New" panose="02070309020205020404" pitchFamily="49" charset="0"/>
+              </a:rPr>
+              <a:t> </a:t>
+            </a:r>
+            <a:r>
+              <a:rPr lang="en-US" b="1" dirty="0" smtClean="0">
+                <a:solidFill>
+                  <a:srgbClr val="993366"/>
+                </a:solidFill>
+                <a:latin typeface="Consolas" panose="020B0609020204030204" pitchFamily="49" charset="0"/>
+                <a:cs typeface="Courier New" panose="02070309020205020404" pitchFamily="49" charset="0"/>
+              </a:rPr>
+              <a:t>(</a:t>
+            </a:r>
+            <a:r>
+              <a:rPr lang="en-US" dirty="0">
+                <a:latin typeface="Consolas" panose="020B0609020204030204" pitchFamily="49" charset="0"/>
+                <a:cs typeface="Courier New" panose="02070309020205020404" pitchFamily="49" charset="0"/>
+              </a:rPr>
+              <a:t>alt1</a:t>
+            </a:r>
+            <a:r>
+              <a:rPr lang="en-US" b="1" dirty="0">
+                <a:solidFill>
+                  <a:srgbClr val="993366"/>
+                </a:solidFill>
+                <a:latin typeface="Consolas" panose="020B0609020204030204" pitchFamily="49" charset="0"/>
+                <a:cs typeface="Courier New" panose="02070309020205020404" pitchFamily="49" charset="0"/>
+              </a:rPr>
+              <a:t>,</a:t>
+            </a:r>
+            <a:r>
+              <a:rPr lang="en-US" dirty="0">
+                <a:latin typeface="Consolas" panose="020B0609020204030204" pitchFamily="49" charset="0"/>
+                <a:cs typeface="Courier New" panose="02070309020205020404" pitchFamily="49" charset="0"/>
+              </a:rPr>
+              <a:t> alt2</a:t>
+            </a:r>
+            <a:r>
+              <a:rPr lang="en-US" b="1" dirty="0">
+                <a:solidFill>
+                  <a:srgbClr val="993366"/>
+                </a:solidFill>
+                <a:latin typeface="Consolas" panose="020B0609020204030204" pitchFamily="49" charset="0"/>
+                <a:cs typeface="Courier New" panose="02070309020205020404" pitchFamily="49" charset="0"/>
+              </a:rPr>
+              <a:t>: </a:t>
+            </a:r>
+            <a:r>
+              <a:rPr lang="en-US" b="1" dirty="0" err="1" smtClean="0">
+                <a:solidFill>
+                  <a:srgbClr val="993366"/>
+                </a:solidFill>
+                <a:latin typeface="Consolas" panose="020B0609020204030204" pitchFamily="49" charset="0"/>
                 <a:cs typeface="Courier New" panose="02070309020205020404" pitchFamily="49" charset="0"/>
               </a:rPr>
               <a:t>int</a:t>
             </a:r>
             <a:r>
-              <a:rPr lang="en-US" sz="1700" dirty="0">
-                <a:latin typeface="Courier New" panose="02070309020205020404" pitchFamily="49" charset="0"/>
-                <a:cs typeface="Courier New" panose="02070309020205020404" pitchFamily="49" charset="0"/>
-              </a:rPr>
-              <a:t>; stat1, stat2 : </a:t>
-            </a:r>
-            <a:r>
-              <a:rPr lang="en-US" sz="1700" b="1" dirty="0">
-                <a:latin typeface="Courier New" panose="02070309020205020404" pitchFamily="49" charset="0"/>
-                <a:cs typeface="Courier New" panose="02070309020205020404" pitchFamily="49" charset="0"/>
-              </a:rPr>
-              <a:t>bool</a:t>
-            </a:r>
-            <a:r>
-              <a:rPr lang="en-US" sz="1700" dirty="0">
-                <a:latin typeface="Courier New" panose="02070309020205020404" pitchFamily="49" charset="0"/>
-                <a:cs typeface="Courier New" panose="02070309020205020404" pitchFamily="49" charset="0"/>
-              </a:rPr>
-              <a:t>)</a:t>
-            </a:r>
-          </a:p>
-          <a:p>
-            <a:r>
-              <a:rPr lang="en-US" sz="1700" dirty="0" smtClean="0">
-                <a:latin typeface="Courier New" panose="02070309020205020404" pitchFamily="49" charset="0"/>
-                <a:cs typeface="Courier New" panose="02070309020205020404" pitchFamily="49" charset="0"/>
-              </a:rPr>
-              <a:t>     </a:t>
-            </a:r>
-            <a:r>
-              <a:rPr lang="en-US" sz="1700" b="1" dirty="0" smtClean="0">
-                <a:latin typeface="Courier New" panose="02070309020205020404" pitchFamily="49" charset="0"/>
-                <a:cs typeface="Courier New" panose="02070309020205020404" pitchFamily="49" charset="0"/>
-              </a:rPr>
-              <a:t>returns</a:t>
-            </a:r>
-            <a:r>
-              <a:rPr lang="en-US" sz="1700" dirty="0" smtClean="0">
-                <a:latin typeface="Courier New" panose="02070309020205020404" pitchFamily="49" charset="0"/>
-                <a:cs typeface="Courier New" panose="02070309020205020404" pitchFamily="49" charset="0"/>
-              </a:rPr>
-              <a:t> </a:t>
-            </a:r>
-            <a:r>
-              <a:rPr lang="en-US" sz="1700" dirty="0">
-                <a:latin typeface="Courier New" panose="02070309020205020404" pitchFamily="49" charset="0"/>
-                <a:cs typeface="Courier New" panose="02070309020205020404" pitchFamily="49" charset="0"/>
-              </a:rPr>
-              <a:t>(alarm: </a:t>
-            </a:r>
-            <a:r>
-              <a:rPr lang="en-US" sz="1700" b="1" dirty="0">
-                <a:latin typeface="Courier New" panose="02070309020205020404" pitchFamily="49" charset="0"/>
-                <a:cs typeface="Courier New" panose="02070309020205020404" pitchFamily="49" charset="0"/>
-              </a:rPr>
-              <a:t>bool</a:t>
-            </a:r>
-            <a:r>
-              <a:rPr lang="en-US" sz="1700" dirty="0">
-                <a:latin typeface="Courier New" panose="02070309020205020404" pitchFamily="49" charset="0"/>
-                <a:cs typeface="Courier New" panose="02070309020205020404" pitchFamily="49" charset="0"/>
-              </a:rPr>
-              <a:t>; </a:t>
-            </a:r>
-            <a:r>
-              <a:rPr lang="en-US" sz="1700" dirty="0" err="1">
-                <a:latin typeface="Courier New" panose="02070309020205020404" pitchFamily="49" charset="0"/>
+              <a:rPr lang="en-US" b="1" dirty="0" smtClean="0">
+                <a:solidFill>
+                  <a:srgbClr val="993366"/>
+                </a:solidFill>
+                <a:latin typeface="Consolas" panose="020B0609020204030204" pitchFamily="49" charset="0"/>
+                <a:cs typeface="Courier New" panose="02070309020205020404" pitchFamily="49" charset="0"/>
+              </a:rPr>
+              <a:t>) returns </a:t>
+            </a:r>
+            <a:r>
+              <a:rPr lang="en-US" b="1" dirty="0">
+                <a:solidFill>
+                  <a:srgbClr val="993366"/>
+                </a:solidFill>
+                <a:latin typeface="Consolas" panose="020B0609020204030204" pitchFamily="49" charset="0"/>
+                <a:cs typeface="Courier New" panose="02070309020205020404" pitchFamily="49" charset="0"/>
+              </a:rPr>
+              <a:t>(</a:t>
+            </a:r>
+            <a:r>
+              <a:rPr lang="en-US" dirty="0" err="1">
+                <a:latin typeface="Consolas" panose="020B0609020204030204" pitchFamily="49" charset="0"/>
                 <a:cs typeface="Courier New" panose="02070309020205020404" pitchFamily="49" charset="0"/>
               </a:rPr>
               <a:t>doi_on</a:t>
             </a:r>
             <a:r>
-              <a:rPr lang="en-US" sz="1700" dirty="0">
-                <a:latin typeface="Courier New" panose="02070309020205020404" pitchFamily="49" charset="0"/>
-                <a:cs typeface="Courier New" panose="02070309020205020404" pitchFamily="49" charset="0"/>
-              </a:rPr>
-              <a:t>: </a:t>
-            </a:r>
-            <a:r>
-              <a:rPr lang="en-US" sz="1700" b="1" dirty="0">
-                <a:latin typeface="Courier New" panose="02070309020205020404" pitchFamily="49" charset="0"/>
-                <a:cs typeface="Courier New" panose="02070309020205020404" pitchFamily="49" charset="0"/>
-              </a:rPr>
-              <a:t>bool</a:t>
-            </a:r>
-            <a:r>
-              <a:rPr lang="en-US" sz="1700" dirty="0">
-                <a:latin typeface="Courier New" panose="02070309020205020404" pitchFamily="49" charset="0"/>
-                <a:cs typeface="Courier New" panose="02070309020205020404" pitchFamily="49" charset="0"/>
-              </a:rPr>
-              <a:t>);</a:t>
-            </a:r>
+              <a:rPr lang="en-US" b="1" dirty="0">
+                <a:solidFill>
+                  <a:srgbClr val="993366"/>
+                </a:solidFill>
+                <a:latin typeface="Consolas" panose="020B0609020204030204" pitchFamily="49" charset="0"/>
+                <a:cs typeface="Courier New" panose="02070309020205020404" pitchFamily="49" charset="0"/>
+              </a:rPr>
+              <a:t>: bool);</a:t>
+            </a:r>
+          </a:p>
+        </p:txBody>
+      </p:sp>
+      <p:sp>
+        <p:nvSpPr>
+          <p:cNvPr id="14" name="Rectangle 13"/>
+          <p:cNvSpPr/>
+          <p:nvPr/>
+        </p:nvSpPr>
+        <p:spPr>
+          <a:xfrm>
+            <a:off x="1246260" y="5786739"/>
+            <a:ext cx="564578" cy="369332"/>
+          </a:xfrm>
+          <a:prstGeom prst="rect">
+            <a:avLst/>
+          </a:prstGeom>
+        </p:spPr>
+        <p:txBody>
+          <a:bodyPr wrap="none">
+            <a:spAutoFit/>
+          </a:bodyPr>
+          <a:lstStyle/>
+          <a:p>
+            <a:r>
+              <a:rPr lang="en-US" dirty="0" smtClean="0">
+                <a:solidFill>
+                  <a:prstClr val="black"/>
+                </a:solidFill>
+                <a:latin typeface="Consolas" panose="020B0609020204030204" pitchFamily="49" charset="0"/>
+                <a:cs typeface="Courier New" panose="02070309020205020404" pitchFamily="49" charset="0"/>
+              </a:rPr>
+              <a:t>(8)</a:t>
+            </a:r>
+            <a:endParaRPr lang="en-US" dirty="0">
+              <a:latin typeface="Consolas" panose="020B0609020204030204" pitchFamily="49" charset="0"/>
+            </a:endParaRPr>
           </a:p>
         </p:txBody>
       </p:sp>
@@ -5479,7 +6840,7 @@
 </p:sld>
 </file>
 
-<file path=ppt/slides/slide4.xml><?xml version="1.0" encoding="utf-8"?>
+<file path=ppt/slides/slide5.xml><?xml version="1.0" encoding="utf-8"?>
 <p:sld xmlns:a="http://schemas.openxmlformats.org/drawingml/2006/main" xmlns:r="http://schemas.openxmlformats.org/officeDocument/2006/relationships" xmlns:p="http://schemas.openxmlformats.org/presentationml/2006/main">
   <p:cSld>
     <p:spTree>
@@ -6747,7 +8108,7 @@
 </p:sld>
 </file>
 
-<file path=ppt/slides/slide5.xml><?xml version="1.0" encoding="utf-8"?>
+<file path=ppt/slides/slide6.xml><?xml version="1.0" encoding="utf-8"?>
 <p:sld xmlns:a="http://schemas.openxmlformats.org/drawingml/2006/main" xmlns:r="http://schemas.openxmlformats.org/officeDocument/2006/relationships" xmlns:p="http://schemas.openxmlformats.org/presentationml/2006/main">
   <p:cSld>
     <p:spTree>
@@ -8259,7 +9620,7 @@
 </p:sld>
 </file>
 
-<file path=ppt/slides/slide6.xml><?xml version="1.0" encoding="utf-8"?>
+<file path=ppt/slides/slide7.xml><?xml version="1.0" encoding="utf-8"?>
 <p:sld xmlns:a="http://schemas.openxmlformats.org/drawingml/2006/main" xmlns:r="http://schemas.openxmlformats.org/officeDocument/2006/relationships" xmlns:p="http://schemas.openxmlformats.org/presentationml/2006/main">
   <p:cSld>
     <p:spTree>
@@ -9199,7 +10560,7 @@
 </p:sld>
 </file>
 
-<file path=ppt/slides/slide7.xml><?xml version="1.0" encoding="utf-8"?>
+<file path=ppt/slides/slide8.xml><?xml version="1.0" encoding="utf-8"?>
 <p:sld xmlns:a="http://schemas.openxmlformats.org/drawingml/2006/main" xmlns:r="http://schemas.openxmlformats.org/officeDocument/2006/relationships" xmlns:p="http://schemas.openxmlformats.org/presentationml/2006/main">
   <p:cSld>
     <p:spTree>
@@ -9715,7 +11076,7 @@
 </p:sld>
 </file>
 
-<file path=ppt/slides/slide8.xml><?xml version="1.0" encoding="utf-8"?>
+<file path=ppt/slides/slide9.xml><?xml version="1.0" encoding="utf-8"?>
 <p:sld xmlns:a="http://schemas.openxmlformats.org/drawingml/2006/main" xmlns:r="http://schemas.openxmlformats.org/officeDocument/2006/relationships" xmlns:p="http://schemas.openxmlformats.org/presentationml/2006/main">
   <p:cSld>
     <p:spTree>
@@ -9884,232 +11245,6 @@
     <p:extLst>
       <p:ext uri="{BB962C8B-B14F-4D97-AF65-F5344CB8AC3E}">
         <p14:creationId xmlns:p14="http://schemas.microsoft.com/office/powerpoint/2010/main" val="219871825"/>
-      </p:ext>
-    </p:extLst>
-  </p:cSld>
-  <p:clrMapOvr>
-    <a:masterClrMapping/>
-  </p:clrMapOvr>
-</p:sld>
-</file>
-
-<file path=ppt/slides/slide9.xml><?xml version="1.0" encoding="utf-8"?>
-<p:sld xmlns:a="http://schemas.openxmlformats.org/drawingml/2006/main" xmlns:r="http://schemas.openxmlformats.org/officeDocument/2006/relationships" xmlns:p="http://schemas.openxmlformats.org/presentationml/2006/main">
-  <p:cSld>
-    <p:spTree>
-      <p:nvGrpSpPr>
-        <p:cNvPr id="1" name=""/>
-        <p:cNvGrpSpPr/>
-        <p:nvPr/>
-      </p:nvGrpSpPr>
-      <p:grpSpPr>
-        <a:xfrm>
-          <a:off x="0" y="0"/>
-          <a:ext cx="0" cy="0"/>
-          <a:chOff x="0" y="0"/>
-          <a:chExt cx="0" cy="0"/>
-        </a:xfrm>
-      </p:grpSpPr>
-      <p:sp>
-        <p:nvSpPr>
-          <p:cNvPr id="3" name="Content Placeholder 2"/>
-          <p:cNvSpPr>
-            <a:spLocks noGrp="1"/>
-          </p:cNvSpPr>
-          <p:nvPr>
-            <p:ph idx="1"/>
-          </p:nvPr>
-        </p:nvSpPr>
-        <p:spPr/>
-        <p:txBody>
-          <a:bodyPr/>
-          <a:lstStyle/>
-          <a:p>
-            <a:endParaRPr lang="en-US"/>
-          </a:p>
-        </p:txBody>
-      </p:sp>
-      <p:pic>
-        <p:nvPicPr>
-          <p:cNvPr id="4" name="Picture 3"/>
-          <p:cNvPicPr>
-            <a:picLocks noChangeAspect="1"/>
-          </p:cNvPicPr>
-          <p:nvPr/>
-        </p:nvPicPr>
-        <p:blipFill rotWithShape="1">
-          <a:blip r:embed="rId2">
-            <a:extLst>
-              <a:ext uri="{28A0092B-C50C-407E-A947-70E740481C1C}">
-                <a14:useLocalDpi xmlns:a14="http://schemas.microsoft.com/office/drawing/2010/main" val="0"/>
-              </a:ext>
-            </a:extLst>
-          </a:blip>
-          <a:srcRect l="2284" r="1866" b="2631"/>
-          <a:stretch/>
-        </p:blipFill>
-        <p:spPr>
-          <a:xfrm>
-            <a:off x="244549" y="988828"/>
-            <a:ext cx="11419367" cy="5709684"/>
-          </a:xfrm>
-          <a:prstGeom prst="rect">
-            <a:avLst/>
-          </a:prstGeom>
-        </p:spPr>
-      </p:pic>
-      <p:pic>
-        <p:nvPicPr>
-          <p:cNvPr id="5" name="Picture 4"/>
-          <p:cNvPicPr>
-            <a:picLocks noChangeAspect="1"/>
-          </p:cNvPicPr>
-          <p:nvPr/>
-        </p:nvPicPr>
-        <p:blipFill>
-          <a:blip r:embed="rId3"/>
-          <a:stretch>
-            <a:fillRect/>
-          </a:stretch>
-        </p:blipFill>
-        <p:spPr>
-          <a:xfrm>
-            <a:off x="700011" y="1040273"/>
-            <a:ext cx="5094733" cy="1617867"/>
-          </a:xfrm>
-          <a:prstGeom prst="rect">
-            <a:avLst/>
-          </a:prstGeom>
-        </p:spPr>
-      </p:pic>
-      <p:sp>
-        <p:nvSpPr>
-          <p:cNvPr id="6" name="Rectangle 5"/>
-          <p:cNvSpPr/>
-          <p:nvPr/>
-        </p:nvSpPr>
-        <p:spPr>
-          <a:xfrm rot="16200000">
-            <a:off x="10520089" y="3593125"/>
-            <a:ext cx="816249" cy="307777"/>
-          </a:xfrm>
-          <a:prstGeom prst="rect">
-            <a:avLst/>
-          </a:prstGeom>
-          <a:solidFill>
-            <a:schemeClr val="bg1"/>
-          </a:solidFill>
-        </p:spPr>
-        <p:txBody>
-          <a:bodyPr wrap="none">
-            <a:spAutoFit/>
-          </a:bodyPr>
-          <a:lstStyle/>
-          <a:p>
-            <a:r>
-              <a:rPr lang="en-US" sz="1400" dirty="0" smtClean="0"/>
-              <a:t>#of  IVCs</a:t>
-            </a:r>
-            <a:endParaRPr lang="en-US" sz="1400" dirty="0"/>
-          </a:p>
-        </p:txBody>
-      </p:sp>
-      <p:sp>
-        <p:nvSpPr>
-          <p:cNvPr id="7" name="Rectangle 6"/>
-          <p:cNvSpPr/>
-          <p:nvPr/>
-        </p:nvSpPr>
-        <p:spPr>
-          <a:xfrm>
-            <a:off x="5462086" y="6550223"/>
-            <a:ext cx="729687" cy="307777"/>
-          </a:xfrm>
-          <a:prstGeom prst="rect">
-            <a:avLst/>
-          </a:prstGeom>
-          <a:noFill/>
-        </p:spPr>
-        <p:txBody>
-          <a:bodyPr wrap="none">
-            <a:spAutoFit/>
-          </a:bodyPr>
-          <a:lstStyle/>
-          <a:p>
-            <a:r>
-              <a:rPr lang="en-US" sz="1400" dirty="0" smtClean="0"/>
-              <a:t>Models</a:t>
-            </a:r>
-            <a:endParaRPr lang="en-US" sz="1400" dirty="0"/>
-          </a:p>
-        </p:txBody>
-      </p:sp>
-      <p:sp>
-        <p:nvSpPr>
-          <p:cNvPr id="8" name="Rectangle 7"/>
-          <p:cNvSpPr/>
-          <p:nvPr/>
-        </p:nvSpPr>
-        <p:spPr>
-          <a:xfrm rot="16200000">
-            <a:off x="-504182" y="3593124"/>
-            <a:ext cx="1189685" cy="307777"/>
-          </a:xfrm>
-          <a:prstGeom prst="rect">
-            <a:avLst/>
-          </a:prstGeom>
-          <a:noFill/>
-        </p:spPr>
-        <p:txBody>
-          <a:bodyPr wrap="none">
-            <a:spAutoFit/>
-          </a:bodyPr>
-          <a:lstStyle/>
-          <a:p>
-            <a:r>
-              <a:rPr lang="en-US" sz="1400" dirty="0" smtClean="0"/>
-              <a:t>Runtime (sec)</a:t>
-            </a:r>
-            <a:endParaRPr lang="en-US" sz="1400" dirty="0"/>
-          </a:p>
-        </p:txBody>
-      </p:sp>
-      <p:sp>
-        <p:nvSpPr>
-          <p:cNvPr id="9" name="Rectangle 8"/>
-          <p:cNvSpPr/>
-          <p:nvPr/>
-        </p:nvSpPr>
-        <p:spPr>
-          <a:xfrm rot="16200000">
-            <a:off x="11033113" y="4187966"/>
-            <a:ext cx="1225528" cy="307777"/>
-          </a:xfrm>
-          <a:prstGeom prst="rect">
-            <a:avLst/>
-          </a:prstGeom>
-          <a:solidFill>
-            <a:schemeClr val="bg1"/>
-          </a:solidFill>
-        </p:spPr>
-        <p:txBody>
-          <a:bodyPr wrap="none">
-            <a:spAutoFit/>
-          </a:bodyPr>
-          <a:lstStyle/>
-          <a:p>
-            <a:r>
-              <a:rPr lang="en-US" sz="1400" dirty="0" smtClean="0"/>
-              <a:t>#of  Equations</a:t>
-            </a:r>
-            <a:endParaRPr lang="en-US" sz="1400" dirty="0"/>
-          </a:p>
-        </p:txBody>
-      </p:sp>
-    </p:spTree>
-    <p:extLst>
-      <p:ext uri="{BB962C8B-B14F-4D97-AF65-F5344CB8AC3E}">
-        <p14:creationId xmlns:p14="http://schemas.microsoft.com/office/powerpoint/2010/main" val="3258950361"/>
       </p:ext>
     </p:extLst>
   </p:cSld>

</xml_diff>

<commit_message>
working on the example (in progress...)
</commit_message>
<xml_diff>
--- a/all_ivcs/all_ivcs_TEX/figs/figs.pptx
+++ b/all_ivcs/all_ivcs_TEX/figs/figs.pptx
@@ -4628,7 +4628,7 @@
         </p:nvSpPr>
         <p:spPr>
           <a:xfrm>
-            <a:off x="5852436" y="4943726"/>
+            <a:off x="3199229" y="5015771"/>
             <a:ext cx="338554" cy="400110"/>
           </a:xfrm>
           <a:prstGeom prst="rect">
@@ -4646,13 +4646,13 @@
                 <a:solidFill>
                   <a:srgbClr val="C00000"/>
                 </a:solidFill>
-                <a:latin typeface="Courier New" panose="02070309020205020404" pitchFamily="49" charset="0"/>
+                <a:latin typeface="Consolas" panose="020B0609020204030204" pitchFamily="49" charset="0"/>
                 <a:cs typeface="Courier New" panose="02070309020205020404" pitchFamily="49" charset="0"/>
               </a:rPr>
               <a:t>P</a:t>
             </a:r>
             <a:endParaRPr lang="en-US" sz="2000" dirty="0">
-              <a:latin typeface="Courier New" panose="02070309020205020404" pitchFamily="49" charset="0"/>
+              <a:latin typeface="Consolas" panose="020B0609020204030204" pitchFamily="49" charset="0"/>
               <a:cs typeface="Courier New" panose="02070309020205020404" pitchFamily="49" charset="0"/>
             </a:endParaRPr>
           </a:p>
@@ -4666,8 +4666,8 @@
         </p:nvSpPr>
         <p:spPr>
           <a:xfrm>
-            <a:off x="5497792" y="2742506"/>
-            <a:ext cx="1569660" cy="400110"/>
+            <a:off x="4893943" y="2575238"/>
+            <a:ext cx="1324402" cy="369332"/>
           </a:xfrm>
           <a:prstGeom prst="rect">
             <a:avLst/>
@@ -4680,14 +4680,14 @@
           <a:lstStyle/>
           <a:p>
             <a:r>
-              <a:rPr lang="en-US" sz="2000" dirty="0" err="1" smtClean="0">
-                <a:latin typeface="Courier New" panose="02070309020205020404" pitchFamily="49" charset="0"/>
+              <a:rPr lang="en-US" dirty="0" err="1" smtClean="0">
+                <a:latin typeface="Consolas" panose="020B0609020204030204" pitchFamily="49" charset="0"/>
                 <a:cs typeface="Courier New" panose="02070309020205020404" pitchFamily="49" charset="0"/>
               </a:rPr>
               <a:t>one_below</a:t>
             </a:r>
-            <a:endParaRPr lang="en-US" sz="2000" dirty="0">
-              <a:latin typeface="Courier New" panose="02070309020205020404" pitchFamily="49" charset="0"/>
+            <a:endParaRPr lang="en-US" dirty="0">
+              <a:latin typeface="Consolas" panose="020B0609020204030204" pitchFamily="49" charset="0"/>
               <a:cs typeface="Courier New" panose="02070309020205020404" pitchFamily="49" charset="0"/>
             </a:endParaRPr>
           </a:p>
@@ -4701,8 +4701,8 @@
         </p:nvSpPr>
         <p:spPr>
           <a:xfrm>
-            <a:off x="7154815" y="2831339"/>
-            <a:ext cx="1415772" cy="400110"/>
+            <a:off x="6550966" y="2664071"/>
+            <a:ext cx="1197764" cy="369332"/>
           </a:xfrm>
           <a:prstGeom prst="rect">
             <a:avLst/>
@@ -4715,14 +4715,14 @@
           <a:lstStyle/>
           <a:p>
             <a:r>
-              <a:rPr lang="en-US" sz="2000" dirty="0" smtClean="0">
-                <a:latin typeface="Courier New" panose="02070309020205020404" pitchFamily="49" charset="0"/>
+              <a:rPr lang="en-US" dirty="0" smtClean="0">
+                <a:latin typeface="Consolas" panose="020B0609020204030204" pitchFamily="49" charset="0"/>
                 <a:cs typeface="Courier New" panose="02070309020205020404" pitchFamily="49" charset="0"/>
               </a:rPr>
               <a:t>a2_below</a:t>
             </a:r>
-            <a:endParaRPr lang="en-US" sz="2000" dirty="0">
-              <a:latin typeface="Courier New" panose="02070309020205020404" pitchFamily="49" charset="0"/>
+            <a:endParaRPr lang="en-US" dirty="0">
+              <a:latin typeface="Consolas" panose="020B0609020204030204" pitchFamily="49" charset="0"/>
               <a:cs typeface="Courier New" panose="02070309020205020404" pitchFamily="49" charset="0"/>
             </a:endParaRPr>
           </a:p>
@@ -4736,8 +4736,8 @@
         </p:nvSpPr>
         <p:spPr>
           <a:xfrm>
-            <a:off x="3880599" y="3372623"/>
-            <a:ext cx="1415772" cy="400110"/>
+            <a:off x="3276750" y="3205355"/>
+            <a:ext cx="1197764" cy="369332"/>
           </a:xfrm>
           <a:prstGeom prst="rect">
             <a:avLst/>
@@ -4750,8 +4750,8 @@
           <a:lstStyle/>
           <a:p>
             <a:r>
-              <a:rPr lang="en-US" sz="2000" dirty="0">
-                <a:latin typeface="Courier New" panose="02070309020205020404" pitchFamily="49" charset="0"/>
+              <a:rPr lang="en-US" dirty="0">
+                <a:latin typeface="Consolas" panose="020B0609020204030204" pitchFamily="49" charset="0"/>
                 <a:cs typeface="Courier New" panose="02070309020205020404" pitchFamily="49" charset="0"/>
               </a:rPr>
               <a:t>a1_below</a:t>
@@ -4767,8 +4767,8 @@
         </p:nvSpPr>
         <p:spPr>
           <a:xfrm>
-            <a:off x="5722524" y="2312907"/>
-            <a:ext cx="1157044" cy="400110"/>
+            <a:off x="5118675" y="2145639"/>
+            <a:ext cx="1157044" cy="369332"/>
           </a:xfrm>
           <a:prstGeom prst="rect">
             <a:avLst/>
@@ -4781,14 +4781,14 @@
           <a:lstStyle/>
           <a:p>
             <a:r>
-              <a:rPr lang="en-US" sz="2000" dirty="0" err="1" smtClean="0">
-                <a:latin typeface="Courier New" panose="02070309020205020404" pitchFamily="49" charset="0"/>
+              <a:rPr lang="en-US" dirty="0" err="1" smtClean="0">
+                <a:latin typeface="Consolas" panose="020B0609020204030204" pitchFamily="49" charset="0"/>
                 <a:cs typeface="Courier New" panose="02070309020205020404" pitchFamily="49" charset="0"/>
               </a:rPr>
               <a:t>on_p</a:t>
             </a:r>
-            <a:endParaRPr lang="en-US" sz="2000" dirty="0">
-              <a:latin typeface="Courier New" panose="02070309020205020404" pitchFamily="49" charset="0"/>
+            <a:endParaRPr lang="en-US" dirty="0">
+              <a:latin typeface="Consolas" panose="020B0609020204030204" pitchFamily="49" charset="0"/>
               <a:cs typeface="Courier New" panose="02070309020205020404" pitchFamily="49" charset="0"/>
             </a:endParaRPr>
           </a:p>
@@ -4802,7 +4802,7 @@
         </p:nvSpPr>
         <p:spPr>
           <a:xfrm rot="16200000">
-            <a:off x="5885998" y="1268112"/>
+            <a:off x="5282149" y="1100844"/>
             <a:ext cx="1987141" cy="3528204"/>
           </a:xfrm>
           <a:prstGeom prst="ellipse">
@@ -4837,7 +4837,7 @@
           <a:p>
             <a:pPr algn="ctr"/>
             <a:endParaRPr lang="en-US" sz="1600">
-              <a:latin typeface="Courier New" panose="02070309020205020404" pitchFamily="49" charset="0"/>
+              <a:latin typeface="Consolas" panose="020B0609020204030204" pitchFamily="49" charset="0"/>
               <a:cs typeface="Courier New" panose="02070309020205020404" pitchFamily="49" charset="0"/>
             </a:endParaRPr>
           </a:p>
@@ -4851,7 +4851,7 @@
         </p:nvSpPr>
         <p:spPr>
           <a:xfrm rot="15327280">
-            <a:off x="4473940" y="1458009"/>
+            <a:off x="3870091" y="1290741"/>
             <a:ext cx="2058743" cy="3444776"/>
           </a:xfrm>
           <a:prstGeom prst="ellipse">
@@ -4886,7 +4886,7 @@
           <a:p>
             <a:pPr algn="ctr"/>
             <a:endParaRPr lang="en-US" sz="1600">
-              <a:latin typeface="Courier New" panose="02070309020205020404" pitchFamily="49" charset="0"/>
+              <a:latin typeface="Consolas" panose="020B0609020204030204" pitchFamily="49" charset="0"/>
               <a:cs typeface="Courier New" panose="02070309020205020404" pitchFamily="49" charset="0"/>
             </a:endParaRPr>
           </a:p>
@@ -4900,8 +4900,8 @@
         </p:nvSpPr>
         <p:spPr>
           <a:xfrm>
-            <a:off x="5601730" y="3273942"/>
-            <a:ext cx="1107996" cy="400110"/>
+            <a:off x="4997881" y="3106674"/>
+            <a:ext cx="944489" cy="369332"/>
           </a:xfrm>
           <a:prstGeom prst="rect">
             <a:avLst/>
@@ -4914,14 +4914,14 @@
           <a:lstStyle/>
           <a:p>
             <a:r>
-              <a:rPr lang="en-US" sz="2000" dirty="0" smtClean="0">
-                <a:latin typeface="Courier New" panose="02070309020205020404" pitchFamily="49" charset="0"/>
+              <a:rPr lang="en-US" dirty="0" smtClean="0">
+                <a:latin typeface="Consolas" panose="020B0609020204030204" pitchFamily="49" charset="0"/>
                 <a:cs typeface="Courier New" panose="02070309020205020404" pitchFamily="49" charset="0"/>
               </a:rPr>
               <a:t>doi_on</a:t>
             </a:r>
-            <a:endParaRPr lang="en-US" sz="2000" dirty="0">
-              <a:latin typeface="Courier New" panose="02070309020205020404" pitchFamily="49" charset="0"/>
+            <a:endParaRPr lang="en-US" dirty="0">
+              <a:latin typeface="Consolas" panose="020B0609020204030204" pitchFamily="49" charset="0"/>
               <a:cs typeface="Courier New" panose="02070309020205020404" pitchFamily="49" charset="0"/>
             </a:endParaRPr>
           </a:p>
@@ -4930,15 +4930,13 @@
       <p:cxnSp>
         <p:nvCxnSpPr>
           <p:cNvPr id="18" name="Straight Arrow Connector 17"/>
-          <p:cNvCxnSpPr>
-            <a:endCxn id="6" idx="0"/>
-          </p:cNvCxnSpPr>
+          <p:cNvCxnSpPr/>
           <p:nvPr/>
         </p:nvCxnSpPr>
         <p:spPr>
           <a:xfrm>
-            <a:off x="5030699" y="4294353"/>
-            <a:ext cx="991014" cy="649373"/>
+            <a:off x="3578727" y="3908210"/>
+            <a:ext cx="42734" cy="1447817"/>
           </a:xfrm>
           <a:prstGeom prst="straightConnector1">
             <a:avLst/>
@@ -4969,16 +4967,13 @@
       <p:cxnSp>
         <p:nvCxnSpPr>
           <p:cNvPr id="19" name="Straight Arrow Connector 18"/>
-          <p:cNvCxnSpPr>
-            <a:stCxn id="6" idx="0"/>
-            <a:endCxn id="14" idx="2"/>
-          </p:cNvCxnSpPr>
+          <p:cNvCxnSpPr/>
           <p:nvPr/>
         </p:nvCxnSpPr>
         <p:spPr>
           <a:xfrm flipV="1">
-            <a:off x="6021713" y="4025785"/>
-            <a:ext cx="801086" cy="917941"/>
+            <a:off x="3614468" y="3872471"/>
+            <a:ext cx="2380890" cy="1475906"/>
           </a:xfrm>
           <a:prstGeom prst="straightConnector1">
             <a:avLst/>
@@ -5014,8 +5009,8 @@
         </p:nvSpPr>
         <p:spPr>
           <a:xfrm>
-            <a:off x="3183147" y="1564427"/>
-            <a:ext cx="5719313" cy="3878841"/>
+            <a:off x="2191109" y="1155941"/>
+            <a:ext cx="7608499" cy="4502988"/>
           </a:xfrm>
           <a:prstGeom prst="rect">
             <a:avLst/>
@@ -5049,7 +5044,7 @@
           <a:p>
             <a:pPr algn="ctr"/>
             <a:endParaRPr lang="en-US" sz="1600">
-              <a:latin typeface="Courier New" panose="02070309020205020404" pitchFamily="49" charset="0"/>
+              <a:latin typeface="Consolas" panose="020B0609020204030204" pitchFamily="49" charset="0"/>
               <a:cs typeface="Courier New" panose="02070309020205020404" pitchFamily="49" charset="0"/>
             </a:endParaRPr>
           </a:p>
@@ -5063,8 +5058,8 @@
         </p:nvSpPr>
         <p:spPr>
           <a:xfrm>
-            <a:off x="3324647" y="2492785"/>
-            <a:ext cx="925253" cy="338554"/>
+            <a:off x="2570896" y="1729632"/>
+            <a:ext cx="857927" cy="338554"/>
           </a:xfrm>
           <a:prstGeom prst="rect">
             <a:avLst/>
@@ -5077,14 +5072,20 @@
           <a:lstStyle/>
           <a:p>
             <a:r>
-              <a:rPr lang="en-US" sz="1600" dirty="0" smtClean="0">
-                <a:latin typeface="Courier New" panose="02070309020205020404" pitchFamily="49" charset="0"/>
+              <a:rPr lang="en-US" sz="1600" b="1" dirty="0" smtClean="0">
+                <a:solidFill>
+                  <a:srgbClr val="993366"/>
+                </a:solidFill>
+                <a:latin typeface="Consolas" panose="020B0609020204030204" pitchFamily="49" charset="0"/>
                 <a:cs typeface="Courier New" panose="02070309020205020404" pitchFamily="49" charset="0"/>
               </a:rPr>
               <a:t>MIVC#1</a:t>
             </a:r>
-            <a:endParaRPr lang="en-US" sz="1600" dirty="0">
-              <a:latin typeface="Courier New" panose="02070309020205020404" pitchFamily="49" charset="0"/>
+            <a:endParaRPr lang="en-US" sz="1600" b="1" dirty="0">
+              <a:solidFill>
+                <a:srgbClr val="993366"/>
+              </a:solidFill>
+              <a:latin typeface="Consolas" panose="020B0609020204030204" pitchFamily="49" charset="0"/>
               <a:cs typeface="Courier New" panose="02070309020205020404" pitchFamily="49" charset="0"/>
             </a:endParaRPr>
           </a:p>
@@ -5098,8 +5099,8 @@
         </p:nvSpPr>
         <p:spPr>
           <a:xfrm>
-            <a:off x="7573718" y="1846652"/>
-            <a:ext cx="925253" cy="338554"/>
+            <a:off x="8651837" y="1431984"/>
+            <a:ext cx="857927" cy="338554"/>
           </a:xfrm>
           <a:prstGeom prst="rect">
             <a:avLst/>
@@ -5112,26 +5113,284 @@
           <a:lstStyle/>
           <a:p>
             <a:r>
-              <a:rPr lang="en-US" sz="1600" dirty="0">
-                <a:latin typeface="Courier New" panose="02070309020205020404" pitchFamily="49" charset="0"/>
+              <a:rPr lang="en-US" sz="1600" b="1" dirty="0">
+                <a:solidFill>
+                  <a:srgbClr val="993366"/>
+                </a:solidFill>
+                <a:latin typeface="Consolas" panose="020B0609020204030204" pitchFamily="49" charset="0"/>
                 <a:cs typeface="Courier New" panose="02070309020205020404" pitchFamily="49" charset="0"/>
               </a:rPr>
               <a:t>M</a:t>
             </a:r>
             <a:r>
-              <a:rPr lang="en-US" sz="1600" dirty="0" smtClean="0">
-                <a:latin typeface="Courier New" panose="02070309020205020404" pitchFamily="49" charset="0"/>
+              <a:rPr lang="en-US" sz="1600" b="1" dirty="0" smtClean="0">
+                <a:solidFill>
+                  <a:srgbClr val="993366"/>
+                </a:solidFill>
+                <a:latin typeface="Consolas" panose="020B0609020204030204" pitchFamily="49" charset="0"/>
                 <a:cs typeface="Courier New" panose="02070309020205020404" pitchFamily="49" charset="0"/>
               </a:rPr>
               <a:t>IVC#2</a:t>
             </a:r>
-            <a:endParaRPr lang="en-US" sz="1600" dirty="0">
-              <a:latin typeface="Courier New" panose="02070309020205020404" pitchFamily="49" charset="0"/>
+            <a:endParaRPr lang="en-US" sz="1600" b="1" dirty="0">
+              <a:solidFill>
+                <a:srgbClr val="993366"/>
+              </a:solidFill>
+              <a:latin typeface="Consolas" panose="020B0609020204030204" pitchFamily="49" charset="0"/>
               <a:cs typeface="Courier New" panose="02070309020205020404" pitchFamily="49" charset="0"/>
             </a:endParaRPr>
           </a:p>
         </p:txBody>
       </p:sp>
+      <p:sp>
+        <p:nvSpPr>
+          <p:cNvPr id="15" name="Rectangle 14"/>
+          <p:cNvSpPr/>
+          <p:nvPr/>
+        </p:nvSpPr>
+        <p:spPr>
+          <a:xfrm>
+            <a:off x="7624108" y="3408827"/>
+            <a:ext cx="1197764" cy="369332"/>
+          </a:xfrm>
+          <a:prstGeom prst="rect">
+            <a:avLst/>
+          </a:prstGeom>
+        </p:spPr>
+        <p:txBody>
+          <a:bodyPr wrap="none">
+            <a:spAutoFit/>
+          </a:bodyPr>
+          <a:lstStyle/>
+          <a:p>
+            <a:r>
+              <a:rPr lang="en-US" dirty="0" smtClean="0">
+                <a:latin typeface="Consolas" panose="020B0609020204030204" pitchFamily="49" charset="0"/>
+                <a:cs typeface="Courier New" panose="02070309020205020404" pitchFamily="49" charset="0"/>
+              </a:rPr>
+              <a:t>a1_above</a:t>
+            </a:r>
+            <a:endParaRPr lang="en-US" dirty="0">
+              <a:latin typeface="Consolas" panose="020B0609020204030204" pitchFamily="49" charset="0"/>
+              <a:cs typeface="Courier New" panose="02070309020205020404" pitchFamily="49" charset="0"/>
+            </a:endParaRPr>
+          </a:p>
+        </p:txBody>
+      </p:sp>
+      <p:sp>
+        <p:nvSpPr>
+          <p:cNvPr id="21" name="Rectangle 20"/>
+          <p:cNvSpPr/>
+          <p:nvPr/>
+        </p:nvSpPr>
+        <p:spPr>
+          <a:xfrm>
+            <a:off x="7275915" y="3908210"/>
+            <a:ext cx="1197764" cy="369332"/>
+          </a:xfrm>
+          <a:prstGeom prst="rect">
+            <a:avLst/>
+          </a:prstGeom>
+        </p:spPr>
+        <p:txBody>
+          <a:bodyPr wrap="none">
+            <a:spAutoFit/>
+          </a:bodyPr>
+          <a:lstStyle/>
+          <a:p>
+            <a:r>
+              <a:rPr lang="en-US" dirty="0" smtClean="0">
+                <a:latin typeface="Consolas" panose="020B0609020204030204" pitchFamily="49" charset="0"/>
+                <a:cs typeface="Courier New" panose="02070309020205020404" pitchFamily="49" charset="0"/>
+              </a:rPr>
+              <a:t>a2</a:t>
+            </a:r>
+            <a:r>
+              <a:rPr lang="en-US" dirty="0" smtClean="0">
+                <a:latin typeface="Consolas" panose="020B0609020204030204" pitchFamily="49" charset="0"/>
+                <a:cs typeface="Courier New" panose="02070309020205020404" pitchFamily="49" charset="0"/>
+              </a:rPr>
+              <a:t>_above</a:t>
+            </a:r>
+            <a:endParaRPr lang="en-US" dirty="0">
+              <a:latin typeface="Consolas" panose="020B0609020204030204" pitchFamily="49" charset="0"/>
+              <a:cs typeface="Courier New" panose="02070309020205020404" pitchFamily="49" charset="0"/>
+            </a:endParaRPr>
+          </a:p>
+        </p:txBody>
+      </p:sp>
+      <p:sp>
+        <p:nvSpPr>
+          <p:cNvPr id="22" name="Rectangle 21"/>
+          <p:cNvSpPr/>
+          <p:nvPr/>
+        </p:nvSpPr>
+        <p:spPr>
+          <a:xfrm>
+            <a:off x="5873014" y="4209159"/>
+            <a:ext cx="1451038" cy="369332"/>
+          </a:xfrm>
+          <a:prstGeom prst="rect">
+            <a:avLst/>
+          </a:prstGeom>
+        </p:spPr>
+        <p:txBody>
+          <a:bodyPr wrap="none">
+            <a:spAutoFit/>
+          </a:bodyPr>
+          <a:lstStyle/>
+          <a:p>
+            <a:r>
+              <a:rPr lang="en-US" dirty="0" err="1" smtClean="0">
+                <a:latin typeface="Consolas" panose="020B0609020204030204" pitchFamily="49" charset="0"/>
+                <a:cs typeface="Courier New" panose="02070309020205020404" pitchFamily="49" charset="0"/>
+              </a:rPr>
+              <a:t>both</a:t>
+            </a:r>
+            <a:r>
+              <a:rPr lang="en-US" dirty="0" err="1" smtClean="0">
+                <a:latin typeface="Consolas" panose="020B0609020204030204" pitchFamily="49" charset="0"/>
+                <a:cs typeface="Courier New" panose="02070309020205020404" pitchFamily="49" charset="0"/>
+              </a:rPr>
+              <a:t>_above</a:t>
+            </a:r>
+            <a:endParaRPr lang="en-US" dirty="0">
+              <a:latin typeface="Consolas" panose="020B0609020204030204" pitchFamily="49" charset="0"/>
+              <a:cs typeface="Courier New" panose="02070309020205020404" pitchFamily="49" charset="0"/>
+            </a:endParaRPr>
+          </a:p>
+        </p:txBody>
+      </p:sp>
+      <p:sp>
+        <p:nvSpPr>
+          <p:cNvPr id="25" name="Oval 24"/>
+          <p:cNvSpPr/>
+          <p:nvPr/>
+        </p:nvSpPr>
+        <p:spPr>
+          <a:xfrm rot="16200000">
+            <a:off x="4245761" y="76302"/>
+            <a:ext cx="3585691" cy="6297058"/>
+          </a:xfrm>
+          <a:prstGeom prst="ellipse">
+            <a:avLst/>
+          </a:prstGeom>
+          <a:noFill/>
+          <a:ln w="9525">
+            <a:solidFill>
+              <a:schemeClr val="tx1"/>
+            </a:solidFill>
+            <a:prstDash val="dash"/>
+          </a:ln>
+        </p:spPr>
+        <p:style>
+          <a:lnRef idx="2">
+            <a:schemeClr val="accent1">
+              <a:shade val="50000"/>
+            </a:schemeClr>
+          </a:lnRef>
+          <a:fillRef idx="1">
+            <a:schemeClr val="accent1"/>
+          </a:fillRef>
+          <a:effectRef idx="0">
+            <a:schemeClr val="accent1"/>
+          </a:effectRef>
+          <a:fontRef idx="minor">
+            <a:schemeClr val="lt1"/>
+          </a:fontRef>
+        </p:style>
+        <p:txBody>
+          <a:bodyPr rtlCol="0" anchor="ctr"/>
+          <a:lstStyle/>
+          <a:p>
+            <a:pPr algn="ctr"/>
+            <a:endParaRPr lang="en-US" sz="1600">
+              <a:latin typeface="Consolas" panose="020B0609020204030204" pitchFamily="49" charset="0"/>
+              <a:cs typeface="Courier New" panose="02070309020205020404" pitchFamily="49" charset="0"/>
+            </a:endParaRPr>
+          </a:p>
+        </p:txBody>
+      </p:sp>
+      <p:cxnSp>
+        <p:nvCxnSpPr>
+          <p:cNvPr id="28" name="Straight Arrow Connector 27"/>
+          <p:cNvCxnSpPr>
+            <a:stCxn id="16" idx="7"/>
+          </p:cNvCxnSpPr>
+          <p:nvPr/>
+        </p:nvCxnSpPr>
+        <p:spPr>
+          <a:xfrm flipH="1" flipV="1">
+            <a:off x="2936652" y="2145639"/>
+            <a:ext cx="601131" cy="468817"/>
+          </a:xfrm>
+          <a:prstGeom prst="straightConnector1">
+            <a:avLst/>
+          </a:prstGeom>
+          <a:ln w="19050">
+            <a:solidFill>
+              <a:srgbClr val="993366"/>
+            </a:solidFill>
+            <a:prstDash val="dash"/>
+            <a:headEnd type="arrow" w="med" len="med"/>
+            <a:tailEnd type="none" w="med" len="med"/>
+          </a:ln>
+        </p:spPr>
+        <p:style>
+          <a:lnRef idx="1">
+            <a:schemeClr val="accent1"/>
+          </a:lnRef>
+          <a:fillRef idx="0">
+            <a:schemeClr val="accent1"/>
+          </a:fillRef>
+          <a:effectRef idx="0">
+            <a:schemeClr val="accent1"/>
+          </a:effectRef>
+          <a:fontRef idx="minor">
+            <a:schemeClr val="tx1"/>
+          </a:fontRef>
+        </p:style>
+      </p:cxnSp>
+      <p:cxnSp>
+        <p:nvCxnSpPr>
+          <p:cNvPr id="30" name="Straight Arrow Connector 29"/>
+          <p:cNvCxnSpPr>
+            <a:stCxn id="14" idx="5"/>
+          </p:cNvCxnSpPr>
+          <p:nvPr/>
+        </p:nvCxnSpPr>
+        <p:spPr>
+          <a:xfrm flipV="1">
+            <a:off x="7523128" y="1770538"/>
+            <a:ext cx="1298744" cy="391848"/>
+          </a:xfrm>
+          <a:prstGeom prst="straightConnector1">
+            <a:avLst/>
+          </a:prstGeom>
+          <a:ln w="19050">
+            <a:solidFill>
+              <a:srgbClr val="993366"/>
+            </a:solidFill>
+            <a:prstDash val="dash"/>
+            <a:headEnd type="arrow" w="med" len="med"/>
+            <a:tailEnd type="none" w="med" len="med"/>
+          </a:ln>
+        </p:spPr>
+        <p:style>
+          <a:lnRef idx="1">
+            <a:schemeClr val="accent1"/>
+          </a:lnRef>
+          <a:fillRef idx="0">
+            <a:schemeClr val="accent1"/>
+          </a:fillRef>
+          <a:effectRef idx="0">
+            <a:schemeClr val="accent1"/>
+          </a:effectRef>
+          <a:fontRef idx="minor">
+            <a:schemeClr val="tx1"/>
+          </a:fontRef>
+        </p:style>
+      </p:cxnSp>
     </p:spTree>
     <p:extLst>
       <p:ext uri="{BB962C8B-B14F-4D97-AF65-F5344CB8AC3E}">
@@ -5284,13 +5543,6 @@
               </a:rPr>
               <a:t>, </a:t>
             </a:r>
-            <a:endParaRPr lang="en-US" sz="1800" b="1" dirty="0" smtClean="0">
-              <a:solidFill>
-                <a:srgbClr val="993366"/>
-              </a:solidFill>
-              <a:latin typeface="Consolas" panose="020B0609020204030204" pitchFamily="49" charset="0"/>
-              <a:cs typeface="Courier New" panose="02070309020205020404" pitchFamily="49" charset="0"/>
-            </a:endParaRPr>
           </a:p>
           <a:p>
             <a:pPr marL="0" indent="0">

</xml_diff>

<commit_message>
fixed timeout for ucbf n must
</commit_message>
<xml_diff>
--- a/all_ivcs/all_ivcs_TEX/figs/figs.pptx
+++ b/all_ivcs/all_ivcs_TEX/figs/figs.pptx
@@ -14,12 +14,8 @@
     <p:sldId id="259" r:id="rId8"/>
     <p:sldId id="262" r:id="rId9"/>
     <p:sldId id="264" r:id="rId10"/>
-    <p:sldId id="263" r:id="rId11"/>
-    <p:sldId id="265" r:id="rId12"/>
-    <p:sldId id="266" r:id="rId13"/>
-    <p:sldId id="267" r:id="rId14"/>
-    <p:sldId id="268" r:id="rId15"/>
-    <p:sldId id="269" r:id="rId16"/>
+    <p:sldId id="266" r:id="rId11"/>
+    <p:sldId id="269" r:id="rId12"/>
   </p:sldIdLst>
   <p:sldSz cx="12192000" cy="6858000"/>
   <p:notesSz cx="6858000" cy="9144000"/>
@@ -257,7 +253,7 @@
           <a:p>
             <a:fld id="{5A779009-EA30-43A9-A43B-F006CC3D9B84}" type="datetimeFigureOut">
               <a:rPr lang="en-US" smtClean="0"/>
-              <a:t>5/9/2017</a:t>
+              <a:t>5/10/2017</a:t>
             </a:fld>
             <a:endParaRPr lang="en-US"/>
           </a:p>
@@ -427,7 +423,7 @@
           <a:p>
             <a:fld id="{5A779009-EA30-43A9-A43B-F006CC3D9B84}" type="datetimeFigureOut">
               <a:rPr lang="en-US" smtClean="0"/>
-              <a:t>5/9/2017</a:t>
+              <a:t>5/10/2017</a:t>
             </a:fld>
             <a:endParaRPr lang="en-US"/>
           </a:p>
@@ -607,7 +603,7 @@
           <a:p>
             <a:fld id="{5A779009-EA30-43A9-A43B-F006CC3D9B84}" type="datetimeFigureOut">
               <a:rPr lang="en-US" smtClean="0"/>
-              <a:t>5/9/2017</a:t>
+              <a:t>5/10/2017</a:t>
             </a:fld>
             <a:endParaRPr lang="en-US"/>
           </a:p>
@@ -777,7 +773,7 @@
           <a:p>
             <a:fld id="{5A779009-EA30-43A9-A43B-F006CC3D9B84}" type="datetimeFigureOut">
               <a:rPr lang="en-US" smtClean="0"/>
-              <a:t>5/9/2017</a:t>
+              <a:t>5/10/2017</a:t>
             </a:fld>
             <a:endParaRPr lang="en-US"/>
           </a:p>
@@ -1023,7 +1019,7 @@
           <a:p>
             <a:fld id="{5A779009-EA30-43A9-A43B-F006CC3D9B84}" type="datetimeFigureOut">
               <a:rPr lang="en-US" smtClean="0"/>
-              <a:t>5/9/2017</a:t>
+              <a:t>5/10/2017</a:t>
             </a:fld>
             <a:endParaRPr lang="en-US"/>
           </a:p>
@@ -1255,7 +1251,7 @@
           <a:p>
             <a:fld id="{5A779009-EA30-43A9-A43B-F006CC3D9B84}" type="datetimeFigureOut">
               <a:rPr lang="en-US" smtClean="0"/>
-              <a:t>5/9/2017</a:t>
+              <a:t>5/10/2017</a:t>
             </a:fld>
             <a:endParaRPr lang="en-US"/>
           </a:p>
@@ -1622,7 +1618,7 @@
           <a:p>
             <a:fld id="{5A779009-EA30-43A9-A43B-F006CC3D9B84}" type="datetimeFigureOut">
               <a:rPr lang="en-US" smtClean="0"/>
-              <a:t>5/9/2017</a:t>
+              <a:t>5/10/2017</a:t>
             </a:fld>
             <a:endParaRPr lang="en-US"/>
           </a:p>
@@ -1740,7 +1736,7 @@
           <a:p>
             <a:fld id="{5A779009-EA30-43A9-A43B-F006CC3D9B84}" type="datetimeFigureOut">
               <a:rPr lang="en-US" smtClean="0"/>
-              <a:t>5/9/2017</a:t>
+              <a:t>5/10/2017</a:t>
             </a:fld>
             <a:endParaRPr lang="en-US"/>
           </a:p>
@@ -1835,7 +1831,7 @@
           <a:p>
             <a:fld id="{5A779009-EA30-43A9-A43B-F006CC3D9B84}" type="datetimeFigureOut">
               <a:rPr lang="en-US" smtClean="0"/>
-              <a:t>5/9/2017</a:t>
+              <a:t>5/10/2017</a:t>
             </a:fld>
             <a:endParaRPr lang="en-US"/>
           </a:p>
@@ -2112,7 +2108,7 @@
           <a:p>
             <a:fld id="{5A779009-EA30-43A9-A43B-F006CC3D9B84}" type="datetimeFigureOut">
               <a:rPr lang="en-US" smtClean="0"/>
-              <a:t>5/9/2017</a:t>
+              <a:t>5/10/2017</a:t>
             </a:fld>
             <a:endParaRPr lang="en-US"/>
           </a:p>
@@ -2365,7 +2361,7 @@
           <a:p>
             <a:fld id="{5A779009-EA30-43A9-A43B-F006CC3D9B84}" type="datetimeFigureOut">
               <a:rPr lang="en-US" smtClean="0"/>
-              <a:t>5/9/2017</a:t>
+              <a:t>5/10/2017</a:t>
             </a:fld>
             <a:endParaRPr lang="en-US"/>
           </a:p>
@@ -2578,7 +2574,7 @@
           <a:p>
             <a:fld id="{5A779009-EA30-43A9-A43B-F006CC3D9B84}" type="datetimeFigureOut">
               <a:rPr lang="en-US" smtClean="0"/>
-              <a:t>5/9/2017</a:t>
+              <a:t>5/10/2017</a:t>
             </a:fld>
             <a:endParaRPr lang="en-US"/>
           </a:p>
@@ -3051,375 +3047,6 @@
           <a:chExt cx="0" cy="0"/>
         </a:xfrm>
       </p:grpSpPr>
-      <p:sp>
-        <p:nvSpPr>
-          <p:cNvPr id="3" name="Content Placeholder 2"/>
-          <p:cNvSpPr>
-            <a:spLocks noGrp="1"/>
-          </p:cNvSpPr>
-          <p:nvPr>
-            <p:ph idx="1"/>
-          </p:nvPr>
-        </p:nvSpPr>
-        <p:spPr/>
-        <p:txBody>
-          <a:bodyPr/>
-          <a:lstStyle/>
-          <a:p>
-            <a:endParaRPr lang="en-US"/>
-          </a:p>
-        </p:txBody>
-      </p:sp>
-      <p:pic>
-        <p:nvPicPr>
-          <p:cNvPr id="4" name="Picture 3"/>
-          <p:cNvPicPr>
-            <a:picLocks noChangeAspect="1"/>
-          </p:cNvPicPr>
-          <p:nvPr/>
-        </p:nvPicPr>
-        <p:blipFill rotWithShape="1">
-          <a:blip r:embed="rId2">
-            <a:extLst>
-              <a:ext uri="{28A0092B-C50C-407E-A947-70E740481C1C}">
-                <a14:useLocalDpi xmlns:a14="http://schemas.microsoft.com/office/drawing/2010/main" val="0"/>
-              </a:ext>
-            </a:extLst>
-          </a:blip>
-          <a:srcRect l="2284" r="1866" b="2631"/>
-          <a:stretch/>
-        </p:blipFill>
-        <p:spPr>
-          <a:xfrm>
-            <a:off x="244549" y="988828"/>
-            <a:ext cx="11419367" cy="5709684"/>
-          </a:xfrm>
-          <a:prstGeom prst="rect">
-            <a:avLst/>
-          </a:prstGeom>
-        </p:spPr>
-      </p:pic>
-      <p:pic>
-        <p:nvPicPr>
-          <p:cNvPr id="5" name="Picture 4"/>
-          <p:cNvPicPr>
-            <a:picLocks noChangeAspect="1"/>
-          </p:cNvPicPr>
-          <p:nvPr/>
-        </p:nvPicPr>
-        <p:blipFill>
-          <a:blip r:embed="rId3"/>
-          <a:stretch>
-            <a:fillRect/>
-          </a:stretch>
-        </p:blipFill>
-        <p:spPr>
-          <a:xfrm>
-            <a:off x="700011" y="1040273"/>
-            <a:ext cx="5094733" cy="1617867"/>
-          </a:xfrm>
-          <a:prstGeom prst="rect">
-            <a:avLst/>
-          </a:prstGeom>
-        </p:spPr>
-      </p:pic>
-      <p:sp>
-        <p:nvSpPr>
-          <p:cNvPr id="6" name="Rectangle 5"/>
-          <p:cNvSpPr/>
-          <p:nvPr/>
-        </p:nvSpPr>
-        <p:spPr>
-          <a:xfrm rot="16200000">
-            <a:off x="10520089" y="3593125"/>
-            <a:ext cx="816249" cy="307777"/>
-          </a:xfrm>
-          <a:prstGeom prst="rect">
-            <a:avLst/>
-          </a:prstGeom>
-          <a:solidFill>
-            <a:schemeClr val="bg1"/>
-          </a:solidFill>
-        </p:spPr>
-        <p:txBody>
-          <a:bodyPr wrap="none">
-            <a:spAutoFit/>
-          </a:bodyPr>
-          <a:lstStyle/>
-          <a:p>
-            <a:r>
-              <a:rPr lang="en-US" sz="1400" dirty="0" smtClean="0"/>
-              <a:t>#of  IVCs</a:t>
-            </a:r>
-            <a:endParaRPr lang="en-US" sz="1400" dirty="0"/>
-          </a:p>
-        </p:txBody>
-      </p:sp>
-      <p:sp>
-        <p:nvSpPr>
-          <p:cNvPr id="7" name="Rectangle 6"/>
-          <p:cNvSpPr/>
-          <p:nvPr/>
-        </p:nvSpPr>
-        <p:spPr>
-          <a:xfrm>
-            <a:off x="5462086" y="6550223"/>
-            <a:ext cx="729687" cy="307777"/>
-          </a:xfrm>
-          <a:prstGeom prst="rect">
-            <a:avLst/>
-          </a:prstGeom>
-          <a:noFill/>
-        </p:spPr>
-        <p:txBody>
-          <a:bodyPr wrap="none">
-            <a:spAutoFit/>
-          </a:bodyPr>
-          <a:lstStyle/>
-          <a:p>
-            <a:r>
-              <a:rPr lang="en-US" sz="1400" dirty="0" smtClean="0"/>
-              <a:t>Models</a:t>
-            </a:r>
-            <a:endParaRPr lang="en-US" sz="1400" dirty="0"/>
-          </a:p>
-        </p:txBody>
-      </p:sp>
-      <p:sp>
-        <p:nvSpPr>
-          <p:cNvPr id="8" name="Rectangle 7"/>
-          <p:cNvSpPr/>
-          <p:nvPr/>
-        </p:nvSpPr>
-        <p:spPr>
-          <a:xfrm rot="16200000">
-            <a:off x="-504182" y="3593124"/>
-            <a:ext cx="1189685" cy="307777"/>
-          </a:xfrm>
-          <a:prstGeom prst="rect">
-            <a:avLst/>
-          </a:prstGeom>
-          <a:noFill/>
-        </p:spPr>
-        <p:txBody>
-          <a:bodyPr wrap="none">
-            <a:spAutoFit/>
-          </a:bodyPr>
-          <a:lstStyle/>
-          <a:p>
-            <a:r>
-              <a:rPr lang="en-US" sz="1400" dirty="0" smtClean="0"/>
-              <a:t>Runtime (sec)</a:t>
-            </a:r>
-            <a:endParaRPr lang="en-US" sz="1400" dirty="0"/>
-          </a:p>
-        </p:txBody>
-      </p:sp>
-      <p:sp>
-        <p:nvSpPr>
-          <p:cNvPr id="9" name="Rectangle 8"/>
-          <p:cNvSpPr/>
-          <p:nvPr/>
-        </p:nvSpPr>
-        <p:spPr>
-          <a:xfrm rot="16200000">
-            <a:off x="11033113" y="4187966"/>
-            <a:ext cx="1225528" cy="307777"/>
-          </a:xfrm>
-          <a:prstGeom prst="rect">
-            <a:avLst/>
-          </a:prstGeom>
-          <a:solidFill>
-            <a:schemeClr val="bg1"/>
-          </a:solidFill>
-        </p:spPr>
-        <p:txBody>
-          <a:bodyPr wrap="none">
-            <a:spAutoFit/>
-          </a:bodyPr>
-          <a:lstStyle/>
-          <a:p>
-            <a:r>
-              <a:rPr lang="en-US" sz="1400" dirty="0" smtClean="0"/>
-              <a:t>#of  Equations</a:t>
-            </a:r>
-            <a:endParaRPr lang="en-US" sz="1400" dirty="0"/>
-          </a:p>
-        </p:txBody>
-      </p:sp>
-    </p:spTree>
-    <p:extLst>
-      <p:ext uri="{BB962C8B-B14F-4D97-AF65-F5344CB8AC3E}">
-        <p14:creationId xmlns:p14="http://schemas.microsoft.com/office/powerpoint/2010/main" val="3258950361"/>
-      </p:ext>
-    </p:extLst>
-  </p:cSld>
-  <p:clrMapOvr>
-    <a:masterClrMapping/>
-  </p:clrMapOvr>
-</p:sld>
-</file>
-
-<file path=ppt/slides/slide11.xml><?xml version="1.0" encoding="utf-8"?>
-<p:sld xmlns:a="http://schemas.openxmlformats.org/drawingml/2006/main" xmlns:r="http://schemas.openxmlformats.org/officeDocument/2006/relationships" xmlns:p="http://schemas.openxmlformats.org/presentationml/2006/main">
-  <p:cSld>
-    <p:spTree>
-      <p:nvGrpSpPr>
-        <p:cNvPr id="1" name=""/>
-        <p:cNvGrpSpPr/>
-        <p:nvPr/>
-      </p:nvGrpSpPr>
-      <p:grpSpPr>
-        <a:xfrm>
-          <a:off x="0" y="0"/>
-          <a:ext cx="0" cy="0"/>
-          <a:chOff x="0" y="0"/>
-          <a:chExt cx="0" cy="0"/>
-        </a:xfrm>
-      </p:grpSpPr>
-      <p:pic>
-        <p:nvPicPr>
-          <p:cNvPr id="4" name="Picture 3"/>
-          <p:cNvPicPr>
-            <a:picLocks noChangeAspect="1"/>
-          </p:cNvPicPr>
-          <p:nvPr/>
-        </p:nvPicPr>
-        <p:blipFill rotWithShape="1">
-          <a:blip r:embed="rId2">
-            <a:extLst>
-              <a:ext uri="{28A0092B-C50C-407E-A947-70E740481C1C}">
-                <a14:useLocalDpi xmlns:a14="http://schemas.microsoft.com/office/drawing/2010/main" val="0"/>
-              </a:ext>
-            </a:extLst>
-          </a:blip>
-          <a:srcRect l="2078" t="3817" b="3055"/>
-          <a:stretch/>
-        </p:blipFill>
-        <p:spPr>
-          <a:xfrm>
-            <a:off x="308342" y="361507"/>
-            <a:ext cx="11344941" cy="6071191"/>
-          </a:xfrm>
-          <a:prstGeom prst="rect">
-            <a:avLst/>
-          </a:prstGeom>
-        </p:spPr>
-      </p:pic>
-      <p:sp>
-        <p:nvSpPr>
-          <p:cNvPr id="5" name="Rectangle 4"/>
-          <p:cNvSpPr/>
-          <p:nvPr/>
-        </p:nvSpPr>
-        <p:spPr>
-          <a:xfrm>
-            <a:off x="5866124" y="6432698"/>
-            <a:ext cx="729687" cy="307777"/>
-          </a:xfrm>
-          <a:prstGeom prst="rect">
-            <a:avLst/>
-          </a:prstGeom>
-          <a:noFill/>
-        </p:spPr>
-        <p:txBody>
-          <a:bodyPr wrap="none">
-            <a:spAutoFit/>
-          </a:bodyPr>
-          <a:lstStyle/>
-          <a:p>
-            <a:r>
-              <a:rPr lang="en-US" sz="1400" dirty="0" smtClean="0"/>
-              <a:t>Models</a:t>
-            </a:r>
-            <a:endParaRPr lang="en-US" sz="1400" dirty="0"/>
-          </a:p>
-        </p:txBody>
-      </p:sp>
-      <p:sp>
-        <p:nvSpPr>
-          <p:cNvPr id="6" name="Rectangle 5"/>
-          <p:cNvSpPr/>
-          <p:nvPr/>
-        </p:nvSpPr>
-        <p:spPr>
-          <a:xfrm rot="16200000">
-            <a:off x="-440954" y="3135924"/>
-            <a:ext cx="1189685" cy="307777"/>
-          </a:xfrm>
-          <a:prstGeom prst="rect">
-            <a:avLst/>
-          </a:prstGeom>
-          <a:noFill/>
-        </p:spPr>
-        <p:txBody>
-          <a:bodyPr wrap="none">
-            <a:spAutoFit/>
-          </a:bodyPr>
-          <a:lstStyle/>
-          <a:p>
-            <a:r>
-              <a:rPr lang="en-US" sz="1400" dirty="0" smtClean="0"/>
-              <a:t>Runtime (sec)</a:t>
-            </a:r>
-            <a:endParaRPr lang="en-US" sz="1400" dirty="0"/>
-          </a:p>
-        </p:txBody>
-      </p:sp>
-      <p:pic>
-        <p:nvPicPr>
-          <p:cNvPr id="7" name="Picture 6"/>
-          <p:cNvPicPr>
-            <a:picLocks noChangeAspect="1"/>
-          </p:cNvPicPr>
-          <p:nvPr/>
-        </p:nvPicPr>
-        <p:blipFill>
-          <a:blip r:embed="rId3"/>
-          <a:stretch>
-            <a:fillRect/>
-          </a:stretch>
-        </p:blipFill>
-        <p:spPr>
-          <a:xfrm>
-            <a:off x="826145" y="478466"/>
-            <a:ext cx="5756348" cy="1467292"/>
-          </a:xfrm>
-          <a:prstGeom prst="rect">
-            <a:avLst/>
-          </a:prstGeom>
-        </p:spPr>
-      </p:pic>
-    </p:spTree>
-    <p:extLst>
-      <p:ext uri="{BB962C8B-B14F-4D97-AF65-F5344CB8AC3E}">
-        <p14:creationId xmlns:p14="http://schemas.microsoft.com/office/powerpoint/2010/main" val="3317551779"/>
-      </p:ext>
-    </p:extLst>
-  </p:cSld>
-  <p:clrMapOvr>
-    <a:masterClrMapping/>
-  </p:clrMapOvr>
-</p:sld>
-</file>
-
-<file path=ppt/slides/slide12.xml><?xml version="1.0" encoding="utf-8"?>
-<p:sld xmlns:a="http://schemas.openxmlformats.org/drawingml/2006/main" xmlns:r="http://schemas.openxmlformats.org/officeDocument/2006/relationships" xmlns:p="http://schemas.openxmlformats.org/presentationml/2006/main">
-  <p:cSld>
-    <p:spTree>
-      <p:nvGrpSpPr>
-        <p:cNvPr id="1" name=""/>
-        <p:cNvGrpSpPr/>
-        <p:nvPr/>
-      </p:nvGrpSpPr>
-      <p:grpSpPr>
-        <a:xfrm>
-          <a:off x="0" y="0"/>
-          <a:ext cx="0" cy="0"/>
-          <a:chOff x="0" y="0"/>
-          <a:chExt cx="0" cy="0"/>
-        </a:xfrm>
-      </p:grpSpPr>
       <p:pic>
         <p:nvPicPr>
           <p:cNvPr id="7" name="Picture 6"/>
@@ -3546,7 +3173,7 @@
 </p:sld>
 </file>
 
-<file path=ppt/slides/slide13.xml><?xml version="1.0" encoding="utf-8"?>
+<file path=ppt/slides/slide11.xml><?xml version="1.0" encoding="utf-8"?>
 <p:sld xmlns:a="http://schemas.openxmlformats.org/drawingml/2006/main" xmlns:r="http://schemas.openxmlformats.org/officeDocument/2006/relationships" xmlns:p="http://schemas.openxmlformats.org/presentationml/2006/main">
   <p:cSld>
     <p:spTree>
@@ -3565,150 +3192,7 @@
       </p:grpSpPr>
       <p:pic>
         <p:nvPicPr>
-          <p:cNvPr id="4" name="Content Placeholder 3"/>
-          <p:cNvPicPr>
-            <a:picLocks noGrp="1" noChangeAspect="1"/>
-          </p:cNvPicPr>
-          <p:nvPr>
-            <p:ph idx="1"/>
-          </p:nvPr>
-        </p:nvPicPr>
-        <p:blipFill>
-          <a:blip r:embed="rId2">
-            <a:extLst>
-              <a:ext uri="{28A0092B-C50C-407E-A947-70E740481C1C}">
-                <a14:useLocalDpi xmlns:a14="http://schemas.microsoft.com/office/drawing/2010/main" val="0"/>
-              </a:ext>
-            </a:extLst>
-          </a:blip>
-          <a:stretch>
-            <a:fillRect/>
-          </a:stretch>
-        </p:blipFill>
-        <p:spPr>
-          <a:xfrm>
-            <a:off x="356152" y="320048"/>
-            <a:ext cx="11512295" cy="6281927"/>
-          </a:xfrm>
-        </p:spPr>
-      </p:pic>
-      <p:sp>
-        <p:nvSpPr>
-          <p:cNvPr id="6" name="Rectangle 5"/>
-          <p:cNvSpPr/>
-          <p:nvPr/>
-        </p:nvSpPr>
-        <p:spPr>
-          <a:xfrm>
-            <a:off x="5866124" y="6432698"/>
-            <a:ext cx="805029" cy="338554"/>
-          </a:xfrm>
-          <a:prstGeom prst="rect">
-            <a:avLst/>
-          </a:prstGeom>
-          <a:noFill/>
-        </p:spPr>
-        <p:txBody>
-          <a:bodyPr wrap="none">
-            <a:spAutoFit/>
-          </a:bodyPr>
-          <a:lstStyle/>
-          <a:p>
-            <a:r>
-              <a:rPr lang="en-US" sz="1600" dirty="0" smtClean="0"/>
-              <a:t>Models</a:t>
-            </a:r>
-            <a:endParaRPr lang="en-US" sz="1600" dirty="0"/>
-          </a:p>
-        </p:txBody>
-      </p:sp>
-      <p:sp>
-        <p:nvSpPr>
-          <p:cNvPr id="7" name="Rectangle 6"/>
-          <p:cNvSpPr/>
-          <p:nvPr/>
-        </p:nvSpPr>
-        <p:spPr>
-          <a:xfrm rot="16200000">
-            <a:off x="-479173" y="3291734"/>
-            <a:ext cx="1332096" cy="338554"/>
-          </a:xfrm>
-          <a:prstGeom prst="rect">
-            <a:avLst/>
-          </a:prstGeom>
-          <a:noFill/>
-        </p:spPr>
-        <p:txBody>
-          <a:bodyPr wrap="none">
-            <a:spAutoFit/>
-          </a:bodyPr>
-          <a:lstStyle/>
-          <a:p>
-            <a:r>
-              <a:rPr lang="en-US" sz="1600" dirty="0" smtClean="0"/>
-              <a:t>Runtime (sec)</a:t>
-            </a:r>
-            <a:endParaRPr lang="en-US" sz="1600" dirty="0"/>
-          </a:p>
-        </p:txBody>
-      </p:sp>
-      <p:pic>
-        <p:nvPicPr>
-          <p:cNvPr id="8" name="Picture 7"/>
-          <p:cNvPicPr>
-            <a:picLocks noChangeAspect="1"/>
-          </p:cNvPicPr>
-          <p:nvPr/>
-        </p:nvPicPr>
-        <p:blipFill>
-          <a:blip r:embed="rId3"/>
-          <a:stretch>
-            <a:fillRect/>
-          </a:stretch>
-        </p:blipFill>
-        <p:spPr>
-          <a:xfrm>
-            <a:off x="870428" y="583501"/>
-            <a:ext cx="5800725" cy="1685925"/>
-          </a:xfrm>
-          <a:prstGeom prst="rect">
-            <a:avLst/>
-          </a:prstGeom>
-        </p:spPr>
-      </p:pic>
-    </p:spTree>
-    <p:extLst>
-      <p:ext uri="{BB962C8B-B14F-4D97-AF65-F5344CB8AC3E}">
-        <p14:creationId xmlns:p14="http://schemas.microsoft.com/office/powerpoint/2010/main" val="2899966833"/>
-      </p:ext>
-    </p:extLst>
-  </p:cSld>
-  <p:clrMapOvr>
-    <a:masterClrMapping/>
-  </p:clrMapOvr>
-</p:sld>
-</file>
-
-<file path=ppt/slides/slide14.xml><?xml version="1.0" encoding="utf-8"?>
-<p:sld xmlns:a="http://schemas.openxmlformats.org/drawingml/2006/main" xmlns:r="http://schemas.openxmlformats.org/officeDocument/2006/relationships" xmlns:p="http://schemas.openxmlformats.org/presentationml/2006/main">
-  <p:cSld>
-    <p:spTree>
-      <p:nvGrpSpPr>
-        <p:cNvPr id="1" name=""/>
-        <p:cNvGrpSpPr/>
-        <p:nvPr/>
-      </p:nvGrpSpPr>
-      <p:grpSpPr>
-        <a:xfrm>
-          <a:off x="0" y="0"/>
-          <a:ext cx="0" cy="0"/>
-          <a:chOff x="0" y="0"/>
-          <a:chExt cx="0" cy="0"/>
-        </a:xfrm>
-      </p:grpSpPr>
-      <p:pic>
-        <p:nvPicPr>
-          <p:cNvPr id="4" name="Picture 3"/>
+          <p:cNvPr id="6" name="Picture 5"/>
           <p:cNvPicPr>
             <a:picLocks noChangeAspect="1"/>
           </p:cNvPicPr>
@@ -3728,164 +3212,14 @@
         </p:blipFill>
         <p:spPr>
           <a:xfrm>
-            <a:off x="510040" y="510845"/>
-            <a:ext cx="11137414" cy="6062484"/>
+            <a:off x="525429" y="202123"/>
+            <a:ext cx="10898910" cy="6296336"/>
           </a:xfrm>
           <a:prstGeom prst="rect">
             <a:avLst/>
           </a:prstGeom>
         </p:spPr>
       </p:pic>
-      <p:pic>
-        <p:nvPicPr>
-          <p:cNvPr id="5" name="Picture 4"/>
-          <p:cNvPicPr>
-            <a:picLocks noChangeAspect="1"/>
-          </p:cNvPicPr>
-          <p:nvPr/>
-        </p:nvPicPr>
-        <p:blipFill>
-          <a:blip r:embed="rId3"/>
-          <a:stretch>
-            <a:fillRect/>
-          </a:stretch>
-        </p:blipFill>
-        <p:spPr>
-          <a:xfrm>
-            <a:off x="969645" y="672274"/>
-            <a:ext cx="6229350" cy="1819275"/>
-          </a:xfrm>
-          <a:prstGeom prst="rect">
-            <a:avLst/>
-          </a:prstGeom>
-        </p:spPr>
-      </p:pic>
-      <p:sp>
-        <p:nvSpPr>
-          <p:cNvPr id="6" name="Rectangle 5"/>
-          <p:cNvSpPr/>
-          <p:nvPr/>
-        </p:nvSpPr>
-        <p:spPr>
-          <a:xfrm>
-            <a:off x="5866124" y="6432698"/>
-            <a:ext cx="805029" cy="338554"/>
-          </a:xfrm>
-          <a:prstGeom prst="rect">
-            <a:avLst/>
-          </a:prstGeom>
-          <a:noFill/>
-        </p:spPr>
-        <p:txBody>
-          <a:bodyPr wrap="none">
-            <a:spAutoFit/>
-          </a:bodyPr>
-          <a:lstStyle/>
-          <a:p>
-            <a:r>
-              <a:rPr lang="en-US" sz="1600" dirty="0" smtClean="0"/>
-              <a:t>Models</a:t>
-            </a:r>
-            <a:endParaRPr lang="en-US" sz="1600" dirty="0"/>
-          </a:p>
-        </p:txBody>
-      </p:sp>
-      <p:sp>
-        <p:nvSpPr>
-          <p:cNvPr id="7" name="Rectangle 6"/>
-          <p:cNvSpPr/>
-          <p:nvPr/>
-        </p:nvSpPr>
-        <p:spPr>
-          <a:xfrm rot="16200000">
-            <a:off x="-309896" y="3372810"/>
-            <a:ext cx="1332096" cy="338554"/>
-          </a:xfrm>
-          <a:prstGeom prst="rect">
-            <a:avLst/>
-          </a:prstGeom>
-          <a:noFill/>
-        </p:spPr>
-        <p:txBody>
-          <a:bodyPr wrap="none">
-            <a:spAutoFit/>
-          </a:bodyPr>
-          <a:lstStyle/>
-          <a:p>
-            <a:r>
-              <a:rPr lang="en-US" sz="1600" dirty="0" smtClean="0"/>
-              <a:t>Runtime (sec)</a:t>
-            </a:r>
-            <a:endParaRPr lang="en-US" sz="1600" dirty="0"/>
-          </a:p>
-        </p:txBody>
-      </p:sp>
-    </p:spTree>
-    <p:extLst>
-      <p:ext uri="{BB962C8B-B14F-4D97-AF65-F5344CB8AC3E}">
-        <p14:creationId xmlns:p14="http://schemas.microsoft.com/office/powerpoint/2010/main" val="1028824182"/>
-      </p:ext>
-    </p:extLst>
-  </p:cSld>
-  <p:clrMapOvr>
-    <a:masterClrMapping/>
-  </p:clrMapOvr>
-  <p:timing>
-    <p:tnLst>
-      <p:par>
-        <p:cTn id="1" dur="indefinite" restart="never" nodeType="tmRoot"/>
-      </p:par>
-    </p:tnLst>
-  </p:timing>
-</p:sld>
-</file>
-
-<file path=ppt/slides/slide15.xml><?xml version="1.0" encoding="utf-8"?>
-<p:sld xmlns:a="http://schemas.openxmlformats.org/drawingml/2006/main" xmlns:r="http://schemas.openxmlformats.org/officeDocument/2006/relationships" xmlns:p="http://schemas.openxmlformats.org/presentationml/2006/main">
-  <p:cSld>
-    <p:spTree>
-      <p:nvGrpSpPr>
-        <p:cNvPr id="1" name=""/>
-        <p:cNvGrpSpPr/>
-        <p:nvPr/>
-      </p:nvGrpSpPr>
-      <p:grpSpPr>
-        <a:xfrm>
-          <a:off x="0" y="0"/>
-          <a:ext cx="0" cy="0"/>
-          <a:chOff x="0" y="0"/>
-          <a:chExt cx="0" cy="0"/>
-        </a:xfrm>
-      </p:grpSpPr>
-      <p:pic>
-        <p:nvPicPr>
-          <p:cNvPr id="3" name="Picture 2"/>
-          <p:cNvPicPr>
-            <a:picLocks noChangeAspect="1"/>
-          </p:cNvPicPr>
-          <p:nvPr/>
-        </p:nvPicPr>
-        <p:blipFill rotWithShape="1">
-          <a:blip r:embed="rId2">
-            <a:extLst>
-              <a:ext uri="{28A0092B-C50C-407E-A947-70E740481C1C}">
-                <a14:useLocalDpi xmlns:a14="http://schemas.microsoft.com/office/drawing/2010/main" val="0"/>
-              </a:ext>
-            </a:extLst>
-          </a:blip>
-          <a:srcRect l="2271" b="3142"/>
-          <a:stretch/>
-        </p:blipFill>
-        <p:spPr>
-          <a:xfrm>
-            <a:off x="480368" y="279955"/>
-            <a:ext cx="11227535" cy="6218504"/>
-          </a:xfrm>
-          <a:prstGeom prst="rect">
-            <a:avLst/>
-          </a:prstGeom>
-        </p:spPr>
-      </p:pic>
       <p:sp>
         <p:nvSpPr>
           <p:cNvPr id="5" name="Rectangle 4"/>
@@ -3894,7 +3228,7 @@
         </p:nvSpPr>
         <p:spPr>
           <a:xfrm rot="16200000">
-            <a:off x="-309896" y="3372810"/>
+            <a:off x="-309896" y="3049537"/>
             <a:ext cx="1332096" cy="338554"/>
           </a:xfrm>
           <a:prstGeom prst="rect">
@@ -3962,7 +3296,7 @@
         </p:blipFill>
         <p:spPr>
           <a:xfrm>
-            <a:off x="1011092" y="493018"/>
+            <a:off x="1048038" y="331915"/>
             <a:ext cx="6337324" cy="2220851"/>
           </a:xfrm>
           <a:prstGeom prst="rect">
@@ -6372,14 +5706,7 @@
                 <a:latin typeface="Consolas" panose="020B0609020204030204" pitchFamily="49" charset="0"/>
                 <a:cs typeface="Courier New" panose="02070309020205020404" pitchFamily="49" charset="0"/>
               </a:rPr>
-              <a:t> </a:t>
-            </a:r>
-            <a:r>
-              <a:rPr lang="en-US" sz="1800" dirty="0">
-                <a:latin typeface="Consolas" panose="020B0609020204030204" pitchFamily="49" charset="0"/>
-                <a:cs typeface="Courier New" panose="02070309020205020404" pitchFamily="49" charset="0"/>
-              </a:rPr>
-              <a:t> </a:t>
+              <a:t>  </a:t>
             </a:r>
             <a:r>
               <a:rPr lang="en-US" sz="1800" dirty="0" smtClean="0">
@@ -6610,10 +5937,6 @@
               </a:rPr>
               <a:t> </a:t>
             </a:r>
-            <a:endParaRPr lang="en-US" sz="1800" dirty="0" smtClean="0">
-              <a:latin typeface="Consolas" panose="020B0609020204030204" pitchFamily="49" charset="0"/>
-              <a:cs typeface="Courier New" panose="02070309020205020404" pitchFamily="49" charset="0"/>
-            </a:endParaRPr>
           </a:p>
           <a:p>
             <a:pPr marL="0" indent="0">
@@ -11407,7 +10730,7 @@
       </p:grpSpPr>
       <p:pic>
         <p:nvPicPr>
-          <p:cNvPr id="9" name="Picture 8"/>
+          <p:cNvPr id="3" name="Picture 2"/>
           <p:cNvPicPr>
             <a:picLocks noChangeAspect="1"/>
           </p:cNvPicPr>
@@ -11421,13 +10744,13 @@
               </a:ext>
             </a:extLst>
           </a:blip>
-          <a:srcRect l="2114" t="-3601" r="1962" b="3601"/>
+          <a:srcRect b="515"/>
           <a:stretch/>
         </p:blipFill>
         <p:spPr>
           <a:xfrm>
-            <a:off x="1429976" y="722112"/>
-            <a:ext cx="9317483" cy="5427138"/>
+            <a:off x="543522" y="181282"/>
+            <a:ext cx="10853950" cy="6031259"/>
           </a:xfrm>
           <a:prstGeom prst="rect">
             <a:avLst/>
@@ -11450,7 +10773,7 @@
         </p:blipFill>
         <p:spPr>
           <a:xfrm>
-            <a:off x="1862279" y="985905"/>
+            <a:off x="1030774" y="310399"/>
             <a:ext cx="4383073" cy="1572459"/>
           </a:xfrm>
           <a:prstGeom prst="rect">
@@ -11467,7 +10790,7 @@
         </p:nvSpPr>
         <p:spPr>
           <a:xfrm rot="16200000">
-            <a:off x="10270389" y="3284236"/>
+            <a:off x="11025671" y="2907718"/>
             <a:ext cx="1082156" cy="338554"/>
           </a:xfrm>
           <a:prstGeom prst="rect">
@@ -11497,7 +10820,7 @@
         </p:nvSpPr>
         <p:spPr>
           <a:xfrm>
-            <a:off x="5940551" y="6074489"/>
+            <a:off x="5842837" y="6128277"/>
             <a:ext cx="805029" cy="338554"/>
           </a:xfrm>
           <a:prstGeom prst="rect">
@@ -11527,7 +10850,7 @@
         </p:nvSpPr>
         <p:spPr>
           <a:xfrm rot="16200000">
-            <a:off x="594651" y="3409206"/>
+            <a:off x="-122526" y="3212524"/>
             <a:ext cx="1332096" cy="338554"/>
           </a:xfrm>
           <a:prstGeom prst="rect">
@@ -11557,8 +10880,8 @@
         </p:nvSpPr>
         <p:spPr>
           <a:xfrm>
-            <a:off x="2851375" y="2137148"/>
-            <a:ext cx="741872" cy="338554"/>
+            <a:off x="1981799" y="1502172"/>
+            <a:ext cx="741872" cy="330860"/>
           </a:xfrm>
           <a:prstGeom prst="rect">
             <a:avLst/>
@@ -11574,62 +10897,21 @@
           <a:lstStyle/>
           <a:p>
             <a:r>
-              <a:rPr lang="en-US" sz="1600" b="1" dirty="0" smtClean="0">
+              <a:rPr lang="en-US" sz="1550" b="1" dirty="0" smtClean="0">
                 <a:solidFill>
-                  <a:schemeClr val="bg2">
-                    <a:lumMod val="25000"/>
-                  </a:schemeClr>
+                  <a:srgbClr val="2C2C2C"/>
                 </a:solidFill>
               </a:rPr>
               <a:t>MIVCs</a:t>
             </a:r>
-            <a:endParaRPr lang="en-US" sz="1600" b="1" dirty="0">
+            <a:endParaRPr lang="en-US" sz="1550" b="1" dirty="0">
               <a:solidFill>
-                <a:schemeClr val="bg2">
-                  <a:lumMod val="25000"/>
-                </a:schemeClr>
+                <a:srgbClr val="2C2C2C"/>
               </a:solidFill>
             </a:endParaRPr>
           </a:p>
         </p:txBody>
       </p:sp>
-      <p:cxnSp>
-        <p:nvCxnSpPr>
-          <p:cNvPr id="4" name="Straight Connector 3"/>
-          <p:cNvCxnSpPr/>
-          <p:nvPr/>
-        </p:nvCxnSpPr>
-        <p:spPr>
-          <a:xfrm flipH="1">
-            <a:off x="1881859" y="2912435"/>
-            <a:ext cx="4058692" cy="0"/>
-          </a:xfrm>
-          <a:prstGeom prst="line">
-            <a:avLst/>
-          </a:prstGeom>
-          <a:ln w="12700">
-            <a:solidFill>
-              <a:schemeClr val="bg1">
-                <a:lumMod val="75000"/>
-              </a:schemeClr>
-            </a:solidFill>
-          </a:ln>
-        </p:spPr>
-        <p:style>
-          <a:lnRef idx="1">
-            <a:schemeClr val="accent1"/>
-          </a:lnRef>
-          <a:fillRef idx="0">
-            <a:schemeClr val="accent1"/>
-          </a:fillRef>
-          <a:effectRef idx="0">
-            <a:schemeClr val="accent1"/>
-          </a:effectRef>
-          <a:fontRef idx="minor">
-            <a:schemeClr val="tx1"/>
-          </a:fontRef>
-        </p:style>
-      </p:cxnSp>
     </p:spTree>
     <p:extLst>
       <p:ext uri="{BB962C8B-B14F-4D97-AF65-F5344CB8AC3E}">

</xml_diff>